<commit_message>
CV updated with solidity skills
</commit_message>
<xml_diff>
--- a/my_resume_v2.pptx
+++ b/my_resume_v2.pptx
@@ -7704,8 +7704,8 @@
         </p:nvSpPr>
         <p:spPr>
           <a:xfrm>
-            <a:off x="99921" y="4792680"/>
-            <a:ext cx="6657120" cy="1225657"/>
+            <a:off x="99921" y="4780095"/>
+            <a:ext cx="6657120" cy="1546257"/>
           </a:xfrm>
           <a:prstGeom prst="rect">
             <a:avLst/>
@@ -7821,38 +7821,43 @@
               <a:buChar char="•"/>
             </a:pPr>
             <a:r>
-              <a:rPr lang="en-IN" sz="900" dirty="0">
-                <a:solidFill>
-                  <a:schemeClr val="tx1">
-                    <a:lumMod val="75000"/>
-                    <a:lumOff val="25000"/>
-                  </a:schemeClr>
-                </a:solidFill>
-              </a:rPr>
-              <a:t>Extensive research into </a:t>
-            </a:r>
-            <a:r>
-              <a:rPr lang="en-IN" sz="900" dirty="0" err="1">
-                <a:solidFill>
-                  <a:schemeClr val="tx1">
-                    <a:lumMod val="75000"/>
-                    <a:lumOff val="25000"/>
-                  </a:schemeClr>
-                </a:solidFill>
-              </a:rPr>
-              <a:t>Steem</a:t>
-            </a:r>
-            <a:r>
-              <a:rPr lang="en-IN" sz="900" dirty="0">
-                <a:solidFill>
-                  <a:schemeClr val="tx1">
-                    <a:lumMod val="75000"/>
-                    <a:lumOff val="25000"/>
-                  </a:schemeClr>
-                </a:solidFill>
-              </a:rPr>
-              <a:t> blockchain’s Tokenomics model &amp; deep dived into EOS blockchain codebase.</a:t>
-            </a:r>
+              <a:rPr lang="en-IN" sz="900" b="0" i="0" dirty="0">
+                <a:solidFill>
+                  <a:srgbClr val="374151"/>
+                </a:solidFill>
+                <a:effectLst/>
+                <a:latin typeface="Söhne"/>
+              </a:rPr>
+              <a:t>Researched and </a:t>
+            </a:r>
+            <a:r>
+              <a:rPr lang="en-IN" sz="900" b="0" i="0" dirty="0" err="1">
+                <a:solidFill>
+                  <a:srgbClr val="374151"/>
+                </a:solidFill>
+                <a:effectLst/>
+                <a:latin typeface="Söhne"/>
+              </a:rPr>
+              <a:t>analyzed</a:t>
+            </a:r>
+            <a:r>
+              <a:rPr lang="en-IN" sz="900" b="0" i="0" dirty="0">
+                <a:solidFill>
+                  <a:srgbClr val="374151"/>
+                </a:solidFill>
+                <a:effectLst/>
+                <a:latin typeface="Söhne"/>
+              </a:rPr>
+              <a:t> the EVM technology stack and early Solidity codebase to write simple contracts.</a:t>
+            </a:r>
+            <a:endParaRPr lang="en-IN" sz="900" dirty="0">
+              <a:solidFill>
+                <a:schemeClr val="tx1">
+                  <a:lumMod val="75000"/>
+                  <a:lumOff val="25000"/>
+                </a:schemeClr>
+              </a:solidFill>
+            </a:endParaRPr>
           </a:p>
           <a:p>
             <a:pPr marL="171450" indent="-171450">
@@ -7866,34 +7871,37 @@
               <a:buChar char="•"/>
             </a:pPr>
             <a:r>
-              <a:rPr lang="en-IN" sz="900" b="0" i="0" dirty="0">
-                <a:solidFill>
-                  <a:srgbClr val="374151"/>
-                </a:solidFill>
-                <a:effectLst/>
-                <a:latin typeface="Söhne"/>
-              </a:rPr>
-              <a:t>Recognized as a leading technical content creator for the Utopian developer community on the </a:t>
-            </a:r>
-            <a:r>
-              <a:rPr lang="en-IN" sz="900" b="0" i="0" dirty="0" err="1">
-                <a:solidFill>
-                  <a:srgbClr val="374151"/>
-                </a:solidFill>
-                <a:effectLst/>
-                <a:latin typeface="Söhne"/>
+              <a:rPr lang="en-IN" sz="900" dirty="0">
+                <a:solidFill>
+                  <a:schemeClr val="tx1">
+                    <a:lumMod val="75000"/>
+                    <a:lumOff val="25000"/>
+                  </a:schemeClr>
+                </a:solidFill>
+              </a:rPr>
+              <a:t>Extensive research into </a:t>
+            </a:r>
+            <a:r>
+              <a:rPr lang="en-IN" sz="900" dirty="0" err="1">
+                <a:solidFill>
+                  <a:schemeClr val="tx1">
+                    <a:lumMod val="75000"/>
+                    <a:lumOff val="25000"/>
+                  </a:schemeClr>
+                </a:solidFill>
               </a:rPr>
               <a:t>Steem</a:t>
             </a:r>
             <a:r>
-              <a:rPr lang="en-IN" sz="900" b="0" i="0" dirty="0">
-                <a:solidFill>
-                  <a:srgbClr val="374151"/>
-                </a:solidFill>
-                <a:effectLst/>
-                <a:latin typeface="Söhne"/>
-              </a:rPr>
-              <a:t> Blockchain; also researched their consensus algorithm – ‘Proof of Brain’.</a:t>
+              <a:rPr lang="en-IN" sz="900" dirty="0">
+                <a:solidFill>
+                  <a:schemeClr val="tx1">
+                    <a:lumMod val="75000"/>
+                    <a:lumOff val="25000"/>
+                  </a:schemeClr>
+                </a:solidFill>
+              </a:rPr>
+              <a:t> blockchain’s Tokenomics model &amp; deep dived into EOS blockchain codebase. Wrote several contracts using C++; also written test scripts; deployment using CLI.</a:t>
             </a:r>
           </a:p>
           <a:p>
@@ -7908,6 +7916,48 @@
               <a:buChar char="•"/>
             </a:pPr>
             <a:r>
+              <a:rPr lang="en-IN" sz="900" b="0" i="0" dirty="0">
+                <a:solidFill>
+                  <a:srgbClr val="374151"/>
+                </a:solidFill>
+                <a:effectLst/>
+                <a:latin typeface="Söhne"/>
+              </a:rPr>
+              <a:t>Recognized as a leading technical content creator for the Utopian developer community on the </a:t>
+            </a:r>
+            <a:r>
+              <a:rPr lang="en-IN" sz="900" b="0" i="0" dirty="0" err="1">
+                <a:solidFill>
+                  <a:srgbClr val="374151"/>
+                </a:solidFill>
+                <a:effectLst/>
+                <a:latin typeface="Söhne"/>
+              </a:rPr>
+              <a:t>Steem</a:t>
+            </a:r>
+            <a:r>
+              <a:rPr lang="en-IN" sz="900" b="0" i="0" dirty="0">
+                <a:solidFill>
+                  <a:srgbClr val="374151"/>
+                </a:solidFill>
+                <a:effectLst/>
+                <a:latin typeface="Söhne"/>
+              </a:rPr>
+              <a:t> Blockchain; also researched their consensus algorithm – ‘Proof of Brain’.</a:t>
+            </a:r>
+          </a:p>
+          <a:p>
+            <a:pPr marL="171450" indent="-171450">
+              <a:lnSpc>
+                <a:spcPts val="1238"/>
+              </a:lnSpc>
+              <a:spcAft>
+                <a:spcPts val="125"/>
+              </a:spcAft>
+              <a:buFont typeface="Arial" panose="020B0604020202020204" pitchFamily="34" charset="0"/>
+              <a:buChar char="•"/>
+            </a:pPr>
+            <a:r>
               <a:rPr lang="en-IN" sz="900" dirty="0">
                 <a:solidFill>
                   <a:schemeClr val="tx1">
@@ -7943,7 +7993,7 @@
         </p:nvSpPr>
         <p:spPr>
           <a:xfrm>
-            <a:off x="99921" y="3756496"/>
+            <a:off x="99921" y="3747787"/>
             <a:ext cx="6657120" cy="1007648"/>
           </a:xfrm>
           <a:prstGeom prst="rect">

</xml_diff>

<commit_message>
CV updated w reordering of skills
</commit_message>
<xml_diff>
--- a/my_resume_v2.pptx
+++ b/my_resume_v2.pptx
@@ -198,7 +198,7 @@
           <a:p>
             <a:fld id="{060BEAD1-672E-E841-95FA-08B9B35A46D7}" type="datetimeFigureOut">
               <a:rPr lang="en-US" smtClean="0"/>
-              <a:t>6/15/23</a:t>
+              <a:t>6/27/23</a:t>
             </a:fld>
             <a:endParaRPr lang="en-US"/>
           </a:p>
@@ -765,7 +765,7 @@
           <a:p>
             <a:fld id="{A417C049-F611-094D-8104-5764D8D04213}" type="datetimeFigureOut">
               <a:rPr lang="en-US" smtClean="0"/>
-              <a:t>6/15/23</a:t>
+              <a:t>6/27/23</a:t>
             </a:fld>
             <a:endParaRPr lang="en-US"/>
           </a:p>
@@ -935,7 +935,7 @@
           <a:p>
             <a:fld id="{A417C049-F611-094D-8104-5764D8D04213}" type="datetimeFigureOut">
               <a:rPr lang="en-US" smtClean="0"/>
-              <a:t>6/15/23</a:t>
+              <a:t>6/27/23</a:t>
             </a:fld>
             <a:endParaRPr lang="en-US"/>
           </a:p>
@@ -1115,7 +1115,7 @@
           <a:p>
             <a:fld id="{A417C049-F611-094D-8104-5764D8D04213}" type="datetimeFigureOut">
               <a:rPr lang="en-US" smtClean="0"/>
-              <a:t>6/15/23</a:t>
+              <a:t>6/27/23</a:t>
             </a:fld>
             <a:endParaRPr lang="en-US"/>
           </a:p>
@@ -1285,7 +1285,7 @@
           <a:p>
             <a:fld id="{A417C049-F611-094D-8104-5764D8D04213}" type="datetimeFigureOut">
               <a:rPr lang="en-US" smtClean="0"/>
-              <a:t>6/15/23</a:t>
+              <a:t>6/27/23</a:t>
             </a:fld>
             <a:endParaRPr lang="en-US"/>
           </a:p>
@@ -1529,7 +1529,7 @@
           <a:p>
             <a:fld id="{A417C049-F611-094D-8104-5764D8D04213}" type="datetimeFigureOut">
               <a:rPr lang="en-US" smtClean="0"/>
-              <a:t>6/15/23</a:t>
+              <a:t>6/27/23</a:t>
             </a:fld>
             <a:endParaRPr lang="en-US"/>
           </a:p>
@@ -1761,7 +1761,7 @@
           <a:p>
             <a:fld id="{A417C049-F611-094D-8104-5764D8D04213}" type="datetimeFigureOut">
               <a:rPr lang="en-US" smtClean="0"/>
-              <a:t>6/15/23</a:t>
+              <a:t>6/27/23</a:t>
             </a:fld>
             <a:endParaRPr lang="en-US"/>
           </a:p>
@@ -2128,7 +2128,7 @@
           <a:p>
             <a:fld id="{A417C049-F611-094D-8104-5764D8D04213}" type="datetimeFigureOut">
               <a:rPr lang="en-US" smtClean="0"/>
-              <a:t>6/15/23</a:t>
+              <a:t>6/27/23</a:t>
             </a:fld>
             <a:endParaRPr lang="en-US"/>
           </a:p>
@@ -2246,7 +2246,7 @@
           <a:p>
             <a:fld id="{A417C049-F611-094D-8104-5764D8D04213}" type="datetimeFigureOut">
               <a:rPr lang="en-US" smtClean="0"/>
-              <a:t>6/15/23</a:t>
+              <a:t>6/27/23</a:t>
             </a:fld>
             <a:endParaRPr lang="en-US"/>
           </a:p>
@@ -2341,7 +2341,7 @@
           <a:p>
             <a:fld id="{A417C049-F611-094D-8104-5764D8D04213}" type="datetimeFigureOut">
               <a:rPr lang="en-US" smtClean="0"/>
-              <a:t>6/15/23</a:t>
+              <a:t>6/27/23</a:t>
             </a:fld>
             <a:endParaRPr lang="en-US"/>
           </a:p>
@@ -2618,7 +2618,7 @@
           <a:p>
             <a:fld id="{A417C049-F611-094D-8104-5764D8D04213}" type="datetimeFigureOut">
               <a:rPr lang="en-US" smtClean="0"/>
-              <a:t>6/15/23</a:t>
+              <a:t>6/27/23</a:t>
             </a:fld>
             <a:endParaRPr lang="en-US"/>
           </a:p>
@@ -2875,7 +2875,7 @@
           <a:p>
             <a:fld id="{A417C049-F611-094D-8104-5764D8D04213}" type="datetimeFigureOut">
               <a:rPr lang="en-US" smtClean="0"/>
-              <a:t>6/15/23</a:t>
+              <a:t>6/27/23</a:t>
             </a:fld>
             <a:endParaRPr lang="en-US"/>
           </a:p>
@@ -3093,7 +3093,7 @@
           <a:p>
             <a:fld id="{A417C049-F611-094D-8104-5764D8D04213}" type="datetimeFigureOut">
               <a:rPr lang="en-US" smtClean="0"/>
-              <a:t>6/15/23</a:t>
+              <a:t>6/27/23</a:t>
             </a:fld>
             <a:endParaRPr lang="en-US"/>
           </a:p>
@@ -3512,8 +3512,8 @@
         </p:nvSpPr>
         <p:spPr>
           <a:xfrm>
-            <a:off x="88190" y="2515192"/>
-            <a:ext cx="6666468" cy="1866858"/>
+            <a:off x="88190" y="2479332"/>
+            <a:ext cx="6666468" cy="2020746"/>
           </a:xfrm>
           <a:prstGeom prst="rect">
             <a:avLst/>
@@ -3589,7 +3589,7 @@
                   </a:schemeClr>
                 </a:solidFill>
               </a:rPr>
-              <a:t>, Telos Blockchain, STFX, Substrate Runtime &amp; SC ink lang, Rustlings</a:t>
+              <a:t>, Telos Blockchain, STFX (Perpetual), Substrate Runtime &amp; SC ink lang, Rustlings</a:t>
             </a:r>
             <a:r>
               <a:rPr lang="en-IN" sz="900" dirty="0">
@@ -3656,7 +3656,40 @@
                   </a:schemeClr>
                 </a:solidFill>
               </a:rPr>
-              <a:t> using a multi-collateral CDP approach, incentivizing staking to prevent liquidation, informed by research into </a:t>
+              <a:t> (</a:t>
+            </a:r>
+            <a:r>
+              <a:rPr lang="en-IN" sz="900" dirty="0" err="1">
+                <a:solidFill>
+                  <a:schemeClr val="tx1">
+                    <a:lumMod val="75000"/>
+                    <a:lumOff val="25000"/>
+                  </a:schemeClr>
+                </a:solidFill>
+              </a:rPr>
+              <a:t>DeFi</a:t>
+            </a:r>
+            <a:r>
+              <a:rPr lang="en-IN" sz="900">
+                <a:solidFill>
+                  <a:schemeClr val="tx1">
+                    <a:lumMod val="75000"/>
+                    <a:lumOff val="25000"/>
+                  </a:schemeClr>
+                </a:solidFill>
+              </a:rPr>
+              <a:t>) using </a:t>
+            </a:r>
+            <a:r>
+              <a:rPr lang="en-IN" sz="900" dirty="0">
+                <a:solidFill>
+                  <a:schemeClr val="tx1">
+                    <a:lumMod val="75000"/>
+                    <a:lumOff val="25000"/>
+                  </a:schemeClr>
+                </a:solidFill>
+              </a:rPr>
+              <a:t>a multi-collateral CDP approach, incentivizing staking to prevent liquidation, informed by research into </a:t>
             </a:r>
             <a:r>
               <a:rPr lang="en-IN" sz="900" dirty="0" err="1">
@@ -5834,7 +5867,7 @@
         </p:nvGrpSpPr>
         <p:grpSpPr>
           <a:xfrm>
-            <a:off x="134191" y="4450013"/>
+            <a:off x="134191" y="4476908"/>
             <a:ext cx="1502200" cy="292388"/>
             <a:chOff x="4141297" y="2815491"/>
             <a:chExt cx="1502200" cy="292388"/>
@@ -5930,7 +5963,7 @@
         </p:nvSpPr>
         <p:spPr>
           <a:xfrm>
-            <a:off x="88190" y="8269508"/>
+            <a:off x="88190" y="8296403"/>
             <a:ext cx="6657120" cy="1494961"/>
           </a:xfrm>
           <a:prstGeom prst="rect">
@@ -6035,7 +6068,25 @@
                 </a:solidFill>
                 <a:effectLst/>
               </a:rPr>
-              <a:t>Architected a modular, upgradeable platform and smart contract system leveraging </a:t>
+              <a:t>Architected a modular, upgradeable </a:t>
+            </a:r>
+            <a:r>
+              <a:rPr lang="en-IN" sz="900" b="0" i="0" dirty="0" err="1">
+                <a:solidFill>
+                  <a:srgbClr val="374151"/>
+                </a:solidFill>
+                <a:effectLst/>
+              </a:rPr>
+              <a:t>DeFi</a:t>
+            </a:r>
+            <a:r>
+              <a:rPr lang="en-IN" sz="900" b="0" i="0" dirty="0">
+                <a:solidFill>
+                  <a:srgbClr val="374151"/>
+                </a:solidFill>
+                <a:effectLst/>
+              </a:rPr>
+              <a:t> platform and smart contract system leveraging </a:t>
             </a:r>
             <a:r>
               <a:rPr lang="en-IN" sz="900" b="0" i="0" u="sng" dirty="0">
@@ -6215,7 +6266,7 @@
                 </a:solidFill>
                 <a:effectLst/>
               </a:rPr>
-              <a:t>Collaboratively wrote and audited smart contracts, enhancing security, optimizing gas use, and minimizing contract size.</a:t>
+              <a:t>Collaboratively wrote and audited solidity smart contracts, enhancing security, optimizing gas use, and minimizing contract size.</a:t>
             </a:r>
           </a:p>
         </p:txBody>
@@ -6234,7 +6285,7 @@
         </p:nvSpPr>
         <p:spPr>
           <a:xfrm>
-            <a:off x="88190" y="6704195"/>
+            <a:off x="88190" y="6731090"/>
             <a:ext cx="6657120" cy="1546257"/>
           </a:xfrm>
           <a:prstGeom prst="rect">
@@ -6388,7 +6439,7 @@
                 </a:solidFill>
                 <a:effectLst/>
               </a:rPr>
-              <a:t> on Token, Vesting, Staking smart contracts for clients including </a:t>
+              <a:t> on Token, Vesting, Staking Solidity smart contracts for clients including </a:t>
             </a:r>
             <a:r>
               <a:rPr lang="en-IN" sz="900" b="0" i="0" dirty="0" err="1">
@@ -6465,7 +6516,29 @@
                   </a:schemeClr>
                 </a:solidFill>
               </a:rPr>
-              <a:t>Designed AMM &amp; Developed smart contracts for DEX - “</a:t>
+              <a:t>Designed AMM &amp; Developed smart contracts for </a:t>
+            </a:r>
+            <a:r>
+              <a:rPr lang="en-IN" sz="900" dirty="0" err="1">
+                <a:solidFill>
+                  <a:schemeClr val="tx1">
+                    <a:lumMod val="75000"/>
+                    <a:lumOff val="25000"/>
+                  </a:schemeClr>
+                </a:solidFill>
+              </a:rPr>
+              <a:t>DeFi</a:t>
+            </a:r>
+            <a:r>
+              <a:rPr lang="en-IN" sz="900" dirty="0">
+                <a:solidFill>
+                  <a:schemeClr val="tx1">
+                    <a:lumMod val="75000"/>
+                    <a:lumOff val="25000"/>
+                  </a:schemeClr>
+                </a:solidFill>
+              </a:rPr>
+              <a:t> DEX - “</a:t>
             </a:r>
             <a:r>
               <a:rPr lang="en-IN" sz="900" dirty="0" err="1">
@@ -6674,7 +6747,7 @@
         </p:nvSpPr>
         <p:spPr>
           <a:xfrm>
-            <a:off x="88190" y="5188785"/>
+            <a:off x="88190" y="5215680"/>
             <a:ext cx="6657120" cy="1494961"/>
           </a:xfrm>
           <a:prstGeom prst="rect">
@@ -6803,7 +6876,51 @@
                   </a:schemeClr>
                 </a:solidFill>
               </a:rPr>
-              <a:t> for Fuel Blockchain.</a:t>
+              <a:t> for Fuel Blockchain using </a:t>
+            </a:r>
+            <a:r>
+              <a:rPr lang="en-IN" sz="900" dirty="0" err="1">
+                <a:solidFill>
+                  <a:schemeClr val="tx1">
+                    <a:lumMod val="75000"/>
+                    <a:lumOff val="25000"/>
+                  </a:schemeClr>
+                </a:solidFill>
+              </a:rPr>
+              <a:t>Circom</a:t>
+            </a:r>
+            <a:r>
+              <a:rPr lang="en-IN" sz="900" dirty="0">
+                <a:solidFill>
+                  <a:schemeClr val="tx1">
+                    <a:lumMod val="75000"/>
+                    <a:lumOff val="25000"/>
+                  </a:schemeClr>
+                </a:solidFill>
+              </a:rPr>
+              <a:t>, Rust, Cairo (</a:t>
+            </a:r>
+            <a:r>
+              <a:rPr lang="en-IN" sz="900" dirty="0" err="1">
+                <a:solidFill>
+                  <a:schemeClr val="tx1">
+                    <a:lumMod val="75000"/>
+                    <a:lumOff val="25000"/>
+                  </a:schemeClr>
+                </a:solidFill>
+              </a:rPr>
+              <a:t>zkSTARK</a:t>
+            </a:r>
+            <a:r>
+              <a:rPr lang="en-IN" sz="900" dirty="0">
+                <a:solidFill>
+                  <a:schemeClr val="tx1">
+                    <a:lumMod val="75000"/>
+                    <a:lumOff val="25000"/>
+                  </a:schemeClr>
+                </a:solidFill>
+              </a:rPr>
+              <a:t>).</a:t>
             </a:r>
           </a:p>
           <a:p>
@@ -7133,7 +7250,7 @@
         </p:nvSpPr>
         <p:spPr>
           <a:xfrm>
-            <a:off x="88190" y="4755230"/>
+            <a:off x="88190" y="4782125"/>
             <a:ext cx="6657120" cy="417743"/>
           </a:xfrm>
           <a:prstGeom prst="rect">
@@ -7210,7 +7327,7 @@
                   </a:schemeClr>
                 </a:solidFill>
               </a:rPr>
-              <a:t>Upskilling with Rust based Blockchains – Substrate, Solana, etc.; </a:t>
+              <a:t>Upskilling with Rust based Blockchains – Substrate, Solana, Near, etc.; </a:t>
             </a:r>
             <a:r>
               <a:rPr lang="en-US" sz="900" dirty="0" err="1">
@@ -7251,7 +7368,7 @@
         </p:nvGrpSpPr>
         <p:grpSpPr>
           <a:xfrm>
-            <a:off x="103342" y="2296446"/>
+            <a:off x="103342" y="2260586"/>
             <a:ext cx="2552737" cy="292388"/>
             <a:chOff x="183939" y="4975856"/>
             <a:chExt cx="2552737" cy="292388"/>
@@ -7345,7 +7462,7 @@
         </p:nvCxnSpPr>
         <p:spPr>
           <a:xfrm>
-            <a:off x="0" y="4389113"/>
+            <a:off x="0" y="4482279"/>
             <a:ext cx="6858000" cy="0"/>
           </a:xfrm>
           <a:prstGeom prst="line">
@@ -7527,7 +7644,7 @@
                   </a:schemeClr>
                 </a:solidFill>
               </a:rPr>
-              <a:t>Rust, Solidity, C++, JavaScript, TypeScript, Python, Java, XML, Markdown</a:t>
+              <a:t>Solidity, Rust, C++, Python, JavaScript, TypeScript, Java, XML, Markdown</a:t>
             </a:r>
           </a:p>
         </p:txBody>
@@ -8034,7 +8151,7 @@
                   <a:srgbClr val="374151"/>
                 </a:solidFill>
               </a:rPr>
-              <a:t>Developed ride-sharing smart contracts for EOSIO blockchains.</a:t>
+              <a:t>Developed ride-sharing smart contracts for EOSIO blockchains using C++.</a:t>
             </a:r>
           </a:p>
           <a:p>
@@ -8328,7 +8445,7 @@
                   </a:schemeClr>
                 </a:solidFill>
               </a:rPr>
-              <a:t>(Betting game with RNG Oracle), Tipping, ICO (single/multi phases), Staking, Vault using C/C++, JS/TS.</a:t>
+              <a:t>(Betting game with RNG Oracle), Tipping, ICO (single/multi phases), Staking, Vault using C/C++, JavaScript/TypeScript.</a:t>
             </a:r>
           </a:p>
           <a:p>
@@ -8432,7 +8549,7 @@
                 <a:effectLst/>
                 <a:latin typeface="Söhne"/>
               </a:rPr>
-              <a:t> for comprehensive analytics based on parsed Excel data.</a:t>
+              <a:t> for comprehensive analytics based on parsed Excel data; using python language.</a:t>
             </a:r>
           </a:p>
           <a:p>

</xml_diff>

<commit_message>
CV updated with Aptos/Sui skills
</commit_message>
<xml_diff>
--- a/my_resume_v2.pptx
+++ b/my_resume_v2.pptx
@@ -198,7 +198,7 @@
           <a:p>
             <a:fld id="{060BEAD1-672E-E841-95FA-08B9B35A46D7}" type="datetimeFigureOut">
               <a:rPr lang="en-US" smtClean="0"/>
-              <a:t>6/27/23</a:t>
+              <a:t>7/5/23</a:t>
             </a:fld>
             <a:endParaRPr lang="en-US"/>
           </a:p>
@@ -765,7 +765,7 @@
           <a:p>
             <a:fld id="{A417C049-F611-094D-8104-5764D8D04213}" type="datetimeFigureOut">
               <a:rPr lang="en-US" smtClean="0"/>
-              <a:t>6/27/23</a:t>
+              <a:t>7/5/23</a:t>
             </a:fld>
             <a:endParaRPr lang="en-US"/>
           </a:p>
@@ -935,7 +935,7 @@
           <a:p>
             <a:fld id="{A417C049-F611-094D-8104-5764D8D04213}" type="datetimeFigureOut">
               <a:rPr lang="en-US" smtClean="0"/>
-              <a:t>6/27/23</a:t>
+              <a:t>7/5/23</a:t>
             </a:fld>
             <a:endParaRPr lang="en-US"/>
           </a:p>
@@ -1115,7 +1115,7 @@
           <a:p>
             <a:fld id="{A417C049-F611-094D-8104-5764D8D04213}" type="datetimeFigureOut">
               <a:rPr lang="en-US" smtClean="0"/>
-              <a:t>6/27/23</a:t>
+              <a:t>7/5/23</a:t>
             </a:fld>
             <a:endParaRPr lang="en-US"/>
           </a:p>
@@ -1285,7 +1285,7 @@
           <a:p>
             <a:fld id="{A417C049-F611-094D-8104-5764D8D04213}" type="datetimeFigureOut">
               <a:rPr lang="en-US" smtClean="0"/>
-              <a:t>6/27/23</a:t>
+              <a:t>7/5/23</a:t>
             </a:fld>
             <a:endParaRPr lang="en-US"/>
           </a:p>
@@ -1529,7 +1529,7 @@
           <a:p>
             <a:fld id="{A417C049-F611-094D-8104-5764D8D04213}" type="datetimeFigureOut">
               <a:rPr lang="en-US" smtClean="0"/>
-              <a:t>6/27/23</a:t>
+              <a:t>7/5/23</a:t>
             </a:fld>
             <a:endParaRPr lang="en-US"/>
           </a:p>
@@ -1761,7 +1761,7 @@
           <a:p>
             <a:fld id="{A417C049-F611-094D-8104-5764D8D04213}" type="datetimeFigureOut">
               <a:rPr lang="en-US" smtClean="0"/>
-              <a:t>6/27/23</a:t>
+              <a:t>7/5/23</a:t>
             </a:fld>
             <a:endParaRPr lang="en-US"/>
           </a:p>
@@ -2128,7 +2128,7 @@
           <a:p>
             <a:fld id="{A417C049-F611-094D-8104-5764D8D04213}" type="datetimeFigureOut">
               <a:rPr lang="en-US" smtClean="0"/>
-              <a:t>6/27/23</a:t>
+              <a:t>7/5/23</a:t>
             </a:fld>
             <a:endParaRPr lang="en-US"/>
           </a:p>
@@ -2246,7 +2246,7 @@
           <a:p>
             <a:fld id="{A417C049-F611-094D-8104-5764D8D04213}" type="datetimeFigureOut">
               <a:rPr lang="en-US" smtClean="0"/>
-              <a:t>6/27/23</a:t>
+              <a:t>7/5/23</a:t>
             </a:fld>
             <a:endParaRPr lang="en-US"/>
           </a:p>
@@ -2341,7 +2341,7 @@
           <a:p>
             <a:fld id="{A417C049-F611-094D-8104-5764D8D04213}" type="datetimeFigureOut">
               <a:rPr lang="en-US" smtClean="0"/>
-              <a:t>6/27/23</a:t>
+              <a:t>7/5/23</a:t>
             </a:fld>
             <a:endParaRPr lang="en-US"/>
           </a:p>
@@ -2618,7 +2618,7 @@
           <a:p>
             <a:fld id="{A417C049-F611-094D-8104-5764D8D04213}" type="datetimeFigureOut">
               <a:rPr lang="en-US" smtClean="0"/>
-              <a:t>6/27/23</a:t>
+              <a:t>7/5/23</a:t>
             </a:fld>
             <a:endParaRPr lang="en-US"/>
           </a:p>
@@ -2875,7 +2875,7 @@
           <a:p>
             <a:fld id="{A417C049-F611-094D-8104-5764D8D04213}" type="datetimeFigureOut">
               <a:rPr lang="en-US" smtClean="0"/>
-              <a:t>6/27/23</a:t>
+              <a:t>7/5/23</a:t>
             </a:fld>
             <a:endParaRPr lang="en-US"/>
           </a:p>
@@ -3093,7 +3093,7 @@
           <a:p>
             <a:fld id="{A417C049-F611-094D-8104-5764D8D04213}" type="datetimeFigureOut">
               <a:rPr lang="en-US" smtClean="0"/>
-              <a:t>6/27/23</a:t>
+              <a:t>7/5/23</a:t>
             </a:fld>
             <a:endParaRPr lang="en-US"/>
           </a:p>
@@ -5867,7 +5867,7 @@
         </p:nvGrpSpPr>
         <p:grpSpPr>
           <a:xfrm>
-            <a:off x="134191" y="4476908"/>
+            <a:off x="134191" y="4460130"/>
             <a:ext cx="1502200" cy="292388"/>
             <a:chOff x="4141297" y="2815491"/>
             <a:chExt cx="1502200" cy="292388"/>
@@ -5963,7 +5963,7 @@
         </p:nvSpPr>
         <p:spPr>
           <a:xfrm>
-            <a:off x="88190" y="8296403"/>
+            <a:off x="88190" y="8392993"/>
             <a:ext cx="6657120" cy="1494961"/>
           </a:xfrm>
           <a:prstGeom prst="rect">
@@ -6285,7 +6285,7 @@
         </p:nvSpPr>
         <p:spPr>
           <a:xfrm>
-            <a:off x="88190" y="6731090"/>
+            <a:off x="88190" y="6827680"/>
             <a:ext cx="6657120" cy="1546257"/>
           </a:xfrm>
           <a:prstGeom prst="rect">
@@ -6747,8 +6747,8 @@
         </p:nvSpPr>
         <p:spPr>
           <a:xfrm>
-            <a:off x="88190" y="5215680"/>
-            <a:ext cx="6657120" cy="1494961"/>
+            <a:off x="88190" y="5151436"/>
+            <a:ext cx="6657120" cy="1648849"/>
           </a:xfrm>
           <a:prstGeom prst="rect">
             <a:avLst/>
@@ -6940,6 +6940,48 @@
                   </a:schemeClr>
                 </a:solidFill>
               </a:rPr>
+              <a:t>R&amp;D on Cross-chain messaging protocols like Substrate XCMP, </a:t>
+            </a:r>
+            <a:r>
+              <a:rPr lang="en-IN" sz="900" dirty="0" err="1">
+                <a:solidFill>
+                  <a:schemeClr val="tx1">
+                    <a:lumMod val="75000"/>
+                    <a:lumOff val="25000"/>
+                  </a:schemeClr>
+                </a:solidFill>
+              </a:rPr>
+              <a:t>Axelar</a:t>
+            </a:r>
+            <a:r>
+              <a:rPr lang="en-IN" sz="900" dirty="0">
+                <a:solidFill>
+                  <a:schemeClr val="tx1">
+                    <a:lumMod val="75000"/>
+                    <a:lumOff val="25000"/>
+                  </a:schemeClr>
+                </a:solidFill>
+              </a:rPr>
+              <a:t> GMP to enable a web3 project support multi-chain.</a:t>
+            </a:r>
+          </a:p>
+          <a:p>
+            <a:pPr marL="171450" indent="-171450">
+              <a:lnSpc>
+                <a:spcPts val="1238"/>
+              </a:lnSpc>
+              <a:buFont typeface="Arial" panose="020B0604020202020204" pitchFamily="34" charset="0"/>
+              <a:buChar char="•"/>
+            </a:pPr>
+            <a:r>
+              <a:rPr lang="en-IN" sz="900" dirty="0">
+                <a:solidFill>
+                  <a:schemeClr val="tx1">
+                    <a:lumMod val="75000"/>
+                    <a:lumOff val="25000"/>
+                  </a:schemeClr>
+                </a:solidFill>
+              </a:rPr>
               <a:t>Have worked on </a:t>
             </a:r>
             <a:r>
@@ -7250,7 +7292,7 @@
         </p:nvSpPr>
         <p:spPr>
           <a:xfrm>
-            <a:off x="88190" y="4782125"/>
+            <a:off x="88190" y="4710935"/>
             <a:ext cx="6657120" cy="417743"/>
           </a:xfrm>
           <a:prstGeom prst="rect">
@@ -7327,7 +7369,7 @@
                   </a:schemeClr>
                 </a:solidFill>
               </a:rPr>
-              <a:t>Upskilling with Rust based Blockchains – Substrate, Solana, Near, etc.; </a:t>
+              <a:t>Upskilling with Rust based Blockchains – Substrate, Solana, Aptos/Sui, Near, etc.; </a:t>
             </a:r>
             <a:r>
               <a:rPr lang="en-US" sz="900" dirty="0" err="1">
@@ -7462,7 +7504,7 @@
         </p:nvCxnSpPr>
         <p:spPr>
           <a:xfrm>
-            <a:off x="0" y="4482279"/>
+            <a:off x="0" y="4440334"/>
             <a:ext cx="6858000" cy="0"/>
           </a:xfrm>
           <a:prstGeom prst="line">

</xml_diff>

<commit_message>
modified CV with Sui PR, hyperlinks
</commit_message>
<xml_diff>
--- a/my_resume_v2.pptx
+++ b/my_resume_v2.pptx
@@ -198,7 +198,7 @@
           <a:p>
             <a:fld id="{060BEAD1-672E-E841-95FA-08B9B35A46D7}" type="datetimeFigureOut">
               <a:rPr lang="en-US" smtClean="0"/>
-              <a:t>7/7/23</a:t>
+              <a:t>7/19/23</a:t>
             </a:fld>
             <a:endParaRPr lang="en-US"/>
           </a:p>
@@ -765,7 +765,7 @@
           <a:p>
             <a:fld id="{A417C049-F611-094D-8104-5764D8D04213}" type="datetimeFigureOut">
               <a:rPr lang="en-US" smtClean="0"/>
-              <a:t>7/7/23</a:t>
+              <a:t>7/19/23</a:t>
             </a:fld>
             <a:endParaRPr lang="en-US"/>
           </a:p>
@@ -935,7 +935,7 @@
           <a:p>
             <a:fld id="{A417C049-F611-094D-8104-5764D8D04213}" type="datetimeFigureOut">
               <a:rPr lang="en-US" smtClean="0"/>
-              <a:t>7/7/23</a:t>
+              <a:t>7/19/23</a:t>
             </a:fld>
             <a:endParaRPr lang="en-US"/>
           </a:p>
@@ -1115,7 +1115,7 @@
           <a:p>
             <a:fld id="{A417C049-F611-094D-8104-5764D8D04213}" type="datetimeFigureOut">
               <a:rPr lang="en-US" smtClean="0"/>
-              <a:t>7/7/23</a:t>
+              <a:t>7/19/23</a:t>
             </a:fld>
             <a:endParaRPr lang="en-US"/>
           </a:p>
@@ -1285,7 +1285,7 @@
           <a:p>
             <a:fld id="{A417C049-F611-094D-8104-5764D8D04213}" type="datetimeFigureOut">
               <a:rPr lang="en-US" smtClean="0"/>
-              <a:t>7/7/23</a:t>
+              <a:t>7/19/23</a:t>
             </a:fld>
             <a:endParaRPr lang="en-US"/>
           </a:p>
@@ -1529,7 +1529,7 @@
           <a:p>
             <a:fld id="{A417C049-F611-094D-8104-5764D8D04213}" type="datetimeFigureOut">
               <a:rPr lang="en-US" smtClean="0"/>
-              <a:t>7/7/23</a:t>
+              <a:t>7/19/23</a:t>
             </a:fld>
             <a:endParaRPr lang="en-US"/>
           </a:p>
@@ -1761,7 +1761,7 @@
           <a:p>
             <a:fld id="{A417C049-F611-094D-8104-5764D8D04213}" type="datetimeFigureOut">
               <a:rPr lang="en-US" smtClean="0"/>
-              <a:t>7/7/23</a:t>
+              <a:t>7/19/23</a:t>
             </a:fld>
             <a:endParaRPr lang="en-US"/>
           </a:p>
@@ -2128,7 +2128,7 @@
           <a:p>
             <a:fld id="{A417C049-F611-094D-8104-5764D8D04213}" type="datetimeFigureOut">
               <a:rPr lang="en-US" smtClean="0"/>
-              <a:t>7/7/23</a:t>
+              <a:t>7/19/23</a:t>
             </a:fld>
             <a:endParaRPr lang="en-US"/>
           </a:p>
@@ -2246,7 +2246,7 @@
           <a:p>
             <a:fld id="{A417C049-F611-094D-8104-5764D8D04213}" type="datetimeFigureOut">
               <a:rPr lang="en-US" smtClean="0"/>
-              <a:t>7/7/23</a:t>
+              <a:t>7/19/23</a:t>
             </a:fld>
             <a:endParaRPr lang="en-US"/>
           </a:p>
@@ -2341,7 +2341,7 @@
           <a:p>
             <a:fld id="{A417C049-F611-094D-8104-5764D8D04213}" type="datetimeFigureOut">
               <a:rPr lang="en-US" smtClean="0"/>
-              <a:t>7/7/23</a:t>
+              <a:t>7/19/23</a:t>
             </a:fld>
             <a:endParaRPr lang="en-US"/>
           </a:p>
@@ -2618,7 +2618,7 @@
           <a:p>
             <a:fld id="{A417C049-F611-094D-8104-5764D8D04213}" type="datetimeFigureOut">
               <a:rPr lang="en-US" smtClean="0"/>
-              <a:t>7/7/23</a:t>
+              <a:t>7/19/23</a:t>
             </a:fld>
             <a:endParaRPr lang="en-US"/>
           </a:p>
@@ -2875,7 +2875,7 @@
           <a:p>
             <a:fld id="{A417C049-F611-094D-8104-5764D8D04213}" type="datetimeFigureOut">
               <a:rPr lang="en-US" smtClean="0"/>
-              <a:t>7/7/23</a:t>
+              <a:t>7/19/23</a:t>
             </a:fld>
             <a:endParaRPr lang="en-US"/>
           </a:p>
@@ -3093,7 +3093,7 @@
           <a:p>
             <a:fld id="{A417C049-F611-094D-8104-5764D8D04213}" type="datetimeFigureOut">
               <a:rPr lang="en-US" smtClean="0"/>
-              <a:t>7/7/23</a:t>
+              <a:t>7/19/23</a:t>
             </a:fld>
             <a:endParaRPr lang="en-US"/>
           </a:p>
@@ -3548,17 +3548,6 @@
               <a:t>Contributed to Opensource projects: </a:t>
             </a:r>
             <a:r>
-              <a:rPr lang="en-IN" sz="900" u="sng" dirty="0" err="1">
-                <a:solidFill>
-                  <a:schemeClr val="tx1">
-                    <a:lumMod val="75000"/>
-                    <a:lumOff val="25000"/>
-                  </a:schemeClr>
-                </a:solidFill>
-              </a:rPr>
-              <a:t>Uniswap</a:t>
-            </a:r>
-            <a:r>
               <a:rPr lang="en-IN" sz="900" u="sng" dirty="0">
                 <a:solidFill>
                   <a:schemeClr val="tx1">
@@ -3566,17 +3555,42 @@
                     <a:lumOff val="25000"/>
                   </a:schemeClr>
                 </a:solidFill>
-              </a:rPr>
-              <a:t> v2, </a:t>
-            </a:r>
-            <a:r>
-              <a:rPr lang="en-IN" sz="900" u="sng" dirty="0" err="1">
-                <a:solidFill>
-                  <a:schemeClr val="tx1">
-                    <a:lumMod val="75000"/>
-                    <a:lumOff val="25000"/>
-                  </a:schemeClr>
-                </a:solidFill>
+                <a:hlinkClick r:id="rId3">
+                  <a:extLst>
+                    <a:ext uri="{A12FA001-AC4F-418D-AE19-62706E023703}">
+                      <ahyp:hlinkClr xmlns:ahyp="http://schemas.microsoft.com/office/drawing/2018/hyperlinkcolor" val="tx"/>
+                    </a:ext>
+                  </a:extLst>
+                </a:hlinkClick>
+              </a:rPr>
+              <a:t>Uniswap v2</a:t>
+            </a:r>
+            <a:r>
+              <a:rPr lang="en-IN" sz="900" u="sng" dirty="0">
+                <a:solidFill>
+                  <a:schemeClr val="tx1">
+                    <a:lumMod val="75000"/>
+                    <a:lumOff val="25000"/>
+                  </a:schemeClr>
+                </a:solidFill>
+              </a:rPr>
+              <a:t>, </a:t>
+            </a:r>
+            <a:r>
+              <a:rPr lang="en-IN" sz="900" u="sng" dirty="0">
+                <a:solidFill>
+                  <a:schemeClr val="tx1">
+                    <a:lumMod val="75000"/>
+                    <a:lumOff val="25000"/>
+                  </a:schemeClr>
+                </a:solidFill>
+                <a:hlinkClick r:id="rId4">
+                  <a:extLst>
+                    <a:ext uri="{A12FA001-AC4F-418D-AE19-62706E023703}">
+                      <ahyp:hlinkClr xmlns:ahyp="http://schemas.microsoft.com/office/drawing/2018/hyperlinkcolor" val="tx"/>
+                    </a:ext>
+                  </a:extLst>
+                </a:hlinkClick>
               </a:rPr>
               <a:t>OpenZeppelin</a:t>
             </a:r>
@@ -3589,10 +3603,144 @@
                   </a:schemeClr>
                 </a:solidFill>
               </a:rPr>
-              <a:t>, Telos Blockchain, STFX (Perpetual), Substrate Runtime &amp; SC ink lang, Rustlings</a:t>
-            </a:r>
-            <a:r>
-              <a:rPr lang="en-IN" sz="900" dirty="0">
+              <a:t>, </a:t>
+            </a:r>
+            <a:r>
+              <a:rPr lang="en-IN" sz="900" u="sng" dirty="0">
+                <a:solidFill>
+                  <a:schemeClr val="tx1">
+                    <a:lumMod val="75000"/>
+                    <a:lumOff val="25000"/>
+                  </a:schemeClr>
+                </a:solidFill>
+                <a:hlinkClick r:id="rId5">
+                  <a:extLst>
+                    <a:ext uri="{A12FA001-AC4F-418D-AE19-62706E023703}">
+                      <ahyp:hlinkClr xmlns:ahyp="http://schemas.microsoft.com/office/drawing/2018/hyperlinkcolor" val="tx"/>
+                    </a:ext>
+                  </a:extLst>
+                </a:hlinkClick>
+              </a:rPr>
+              <a:t>Telos Blockchain</a:t>
+            </a:r>
+            <a:r>
+              <a:rPr lang="en-IN" sz="900" u="sng" dirty="0">
+                <a:solidFill>
+                  <a:schemeClr val="tx1">
+                    <a:lumMod val="75000"/>
+                    <a:lumOff val="25000"/>
+                  </a:schemeClr>
+                </a:solidFill>
+              </a:rPr>
+              <a:t>, STFX (Perpetual), </a:t>
+            </a:r>
+            <a:r>
+              <a:rPr lang="en-IN" sz="900" u="sng" dirty="0">
+                <a:solidFill>
+                  <a:schemeClr val="tx1">
+                    <a:lumMod val="75000"/>
+                    <a:lumOff val="25000"/>
+                  </a:schemeClr>
+                </a:solidFill>
+                <a:hlinkClick r:id="rId6">
+                  <a:extLst>
+                    <a:ext uri="{A12FA001-AC4F-418D-AE19-62706E023703}">
+                      <ahyp:hlinkClr xmlns:ahyp="http://schemas.microsoft.com/office/drawing/2018/hyperlinkcolor" val="tx"/>
+                    </a:ext>
+                  </a:extLst>
+                </a:hlinkClick>
+              </a:rPr>
+              <a:t>Substrate Runtime</a:t>
+            </a:r>
+            <a:r>
+              <a:rPr lang="en-IN" sz="900" u="sng" dirty="0">
+                <a:solidFill>
+                  <a:schemeClr val="tx1">
+                    <a:lumMod val="75000"/>
+                    <a:lumOff val="25000"/>
+                  </a:schemeClr>
+                </a:solidFill>
+              </a:rPr>
+              <a:t> &amp; </a:t>
+            </a:r>
+            <a:r>
+              <a:rPr lang="en-IN" sz="900" u="sng" dirty="0">
+                <a:solidFill>
+                  <a:schemeClr val="tx1">
+                    <a:lumMod val="75000"/>
+                    <a:lumOff val="25000"/>
+                  </a:schemeClr>
+                </a:solidFill>
+                <a:hlinkClick r:id="rId7">
+                  <a:extLst>
+                    <a:ext uri="{A12FA001-AC4F-418D-AE19-62706E023703}">
+                      <ahyp:hlinkClr xmlns:ahyp="http://schemas.microsoft.com/office/drawing/2018/hyperlinkcolor" val="tx"/>
+                    </a:ext>
+                  </a:extLst>
+                </a:hlinkClick>
+              </a:rPr>
+              <a:t>SC ink lang</a:t>
+            </a:r>
+            <a:r>
+              <a:rPr lang="en-IN" sz="900" u="sng" dirty="0">
+                <a:solidFill>
+                  <a:schemeClr val="tx1">
+                    <a:lumMod val="75000"/>
+                    <a:lumOff val="25000"/>
+                  </a:schemeClr>
+                </a:solidFill>
+              </a:rPr>
+              <a:t>, </a:t>
+            </a:r>
+            <a:r>
+              <a:rPr lang="en-IN" sz="900" u="sng" dirty="0">
+                <a:solidFill>
+                  <a:schemeClr val="tx1">
+                    <a:lumMod val="75000"/>
+                    <a:lumOff val="25000"/>
+                  </a:schemeClr>
+                </a:solidFill>
+                <a:hlinkClick r:id="rId8">
+                  <a:extLst>
+                    <a:ext uri="{A12FA001-AC4F-418D-AE19-62706E023703}">
+                      <ahyp:hlinkClr xmlns:ahyp="http://schemas.microsoft.com/office/drawing/2018/hyperlinkcolor" val="tx"/>
+                    </a:ext>
+                  </a:extLst>
+                </a:hlinkClick>
+              </a:rPr>
+              <a:t>Rustlings</a:t>
+            </a:r>
+            <a:r>
+              <a:rPr lang="en-IN" sz="900" u="sng" dirty="0">
+                <a:solidFill>
+                  <a:schemeClr val="tx1">
+                    <a:lumMod val="75000"/>
+                    <a:lumOff val="25000"/>
+                  </a:schemeClr>
+                </a:solidFill>
+              </a:rPr>
+              <a:t>, </a:t>
+            </a:r>
+            <a:r>
+              <a:rPr lang="en-IN" sz="900" u="sng" dirty="0">
+                <a:solidFill>
+                  <a:schemeClr val="tx1">
+                    <a:lumMod val="75000"/>
+                    <a:lumOff val="25000"/>
+                  </a:schemeClr>
+                </a:solidFill>
+                <a:hlinkClick r:id="rId9">
+                  <a:extLst>
+                    <a:ext uri="{A12FA001-AC4F-418D-AE19-62706E023703}">
+                      <ahyp:hlinkClr xmlns:ahyp="http://schemas.microsoft.com/office/drawing/2018/hyperlinkcolor" val="tx"/>
+                    </a:ext>
+                  </a:extLst>
+                </a:hlinkClick>
+              </a:rPr>
+              <a:t>Sui</a:t>
+            </a:r>
+            <a:r>
+              <a:rPr lang="en-IN" sz="900" u="sng" dirty="0">
                 <a:solidFill>
                   <a:schemeClr val="tx1">
                     <a:lumMod val="75000"/>
@@ -3602,6 +3750,14 @@
               </a:rPr>
               <a:t>.</a:t>
             </a:r>
+            <a:endParaRPr lang="en-IN" sz="900" dirty="0">
+              <a:solidFill>
+                <a:schemeClr val="tx1">
+                  <a:lumMod val="75000"/>
+                  <a:lumOff val="25000"/>
+                </a:schemeClr>
+              </a:solidFill>
+            </a:endParaRPr>
           </a:p>
           <a:p>
             <a:pPr marL="171450" indent="-171450">
@@ -3670,17 +3826,6 @@
               <a:t>DeFi</a:t>
             </a:r>
             <a:r>
-              <a:rPr lang="en-IN" sz="900">
-                <a:solidFill>
-                  <a:schemeClr val="tx1">
-                    <a:lumMod val="75000"/>
-                    <a:lumOff val="25000"/>
-                  </a:schemeClr>
-                </a:solidFill>
-              </a:rPr>
-              <a:t>) using </a:t>
-            </a:r>
-            <a:r>
               <a:rPr lang="en-IN" sz="900" dirty="0">
                 <a:solidFill>
                   <a:schemeClr val="tx1">
@@ -3689,7 +3834,7 @@
                   </a:schemeClr>
                 </a:solidFill>
               </a:rPr>
-              <a:t>a multi-collateral CDP approach, incentivizing staking to prevent liquidation, informed by research into </a:t>
+              <a:t>) using a multi-collateral CDP approach, incentivizing staking to prevent liquidation, informed by research into </a:t>
             </a:r>
             <a:r>
               <a:rPr lang="en-IN" sz="900" dirty="0" err="1">
@@ -3810,7 +3955,7 @@
                     <a:lumOff val="25000"/>
                   </a:schemeClr>
                 </a:solidFill>
-                <a:hlinkClick r:id="rId3">
+                <a:hlinkClick r:id="rId10">
                   <a:extLst>
                     <a:ext uri="{A12FA001-AC4F-418D-AE19-62706E023703}">
                       <ahyp:hlinkClr xmlns:ahyp="http://schemas.microsoft.com/office/drawing/2018/hyperlinkcolor" val="tx"/>
@@ -3932,7 +4077,7 @@
                     <a:lumOff val="25000"/>
                   </a:schemeClr>
                 </a:solidFill>
-                <a:hlinkClick r:id="rId4">
+                <a:hlinkClick r:id="rId11">
                   <a:extLst>
                     <a:ext uri="{A12FA001-AC4F-418D-AE19-62706E023703}">
                       <ahyp:hlinkClr xmlns:ahyp="http://schemas.microsoft.com/office/drawing/2018/hyperlinkcolor" val="tx"/>
@@ -3961,7 +4106,7 @@
                     <a:lumOff val="25000"/>
                   </a:schemeClr>
                 </a:solidFill>
-                <a:hlinkClick r:id="rId5">
+                <a:hlinkClick r:id="rId12">
                   <a:extLst>
                     <a:ext uri="{A12FA001-AC4F-418D-AE19-62706E023703}">
                       <ahyp:hlinkClr xmlns:ahyp="http://schemas.microsoft.com/office/drawing/2018/hyperlinkcolor" val="tx"/>
@@ -4046,7 +4191,7 @@
                     <a:lumOff val="25000"/>
                   </a:schemeClr>
                 </a:solidFill>
-                <a:hlinkClick r:id="rId6">
+                <a:hlinkClick r:id="rId13">
                   <a:extLst>
                     <a:ext uri="{A12FA001-AC4F-418D-AE19-62706E023703}">
                       <ahyp:hlinkClr xmlns:ahyp="http://schemas.microsoft.com/office/drawing/2018/hyperlinkcolor" val="tx"/>
@@ -4101,7 +4246,7 @@
                     <a:lumOff val="25000"/>
                   </a:schemeClr>
                 </a:solidFill>
-                <a:hlinkClick r:id="rId7">
+                <a:hlinkClick r:id="rId14">
                   <a:extLst>
                     <a:ext uri="{A12FA001-AC4F-418D-AE19-62706E023703}">
                       <ahyp:hlinkClr xmlns:ahyp="http://schemas.microsoft.com/office/drawing/2018/hyperlinkcolor" val="tx"/>
@@ -4237,11 +4382,11 @@
           <p:nvPr/>
         </p:nvPicPr>
         <p:blipFill rotWithShape="1">
-          <a:blip r:embed="rId8">
+          <a:blip r:embed="rId15">
             <a:extLst>
               <a:ext uri="{BEBA8EAE-BF5A-486C-A8C5-ECC9F3942E4B}">
                 <a14:imgProps xmlns:a14="http://schemas.microsoft.com/office/drawing/2010/main">
-                  <a14:imgLayer r:embed="rId9">
+                  <a14:imgLayer r:embed="rId16">
                     <a14:imgEffect>
                       <a14:colorTemperature colorTemp="7200"/>
                     </a14:imgEffect>
@@ -4764,7 +4909,7 @@
                     <a:lumOff val="35000"/>
                   </a:schemeClr>
                 </a:solidFill>
-                <a:hlinkClick r:id="rId10">
+                <a:hlinkClick r:id="rId17">
                   <a:extLst>
                     <a:ext uri="{A12FA001-AC4F-418D-AE19-62706E023703}">
                       <ahyp:hlinkClr xmlns:ahyp="http://schemas.microsoft.com/office/drawing/2018/hyperlinkcolor" val="tx"/>
@@ -4822,7 +4967,7 @@
                     <a:lumOff val="35000"/>
                   </a:schemeClr>
                 </a:solidFill>
-                <a:hlinkClick r:id="rId11">
+                <a:hlinkClick r:id="rId18">
                   <a:extLst>
                     <a:ext uri="{A12FA001-AC4F-418D-AE19-62706E023703}">
                       <ahyp:hlinkClr xmlns:ahyp="http://schemas.microsoft.com/office/drawing/2018/hyperlinkcolor" val="tx"/>
@@ -4956,7 +5101,7 @@
                     <a:lumOff val="35000"/>
                   </a:schemeClr>
                 </a:solidFill>
-                <a:hlinkClick r:id="rId12">
+                <a:hlinkClick r:id="rId19">
                   <a:extLst>
                     <a:ext uri="{A12FA001-AC4F-418D-AE19-62706E023703}">
                       <ahyp:hlinkClr xmlns:ahyp="http://schemas.microsoft.com/office/drawing/2018/hyperlinkcolor" val="tx"/>
@@ -5014,7 +5159,7 @@
                     <a:lumOff val="35000"/>
                   </a:schemeClr>
                 </a:solidFill>
-                <a:hlinkClick r:id="rId13">
+                <a:hlinkClick r:id="rId20">
                   <a:extLst>
                     <a:ext uri="{A12FA001-AC4F-418D-AE19-62706E023703}">
                       <ahyp:hlinkClr xmlns:ahyp="http://schemas.microsoft.com/office/drawing/2018/hyperlinkcolor" val="tx"/>
@@ -5072,7 +5217,7 @@
                     <a:lumOff val="35000"/>
                   </a:schemeClr>
                 </a:solidFill>
-                <a:hlinkClick r:id="rId14">
+                <a:hlinkClick r:id="rId21">
                   <a:extLst>
                     <a:ext uri="{A12FA001-AC4F-418D-AE19-62706E023703}">
                       <ahyp:hlinkClr xmlns:ahyp="http://schemas.microsoft.com/office/drawing/2018/hyperlinkcolor" val="tx"/>
@@ -5176,10 +5321,10 @@
             <p:nvPr/>
           </p:nvPicPr>
           <p:blipFill>
-            <a:blip r:embed="rId15" cstate="print">
+            <a:blip r:embed="rId22" cstate="print">
               <a:extLst>
                 <a:ext uri="{96DAC541-7B7A-43D3-8B79-37D633B846F1}">
-                  <asvg:svgBlip xmlns:asvg="http://schemas.microsoft.com/office/drawing/2016/SVG/main" r:embed="rId16"/>
+                  <asvg:svgBlip xmlns:asvg="http://schemas.microsoft.com/office/drawing/2016/SVG/main" r:embed="rId23"/>
                 </a:ext>
               </a:extLst>
             </a:blip>
@@ -5527,10 +5672,10 @@
             <p:nvPr/>
           </p:nvPicPr>
           <p:blipFill>
-            <a:blip r:embed="rId17">
+            <a:blip r:embed="rId24">
               <a:extLst>
                 <a:ext uri="{96DAC541-7B7A-43D3-8B79-37D633B846F1}">
-                  <asvg:svgBlip xmlns:asvg="http://schemas.microsoft.com/office/drawing/2016/SVG/main" r:embed="rId18"/>
+                  <asvg:svgBlip xmlns:asvg="http://schemas.microsoft.com/office/drawing/2016/SVG/main" r:embed="rId25"/>
                 </a:ext>
               </a:extLst>
             </a:blip>
@@ -5666,10 +5811,10 @@
             <p:nvPr/>
           </p:nvPicPr>
           <p:blipFill>
-            <a:blip r:embed="rId19">
+            <a:blip r:embed="rId26">
               <a:extLst>
                 <a:ext uri="{96DAC541-7B7A-43D3-8B79-37D633B846F1}">
-                  <asvg:svgBlip xmlns:asvg="http://schemas.microsoft.com/office/drawing/2016/SVG/main" r:embed="rId20"/>
+                  <asvg:svgBlip xmlns:asvg="http://schemas.microsoft.com/office/drawing/2016/SVG/main" r:embed="rId27"/>
                 </a:ext>
               </a:extLst>
             </a:blip>
@@ -5891,10 +6036,10 @@
             <p:nvPr/>
           </p:nvPicPr>
           <p:blipFill>
-            <a:blip r:embed="rId21" cstate="print">
+            <a:blip r:embed="rId28" cstate="print">
               <a:extLst>
                 <a:ext uri="{96DAC541-7B7A-43D3-8B79-37D633B846F1}">
-                  <asvg:svgBlip xmlns:asvg="http://schemas.microsoft.com/office/drawing/2016/SVG/main" r:embed="rId22"/>
+                  <asvg:svgBlip xmlns:asvg="http://schemas.microsoft.com/office/drawing/2016/SVG/main" r:embed="rId29"/>
                 </a:ext>
               </a:extLst>
             </a:blip>
@@ -7431,10 +7576,10 @@
             <p:nvPr/>
           </p:nvPicPr>
           <p:blipFill>
-            <a:blip r:embed="rId23">
+            <a:blip r:embed="rId30">
               <a:extLst>
                 <a:ext uri="{96DAC541-7B7A-43D3-8B79-37D633B846F1}">
-                  <asvg:svgBlip xmlns:asvg="http://schemas.microsoft.com/office/drawing/2016/SVG/main" r:embed="rId24"/>
+                  <asvg:svgBlip xmlns:asvg="http://schemas.microsoft.com/office/drawing/2016/SVG/main" r:embed="rId31"/>
                 </a:ext>
               </a:extLst>
             </a:blip>
@@ -7593,10 +7738,10 @@
           <p:nvPr/>
         </p:nvPicPr>
         <p:blipFill>
-          <a:blip r:embed="rId25">
+          <a:blip r:embed="rId32">
             <a:extLst>
               <a:ext uri="{96DAC541-7B7A-43D3-8B79-37D633B846F1}">
-                <asvg:svgBlip xmlns:asvg="http://schemas.microsoft.com/office/drawing/2016/SVG/main" r:embed="rId26"/>
+                <asvg:svgBlip xmlns:asvg="http://schemas.microsoft.com/office/drawing/2016/SVG/main" r:embed="rId33"/>
               </a:ext>
             </a:extLst>
           </a:blip>

</xml_diff>

<commit_message>
STARK winterfell contribution added to CV
</commit_message>
<xml_diff>
--- a/my_resume_v2.pptx
+++ b/my_resume_v2.pptx
@@ -198,7 +198,7 @@
           <a:p>
             <a:fld id="{060BEAD1-672E-E841-95FA-08B9B35A46D7}" type="datetimeFigureOut">
               <a:rPr lang="en-US" smtClean="0"/>
-              <a:t>7/19/23</a:t>
+              <a:t>8/9/23</a:t>
             </a:fld>
             <a:endParaRPr lang="en-US"/>
           </a:p>
@@ -765,7 +765,7 @@
           <a:p>
             <a:fld id="{A417C049-F611-094D-8104-5764D8D04213}" type="datetimeFigureOut">
               <a:rPr lang="en-US" smtClean="0"/>
-              <a:t>7/19/23</a:t>
+              <a:t>8/9/23</a:t>
             </a:fld>
             <a:endParaRPr lang="en-US"/>
           </a:p>
@@ -935,7 +935,7 @@
           <a:p>
             <a:fld id="{A417C049-F611-094D-8104-5764D8D04213}" type="datetimeFigureOut">
               <a:rPr lang="en-US" smtClean="0"/>
-              <a:t>7/19/23</a:t>
+              <a:t>8/9/23</a:t>
             </a:fld>
             <a:endParaRPr lang="en-US"/>
           </a:p>
@@ -1115,7 +1115,7 @@
           <a:p>
             <a:fld id="{A417C049-F611-094D-8104-5764D8D04213}" type="datetimeFigureOut">
               <a:rPr lang="en-US" smtClean="0"/>
-              <a:t>7/19/23</a:t>
+              <a:t>8/9/23</a:t>
             </a:fld>
             <a:endParaRPr lang="en-US"/>
           </a:p>
@@ -1285,7 +1285,7 @@
           <a:p>
             <a:fld id="{A417C049-F611-094D-8104-5764D8D04213}" type="datetimeFigureOut">
               <a:rPr lang="en-US" smtClean="0"/>
-              <a:t>7/19/23</a:t>
+              <a:t>8/9/23</a:t>
             </a:fld>
             <a:endParaRPr lang="en-US"/>
           </a:p>
@@ -1529,7 +1529,7 @@
           <a:p>
             <a:fld id="{A417C049-F611-094D-8104-5764D8D04213}" type="datetimeFigureOut">
               <a:rPr lang="en-US" smtClean="0"/>
-              <a:t>7/19/23</a:t>
+              <a:t>8/9/23</a:t>
             </a:fld>
             <a:endParaRPr lang="en-US"/>
           </a:p>
@@ -1761,7 +1761,7 @@
           <a:p>
             <a:fld id="{A417C049-F611-094D-8104-5764D8D04213}" type="datetimeFigureOut">
               <a:rPr lang="en-US" smtClean="0"/>
-              <a:t>7/19/23</a:t>
+              <a:t>8/9/23</a:t>
             </a:fld>
             <a:endParaRPr lang="en-US"/>
           </a:p>
@@ -2128,7 +2128,7 @@
           <a:p>
             <a:fld id="{A417C049-F611-094D-8104-5764D8D04213}" type="datetimeFigureOut">
               <a:rPr lang="en-US" smtClean="0"/>
-              <a:t>7/19/23</a:t>
+              <a:t>8/9/23</a:t>
             </a:fld>
             <a:endParaRPr lang="en-US"/>
           </a:p>
@@ -2246,7 +2246,7 @@
           <a:p>
             <a:fld id="{A417C049-F611-094D-8104-5764D8D04213}" type="datetimeFigureOut">
               <a:rPr lang="en-US" smtClean="0"/>
-              <a:t>7/19/23</a:t>
+              <a:t>8/9/23</a:t>
             </a:fld>
             <a:endParaRPr lang="en-US"/>
           </a:p>
@@ -2341,7 +2341,7 @@
           <a:p>
             <a:fld id="{A417C049-F611-094D-8104-5764D8D04213}" type="datetimeFigureOut">
               <a:rPr lang="en-US" smtClean="0"/>
-              <a:t>7/19/23</a:t>
+              <a:t>8/9/23</a:t>
             </a:fld>
             <a:endParaRPr lang="en-US"/>
           </a:p>
@@ -2618,7 +2618,7 @@
           <a:p>
             <a:fld id="{A417C049-F611-094D-8104-5764D8D04213}" type="datetimeFigureOut">
               <a:rPr lang="en-US" smtClean="0"/>
-              <a:t>7/19/23</a:t>
+              <a:t>8/9/23</a:t>
             </a:fld>
             <a:endParaRPr lang="en-US"/>
           </a:p>
@@ -2875,7 +2875,7 @@
           <a:p>
             <a:fld id="{A417C049-F611-094D-8104-5764D8D04213}" type="datetimeFigureOut">
               <a:rPr lang="en-US" smtClean="0"/>
-              <a:t>7/19/23</a:t>
+              <a:t>8/9/23</a:t>
             </a:fld>
             <a:endParaRPr lang="en-US"/>
           </a:p>
@@ -3093,7 +3093,7 @@
           <a:p>
             <a:fld id="{A417C049-F611-094D-8104-5764D8D04213}" type="datetimeFigureOut">
               <a:rPr lang="en-US" smtClean="0"/>
-              <a:t>7/19/23</a:t>
+              <a:t>8/9/23</a:t>
             </a:fld>
             <a:endParaRPr lang="en-US"/>
           </a:p>
@@ -3513,7 +3513,7 @@
         <p:spPr>
           <a:xfrm>
             <a:off x="88190" y="2479332"/>
-            <a:ext cx="6666468" cy="2020746"/>
+            <a:ext cx="6666468" cy="1854034"/>
           </a:xfrm>
           <a:prstGeom prst="rect">
             <a:avLst/>
@@ -3549,12 +3549,6 @@
             </a:r>
             <a:r>
               <a:rPr lang="en-IN" sz="900" u="sng" dirty="0">
-                <a:solidFill>
-                  <a:schemeClr val="tx1">
-                    <a:lumMod val="75000"/>
-                    <a:lumOff val="25000"/>
-                  </a:schemeClr>
-                </a:solidFill>
                 <a:hlinkClick r:id="rId3">
                   <a:extLst>
                     <a:ext uri="{A12FA001-AC4F-418D-AE19-62706E023703}">
@@ -3563,7 +3557,7 @@
                   </a:extLst>
                 </a:hlinkClick>
               </a:rPr>
-              <a:t>Uniswap v2</a:t>
+              <a:t>STARK Winterfell</a:t>
             </a:r>
             <a:r>
               <a:rPr lang="en-IN" sz="900" u="sng" dirty="0">
@@ -3592,7 +3586,7 @@
                   </a:extLst>
                 </a:hlinkClick>
               </a:rPr>
-              <a:t>OpenZeppelin</a:t>
+              <a:t>Uniswap v2</a:t>
             </a:r>
             <a:r>
               <a:rPr lang="en-IN" sz="900" u="sng" dirty="0">
@@ -3621,7 +3615,7 @@
                   </a:extLst>
                 </a:hlinkClick>
               </a:rPr>
-              <a:t>Telos Blockchain</a:t>
+              <a:t>OpenZeppelin</a:t>
             </a:r>
             <a:r>
               <a:rPr lang="en-IN" sz="900" u="sng" dirty="0">
@@ -3632,7 +3626,7 @@
                   </a:schemeClr>
                 </a:solidFill>
               </a:rPr>
-              <a:t>, STFX (Perpetual), </a:t>
+              <a:t>, </a:t>
             </a:r>
             <a:r>
               <a:rPr lang="en-IN" sz="900" u="sng" dirty="0">
@@ -3650,7 +3644,7 @@
                   </a:extLst>
                 </a:hlinkClick>
               </a:rPr>
-              <a:t>Substrate Runtime</a:t>
+              <a:t>Telos Blockchain</a:t>
             </a:r>
             <a:r>
               <a:rPr lang="en-IN" sz="900" u="sng" dirty="0">
@@ -3661,7 +3655,7 @@
                   </a:schemeClr>
                 </a:solidFill>
               </a:rPr>
-              <a:t> &amp; </a:t>
+              <a:t>, STFX (Perpetual), </a:t>
             </a:r>
             <a:r>
               <a:rPr lang="en-IN" sz="900" u="sng" dirty="0">
@@ -3679,7 +3673,7 @@
                   </a:extLst>
                 </a:hlinkClick>
               </a:rPr>
-              <a:t>SC ink lang</a:t>
+              <a:t>Substrate Runtime</a:t>
             </a:r>
             <a:r>
               <a:rPr lang="en-IN" sz="900" u="sng" dirty="0">
@@ -3690,7 +3684,7 @@
                   </a:schemeClr>
                 </a:solidFill>
               </a:rPr>
-              <a:t>, </a:t>
+              <a:t> &amp; </a:t>
             </a:r>
             <a:r>
               <a:rPr lang="en-IN" sz="900" u="sng" dirty="0">
@@ -3708,6 +3702,35 @@
                   </a:extLst>
                 </a:hlinkClick>
               </a:rPr>
+              <a:t>SC ink lang</a:t>
+            </a:r>
+            <a:r>
+              <a:rPr lang="en-IN" sz="900" u="sng" dirty="0">
+                <a:solidFill>
+                  <a:schemeClr val="tx1">
+                    <a:lumMod val="75000"/>
+                    <a:lumOff val="25000"/>
+                  </a:schemeClr>
+                </a:solidFill>
+              </a:rPr>
+              <a:t>, </a:t>
+            </a:r>
+            <a:r>
+              <a:rPr lang="en-IN" sz="900" u="sng" dirty="0">
+                <a:solidFill>
+                  <a:schemeClr val="tx1">
+                    <a:lumMod val="75000"/>
+                    <a:lumOff val="25000"/>
+                  </a:schemeClr>
+                </a:solidFill>
+                <a:hlinkClick r:id="rId9">
+                  <a:extLst>
+                    <a:ext uri="{A12FA001-AC4F-418D-AE19-62706E023703}">
+                      <ahyp:hlinkClr xmlns:ahyp="http://schemas.microsoft.com/office/drawing/2018/hyperlinkcolor" val="tx"/>
+                    </a:ext>
+                  </a:extLst>
+                </a:hlinkClick>
+              </a:rPr>
               <a:t>Rustlings</a:t>
             </a:r>
             <a:r>
@@ -3729,7 +3752,7 @@
                     <a:lumOff val="25000"/>
                   </a:schemeClr>
                 </a:solidFill>
-                <a:hlinkClick r:id="rId9">
+                <a:hlinkClick r:id="rId10">
                   <a:extLst>
                     <a:ext uri="{A12FA001-AC4F-418D-AE19-62706E023703}">
                       <ahyp:hlinkClr xmlns:ahyp="http://schemas.microsoft.com/office/drawing/2018/hyperlinkcolor" val="tx"/>
@@ -3955,7 +3978,7 @@
                     <a:lumOff val="25000"/>
                   </a:schemeClr>
                 </a:solidFill>
-                <a:hlinkClick r:id="rId10">
+                <a:hlinkClick r:id="rId11">
                   <a:extLst>
                     <a:ext uri="{A12FA001-AC4F-418D-AE19-62706E023703}">
                       <ahyp:hlinkClr xmlns:ahyp="http://schemas.microsoft.com/office/drawing/2018/hyperlinkcolor" val="tx"/>
@@ -4077,7 +4100,7 @@
                     <a:lumOff val="25000"/>
                   </a:schemeClr>
                 </a:solidFill>
-                <a:hlinkClick r:id="rId11">
+                <a:hlinkClick r:id="rId12">
                   <a:extLst>
                     <a:ext uri="{A12FA001-AC4F-418D-AE19-62706E023703}">
                       <ahyp:hlinkClr xmlns:ahyp="http://schemas.microsoft.com/office/drawing/2018/hyperlinkcolor" val="tx"/>
@@ -4106,7 +4129,7 @@
                     <a:lumOff val="25000"/>
                   </a:schemeClr>
                 </a:solidFill>
-                <a:hlinkClick r:id="rId12">
+                <a:hlinkClick r:id="rId13">
                   <a:extLst>
                     <a:ext uri="{A12FA001-AC4F-418D-AE19-62706E023703}">
                       <ahyp:hlinkClr xmlns:ahyp="http://schemas.microsoft.com/office/drawing/2018/hyperlinkcolor" val="tx"/>
@@ -4191,7 +4214,7 @@
                     <a:lumOff val="25000"/>
                   </a:schemeClr>
                 </a:solidFill>
-                <a:hlinkClick r:id="rId13">
+                <a:hlinkClick r:id="rId14">
                   <a:extLst>
                     <a:ext uri="{A12FA001-AC4F-418D-AE19-62706E023703}">
                       <ahyp:hlinkClr xmlns:ahyp="http://schemas.microsoft.com/office/drawing/2018/hyperlinkcolor" val="tx"/>
@@ -4246,7 +4269,7 @@
                     <a:lumOff val="25000"/>
                   </a:schemeClr>
                 </a:solidFill>
-                <a:hlinkClick r:id="rId14">
+                <a:hlinkClick r:id="rId15">
                   <a:extLst>
                     <a:ext uri="{A12FA001-AC4F-418D-AE19-62706E023703}">
                       <ahyp:hlinkClr xmlns:ahyp="http://schemas.microsoft.com/office/drawing/2018/hyperlinkcolor" val="tx"/>
@@ -4265,41 +4288,7 @@
                   </a:schemeClr>
                 </a:solidFill>
               </a:rPr>
-              <a:t> which has a total of 300 (approx. &amp; counting) students enrolled for 4 courses to date.</a:t>
-            </a:r>
-            <a:endParaRPr lang="en-US" sz="900" dirty="0">
-              <a:solidFill>
-                <a:schemeClr val="tx1">
-                  <a:lumMod val="75000"/>
-                  <a:lumOff val="25000"/>
-                </a:schemeClr>
-              </a:solidFill>
-            </a:endParaRPr>
-          </a:p>
-          <a:p>
-            <a:pPr marL="171450" marR="0" lvl="0" indent="-171450">
-              <a:lnSpc>
-                <a:spcPts val="1238"/>
-              </a:lnSpc>
-              <a:spcBef>
-                <a:spcPts val="0"/>
-              </a:spcBef>
-              <a:spcAft>
-                <a:spcPts val="125"/>
-              </a:spcAft>
-              <a:buFont typeface="Arial" panose="020B0604020202020204" pitchFamily="34" charset="0"/>
-              <a:buChar char="•"/>
-            </a:pPr>
-            <a:r>
-              <a:rPr lang="en-IN" sz="900" dirty="0">
-                <a:solidFill>
-                  <a:schemeClr val="tx1">
-                    <a:lumMod val="75000"/>
-                    <a:lumOff val="25000"/>
-                  </a:schemeClr>
-                </a:solidFill>
-              </a:rPr>
-              <a:t>I have done mentorship (individual/group), delivered talks, sessions at Universities.</a:t>
+              <a:t> which has a total of 300 (approx. &amp; counting) students enrolled for 4 courses to date; mentorship (individual/group), delivered talks, sessions at Universities.</a:t>
             </a:r>
             <a:endParaRPr lang="en-US" sz="900" dirty="0">
               <a:solidFill>
@@ -4382,11 +4371,11 @@
           <p:nvPr/>
         </p:nvPicPr>
         <p:blipFill rotWithShape="1">
-          <a:blip r:embed="rId15">
+          <a:blip r:embed="rId16">
             <a:extLst>
               <a:ext uri="{BEBA8EAE-BF5A-486C-A8C5-ECC9F3942E4B}">
                 <a14:imgProps xmlns:a14="http://schemas.microsoft.com/office/drawing/2010/main">
-                  <a14:imgLayer r:embed="rId16">
+                  <a14:imgLayer r:embed="rId17">
                     <a14:imgEffect>
                       <a14:colorTemperature colorTemp="7200"/>
                     </a14:imgEffect>
@@ -4909,7 +4898,7 @@
                     <a:lumOff val="35000"/>
                   </a:schemeClr>
                 </a:solidFill>
-                <a:hlinkClick r:id="rId17">
+                <a:hlinkClick r:id="rId18">
                   <a:extLst>
                     <a:ext uri="{A12FA001-AC4F-418D-AE19-62706E023703}">
                       <ahyp:hlinkClr xmlns:ahyp="http://schemas.microsoft.com/office/drawing/2018/hyperlinkcolor" val="tx"/>
@@ -4967,7 +4956,7 @@
                     <a:lumOff val="35000"/>
                   </a:schemeClr>
                 </a:solidFill>
-                <a:hlinkClick r:id="rId18">
+                <a:hlinkClick r:id="rId19">
                   <a:extLst>
                     <a:ext uri="{A12FA001-AC4F-418D-AE19-62706E023703}">
                       <ahyp:hlinkClr xmlns:ahyp="http://schemas.microsoft.com/office/drawing/2018/hyperlinkcolor" val="tx"/>
@@ -5101,7 +5090,7 @@
                     <a:lumOff val="35000"/>
                   </a:schemeClr>
                 </a:solidFill>
-                <a:hlinkClick r:id="rId19">
+                <a:hlinkClick r:id="rId20">
                   <a:extLst>
                     <a:ext uri="{A12FA001-AC4F-418D-AE19-62706E023703}">
                       <ahyp:hlinkClr xmlns:ahyp="http://schemas.microsoft.com/office/drawing/2018/hyperlinkcolor" val="tx"/>
@@ -5159,7 +5148,7 @@
                     <a:lumOff val="35000"/>
                   </a:schemeClr>
                 </a:solidFill>
-                <a:hlinkClick r:id="rId20">
+                <a:hlinkClick r:id="rId21">
                   <a:extLst>
                     <a:ext uri="{A12FA001-AC4F-418D-AE19-62706E023703}">
                       <ahyp:hlinkClr xmlns:ahyp="http://schemas.microsoft.com/office/drawing/2018/hyperlinkcolor" val="tx"/>
@@ -5217,7 +5206,7 @@
                     <a:lumOff val="35000"/>
                   </a:schemeClr>
                 </a:solidFill>
-                <a:hlinkClick r:id="rId21">
+                <a:hlinkClick r:id="rId22">
                   <a:extLst>
                     <a:ext uri="{A12FA001-AC4F-418D-AE19-62706E023703}">
                       <ahyp:hlinkClr xmlns:ahyp="http://schemas.microsoft.com/office/drawing/2018/hyperlinkcolor" val="tx"/>
@@ -5321,10 +5310,10 @@
             <p:nvPr/>
           </p:nvPicPr>
           <p:blipFill>
-            <a:blip r:embed="rId22" cstate="print">
+            <a:blip r:embed="rId23" cstate="print">
               <a:extLst>
                 <a:ext uri="{96DAC541-7B7A-43D3-8B79-37D633B846F1}">
-                  <asvg:svgBlip xmlns:asvg="http://schemas.microsoft.com/office/drawing/2016/SVG/main" r:embed="rId23"/>
+                  <asvg:svgBlip xmlns:asvg="http://schemas.microsoft.com/office/drawing/2016/SVG/main" r:embed="rId24"/>
                 </a:ext>
               </a:extLst>
             </a:blip>
@@ -5672,10 +5661,10 @@
             <p:nvPr/>
           </p:nvPicPr>
           <p:blipFill>
-            <a:blip r:embed="rId24">
+            <a:blip r:embed="rId25">
               <a:extLst>
                 <a:ext uri="{96DAC541-7B7A-43D3-8B79-37D633B846F1}">
-                  <asvg:svgBlip xmlns:asvg="http://schemas.microsoft.com/office/drawing/2016/SVG/main" r:embed="rId25"/>
+                  <asvg:svgBlip xmlns:asvg="http://schemas.microsoft.com/office/drawing/2016/SVG/main" r:embed="rId26"/>
                 </a:ext>
               </a:extLst>
             </a:blip>
@@ -5811,10 +5800,10 @@
             <p:nvPr/>
           </p:nvPicPr>
           <p:blipFill>
-            <a:blip r:embed="rId26">
+            <a:blip r:embed="rId27">
               <a:extLst>
                 <a:ext uri="{96DAC541-7B7A-43D3-8B79-37D633B846F1}">
-                  <asvg:svgBlip xmlns:asvg="http://schemas.microsoft.com/office/drawing/2016/SVG/main" r:embed="rId27"/>
+                  <asvg:svgBlip xmlns:asvg="http://schemas.microsoft.com/office/drawing/2016/SVG/main" r:embed="rId28"/>
                 </a:ext>
               </a:extLst>
             </a:blip>
@@ -6012,9 +6001,9 @@
         </p:nvGrpSpPr>
         <p:grpSpPr>
           <a:xfrm>
-            <a:off x="134191" y="4460130"/>
+            <a:off x="134191" y="4301053"/>
             <a:ext cx="1502200" cy="292388"/>
-            <a:chOff x="4141297" y="2815491"/>
+            <a:chOff x="4141297" y="2679564"/>
             <a:chExt cx="1502200" cy="292388"/>
           </a:xfrm>
         </p:grpSpPr>
@@ -6036,10 +6025,10 @@
             <p:nvPr/>
           </p:nvPicPr>
           <p:blipFill>
-            <a:blip r:embed="rId28" cstate="print">
+            <a:blip r:embed="rId29" cstate="print">
               <a:extLst>
                 <a:ext uri="{96DAC541-7B7A-43D3-8B79-37D633B846F1}">
-                  <asvg:svgBlip xmlns:asvg="http://schemas.microsoft.com/office/drawing/2016/SVG/main" r:embed="rId29"/>
+                  <asvg:svgBlip xmlns:asvg="http://schemas.microsoft.com/office/drawing/2016/SVG/main" r:embed="rId30"/>
                 </a:ext>
               </a:extLst>
             </a:blip>
@@ -6049,7 +6038,7 @@
           </p:blipFill>
           <p:spPr>
             <a:xfrm>
-              <a:off x="4141297" y="2874735"/>
+              <a:off x="4141297" y="2749768"/>
               <a:ext cx="151949" cy="151949"/>
             </a:xfrm>
             <a:prstGeom prst="rect">
@@ -6071,7 +6060,7 @@
           </p:nvSpPr>
           <p:spPr>
             <a:xfrm>
-              <a:off x="4214946" y="2815491"/>
+              <a:off x="4214946" y="2679564"/>
               <a:ext cx="1428551" cy="292388"/>
             </a:xfrm>
             <a:prstGeom prst="rect">
@@ -6430,7 +6419,7 @@
         </p:nvSpPr>
         <p:spPr>
           <a:xfrm>
-            <a:off x="88190" y="6827680"/>
+            <a:off x="88190" y="6824126"/>
             <a:ext cx="6657120" cy="1546257"/>
           </a:xfrm>
           <a:prstGeom prst="rect">
@@ -6892,7 +6881,7 @@
         </p:nvSpPr>
         <p:spPr>
           <a:xfrm>
-            <a:off x="88190" y="5151436"/>
+            <a:off x="88190" y="5155903"/>
             <a:ext cx="6657120" cy="1648849"/>
           </a:xfrm>
           <a:prstGeom prst="rect">
@@ -7437,8 +7426,8 @@
         </p:nvSpPr>
         <p:spPr>
           <a:xfrm>
-            <a:off x="88190" y="4710935"/>
-            <a:ext cx="6657120" cy="417743"/>
+            <a:off x="88190" y="4565772"/>
+            <a:ext cx="6657120" cy="571631"/>
           </a:xfrm>
           <a:prstGeom prst="rect">
             <a:avLst/>
@@ -7514,7 +7503,7 @@
                   </a:schemeClr>
                 </a:solidFill>
               </a:rPr>
-              <a:t>Contributing to Rust based Blockchains – Substrate, Solana, Aptos/Sui, Near, etc.; </a:t>
+              <a:t>Contributing to Solidity + Rust based Blockchains – EVM chains, Substrate, Solana, Aptos/Sui, etc.; </a:t>
             </a:r>
             <a:r>
               <a:rPr lang="en-US" sz="900" dirty="0" err="1">
@@ -7536,7 +7525,29 @@
                   </a:schemeClr>
                 </a:solidFill>
               </a:rPr>
-              <a:t> Cairo; in form of pallets, contracts.</a:t>
+              <a:t> Cairo; in form of pallets, contracts; All my contributions are listed for respective blockchains in my </a:t>
+            </a:r>
+            <a:r>
+              <a:rPr lang="en-US" sz="900" dirty="0" err="1">
+                <a:solidFill>
+                  <a:schemeClr val="tx1">
+                    <a:lumMod val="75000"/>
+                    <a:lumOff val="25000"/>
+                  </a:schemeClr>
+                </a:solidFill>
+              </a:rPr>
+              <a:t>github</a:t>
+            </a:r>
+            <a:r>
+              <a:rPr lang="en-US" sz="900" dirty="0">
+                <a:solidFill>
+                  <a:schemeClr val="tx1">
+                    <a:lumMod val="75000"/>
+                    <a:lumOff val="25000"/>
+                  </a:schemeClr>
+                </a:solidFill>
+              </a:rPr>
+              <a:t> profile.</a:t>
             </a:r>
           </a:p>
         </p:txBody>
@@ -7576,10 +7587,10 @@
             <p:nvPr/>
           </p:nvPicPr>
           <p:blipFill>
-            <a:blip r:embed="rId30">
+            <a:blip r:embed="rId31">
               <a:extLst>
                 <a:ext uri="{96DAC541-7B7A-43D3-8B79-37D633B846F1}">
-                  <asvg:svgBlip xmlns:asvg="http://schemas.microsoft.com/office/drawing/2016/SVG/main" r:embed="rId31"/>
+                  <asvg:svgBlip xmlns:asvg="http://schemas.microsoft.com/office/drawing/2016/SVG/main" r:embed="rId32"/>
                 </a:ext>
               </a:extLst>
             </a:blip>
@@ -7649,7 +7660,7 @@
         </p:nvCxnSpPr>
         <p:spPr>
           <a:xfrm>
-            <a:off x="0" y="4440334"/>
+            <a:off x="0" y="4292050"/>
             <a:ext cx="6858000" cy="0"/>
           </a:xfrm>
           <a:prstGeom prst="line">
@@ -7738,10 +7749,10 @@
           <p:nvPr/>
         </p:nvPicPr>
         <p:blipFill>
-          <a:blip r:embed="rId32">
+          <a:blip r:embed="rId33">
             <a:extLst>
               <a:ext uri="{96DAC541-7B7A-43D3-8B79-37D633B846F1}">
-                <asvg:svgBlip xmlns:asvg="http://schemas.microsoft.com/office/drawing/2016/SVG/main" r:embed="rId33"/>
+                <asvg:svgBlip xmlns:asvg="http://schemas.microsoft.com/office/drawing/2016/SVG/main" r:embed="rId34"/>
               </a:ext>
             </a:extLst>
           </a:blip>

</xml_diff>

<commit_message>
CV updated w rust exp.
</commit_message>
<xml_diff>
--- a/my_resume_v2.pptx
+++ b/my_resume_v2.pptx
@@ -198,7 +198,7 @@
           <a:p>
             <a:fld id="{060BEAD1-672E-E841-95FA-08B9B35A46D7}" type="datetimeFigureOut">
               <a:rPr lang="en-US" smtClean="0"/>
-              <a:t>8/9/23</a:t>
+              <a:t>8/16/23</a:t>
             </a:fld>
             <a:endParaRPr lang="en-US"/>
           </a:p>
@@ -765,7 +765,7 @@
           <a:p>
             <a:fld id="{A417C049-F611-094D-8104-5764D8D04213}" type="datetimeFigureOut">
               <a:rPr lang="en-US" smtClean="0"/>
-              <a:t>8/9/23</a:t>
+              <a:t>8/16/23</a:t>
             </a:fld>
             <a:endParaRPr lang="en-US"/>
           </a:p>
@@ -935,7 +935,7 @@
           <a:p>
             <a:fld id="{A417C049-F611-094D-8104-5764D8D04213}" type="datetimeFigureOut">
               <a:rPr lang="en-US" smtClean="0"/>
-              <a:t>8/9/23</a:t>
+              <a:t>8/16/23</a:t>
             </a:fld>
             <a:endParaRPr lang="en-US"/>
           </a:p>
@@ -1115,7 +1115,7 @@
           <a:p>
             <a:fld id="{A417C049-F611-094D-8104-5764D8D04213}" type="datetimeFigureOut">
               <a:rPr lang="en-US" smtClean="0"/>
-              <a:t>8/9/23</a:t>
+              <a:t>8/16/23</a:t>
             </a:fld>
             <a:endParaRPr lang="en-US"/>
           </a:p>
@@ -1285,7 +1285,7 @@
           <a:p>
             <a:fld id="{A417C049-F611-094D-8104-5764D8D04213}" type="datetimeFigureOut">
               <a:rPr lang="en-US" smtClean="0"/>
-              <a:t>8/9/23</a:t>
+              <a:t>8/16/23</a:t>
             </a:fld>
             <a:endParaRPr lang="en-US"/>
           </a:p>
@@ -1529,7 +1529,7 @@
           <a:p>
             <a:fld id="{A417C049-F611-094D-8104-5764D8D04213}" type="datetimeFigureOut">
               <a:rPr lang="en-US" smtClean="0"/>
-              <a:t>8/9/23</a:t>
+              <a:t>8/16/23</a:t>
             </a:fld>
             <a:endParaRPr lang="en-US"/>
           </a:p>
@@ -1761,7 +1761,7 @@
           <a:p>
             <a:fld id="{A417C049-F611-094D-8104-5764D8D04213}" type="datetimeFigureOut">
               <a:rPr lang="en-US" smtClean="0"/>
-              <a:t>8/9/23</a:t>
+              <a:t>8/16/23</a:t>
             </a:fld>
             <a:endParaRPr lang="en-US"/>
           </a:p>
@@ -2128,7 +2128,7 @@
           <a:p>
             <a:fld id="{A417C049-F611-094D-8104-5764D8D04213}" type="datetimeFigureOut">
               <a:rPr lang="en-US" smtClean="0"/>
-              <a:t>8/9/23</a:t>
+              <a:t>8/16/23</a:t>
             </a:fld>
             <a:endParaRPr lang="en-US"/>
           </a:p>
@@ -2246,7 +2246,7 @@
           <a:p>
             <a:fld id="{A417C049-F611-094D-8104-5764D8D04213}" type="datetimeFigureOut">
               <a:rPr lang="en-US" smtClean="0"/>
-              <a:t>8/9/23</a:t>
+              <a:t>8/16/23</a:t>
             </a:fld>
             <a:endParaRPr lang="en-US"/>
           </a:p>
@@ -2341,7 +2341,7 @@
           <a:p>
             <a:fld id="{A417C049-F611-094D-8104-5764D8D04213}" type="datetimeFigureOut">
               <a:rPr lang="en-US" smtClean="0"/>
-              <a:t>8/9/23</a:t>
+              <a:t>8/16/23</a:t>
             </a:fld>
             <a:endParaRPr lang="en-US"/>
           </a:p>
@@ -2618,7 +2618,7 @@
           <a:p>
             <a:fld id="{A417C049-F611-094D-8104-5764D8D04213}" type="datetimeFigureOut">
               <a:rPr lang="en-US" smtClean="0"/>
-              <a:t>8/9/23</a:t>
+              <a:t>8/16/23</a:t>
             </a:fld>
             <a:endParaRPr lang="en-US"/>
           </a:p>
@@ -2875,7 +2875,7 @@
           <a:p>
             <a:fld id="{A417C049-F611-094D-8104-5764D8D04213}" type="datetimeFigureOut">
               <a:rPr lang="en-US" smtClean="0"/>
-              <a:t>8/9/23</a:t>
+              <a:t>8/16/23</a:t>
             </a:fld>
             <a:endParaRPr lang="en-US"/>
           </a:p>
@@ -3093,7 +3093,7 @@
           <a:p>
             <a:fld id="{A417C049-F611-094D-8104-5764D8D04213}" type="datetimeFigureOut">
               <a:rPr lang="en-US" smtClean="0"/>
-              <a:t>8/9/23</a:t>
+              <a:t>8/16/23</a:t>
             </a:fld>
             <a:endParaRPr lang="en-US"/>
           </a:p>
@@ -3549,6 +3549,12 @@
             </a:r>
             <a:r>
               <a:rPr lang="en-IN" sz="900" u="sng" dirty="0">
+                <a:solidFill>
+                  <a:schemeClr val="tx1">
+                    <a:lumMod val="75000"/>
+                    <a:lumOff val="25000"/>
+                  </a:schemeClr>
+                </a:solidFill>
                 <a:hlinkClick r:id="rId3">
                   <a:extLst>
                     <a:ext uri="{A12FA001-AC4F-418D-AE19-62706E023703}">
@@ -7503,19 +7509,17 @@
                   </a:schemeClr>
                 </a:solidFill>
               </a:rPr>
-              <a:t>Contributing to Solidity + Rust based Blockchains – EVM chains, Substrate, Solana, Aptos/Sui, etc.; </a:t>
-            </a:r>
-            <a:r>
-              <a:rPr lang="en-US" sz="900" dirty="0" err="1">
-                <a:solidFill>
-                  <a:schemeClr val="tx1">
-                    <a:lumMod val="75000"/>
-                    <a:lumOff val="25000"/>
-                  </a:schemeClr>
-                </a:solidFill>
-              </a:rPr>
-              <a:t>zkStark</a:t>
-            </a:r>
+              <a:t>Built Bank pallet for substrate chain featuring traditional staking opportunities like fixed deposit, recurring deposit.</a:t>
+            </a:r>
+          </a:p>
+          <a:p>
+            <a:pPr marL="171450" indent="-171450">
+              <a:lnSpc>
+                <a:spcPts val="1238"/>
+              </a:lnSpc>
+              <a:buFont typeface="Arial" panose="020B0604020202020204" pitchFamily="34" charset="0"/>
+              <a:buChar char="•"/>
+            </a:pPr>
             <a:r>
               <a:rPr lang="en-US" sz="900" dirty="0">
                 <a:solidFill>
@@ -7525,29 +7529,7 @@
                   </a:schemeClr>
                 </a:solidFill>
               </a:rPr>
-              <a:t> Cairo; in form of pallets, contracts; All my contributions are listed for respective blockchains in my </a:t>
-            </a:r>
-            <a:r>
-              <a:rPr lang="en-US" sz="900" dirty="0" err="1">
-                <a:solidFill>
-                  <a:schemeClr val="tx1">
-                    <a:lumMod val="75000"/>
-                    <a:lumOff val="25000"/>
-                  </a:schemeClr>
-                </a:solidFill>
-              </a:rPr>
-              <a:t>github</a:t>
-            </a:r>
-            <a:r>
-              <a:rPr lang="en-US" sz="900" dirty="0">
-                <a:solidFill>
-                  <a:schemeClr val="tx1">
-                    <a:lumMod val="75000"/>
-                    <a:lumOff val="25000"/>
-                  </a:schemeClr>
-                </a:solidFill>
-              </a:rPr>
-              <a:t> profile.</a:t>
+              <a:t>Built Target proximity game &amp; food delivery proximity app using Rust.</a:t>
             </a:r>
           </a:p>
         </p:txBody>

</xml_diff>

<commit_message>
CV updated with recent development
</commit_message>
<xml_diff>
--- a/my_resume_v2.pptx
+++ b/my_resume_v2.pptx
@@ -198,7 +198,7 @@
           <a:p>
             <a:fld id="{060BEAD1-672E-E841-95FA-08B9B35A46D7}" type="datetimeFigureOut">
               <a:rPr lang="en-US" smtClean="0"/>
-              <a:t>8/16/23</a:t>
+              <a:t>8/28/23</a:t>
             </a:fld>
             <a:endParaRPr lang="en-US"/>
           </a:p>
@@ -765,7 +765,7 @@
           <a:p>
             <a:fld id="{A417C049-F611-094D-8104-5764D8D04213}" type="datetimeFigureOut">
               <a:rPr lang="en-US" smtClean="0"/>
-              <a:t>8/16/23</a:t>
+              <a:t>8/28/23</a:t>
             </a:fld>
             <a:endParaRPr lang="en-US"/>
           </a:p>
@@ -935,7 +935,7 @@
           <a:p>
             <a:fld id="{A417C049-F611-094D-8104-5764D8D04213}" type="datetimeFigureOut">
               <a:rPr lang="en-US" smtClean="0"/>
-              <a:t>8/16/23</a:t>
+              <a:t>8/28/23</a:t>
             </a:fld>
             <a:endParaRPr lang="en-US"/>
           </a:p>
@@ -1115,7 +1115,7 @@
           <a:p>
             <a:fld id="{A417C049-F611-094D-8104-5764D8D04213}" type="datetimeFigureOut">
               <a:rPr lang="en-US" smtClean="0"/>
-              <a:t>8/16/23</a:t>
+              <a:t>8/28/23</a:t>
             </a:fld>
             <a:endParaRPr lang="en-US"/>
           </a:p>
@@ -1285,7 +1285,7 @@
           <a:p>
             <a:fld id="{A417C049-F611-094D-8104-5764D8D04213}" type="datetimeFigureOut">
               <a:rPr lang="en-US" smtClean="0"/>
-              <a:t>8/16/23</a:t>
+              <a:t>8/28/23</a:t>
             </a:fld>
             <a:endParaRPr lang="en-US"/>
           </a:p>
@@ -1529,7 +1529,7 @@
           <a:p>
             <a:fld id="{A417C049-F611-094D-8104-5764D8D04213}" type="datetimeFigureOut">
               <a:rPr lang="en-US" smtClean="0"/>
-              <a:t>8/16/23</a:t>
+              <a:t>8/28/23</a:t>
             </a:fld>
             <a:endParaRPr lang="en-US"/>
           </a:p>
@@ -1761,7 +1761,7 @@
           <a:p>
             <a:fld id="{A417C049-F611-094D-8104-5764D8D04213}" type="datetimeFigureOut">
               <a:rPr lang="en-US" smtClean="0"/>
-              <a:t>8/16/23</a:t>
+              <a:t>8/28/23</a:t>
             </a:fld>
             <a:endParaRPr lang="en-US"/>
           </a:p>
@@ -2128,7 +2128,7 @@
           <a:p>
             <a:fld id="{A417C049-F611-094D-8104-5764D8D04213}" type="datetimeFigureOut">
               <a:rPr lang="en-US" smtClean="0"/>
-              <a:t>8/16/23</a:t>
+              <a:t>8/28/23</a:t>
             </a:fld>
             <a:endParaRPr lang="en-US"/>
           </a:p>
@@ -2246,7 +2246,7 @@
           <a:p>
             <a:fld id="{A417C049-F611-094D-8104-5764D8D04213}" type="datetimeFigureOut">
               <a:rPr lang="en-US" smtClean="0"/>
-              <a:t>8/16/23</a:t>
+              <a:t>8/28/23</a:t>
             </a:fld>
             <a:endParaRPr lang="en-US"/>
           </a:p>
@@ -2341,7 +2341,7 @@
           <a:p>
             <a:fld id="{A417C049-F611-094D-8104-5764D8D04213}" type="datetimeFigureOut">
               <a:rPr lang="en-US" smtClean="0"/>
-              <a:t>8/16/23</a:t>
+              <a:t>8/28/23</a:t>
             </a:fld>
             <a:endParaRPr lang="en-US"/>
           </a:p>
@@ -2618,7 +2618,7 @@
           <a:p>
             <a:fld id="{A417C049-F611-094D-8104-5764D8D04213}" type="datetimeFigureOut">
               <a:rPr lang="en-US" smtClean="0"/>
-              <a:t>8/16/23</a:t>
+              <a:t>8/28/23</a:t>
             </a:fld>
             <a:endParaRPr lang="en-US"/>
           </a:p>
@@ -2875,7 +2875,7 @@
           <a:p>
             <a:fld id="{A417C049-F611-094D-8104-5764D8D04213}" type="datetimeFigureOut">
               <a:rPr lang="en-US" smtClean="0"/>
-              <a:t>8/16/23</a:t>
+              <a:t>8/28/23</a:t>
             </a:fld>
             <a:endParaRPr lang="en-US"/>
           </a:p>
@@ -3093,7 +3093,7 @@
           <a:p>
             <a:fld id="{A417C049-F611-094D-8104-5764D8D04213}" type="datetimeFigureOut">
               <a:rPr lang="en-US" smtClean="0"/>
-              <a:t>8/16/23</a:t>
+              <a:t>8/28/23</a:t>
             </a:fld>
             <a:endParaRPr lang="en-US"/>
           </a:p>
@@ -6007,9 +6007,9 @@
         </p:nvGrpSpPr>
         <p:grpSpPr>
           <a:xfrm>
-            <a:off x="134191" y="4301053"/>
+            <a:off x="134191" y="4230035"/>
             <a:ext cx="1502200" cy="292388"/>
-            <a:chOff x="4141297" y="2679564"/>
+            <a:chOff x="4141297" y="2671400"/>
             <a:chExt cx="1502200" cy="292388"/>
           </a:xfrm>
         </p:grpSpPr>
@@ -6044,7 +6044,7 @@
           </p:blipFill>
           <p:spPr>
             <a:xfrm>
-              <a:off x="4141297" y="2749768"/>
+              <a:off x="4141297" y="2718996"/>
               <a:ext cx="151949" cy="151949"/>
             </a:xfrm>
             <a:prstGeom prst="rect">
@@ -6066,7 +6066,7 @@
           </p:nvSpPr>
           <p:spPr>
             <a:xfrm>
-              <a:off x="4214946" y="2679564"/>
+              <a:off x="4214946" y="2671400"/>
               <a:ext cx="1428551" cy="292388"/>
             </a:xfrm>
             <a:prstGeom prst="rect">
@@ -7432,8 +7432,8 @@
         </p:nvSpPr>
         <p:spPr>
           <a:xfrm>
-            <a:off x="88190" y="4565772"/>
-            <a:ext cx="6657120" cy="571631"/>
+            <a:off x="88190" y="4464336"/>
+            <a:ext cx="6657120" cy="725520"/>
           </a:xfrm>
           <a:prstGeom prst="rect">
             <a:avLst/>
@@ -7530,6 +7530,70 @@
                 </a:solidFill>
               </a:rPr>
               <a:t>Built Target proximity game &amp; food delivery proximity app using Rust.</a:t>
+            </a:r>
+          </a:p>
+          <a:p>
+            <a:pPr marL="171450" indent="-171450">
+              <a:lnSpc>
+                <a:spcPts val="1238"/>
+              </a:lnSpc>
+              <a:buFont typeface="Arial" panose="020B0604020202020204" pitchFamily="34" charset="0"/>
+              <a:buChar char="•"/>
+            </a:pPr>
+            <a:r>
+              <a:rPr lang="en-US" sz="900" dirty="0">
+                <a:solidFill>
+                  <a:schemeClr val="tx1">
+                    <a:lumMod val="75000"/>
+                    <a:lumOff val="25000"/>
+                  </a:schemeClr>
+                </a:solidFill>
+              </a:rPr>
+              <a:t>Built Revealable </a:t>
+            </a:r>
+            <a:r>
+              <a:rPr lang="en-US" sz="900" dirty="0" err="1">
+                <a:solidFill>
+                  <a:schemeClr val="tx1">
+                    <a:lumMod val="75000"/>
+                    <a:lumOff val="25000"/>
+                  </a:schemeClr>
+                </a:solidFill>
+              </a:rPr>
+              <a:t>Stakeable</a:t>
+            </a:r>
+            <a:r>
+              <a:rPr lang="en-US" sz="900" dirty="0">
+                <a:solidFill>
+                  <a:schemeClr val="tx1">
+                    <a:lumMod val="75000"/>
+                    <a:lumOff val="25000"/>
+                  </a:schemeClr>
+                </a:solidFill>
+              </a:rPr>
+              <a:t> Dynamic On-chain NFT for EVM chain; developed concurrent RESTful APIs using Rust </a:t>
+            </a:r>
+            <a:r>
+              <a:rPr lang="en-US" sz="900" dirty="0" err="1">
+                <a:solidFill>
+                  <a:schemeClr val="tx1">
+                    <a:lumMod val="75000"/>
+                    <a:lumOff val="25000"/>
+                  </a:schemeClr>
+                </a:solidFill>
+              </a:rPr>
+              <a:t>Actix</a:t>
+            </a:r>
+            <a:r>
+              <a:rPr lang="en-US" sz="900" dirty="0">
+                <a:solidFill>
+                  <a:schemeClr val="tx1">
+                    <a:lumMod val="75000"/>
+                    <a:lumOff val="25000"/>
+                  </a:schemeClr>
+                </a:solidFill>
+              </a:rPr>
+              <a:t> web framework.</a:t>
             </a:r>
           </a:p>
         </p:txBody>
@@ -7628,51 +7692,6 @@
       </p:grpSp>
       <p:cxnSp>
         <p:nvCxnSpPr>
-          <p:cNvPr id="1065" name="Straight Connector 1064">
-            <a:extLst>
-              <a:ext uri="{FF2B5EF4-FFF2-40B4-BE49-F238E27FC236}">
-                <a16:creationId xmlns:a16="http://schemas.microsoft.com/office/drawing/2014/main" id="{5D904CE3-3A75-31DA-5DDF-BBE05D91CDA2}"/>
-              </a:ext>
-            </a:extLst>
-          </p:cNvPr>
-          <p:cNvCxnSpPr>
-            <a:cxnSpLocks/>
-          </p:cNvCxnSpPr>
-          <p:nvPr/>
-        </p:nvCxnSpPr>
-        <p:spPr>
-          <a:xfrm>
-            <a:off x="0" y="4292050"/>
-            <a:ext cx="6858000" cy="0"/>
-          </a:xfrm>
-          <a:prstGeom prst="line">
-            <a:avLst/>
-          </a:prstGeom>
-          <a:ln>
-            <a:solidFill>
-              <a:schemeClr val="bg1">
-                <a:lumMod val="75000"/>
-              </a:schemeClr>
-            </a:solidFill>
-          </a:ln>
-        </p:spPr>
-        <p:style>
-          <a:lnRef idx="1">
-            <a:schemeClr val="accent1"/>
-          </a:lnRef>
-          <a:fillRef idx="0">
-            <a:schemeClr val="accent1"/>
-          </a:fillRef>
-          <a:effectRef idx="0">
-            <a:schemeClr val="accent1"/>
-          </a:effectRef>
-          <a:fontRef idx="minor">
-            <a:schemeClr val="tx1"/>
-          </a:fontRef>
-        </p:style>
-      </p:cxnSp>
-      <p:cxnSp>
-        <p:nvCxnSpPr>
           <p:cNvPr id="1068" name="Straight Connector 1067">
             <a:extLst>
               <a:ext uri="{FF2B5EF4-FFF2-40B4-BE49-F238E27FC236}">
@@ -8003,7 +8022,7 @@
                   </a:schemeClr>
                 </a:solidFill>
               </a:rPr>
-              <a:t>Sept 2016 – Jan 2018 | Freelancing as Web3 Full-stack Engineer </a:t>
+              <a:t>Sep 2016 – Jan 2018 | Freelancing as Web3 Full-stack Engineer </a:t>
             </a:r>
             <a:r>
               <a:rPr lang="en-US" sz="900" dirty="0">
@@ -9332,7 +9351,7 @@
         </p:nvGrpSpPr>
         <p:grpSpPr>
           <a:xfrm>
-            <a:off x="43383" y="6581788"/>
+            <a:off x="114726" y="7011927"/>
             <a:ext cx="746451" cy="307777"/>
             <a:chOff x="4078910" y="4249257"/>
             <a:chExt cx="746451" cy="307777"/>
@@ -9428,7 +9447,7 @@
         </p:nvSpPr>
         <p:spPr>
           <a:xfrm>
-            <a:off x="222612" y="7238972"/>
+            <a:off x="293955" y="7629696"/>
             <a:ext cx="1862030" cy="114300"/>
           </a:xfrm>
           <a:prstGeom prst="rect">
@@ -9483,7 +9502,7 @@
         </p:nvSpPr>
         <p:spPr>
           <a:xfrm>
-            <a:off x="222612" y="7238972"/>
+            <a:off x="293955" y="7629696"/>
             <a:ext cx="1847945" cy="114300"/>
           </a:xfrm>
           <a:prstGeom prst="rect">
@@ -9535,7 +9554,7 @@
         </p:nvSpPr>
         <p:spPr>
           <a:xfrm>
-            <a:off x="134248" y="7041518"/>
+            <a:off x="205591" y="7432242"/>
             <a:ext cx="784189" cy="230832"/>
           </a:xfrm>
           <a:prstGeom prst="rect">
@@ -9585,7 +9604,7 @@
         </p:nvSpPr>
         <p:spPr>
           <a:xfrm>
-            <a:off x="7200" y="6868317"/>
+            <a:off x="199665" y="7251939"/>
             <a:ext cx="1483708" cy="230832"/>
           </a:xfrm>
           <a:prstGeom prst="rect">
@@ -9603,7 +9622,7 @@
               <a:rPr lang="en-US" sz="900" b="1" dirty="0">
                 <a:latin typeface="Monaco" pitchFamily="2" charset="77"/>
               </a:rPr>
-              <a:t>- Developer Skills</a:t>
+              <a:t>Developer Skills</a:t>
             </a:r>
           </a:p>
         </p:txBody>
@@ -9622,7 +9641,7 @@
         </p:nvSpPr>
         <p:spPr>
           <a:xfrm>
-            <a:off x="222612" y="7533817"/>
+            <a:off x="293955" y="7924541"/>
             <a:ext cx="1862030" cy="114300"/>
           </a:xfrm>
           <a:prstGeom prst="rect">
@@ -9677,7 +9696,7 @@
         </p:nvSpPr>
         <p:spPr>
           <a:xfrm>
-            <a:off x="222612" y="7533817"/>
+            <a:off x="293955" y="7924541"/>
             <a:ext cx="1847945" cy="114300"/>
           </a:xfrm>
           <a:prstGeom prst="rect">
@@ -9729,7 +9748,7 @@
         </p:nvSpPr>
         <p:spPr>
           <a:xfrm>
-            <a:off x="134248" y="7336363"/>
+            <a:off x="205591" y="7727087"/>
             <a:ext cx="1383712" cy="230832"/>
           </a:xfrm>
           <a:prstGeom prst="rect">
@@ -9779,7 +9798,7 @@
         </p:nvSpPr>
         <p:spPr>
           <a:xfrm>
-            <a:off x="222613" y="7827668"/>
+            <a:off x="293956" y="8218392"/>
             <a:ext cx="1862030" cy="114300"/>
           </a:xfrm>
           <a:prstGeom prst="rect">
@@ -9834,7 +9853,7 @@
         </p:nvSpPr>
         <p:spPr>
           <a:xfrm>
-            <a:off x="222612" y="7828172"/>
+            <a:off x="293955" y="8218896"/>
             <a:ext cx="1773957" cy="114750"/>
           </a:xfrm>
           <a:prstGeom prst="rect">
@@ -9886,7 +9905,7 @@
         </p:nvSpPr>
         <p:spPr>
           <a:xfrm>
-            <a:off x="134249" y="7630214"/>
+            <a:off x="205592" y="8020938"/>
             <a:ext cx="1322798" cy="230832"/>
           </a:xfrm>
           <a:prstGeom prst="rect">
@@ -9947,7 +9966,7 @@
         </p:nvSpPr>
         <p:spPr>
           <a:xfrm>
-            <a:off x="222612" y="8133455"/>
+            <a:off x="293955" y="8524179"/>
             <a:ext cx="1862030" cy="114300"/>
           </a:xfrm>
           <a:prstGeom prst="rect">
@@ -10002,7 +10021,7 @@
         </p:nvSpPr>
         <p:spPr>
           <a:xfrm>
-            <a:off x="222612" y="8133455"/>
+            <a:off x="293955" y="8524179"/>
             <a:ext cx="1748020" cy="114300"/>
           </a:xfrm>
           <a:prstGeom prst="rect">
@@ -10054,7 +10073,7 @@
         </p:nvSpPr>
         <p:spPr>
           <a:xfrm>
-            <a:off x="134248" y="7936001"/>
+            <a:off x="205591" y="8326725"/>
             <a:ext cx="1079142" cy="230832"/>
           </a:xfrm>
           <a:prstGeom prst="rect">
@@ -10103,10 +10122,10 @@
       </p:sp>
       <p:sp>
         <p:nvSpPr>
-          <p:cNvPr id="1030" name="Rectangle 1029">
+          <p:cNvPr id="1085" name="Rectangle 1084">
             <a:extLst>
               <a:ext uri="{FF2B5EF4-FFF2-40B4-BE49-F238E27FC236}">
-                <a16:creationId xmlns:a16="http://schemas.microsoft.com/office/drawing/2014/main" id="{88775E24-D6FA-B38C-DF72-B657A44D8EBC}"/>
+                <a16:creationId xmlns:a16="http://schemas.microsoft.com/office/drawing/2014/main" id="{7EDEAE20-D722-2C2A-E550-DE8A985BBE15}"/>
               </a:ext>
             </a:extLst>
           </p:cNvPr>
@@ -10115,7 +10134,1265 @@
         </p:nvSpPr>
         <p:spPr>
           <a:xfrm>
-            <a:off x="222612" y="8447640"/>
+            <a:off x="3211050" y="8012606"/>
+            <a:ext cx="1794994" cy="114300"/>
+          </a:xfrm>
+          <a:prstGeom prst="rect">
+            <a:avLst/>
+          </a:prstGeom>
+          <a:solidFill>
+            <a:schemeClr val="tx1">
+              <a:lumMod val="75000"/>
+              <a:lumOff val="25000"/>
+            </a:schemeClr>
+          </a:solidFill>
+          <a:ln>
+            <a:noFill/>
+          </a:ln>
+        </p:spPr>
+        <p:style>
+          <a:lnRef idx="2">
+            <a:schemeClr val="accent1">
+              <a:shade val="50000"/>
+            </a:schemeClr>
+          </a:lnRef>
+          <a:fillRef idx="1">
+            <a:schemeClr val="accent1"/>
+          </a:fillRef>
+          <a:effectRef idx="0">
+            <a:schemeClr val="accent1"/>
+          </a:effectRef>
+          <a:fontRef idx="minor">
+            <a:schemeClr val="lt1"/>
+          </a:fontRef>
+        </p:style>
+        <p:txBody>
+          <a:bodyPr rtlCol="0" anchor="ctr"/>
+          <a:lstStyle/>
+          <a:p>
+            <a:pPr algn="ctr"/>
+            <a:endParaRPr lang="en-US"/>
+          </a:p>
+        </p:txBody>
+      </p:sp>
+      <p:sp>
+        <p:nvSpPr>
+          <p:cNvPr id="1086" name="Rectangle 1085">
+            <a:extLst>
+              <a:ext uri="{FF2B5EF4-FFF2-40B4-BE49-F238E27FC236}">
+                <a16:creationId xmlns:a16="http://schemas.microsoft.com/office/drawing/2014/main" id="{914EEABC-C75C-F61B-6C4C-ADBB7C7C7364}"/>
+              </a:ext>
+            </a:extLst>
+          </p:cNvPr>
+          <p:cNvSpPr/>
+          <p:nvPr/>
+        </p:nvSpPr>
+        <p:spPr>
+          <a:xfrm>
+            <a:off x="3211049" y="8012606"/>
+            <a:ext cx="1766721" cy="114300"/>
+          </a:xfrm>
+          <a:prstGeom prst="rect">
+            <a:avLst/>
+          </a:prstGeom>
+          <a:solidFill>
+            <a:srgbClr val="00B0F0"/>
+          </a:solidFill>
+          <a:ln>
+            <a:noFill/>
+          </a:ln>
+        </p:spPr>
+        <p:style>
+          <a:lnRef idx="2">
+            <a:schemeClr val="accent1">
+              <a:shade val="50000"/>
+            </a:schemeClr>
+          </a:lnRef>
+          <a:fillRef idx="1">
+            <a:schemeClr val="accent1"/>
+          </a:fillRef>
+          <a:effectRef idx="0">
+            <a:schemeClr val="accent1"/>
+          </a:effectRef>
+          <a:fontRef idx="minor">
+            <a:schemeClr val="lt1"/>
+          </a:fontRef>
+        </p:style>
+        <p:txBody>
+          <a:bodyPr rtlCol="0" anchor="ctr"/>
+          <a:lstStyle/>
+          <a:p>
+            <a:pPr algn="ctr"/>
+            <a:endParaRPr lang="en-US"/>
+          </a:p>
+        </p:txBody>
+      </p:sp>
+      <p:sp>
+        <p:nvSpPr>
+          <p:cNvPr id="1087" name="TextBox 1086">
+            <a:extLst>
+              <a:ext uri="{FF2B5EF4-FFF2-40B4-BE49-F238E27FC236}">
+                <a16:creationId xmlns:a16="http://schemas.microsoft.com/office/drawing/2014/main" id="{2BC93861-CEF6-D4D5-9474-C6E7A2CAED65}"/>
+              </a:ext>
+            </a:extLst>
+          </p:cNvPr>
+          <p:cNvSpPr txBox="1"/>
+          <p:nvPr/>
+        </p:nvSpPr>
+        <p:spPr>
+          <a:xfrm>
+            <a:off x="3122685" y="7787720"/>
+            <a:ext cx="1611339" cy="230832"/>
+          </a:xfrm>
+          <a:prstGeom prst="rect">
+            <a:avLst/>
+          </a:prstGeom>
+          <a:noFill/>
+        </p:spPr>
+        <p:txBody>
+          <a:bodyPr wrap="none" rtlCol="0">
+            <a:spAutoFit/>
+          </a:bodyPr>
+          <a:lstStyle/>
+          <a:p>
+            <a:r>
+              <a:rPr lang="en-US" sz="900" dirty="0">
+                <a:solidFill>
+                  <a:schemeClr val="tx1">
+                    <a:lumMod val="75000"/>
+                    <a:lumOff val="25000"/>
+                  </a:schemeClr>
+                </a:solidFill>
+              </a:rPr>
+              <a:t>Ability to work under pressure</a:t>
+            </a:r>
+            <a:endParaRPr lang="en-US" sz="800" dirty="0">
+              <a:solidFill>
+                <a:schemeClr val="tx1">
+                  <a:lumMod val="75000"/>
+                  <a:lumOff val="25000"/>
+                </a:schemeClr>
+              </a:solidFill>
+            </a:endParaRPr>
+          </a:p>
+        </p:txBody>
+      </p:sp>
+      <p:sp>
+        <p:nvSpPr>
+          <p:cNvPr id="1088" name="TextBox 1087">
+            <a:extLst>
+              <a:ext uri="{FF2B5EF4-FFF2-40B4-BE49-F238E27FC236}">
+                <a16:creationId xmlns:a16="http://schemas.microsoft.com/office/drawing/2014/main" id="{1D1120FA-590C-B8A1-BDB0-5C777A30968A}"/>
+              </a:ext>
+            </a:extLst>
+          </p:cNvPr>
+          <p:cNvSpPr txBox="1"/>
+          <p:nvPr/>
+        </p:nvSpPr>
+        <p:spPr>
+          <a:xfrm>
+            <a:off x="3122685" y="7289425"/>
+            <a:ext cx="1883359" cy="230822"/>
+          </a:xfrm>
+          <a:prstGeom prst="rect">
+            <a:avLst/>
+          </a:prstGeom>
+          <a:noFill/>
+        </p:spPr>
+        <p:txBody>
+          <a:bodyPr wrap="square" rtlCol="0">
+            <a:spAutoFit/>
+          </a:bodyPr>
+          <a:lstStyle/>
+          <a:p>
+            <a:r>
+              <a:rPr lang="en-US" sz="900" b="1" dirty="0">
+                <a:latin typeface="Monaco" pitchFamily="2" charset="77"/>
+              </a:rPr>
+              <a:t>Inter-personal Skills</a:t>
+            </a:r>
+          </a:p>
+        </p:txBody>
+      </p:sp>
+      <p:sp>
+        <p:nvSpPr>
+          <p:cNvPr id="1089" name="Rectangle 1088">
+            <a:extLst>
+              <a:ext uri="{FF2B5EF4-FFF2-40B4-BE49-F238E27FC236}">
+                <a16:creationId xmlns:a16="http://schemas.microsoft.com/office/drawing/2014/main" id="{A3C1F358-2F9E-3478-F1BF-24475DF839D2}"/>
+              </a:ext>
+            </a:extLst>
+          </p:cNvPr>
+          <p:cNvSpPr/>
+          <p:nvPr/>
+        </p:nvSpPr>
+        <p:spPr>
+          <a:xfrm>
+            <a:off x="3211050" y="8346326"/>
+            <a:ext cx="1794994" cy="114300"/>
+          </a:xfrm>
+          <a:prstGeom prst="rect">
+            <a:avLst/>
+          </a:prstGeom>
+          <a:solidFill>
+            <a:schemeClr val="tx1">
+              <a:lumMod val="75000"/>
+              <a:lumOff val="25000"/>
+            </a:schemeClr>
+          </a:solidFill>
+          <a:ln>
+            <a:noFill/>
+          </a:ln>
+        </p:spPr>
+        <p:style>
+          <a:lnRef idx="2">
+            <a:schemeClr val="accent1">
+              <a:shade val="50000"/>
+            </a:schemeClr>
+          </a:lnRef>
+          <a:fillRef idx="1">
+            <a:schemeClr val="accent1"/>
+          </a:fillRef>
+          <a:effectRef idx="0">
+            <a:schemeClr val="accent1"/>
+          </a:effectRef>
+          <a:fontRef idx="minor">
+            <a:schemeClr val="lt1"/>
+          </a:fontRef>
+        </p:style>
+        <p:txBody>
+          <a:bodyPr rtlCol="0" anchor="ctr"/>
+          <a:lstStyle/>
+          <a:p>
+            <a:pPr algn="ctr"/>
+            <a:endParaRPr lang="en-US"/>
+          </a:p>
+        </p:txBody>
+      </p:sp>
+      <p:sp>
+        <p:nvSpPr>
+          <p:cNvPr id="1090" name="Rectangle 1089">
+            <a:extLst>
+              <a:ext uri="{FF2B5EF4-FFF2-40B4-BE49-F238E27FC236}">
+                <a16:creationId xmlns:a16="http://schemas.microsoft.com/office/drawing/2014/main" id="{A66AC53A-0F09-55B3-DFAF-F76817367811}"/>
+              </a:ext>
+            </a:extLst>
+          </p:cNvPr>
+          <p:cNvSpPr/>
+          <p:nvPr/>
+        </p:nvSpPr>
+        <p:spPr>
+          <a:xfrm>
+            <a:off x="3211049" y="8346326"/>
+            <a:ext cx="1780857" cy="114300"/>
+          </a:xfrm>
+          <a:prstGeom prst="rect">
+            <a:avLst/>
+          </a:prstGeom>
+          <a:solidFill>
+            <a:srgbClr val="00B0F0"/>
+          </a:solidFill>
+          <a:ln>
+            <a:noFill/>
+          </a:ln>
+        </p:spPr>
+        <p:style>
+          <a:lnRef idx="2">
+            <a:schemeClr val="accent1">
+              <a:shade val="50000"/>
+            </a:schemeClr>
+          </a:lnRef>
+          <a:fillRef idx="1">
+            <a:schemeClr val="accent1"/>
+          </a:fillRef>
+          <a:effectRef idx="0">
+            <a:schemeClr val="accent1"/>
+          </a:effectRef>
+          <a:fontRef idx="minor">
+            <a:schemeClr val="lt1"/>
+          </a:fontRef>
+        </p:style>
+        <p:txBody>
+          <a:bodyPr rtlCol="0" anchor="ctr"/>
+          <a:lstStyle/>
+          <a:p>
+            <a:pPr algn="ctr"/>
+            <a:endParaRPr lang="en-US"/>
+          </a:p>
+        </p:txBody>
+      </p:sp>
+      <p:sp>
+        <p:nvSpPr>
+          <p:cNvPr id="1091" name="TextBox 1090">
+            <a:extLst>
+              <a:ext uri="{FF2B5EF4-FFF2-40B4-BE49-F238E27FC236}">
+                <a16:creationId xmlns:a16="http://schemas.microsoft.com/office/drawing/2014/main" id="{8637B99D-8F4C-DA7C-72E3-A1A997C1E4EC}"/>
+              </a:ext>
+            </a:extLst>
+          </p:cNvPr>
+          <p:cNvSpPr txBox="1"/>
+          <p:nvPr/>
+        </p:nvSpPr>
+        <p:spPr>
+          <a:xfrm>
+            <a:off x="3122685" y="8130584"/>
+            <a:ext cx="901209" cy="230832"/>
+          </a:xfrm>
+          <a:prstGeom prst="rect">
+            <a:avLst/>
+          </a:prstGeom>
+          <a:noFill/>
+        </p:spPr>
+        <p:txBody>
+          <a:bodyPr wrap="none" rtlCol="0">
+            <a:spAutoFit/>
+          </a:bodyPr>
+          <a:lstStyle/>
+          <a:p>
+            <a:r>
+              <a:rPr lang="en-US" sz="900" dirty="0">
+                <a:solidFill>
+                  <a:schemeClr val="tx1">
+                    <a:lumMod val="75000"/>
+                    <a:lumOff val="25000"/>
+                  </a:schemeClr>
+                </a:solidFill>
+              </a:rPr>
+              <a:t>Analytical Skills</a:t>
+            </a:r>
+            <a:endParaRPr lang="en-US" sz="800" dirty="0">
+              <a:solidFill>
+                <a:schemeClr val="tx1">
+                  <a:lumMod val="75000"/>
+                  <a:lumOff val="25000"/>
+                </a:schemeClr>
+              </a:solidFill>
+            </a:endParaRPr>
+          </a:p>
+        </p:txBody>
+      </p:sp>
+      <p:sp>
+        <p:nvSpPr>
+          <p:cNvPr id="1095" name="Rectangle 1094">
+            <a:extLst>
+              <a:ext uri="{FF2B5EF4-FFF2-40B4-BE49-F238E27FC236}">
+                <a16:creationId xmlns:a16="http://schemas.microsoft.com/office/drawing/2014/main" id="{DFE758B5-FD15-0888-C6EB-EDC485C4B21F}"/>
+              </a:ext>
+            </a:extLst>
+          </p:cNvPr>
+          <p:cNvSpPr/>
+          <p:nvPr/>
+        </p:nvSpPr>
+        <p:spPr>
+          <a:xfrm>
+            <a:off x="3211050" y="8640265"/>
+            <a:ext cx="1794994" cy="114300"/>
+          </a:xfrm>
+          <a:prstGeom prst="rect">
+            <a:avLst/>
+          </a:prstGeom>
+          <a:solidFill>
+            <a:schemeClr val="tx1">
+              <a:lumMod val="75000"/>
+              <a:lumOff val="25000"/>
+            </a:schemeClr>
+          </a:solidFill>
+          <a:ln>
+            <a:noFill/>
+          </a:ln>
+        </p:spPr>
+        <p:style>
+          <a:lnRef idx="2">
+            <a:schemeClr val="accent1">
+              <a:shade val="50000"/>
+            </a:schemeClr>
+          </a:lnRef>
+          <a:fillRef idx="1">
+            <a:schemeClr val="accent1"/>
+          </a:fillRef>
+          <a:effectRef idx="0">
+            <a:schemeClr val="accent1"/>
+          </a:effectRef>
+          <a:fontRef idx="minor">
+            <a:schemeClr val="lt1"/>
+          </a:fontRef>
+        </p:style>
+        <p:txBody>
+          <a:bodyPr rtlCol="0" anchor="ctr"/>
+          <a:lstStyle/>
+          <a:p>
+            <a:pPr algn="ctr"/>
+            <a:endParaRPr lang="en-US"/>
+          </a:p>
+        </p:txBody>
+      </p:sp>
+      <p:sp>
+        <p:nvSpPr>
+          <p:cNvPr id="1096" name="Rectangle 1095">
+            <a:extLst>
+              <a:ext uri="{FF2B5EF4-FFF2-40B4-BE49-F238E27FC236}">
+                <a16:creationId xmlns:a16="http://schemas.microsoft.com/office/drawing/2014/main" id="{BCF60A8B-0218-0323-5D34-72EE64B85DFA}"/>
+              </a:ext>
+            </a:extLst>
+          </p:cNvPr>
+          <p:cNvSpPr/>
+          <p:nvPr/>
+        </p:nvSpPr>
+        <p:spPr>
+          <a:xfrm>
+            <a:off x="3211049" y="8640265"/>
+            <a:ext cx="1753946" cy="114300"/>
+          </a:xfrm>
+          <a:prstGeom prst="rect">
+            <a:avLst/>
+          </a:prstGeom>
+          <a:solidFill>
+            <a:srgbClr val="00B0F0"/>
+          </a:solidFill>
+          <a:ln>
+            <a:noFill/>
+          </a:ln>
+        </p:spPr>
+        <p:style>
+          <a:lnRef idx="2">
+            <a:schemeClr val="accent1">
+              <a:shade val="50000"/>
+            </a:schemeClr>
+          </a:lnRef>
+          <a:fillRef idx="1">
+            <a:schemeClr val="accent1"/>
+          </a:fillRef>
+          <a:effectRef idx="0">
+            <a:schemeClr val="accent1"/>
+          </a:effectRef>
+          <a:fontRef idx="minor">
+            <a:schemeClr val="lt1"/>
+          </a:fontRef>
+        </p:style>
+        <p:txBody>
+          <a:bodyPr rtlCol="0" anchor="ctr"/>
+          <a:lstStyle/>
+          <a:p>
+            <a:pPr algn="ctr"/>
+            <a:endParaRPr lang="en-US"/>
+          </a:p>
+        </p:txBody>
+      </p:sp>
+      <p:sp>
+        <p:nvSpPr>
+          <p:cNvPr id="1097" name="TextBox 1096">
+            <a:extLst>
+              <a:ext uri="{FF2B5EF4-FFF2-40B4-BE49-F238E27FC236}">
+                <a16:creationId xmlns:a16="http://schemas.microsoft.com/office/drawing/2014/main" id="{4F62FE6A-1D35-6A88-64D6-1FA1CF67BC90}"/>
+              </a:ext>
+            </a:extLst>
+          </p:cNvPr>
+          <p:cNvSpPr txBox="1"/>
+          <p:nvPr/>
+        </p:nvSpPr>
+        <p:spPr>
+          <a:xfrm>
+            <a:off x="3122685" y="8433667"/>
+            <a:ext cx="771365" cy="230832"/>
+          </a:xfrm>
+          <a:prstGeom prst="rect">
+            <a:avLst/>
+          </a:prstGeom>
+          <a:noFill/>
+        </p:spPr>
+        <p:txBody>
+          <a:bodyPr wrap="none" rtlCol="0">
+            <a:spAutoFit/>
+          </a:bodyPr>
+          <a:lstStyle/>
+          <a:p>
+            <a:r>
+              <a:rPr lang="en-US" sz="900" dirty="0">
+                <a:solidFill>
+                  <a:schemeClr val="tx1">
+                    <a:lumMod val="75000"/>
+                    <a:lumOff val="25000"/>
+                  </a:schemeClr>
+                </a:solidFill>
+              </a:rPr>
+              <a:t>Multitasking</a:t>
+            </a:r>
+            <a:endParaRPr lang="en-US" sz="800" dirty="0">
+              <a:solidFill>
+                <a:schemeClr val="tx1">
+                  <a:lumMod val="75000"/>
+                  <a:lumOff val="25000"/>
+                </a:schemeClr>
+              </a:solidFill>
+            </a:endParaRPr>
+          </a:p>
+        </p:txBody>
+      </p:sp>
+      <p:sp>
+        <p:nvSpPr>
+          <p:cNvPr id="1098" name="Rectangle 1097">
+            <a:extLst>
+              <a:ext uri="{FF2B5EF4-FFF2-40B4-BE49-F238E27FC236}">
+                <a16:creationId xmlns:a16="http://schemas.microsoft.com/office/drawing/2014/main" id="{211391E0-B532-2FF5-5ACB-875E435F7B48}"/>
+              </a:ext>
+            </a:extLst>
+          </p:cNvPr>
+          <p:cNvSpPr/>
+          <p:nvPr/>
+        </p:nvSpPr>
+        <p:spPr>
+          <a:xfrm>
+            <a:off x="3211050" y="8946223"/>
+            <a:ext cx="1794994" cy="114300"/>
+          </a:xfrm>
+          <a:prstGeom prst="rect">
+            <a:avLst/>
+          </a:prstGeom>
+          <a:solidFill>
+            <a:schemeClr val="tx1">
+              <a:lumMod val="75000"/>
+              <a:lumOff val="25000"/>
+            </a:schemeClr>
+          </a:solidFill>
+          <a:ln>
+            <a:noFill/>
+          </a:ln>
+        </p:spPr>
+        <p:style>
+          <a:lnRef idx="2">
+            <a:schemeClr val="accent1">
+              <a:shade val="50000"/>
+            </a:schemeClr>
+          </a:lnRef>
+          <a:fillRef idx="1">
+            <a:schemeClr val="accent1"/>
+          </a:fillRef>
+          <a:effectRef idx="0">
+            <a:schemeClr val="accent1"/>
+          </a:effectRef>
+          <a:fontRef idx="minor">
+            <a:schemeClr val="lt1"/>
+          </a:fontRef>
+        </p:style>
+        <p:txBody>
+          <a:bodyPr rtlCol="0" anchor="ctr"/>
+          <a:lstStyle/>
+          <a:p>
+            <a:pPr algn="ctr"/>
+            <a:endParaRPr lang="en-US"/>
+          </a:p>
+        </p:txBody>
+      </p:sp>
+      <p:sp>
+        <p:nvSpPr>
+          <p:cNvPr id="1099" name="Rectangle 1098">
+            <a:extLst>
+              <a:ext uri="{FF2B5EF4-FFF2-40B4-BE49-F238E27FC236}">
+                <a16:creationId xmlns:a16="http://schemas.microsoft.com/office/drawing/2014/main" id="{56C14BF6-2BF9-C49A-6F1D-C0FCF6E32D75}"/>
+              </a:ext>
+            </a:extLst>
+          </p:cNvPr>
+          <p:cNvSpPr/>
+          <p:nvPr/>
+        </p:nvSpPr>
+        <p:spPr>
+          <a:xfrm>
+            <a:off x="3211050" y="8946223"/>
+            <a:ext cx="1781416" cy="114300"/>
+          </a:xfrm>
+          <a:prstGeom prst="rect">
+            <a:avLst/>
+          </a:prstGeom>
+          <a:solidFill>
+            <a:srgbClr val="00B0F0"/>
+          </a:solidFill>
+          <a:ln>
+            <a:noFill/>
+          </a:ln>
+        </p:spPr>
+        <p:style>
+          <a:lnRef idx="2">
+            <a:schemeClr val="accent1">
+              <a:shade val="50000"/>
+            </a:schemeClr>
+          </a:lnRef>
+          <a:fillRef idx="1">
+            <a:schemeClr val="accent1"/>
+          </a:fillRef>
+          <a:effectRef idx="0">
+            <a:schemeClr val="accent1"/>
+          </a:effectRef>
+          <a:fontRef idx="minor">
+            <a:schemeClr val="lt1"/>
+          </a:fontRef>
+        </p:style>
+        <p:txBody>
+          <a:bodyPr rtlCol="0" anchor="ctr"/>
+          <a:lstStyle/>
+          <a:p>
+            <a:pPr algn="ctr"/>
+            <a:endParaRPr lang="en-US"/>
+          </a:p>
+        </p:txBody>
+      </p:sp>
+      <p:sp>
+        <p:nvSpPr>
+          <p:cNvPr id="1100" name="TextBox 1099">
+            <a:extLst>
+              <a:ext uri="{FF2B5EF4-FFF2-40B4-BE49-F238E27FC236}">
+                <a16:creationId xmlns:a16="http://schemas.microsoft.com/office/drawing/2014/main" id="{FEB51D22-AF41-B863-2261-1C172C8A3355}"/>
+              </a:ext>
+            </a:extLst>
+          </p:cNvPr>
+          <p:cNvSpPr txBox="1"/>
+          <p:nvPr/>
+        </p:nvSpPr>
+        <p:spPr>
+          <a:xfrm>
+            <a:off x="3122685" y="8730481"/>
+            <a:ext cx="947695" cy="230832"/>
+          </a:xfrm>
+          <a:prstGeom prst="rect">
+            <a:avLst/>
+          </a:prstGeom>
+          <a:noFill/>
+        </p:spPr>
+        <p:txBody>
+          <a:bodyPr wrap="none" rtlCol="0">
+            <a:spAutoFit/>
+          </a:bodyPr>
+          <a:lstStyle/>
+          <a:p>
+            <a:r>
+              <a:rPr lang="en-US" sz="900" dirty="0">
+                <a:solidFill>
+                  <a:schemeClr val="tx1">
+                    <a:lumMod val="75000"/>
+                    <a:lumOff val="25000"/>
+                  </a:schemeClr>
+                </a:solidFill>
+              </a:rPr>
+              <a:t>Problem-solving</a:t>
+            </a:r>
+          </a:p>
+        </p:txBody>
+      </p:sp>
+      <p:sp>
+        <p:nvSpPr>
+          <p:cNvPr id="1101" name="Rectangle 1100">
+            <a:extLst>
+              <a:ext uri="{FF2B5EF4-FFF2-40B4-BE49-F238E27FC236}">
+                <a16:creationId xmlns:a16="http://schemas.microsoft.com/office/drawing/2014/main" id="{1D54513D-5D08-62E0-BC91-FA2A92A3AAB3}"/>
+              </a:ext>
+            </a:extLst>
+          </p:cNvPr>
+          <p:cNvSpPr/>
+          <p:nvPr/>
+        </p:nvSpPr>
+        <p:spPr>
+          <a:xfrm>
+            <a:off x="3211050" y="9262326"/>
+            <a:ext cx="1794994" cy="114300"/>
+          </a:xfrm>
+          <a:prstGeom prst="rect">
+            <a:avLst/>
+          </a:prstGeom>
+          <a:solidFill>
+            <a:schemeClr val="tx1">
+              <a:lumMod val="75000"/>
+              <a:lumOff val="25000"/>
+            </a:schemeClr>
+          </a:solidFill>
+          <a:ln>
+            <a:noFill/>
+          </a:ln>
+        </p:spPr>
+        <p:style>
+          <a:lnRef idx="2">
+            <a:schemeClr val="accent1">
+              <a:shade val="50000"/>
+            </a:schemeClr>
+          </a:lnRef>
+          <a:fillRef idx="1">
+            <a:schemeClr val="accent1"/>
+          </a:fillRef>
+          <a:effectRef idx="0">
+            <a:schemeClr val="accent1"/>
+          </a:effectRef>
+          <a:fontRef idx="minor">
+            <a:schemeClr val="lt1"/>
+          </a:fontRef>
+        </p:style>
+        <p:txBody>
+          <a:bodyPr rtlCol="0" anchor="ctr"/>
+          <a:lstStyle/>
+          <a:p>
+            <a:pPr algn="ctr"/>
+            <a:endParaRPr lang="en-US"/>
+          </a:p>
+        </p:txBody>
+      </p:sp>
+      <p:sp>
+        <p:nvSpPr>
+          <p:cNvPr id="1102" name="Rectangle 1101">
+            <a:extLst>
+              <a:ext uri="{FF2B5EF4-FFF2-40B4-BE49-F238E27FC236}">
+                <a16:creationId xmlns:a16="http://schemas.microsoft.com/office/drawing/2014/main" id="{C2B82B19-46B2-B48A-530A-35562D3430B9}"/>
+              </a:ext>
+            </a:extLst>
+          </p:cNvPr>
+          <p:cNvSpPr/>
+          <p:nvPr/>
+        </p:nvSpPr>
+        <p:spPr>
+          <a:xfrm>
+            <a:off x="3211049" y="9262326"/>
+            <a:ext cx="1735787" cy="114300"/>
+          </a:xfrm>
+          <a:prstGeom prst="rect">
+            <a:avLst/>
+          </a:prstGeom>
+          <a:solidFill>
+            <a:srgbClr val="00B0F0"/>
+          </a:solidFill>
+          <a:ln>
+            <a:noFill/>
+          </a:ln>
+        </p:spPr>
+        <p:style>
+          <a:lnRef idx="2">
+            <a:schemeClr val="accent1">
+              <a:shade val="50000"/>
+            </a:schemeClr>
+          </a:lnRef>
+          <a:fillRef idx="1">
+            <a:schemeClr val="accent1"/>
+          </a:fillRef>
+          <a:effectRef idx="0">
+            <a:schemeClr val="accent1"/>
+          </a:effectRef>
+          <a:fontRef idx="minor">
+            <a:schemeClr val="lt1"/>
+          </a:fontRef>
+        </p:style>
+        <p:txBody>
+          <a:bodyPr rtlCol="0" anchor="ctr"/>
+          <a:lstStyle/>
+          <a:p>
+            <a:pPr algn="ctr"/>
+            <a:endParaRPr lang="en-US"/>
+          </a:p>
+        </p:txBody>
+      </p:sp>
+      <p:sp>
+        <p:nvSpPr>
+          <p:cNvPr id="1103" name="TextBox 1102">
+            <a:extLst>
+              <a:ext uri="{FF2B5EF4-FFF2-40B4-BE49-F238E27FC236}">
+                <a16:creationId xmlns:a16="http://schemas.microsoft.com/office/drawing/2014/main" id="{4061022E-9BDC-4024-44F2-1B06A525C6B8}"/>
+              </a:ext>
+            </a:extLst>
+          </p:cNvPr>
+          <p:cNvSpPr txBox="1"/>
+          <p:nvPr/>
+        </p:nvSpPr>
+        <p:spPr>
+          <a:xfrm>
+            <a:off x="3122685" y="9046584"/>
+            <a:ext cx="1075936" cy="230832"/>
+          </a:xfrm>
+          <a:prstGeom prst="rect">
+            <a:avLst/>
+          </a:prstGeom>
+          <a:noFill/>
+        </p:spPr>
+        <p:txBody>
+          <a:bodyPr wrap="none" rtlCol="0">
+            <a:spAutoFit/>
+          </a:bodyPr>
+          <a:lstStyle/>
+          <a:p>
+            <a:r>
+              <a:rPr lang="en-US" sz="900" dirty="0">
+                <a:solidFill>
+                  <a:schemeClr val="tx1">
+                    <a:lumMod val="75000"/>
+                    <a:lumOff val="25000"/>
+                  </a:schemeClr>
+                </a:solidFill>
+              </a:rPr>
+              <a:t>Time Management</a:t>
+            </a:r>
+            <a:endParaRPr lang="en-US" sz="800" dirty="0">
+              <a:solidFill>
+                <a:schemeClr val="tx1">
+                  <a:lumMod val="75000"/>
+                  <a:lumOff val="25000"/>
+                </a:schemeClr>
+              </a:solidFill>
+            </a:endParaRPr>
+          </a:p>
+        </p:txBody>
+      </p:sp>
+      <p:sp>
+        <p:nvSpPr>
+          <p:cNvPr id="1104" name="Rectangle 1103">
+            <a:extLst>
+              <a:ext uri="{FF2B5EF4-FFF2-40B4-BE49-F238E27FC236}">
+                <a16:creationId xmlns:a16="http://schemas.microsoft.com/office/drawing/2014/main" id="{0195119F-0330-D16C-98F4-F0BFCF7644D2}"/>
+              </a:ext>
+            </a:extLst>
+          </p:cNvPr>
+          <p:cNvSpPr/>
+          <p:nvPr/>
+        </p:nvSpPr>
+        <p:spPr>
+          <a:xfrm>
+            <a:off x="3211050" y="9574017"/>
+            <a:ext cx="1794994" cy="114300"/>
+          </a:xfrm>
+          <a:prstGeom prst="rect">
+            <a:avLst/>
+          </a:prstGeom>
+          <a:solidFill>
+            <a:schemeClr val="tx1">
+              <a:lumMod val="75000"/>
+              <a:lumOff val="25000"/>
+            </a:schemeClr>
+          </a:solidFill>
+          <a:ln>
+            <a:noFill/>
+          </a:ln>
+        </p:spPr>
+        <p:style>
+          <a:lnRef idx="2">
+            <a:schemeClr val="accent1">
+              <a:shade val="50000"/>
+            </a:schemeClr>
+          </a:lnRef>
+          <a:fillRef idx="1">
+            <a:schemeClr val="accent1"/>
+          </a:fillRef>
+          <a:effectRef idx="0">
+            <a:schemeClr val="accent1"/>
+          </a:effectRef>
+          <a:fontRef idx="minor">
+            <a:schemeClr val="lt1"/>
+          </a:fontRef>
+        </p:style>
+        <p:txBody>
+          <a:bodyPr rtlCol="0" anchor="ctr"/>
+          <a:lstStyle/>
+          <a:p>
+            <a:pPr algn="ctr"/>
+            <a:endParaRPr lang="en-US"/>
+          </a:p>
+        </p:txBody>
+      </p:sp>
+      <p:sp>
+        <p:nvSpPr>
+          <p:cNvPr id="1105" name="Rectangle 1104">
+            <a:extLst>
+              <a:ext uri="{FF2B5EF4-FFF2-40B4-BE49-F238E27FC236}">
+                <a16:creationId xmlns:a16="http://schemas.microsoft.com/office/drawing/2014/main" id="{A14D6596-8F82-29AE-09E6-773B2D0DAB7D}"/>
+              </a:ext>
+            </a:extLst>
+          </p:cNvPr>
+          <p:cNvSpPr/>
+          <p:nvPr/>
+        </p:nvSpPr>
+        <p:spPr>
+          <a:xfrm>
+            <a:off x="3211049" y="9574017"/>
+            <a:ext cx="1753946" cy="114300"/>
+          </a:xfrm>
+          <a:prstGeom prst="rect">
+            <a:avLst/>
+          </a:prstGeom>
+          <a:solidFill>
+            <a:srgbClr val="00B0F0"/>
+          </a:solidFill>
+          <a:ln>
+            <a:noFill/>
+          </a:ln>
+        </p:spPr>
+        <p:style>
+          <a:lnRef idx="2">
+            <a:schemeClr val="accent1">
+              <a:shade val="50000"/>
+            </a:schemeClr>
+          </a:lnRef>
+          <a:fillRef idx="1">
+            <a:schemeClr val="accent1"/>
+          </a:fillRef>
+          <a:effectRef idx="0">
+            <a:schemeClr val="accent1"/>
+          </a:effectRef>
+          <a:fontRef idx="minor">
+            <a:schemeClr val="lt1"/>
+          </a:fontRef>
+        </p:style>
+        <p:txBody>
+          <a:bodyPr rtlCol="0" anchor="ctr"/>
+          <a:lstStyle/>
+          <a:p>
+            <a:pPr algn="ctr"/>
+            <a:endParaRPr lang="en-US"/>
+          </a:p>
+        </p:txBody>
+      </p:sp>
+      <p:sp>
+        <p:nvSpPr>
+          <p:cNvPr id="1106" name="TextBox 1105">
+            <a:extLst>
+              <a:ext uri="{FF2B5EF4-FFF2-40B4-BE49-F238E27FC236}">
+                <a16:creationId xmlns:a16="http://schemas.microsoft.com/office/drawing/2014/main" id="{ED9B529B-EEC0-2A9E-F08C-D0CEE83F38F1}"/>
+              </a:ext>
+            </a:extLst>
+          </p:cNvPr>
+          <p:cNvSpPr txBox="1"/>
+          <p:nvPr/>
+        </p:nvSpPr>
+        <p:spPr>
+          <a:xfrm>
+            <a:off x="3122685" y="9358275"/>
+            <a:ext cx="681597" cy="230832"/>
+          </a:xfrm>
+          <a:prstGeom prst="rect">
+            <a:avLst/>
+          </a:prstGeom>
+          <a:noFill/>
+        </p:spPr>
+        <p:txBody>
+          <a:bodyPr wrap="none" rtlCol="0">
+            <a:spAutoFit/>
+          </a:bodyPr>
+          <a:lstStyle/>
+          <a:p>
+            <a:r>
+              <a:rPr lang="en-US" sz="900" dirty="0">
+                <a:solidFill>
+                  <a:schemeClr val="tx1">
+                    <a:lumMod val="75000"/>
+                    <a:lumOff val="25000"/>
+                  </a:schemeClr>
+                </a:solidFill>
+              </a:rPr>
+              <a:t>Teamwork</a:t>
+            </a:r>
+            <a:endParaRPr lang="en-US" sz="800" dirty="0">
+              <a:solidFill>
+                <a:schemeClr val="tx1">
+                  <a:lumMod val="75000"/>
+                  <a:lumOff val="25000"/>
+                </a:schemeClr>
+              </a:solidFill>
+            </a:endParaRPr>
+          </a:p>
+        </p:txBody>
+      </p:sp>
+      <p:sp>
+        <p:nvSpPr>
+          <p:cNvPr id="1113" name="Rectangle 1112">
+            <a:extLst>
+              <a:ext uri="{FF2B5EF4-FFF2-40B4-BE49-F238E27FC236}">
+                <a16:creationId xmlns:a16="http://schemas.microsoft.com/office/drawing/2014/main" id="{EC473602-EBFB-93BF-9945-AD0CF9E0D125}"/>
+              </a:ext>
+            </a:extLst>
+          </p:cNvPr>
+          <p:cNvSpPr/>
+          <p:nvPr/>
+        </p:nvSpPr>
+        <p:spPr>
+          <a:xfrm>
+            <a:off x="3213930" y="7671783"/>
+            <a:ext cx="1794994" cy="114300"/>
+          </a:xfrm>
+          <a:prstGeom prst="rect">
+            <a:avLst/>
+          </a:prstGeom>
+          <a:solidFill>
+            <a:schemeClr val="tx1">
+              <a:lumMod val="75000"/>
+              <a:lumOff val="25000"/>
+            </a:schemeClr>
+          </a:solidFill>
+          <a:ln>
+            <a:noFill/>
+          </a:ln>
+        </p:spPr>
+        <p:style>
+          <a:lnRef idx="2">
+            <a:schemeClr val="accent1">
+              <a:shade val="50000"/>
+            </a:schemeClr>
+          </a:lnRef>
+          <a:fillRef idx="1">
+            <a:schemeClr val="accent1"/>
+          </a:fillRef>
+          <a:effectRef idx="0">
+            <a:schemeClr val="accent1"/>
+          </a:effectRef>
+          <a:fontRef idx="minor">
+            <a:schemeClr val="lt1"/>
+          </a:fontRef>
+        </p:style>
+        <p:txBody>
+          <a:bodyPr rtlCol="0" anchor="ctr"/>
+          <a:lstStyle/>
+          <a:p>
+            <a:pPr algn="ctr"/>
+            <a:endParaRPr lang="en-US"/>
+          </a:p>
+        </p:txBody>
+      </p:sp>
+      <p:sp>
+        <p:nvSpPr>
+          <p:cNvPr id="1114" name="Rectangle 1113">
+            <a:extLst>
+              <a:ext uri="{FF2B5EF4-FFF2-40B4-BE49-F238E27FC236}">
+                <a16:creationId xmlns:a16="http://schemas.microsoft.com/office/drawing/2014/main" id="{16FAF720-DA75-EE86-637B-DFA0A91B4489}"/>
+              </a:ext>
+            </a:extLst>
+          </p:cNvPr>
+          <p:cNvSpPr/>
+          <p:nvPr/>
+        </p:nvSpPr>
+        <p:spPr>
+          <a:xfrm>
+            <a:off x="3213929" y="7671783"/>
+            <a:ext cx="1753946" cy="114300"/>
+          </a:xfrm>
+          <a:prstGeom prst="rect">
+            <a:avLst/>
+          </a:prstGeom>
+          <a:solidFill>
+            <a:srgbClr val="00B0F0"/>
+          </a:solidFill>
+          <a:ln>
+            <a:noFill/>
+          </a:ln>
+        </p:spPr>
+        <p:style>
+          <a:lnRef idx="2">
+            <a:schemeClr val="accent1">
+              <a:shade val="50000"/>
+            </a:schemeClr>
+          </a:lnRef>
+          <a:fillRef idx="1">
+            <a:schemeClr val="accent1"/>
+          </a:fillRef>
+          <a:effectRef idx="0">
+            <a:schemeClr val="accent1"/>
+          </a:effectRef>
+          <a:fontRef idx="minor">
+            <a:schemeClr val="lt1"/>
+          </a:fontRef>
+        </p:style>
+        <p:txBody>
+          <a:bodyPr rtlCol="0" anchor="ctr"/>
+          <a:lstStyle/>
+          <a:p>
+            <a:pPr algn="ctr"/>
+            <a:endParaRPr lang="en-US"/>
+          </a:p>
+        </p:txBody>
+      </p:sp>
+      <p:sp>
+        <p:nvSpPr>
+          <p:cNvPr id="1115" name="TextBox 1114">
+            <a:extLst>
+              <a:ext uri="{FF2B5EF4-FFF2-40B4-BE49-F238E27FC236}">
+                <a16:creationId xmlns:a16="http://schemas.microsoft.com/office/drawing/2014/main" id="{24F69EFB-33EB-D336-361F-BAE99F741394}"/>
+              </a:ext>
+            </a:extLst>
+          </p:cNvPr>
+          <p:cNvSpPr txBox="1"/>
+          <p:nvPr/>
+        </p:nvSpPr>
+        <p:spPr>
+          <a:xfrm>
+            <a:off x="3125565" y="7456041"/>
+            <a:ext cx="697627" cy="230832"/>
+          </a:xfrm>
+          <a:prstGeom prst="rect">
+            <a:avLst/>
+          </a:prstGeom>
+          <a:noFill/>
+        </p:spPr>
+        <p:txBody>
+          <a:bodyPr wrap="none" rtlCol="0">
+            <a:spAutoFit/>
+          </a:bodyPr>
+          <a:lstStyle/>
+          <a:p>
+            <a:r>
+              <a:rPr lang="en-US" sz="900" dirty="0">
+                <a:solidFill>
+                  <a:schemeClr val="tx1">
+                    <a:lumMod val="75000"/>
+                    <a:lumOff val="25000"/>
+                  </a:schemeClr>
+                </a:solidFill>
+              </a:rPr>
+              <a:t>Leadership</a:t>
+            </a:r>
+            <a:endParaRPr lang="en-US" sz="800" dirty="0">
+              <a:solidFill>
+                <a:schemeClr val="tx1">
+                  <a:lumMod val="75000"/>
+                  <a:lumOff val="25000"/>
+                </a:schemeClr>
+              </a:solidFill>
+            </a:endParaRPr>
+          </a:p>
+        </p:txBody>
+      </p:sp>
+      <p:sp>
+        <p:nvSpPr>
+          <p:cNvPr id="2" name="TextBox 1">
+            <a:extLst>
+              <a:ext uri="{FF2B5EF4-FFF2-40B4-BE49-F238E27FC236}">
+                <a16:creationId xmlns:a16="http://schemas.microsoft.com/office/drawing/2014/main" id="{89DAF098-062D-4904-6090-6479353738B2}"/>
+              </a:ext>
+            </a:extLst>
+          </p:cNvPr>
+          <p:cNvSpPr txBox="1"/>
+          <p:nvPr/>
+        </p:nvSpPr>
+        <p:spPr>
+          <a:xfrm>
+            <a:off x="98851" y="6288154"/>
+            <a:ext cx="6657120" cy="738344"/>
+          </a:xfrm>
+          <a:prstGeom prst="rect">
+            <a:avLst/>
+          </a:prstGeom>
+          <a:noFill/>
+          <a:ln>
+            <a:solidFill>
+              <a:schemeClr val="tx2">
+                <a:lumMod val="50000"/>
+              </a:schemeClr>
+            </a:solidFill>
+          </a:ln>
+        </p:spPr>
+        <p:txBody>
+          <a:bodyPr wrap="square" anchor="ctr">
+            <a:spAutoFit/>
+          </a:bodyPr>
+          <a:lstStyle/>
+          <a:p>
+            <a:pPr>
+              <a:lnSpc>
+                <a:spcPts val="1440"/>
+              </a:lnSpc>
+            </a:pPr>
+            <a:r>
+              <a:rPr lang="en-US" sz="900" b="1" dirty="0">
+                <a:solidFill>
+                  <a:schemeClr val="tx1">
+                    <a:lumMod val="75000"/>
+                    <a:lumOff val="25000"/>
+                  </a:schemeClr>
+                </a:solidFill>
+              </a:rPr>
+              <a:t>Sep 2014 – Sep 2016 | Scientist at ISRO</a:t>
+            </a:r>
+            <a:r>
+              <a:rPr lang="en-US" sz="900" dirty="0">
+                <a:solidFill>
+                  <a:schemeClr val="tx1">
+                    <a:lumMod val="75000"/>
+                    <a:lumOff val="25000"/>
+                  </a:schemeClr>
+                </a:solidFill>
+              </a:rPr>
+              <a:t>| </a:t>
+            </a:r>
+            <a:r>
+              <a:rPr lang="en-US" sz="900" b="1" dirty="0">
+                <a:solidFill>
+                  <a:schemeClr val="tx1">
+                    <a:lumMod val="75000"/>
+                    <a:lumOff val="25000"/>
+                  </a:schemeClr>
+                </a:solidFill>
+              </a:rPr>
+              <a:t>Full-time</a:t>
+            </a:r>
+          </a:p>
+          <a:p>
+            <a:pPr marL="171450" indent="-171450">
+              <a:lnSpc>
+                <a:spcPts val="1238"/>
+              </a:lnSpc>
+              <a:spcAft>
+                <a:spcPts val="125"/>
+              </a:spcAft>
+              <a:buFont typeface="Arial" panose="020B0604020202020204" pitchFamily="34" charset="0"/>
+              <a:buChar char="•"/>
+            </a:pPr>
+            <a:r>
+              <a:rPr lang="en-IN" sz="900" dirty="0">
+                <a:solidFill>
+                  <a:schemeClr val="tx1">
+                    <a:lumMod val="75000"/>
+                    <a:lumOff val="25000"/>
+                  </a:schemeClr>
+                </a:solidFill>
+              </a:rPr>
+              <a:t>Worked in field of "Dry Etching" in 8-inch foundry for fabrication of CMOS, ASIC devices.</a:t>
+            </a:r>
+          </a:p>
+          <a:p>
+            <a:pPr marL="171450" indent="-171450">
+              <a:lnSpc>
+                <a:spcPts val="1238"/>
+              </a:lnSpc>
+              <a:spcAft>
+                <a:spcPts val="125"/>
+              </a:spcAft>
+              <a:buFont typeface="Arial" panose="020B0604020202020204" pitchFamily="34" charset="0"/>
+              <a:buChar char="•"/>
+            </a:pPr>
+            <a:r>
+              <a:rPr lang="en-IN" sz="900" dirty="0">
+                <a:solidFill>
+                  <a:schemeClr val="tx1">
+                    <a:lumMod val="75000"/>
+                    <a:lumOff val="25000"/>
+                  </a:schemeClr>
+                </a:solidFill>
+              </a:rPr>
+              <a:t>Developed a command-line interface (CLI) application in Python for automated analysis of large-scale data (QC, production) collected from foundry machines.</a:t>
+            </a:r>
+            <a:endParaRPr lang="en-US" sz="900" dirty="0">
+              <a:solidFill>
+                <a:schemeClr val="tx1">
+                  <a:lumMod val="75000"/>
+                  <a:lumOff val="25000"/>
+                </a:schemeClr>
+              </a:solidFill>
+            </a:endParaRPr>
+          </a:p>
+        </p:txBody>
+      </p:sp>
+      <p:sp>
+        <p:nvSpPr>
+          <p:cNvPr id="3" name="Rectangle 2">
+            <a:extLst>
+              <a:ext uri="{FF2B5EF4-FFF2-40B4-BE49-F238E27FC236}">
+                <a16:creationId xmlns:a16="http://schemas.microsoft.com/office/drawing/2014/main" id="{32F9C3D6-07E4-2488-8AA6-3B216FB14BBD}"/>
+              </a:ext>
+            </a:extLst>
+          </p:cNvPr>
+          <p:cNvSpPr/>
+          <p:nvPr/>
+        </p:nvSpPr>
+        <p:spPr>
+          <a:xfrm>
+            <a:off x="288029" y="8807209"/>
             <a:ext cx="1862030" cy="114300"/>
           </a:xfrm>
           <a:prstGeom prst="rect">
@@ -10158,10 +11435,10 @@
       </p:sp>
       <p:sp>
         <p:nvSpPr>
-          <p:cNvPr id="1031" name="Rectangle 1030">
+          <p:cNvPr id="4" name="Rectangle 3">
             <a:extLst>
               <a:ext uri="{FF2B5EF4-FFF2-40B4-BE49-F238E27FC236}">
-                <a16:creationId xmlns:a16="http://schemas.microsoft.com/office/drawing/2014/main" id="{6BA5A4F8-C973-8B00-38E4-A7D94E5ADA69}"/>
+                <a16:creationId xmlns:a16="http://schemas.microsoft.com/office/drawing/2014/main" id="{611CE261-3F84-AD49-E4F3-56EDA44288FF}"/>
               </a:ext>
             </a:extLst>
           </p:cNvPr>
@@ -10170,7 +11447,7 @@
         </p:nvSpPr>
         <p:spPr>
           <a:xfrm>
-            <a:off x="222612" y="8447640"/>
+            <a:off x="288029" y="8807209"/>
             <a:ext cx="1800611" cy="114300"/>
           </a:xfrm>
           <a:prstGeom prst="rect">
@@ -10210,10 +11487,10 @@
       </p:sp>
       <p:sp>
         <p:nvSpPr>
-          <p:cNvPr id="1032" name="TextBox 1031">
+          <p:cNvPr id="5" name="TextBox 4">
             <a:extLst>
               <a:ext uri="{FF2B5EF4-FFF2-40B4-BE49-F238E27FC236}">
-                <a16:creationId xmlns:a16="http://schemas.microsoft.com/office/drawing/2014/main" id="{2611F15C-469B-87A1-04C3-83CAD3F5171D}"/>
+                <a16:creationId xmlns:a16="http://schemas.microsoft.com/office/drawing/2014/main" id="{90FF089B-EE85-285A-3F8A-CB9BC5987EAA}"/>
               </a:ext>
             </a:extLst>
           </p:cNvPr>
@@ -10222,7 +11499,7 @@
         </p:nvSpPr>
         <p:spPr>
           <a:xfrm>
-            <a:off x="134248" y="8250186"/>
+            <a:off x="199665" y="8609755"/>
             <a:ext cx="779381" cy="230832"/>
           </a:xfrm>
           <a:prstGeom prst="rect">
@@ -10252,10 +11529,10 @@
       </p:sp>
       <p:sp>
         <p:nvSpPr>
-          <p:cNvPr id="1033" name="Rectangle 1032">
+          <p:cNvPr id="6" name="Rectangle 5">
             <a:extLst>
               <a:ext uri="{FF2B5EF4-FFF2-40B4-BE49-F238E27FC236}">
-                <a16:creationId xmlns:a16="http://schemas.microsoft.com/office/drawing/2014/main" id="{CEAAAE47-E585-9477-10CD-373B88757E6F}"/>
+                <a16:creationId xmlns:a16="http://schemas.microsoft.com/office/drawing/2014/main" id="{885487E6-3590-BB2F-24C0-5062E0EDFA9C}"/>
               </a:ext>
             </a:extLst>
           </p:cNvPr>
@@ -10264,7 +11541,7 @@
         </p:nvSpPr>
         <p:spPr>
           <a:xfrm>
-            <a:off x="222612" y="8761925"/>
+            <a:off x="288029" y="9121494"/>
             <a:ext cx="1862030" cy="114300"/>
           </a:xfrm>
           <a:prstGeom prst="rect">
@@ -10307,10 +11584,10 @@
       </p:sp>
       <p:sp>
         <p:nvSpPr>
-          <p:cNvPr id="1034" name="Rectangle 1033">
+          <p:cNvPr id="7" name="Rectangle 6">
             <a:extLst>
               <a:ext uri="{FF2B5EF4-FFF2-40B4-BE49-F238E27FC236}">
-                <a16:creationId xmlns:a16="http://schemas.microsoft.com/office/drawing/2014/main" id="{C251F77D-A4B4-2BB4-8005-8A89A48215BA}"/>
+                <a16:creationId xmlns:a16="http://schemas.microsoft.com/office/drawing/2014/main" id="{C9667359-1BC5-B7FA-DF5A-488B553B0BF5}"/>
               </a:ext>
             </a:extLst>
           </p:cNvPr>
@@ -10319,7 +11596,7 @@
         </p:nvSpPr>
         <p:spPr>
           <a:xfrm>
-            <a:off x="222612" y="8761925"/>
+            <a:off x="288029" y="9121494"/>
             <a:ext cx="1748020" cy="114300"/>
           </a:xfrm>
           <a:prstGeom prst="rect">
@@ -10359,10 +11636,10 @@
       </p:sp>
       <p:sp>
         <p:nvSpPr>
-          <p:cNvPr id="1035" name="TextBox 1034">
+          <p:cNvPr id="8" name="TextBox 7">
             <a:extLst>
               <a:ext uri="{FF2B5EF4-FFF2-40B4-BE49-F238E27FC236}">
-                <a16:creationId xmlns:a16="http://schemas.microsoft.com/office/drawing/2014/main" id="{9EC357C5-D0E6-DCAD-C84C-6E62DEA136F0}"/>
+                <a16:creationId xmlns:a16="http://schemas.microsoft.com/office/drawing/2014/main" id="{BD2FD4F3-D55D-C34F-D821-858CD6D90D97}"/>
               </a:ext>
             </a:extLst>
           </p:cNvPr>
@@ -10371,7 +11648,7 @@
         </p:nvSpPr>
         <p:spPr>
           <a:xfrm>
-            <a:off x="134248" y="8564471"/>
+            <a:off x="199665" y="8924040"/>
             <a:ext cx="1337226" cy="230832"/>
           </a:xfrm>
           <a:prstGeom prst="rect">
@@ -10394,7 +11671,7 @@
                   </a:schemeClr>
                 </a:solidFill>
               </a:rPr>
-              <a:t>Backend (NodeJS + Rust)</a:t>
+              <a:t>Backend (Rust + NodeJS)</a:t>
             </a:r>
             <a:endParaRPr lang="en-US" sz="800" dirty="0">
               <a:solidFill>
@@ -10409,10 +11686,10 @@
       </p:sp>
       <p:sp>
         <p:nvSpPr>
-          <p:cNvPr id="1039" name="Rectangle 1038">
+          <p:cNvPr id="10" name="Rectangle 9">
             <a:extLst>
               <a:ext uri="{FF2B5EF4-FFF2-40B4-BE49-F238E27FC236}">
-                <a16:creationId xmlns:a16="http://schemas.microsoft.com/office/drawing/2014/main" id="{E5CEE3CE-0B3E-1A30-B18A-A77C0A6B3562}"/>
+                <a16:creationId xmlns:a16="http://schemas.microsoft.com/office/drawing/2014/main" id="{AAC1F0A8-8FD4-FC7E-E032-0FC498E97B03}"/>
               </a:ext>
             </a:extLst>
           </p:cNvPr>
@@ -10421,7 +11698,7 @@
         </p:nvSpPr>
         <p:spPr>
           <a:xfrm>
-            <a:off x="222613" y="9072019"/>
+            <a:off x="288030" y="9431588"/>
             <a:ext cx="1862030" cy="114300"/>
           </a:xfrm>
           <a:prstGeom prst="rect">
@@ -10464,10 +11741,10 @@
       </p:sp>
       <p:sp>
         <p:nvSpPr>
-          <p:cNvPr id="1044" name="Rectangle 1043">
+          <p:cNvPr id="11" name="Rectangle 10">
             <a:extLst>
               <a:ext uri="{FF2B5EF4-FFF2-40B4-BE49-F238E27FC236}">
-                <a16:creationId xmlns:a16="http://schemas.microsoft.com/office/drawing/2014/main" id="{A9747702-29A1-2BE3-DD53-D105B14F6F91}"/>
+                <a16:creationId xmlns:a16="http://schemas.microsoft.com/office/drawing/2014/main" id="{19A1A814-9387-6399-6DC4-7CA2B29C983F}"/>
               </a:ext>
             </a:extLst>
           </p:cNvPr>
@@ -10476,7 +11753,7 @@
         </p:nvSpPr>
         <p:spPr>
           <a:xfrm>
-            <a:off x="222612" y="9072019"/>
+            <a:off x="288029" y="9431588"/>
             <a:ext cx="1773957" cy="114300"/>
           </a:xfrm>
           <a:prstGeom prst="rect">
@@ -10516,10 +11793,10 @@
       </p:sp>
       <p:sp>
         <p:nvSpPr>
-          <p:cNvPr id="1045" name="TextBox 1044">
+          <p:cNvPr id="12" name="TextBox 11">
             <a:extLst>
               <a:ext uri="{FF2B5EF4-FFF2-40B4-BE49-F238E27FC236}">
-                <a16:creationId xmlns:a16="http://schemas.microsoft.com/office/drawing/2014/main" id="{BD2A0663-BDF9-F7D8-B3B4-C98C11BB0CD7}"/>
+                <a16:creationId xmlns:a16="http://schemas.microsoft.com/office/drawing/2014/main" id="{3D17233B-578D-993A-5D44-5295DC2E38EE}"/>
               </a:ext>
             </a:extLst>
           </p:cNvPr>
@@ -10528,7 +11805,7 @@
         </p:nvSpPr>
         <p:spPr>
           <a:xfrm>
-            <a:off x="134249" y="8874565"/>
+            <a:off x="199666" y="9234134"/>
             <a:ext cx="784189" cy="230832"/>
           </a:xfrm>
           <a:prstGeom prst="rect">
@@ -10566,10 +11843,10 @@
       </p:sp>
       <p:sp>
         <p:nvSpPr>
-          <p:cNvPr id="1046" name="Rectangle 1045">
+          <p:cNvPr id="13" name="Rectangle 12">
             <a:extLst>
               <a:ext uri="{FF2B5EF4-FFF2-40B4-BE49-F238E27FC236}">
-                <a16:creationId xmlns:a16="http://schemas.microsoft.com/office/drawing/2014/main" id="{B2B1F26E-87E0-95FC-B261-A188B7390D9D}"/>
+                <a16:creationId xmlns:a16="http://schemas.microsoft.com/office/drawing/2014/main" id="{58974804-5C5F-4CEE-08C8-60092AD207C5}"/>
               </a:ext>
             </a:extLst>
           </p:cNvPr>
@@ -10578,7 +11855,7 @@
         </p:nvSpPr>
         <p:spPr>
           <a:xfrm>
-            <a:off x="222612" y="9385624"/>
+            <a:off x="288029" y="9745193"/>
             <a:ext cx="1862030" cy="114300"/>
           </a:xfrm>
           <a:prstGeom prst="rect">
@@ -10621,10 +11898,10 @@
       </p:sp>
       <p:sp>
         <p:nvSpPr>
-          <p:cNvPr id="1047" name="Rectangle 1046">
+          <p:cNvPr id="14" name="Rectangle 13">
             <a:extLst>
               <a:ext uri="{FF2B5EF4-FFF2-40B4-BE49-F238E27FC236}">
-                <a16:creationId xmlns:a16="http://schemas.microsoft.com/office/drawing/2014/main" id="{2C805D83-F8A5-00B7-A0A3-DE2686BA841D}"/>
+                <a16:creationId xmlns:a16="http://schemas.microsoft.com/office/drawing/2014/main" id="{5D08537A-D252-5958-7842-01F8C9C115F7}"/>
               </a:ext>
             </a:extLst>
           </p:cNvPr>
@@ -10633,7 +11910,7 @@
         </p:nvSpPr>
         <p:spPr>
           <a:xfrm>
-            <a:off x="222612" y="9385624"/>
+            <a:off x="288029" y="9745193"/>
             <a:ext cx="1822363" cy="114300"/>
           </a:xfrm>
           <a:prstGeom prst="rect">
@@ -10673,10 +11950,10 @@
       </p:sp>
       <p:sp>
         <p:nvSpPr>
-          <p:cNvPr id="1048" name="TextBox 1047">
+          <p:cNvPr id="15" name="TextBox 14">
             <a:extLst>
               <a:ext uri="{FF2B5EF4-FFF2-40B4-BE49-F238E27FC236}">
-                <a16:creationId xmlns:a16="http://schemas.microsoft.com/office/drawing/2014/main" id="{43387A8E-8F62-A40C-56A1-80E960C73BEB}"/>
+                <a16:creationId xmlns:a16="http://schemas.microsoft.com/office/drawing/2014/main" id="{A4FB890E-1BCD-8FF8-3E4D-B93EDC9CABFD}"/>
               </a:ext>
             </a:extLst>
           </p:cNvPr>
@@ -10685,7 +11962,7 @@
         </p:nvSpPr>
         <p:spPr>
           <a:xfrm>
-            <a:off x="134248" y="9188170"/>
+            <a:off x="199665" y="9547739"/>
             <a:ext cx="1715534" cy="230832"/>
           </a:xfrm>
           <a:prstGeom prst="rect">
@@ -10713,1750 +11990,6 @@
           </a:p>
         </p:txBody>
       </p:sp>
-      <p:sp>
-        <p:nvSpPr>
-          <p:cNvPr id="1049" name="Rectangle 1048">
-            <a:extLst>
-              <a:ext uri="{FF2B5EF4-FFF2-40B4-BE49-F238E27FC236}">
-                <a16:creationId xmlns:a16="http://schemas.microsoft.com/office/drawing/2014/main" id="{2955D745-1136-E11C-E4E3-2DA9B3B44881}"/>
-              </a:ext>
-            </a:extLst>
-          </p:cNvPr>
-          <p:cNvSpPr/>
-          <p:nvPr/>
-        </p:nvSpPr>
-        <p:spPr>
-          <a:xfrm>
-            <a:off x="222224" y="9685603"/>
-            <a:ext cx="1862030" cy="114300"/>
-          </a:xfrm>
-          <a:prstGeom prst="rect">
-            <a:avLst/>
-          </a:prstGeom>
-          <a:solidFill>
-            <a:schemeClr val="tx1">
-              <a:lumMod val="75000"/>
-              <a:lumOff val="25000"/>
-            </a:schemeClr>
-          </a:solidFill>
-          <a:ln>
-            <a:noFill/>
-          </a:ln>
-        </p:spPr>
-        <p:style>
-          <a:lnRef idx="2">
-            <a:schemeClr val="accent1">
-              <a:shade val="50000"/>
-            </a:schemeClr>
-          </a:lnRef>
-          <a:fillRef idx="1">
-            <a:schemeClr val="accent1"/>
-          </a:fillRef>
-          <a:effectRef idx="0">
-            <a:schemeClr val="accent1"/>
-          </a:effectRef>
-          <a:fontRef idx="minor">
-            <a:schemeClr val="lt1"/>
-          </a:fontRef>
-        </p:style>
-        <p:txBody>
-          <a:bodyPr rtlCol="0" anchor="ctr"/>
-          <a:lstStyle/>
-          <a:p>
-            <a:pPr algn="ctr"/>
-            <a:endParaRPr lang="en-US"/>
-          </a:p>
-        </p:txBody>
-      </p:sp>
-      <p:sp>
-        <p:nvSpPr>
-          <p:cNvPr id="1050" name="Rectangle 1049">
-            <a:extLst>
-              <a:ext uri="{FF2B5EF4-FFF2-40B4-BE49-F238E27FC236}">
-                <a16:creationId xmlns:a16="http://schemas.microsoft.com/office/drawing/2014/main" id="{D11EF6E6-9F25-CEDE-892B-2EEE1E3E4163}"/>
-              </a:ext>
-            </a:extLst>
-          </p:cNvPr>
-          <p:cNvSpPr/>
-          <p:nvPr/>
-        </p:nvSpPr>
-        <p:spPr>
-          <a:xfrm>
-            <a:off x="222224" y="9685603"/>
-            <a:ext cx="1822363" cy="114300"/>
-          </a:xfrm>
-          <a:prstGeom prst="rect">
-            <a:avLst/>
-          </a:prstGeom>
-          <a:solidFill>
-            <a:srgbClr val="00B0F0"/>
-          </a:solidFill>
-          <a:ln>
-            <a:noFill/>
-          </a:ln>
-        </p:spPr>
-        <p:style>
-          <a:lnRef idx="2">
-            <a:schemeClr val="accent1">
-              <a:shade val="50000"/>
-            </a:schemeClr>
-          </a:lnRef>
-          <a:fillRef idx="1">
-            <a:schemeClr val="accent1"/>
-          </a:fillRef>
-          <a:effectRef idx="0">
-            <a:schemeClr val="accent1"/>
-          </a:effectRef>
-          <a:fontRef idx="minor">
-            <a:schemeClr val="lt1"/>
-          </a:fontRef>
-        </p:style>
-        <p:txBody>
-          <a:bodyPr rtlCol="0" anchor="ctr"/>
-          <a:lstStyle/>
-          <a:p>
-            <a:pPr algn="ctr"/>
-            <a:endParaRPr lang="en-US"/>
-          </a:p>
-        </p:txBody>
-      </p:sp>
-      <p:sp>
-        <p:nvSpPr>
-          <p:cNvPr id="1051" name="TextBox 1050">
-            <a:extLst>
-              <a:ext uri="{FF2B5EF4-FFF2-40B4-BE49-F238E27FC236}">
-                <a16:creationId xmlns:a16="http://schemas.microsoft.com/office/drawing/2014/main" id="{1BF6A012-B3FB-9F86-E4CB-D69C4380183C}"/>
-              </a:ext>
-            </a:extLst>
-          </p:cNvPr>
-          <p:cNvSpPr txBox="1"/>
-          <p:nvPr/>
-        </p:nvSpPr>
-        <p:spPr>
-          <a:xfrm>
-            <a:off x="133860" y="9488149"/>
-            <a:ext cx="1189749" cy="230832"/>
-          </a:xfrm>
-          <a:prstGeom prst="rect">
-            <a:avLst/>
-          </a:prstGeom>
-          <a:noFill/>
-        </p:spPr>
-        <p:txBody>
-          <a:bodyPr wrap="none" rtlCol="0">
-            <a:spAutoFit/>
-          </a:bodyPr>
-          <a:lstStyle/>
-          <a:p>
-            <a:r>
-              <a:rPr lang="en-US" sz="900" dirty="0">
-                <a:solidFill>
-                  <a:schemeClr val="tx1">
-                    <a:lumMod val="75000"/>
-                    <a:lumOff val="25000"/>
-                  </a:schemeClr>
-                </a:solidFill>
-              </a:rPr>
-              <a:t>Architecture Diagram</a:t>
-            </a:r>
-          </a:p>
-        </p:txBody>
-      </p:sp>
-      <p:sp>
-        <p:nvSpPr>
-          <p:cNvPr id="1085" name="Rectangle 1084">
-            <a:extLst>
-              <a:ext uri="{FF2B5EF4-FFF2-40B4-BE49-F238E27FC236}">
-                <a16:creationId xmlns:a16="http://schemas.microsoft.com/office/drawing/2014/main" id="{7EDEAE20-D722-2C2A-E550-DE8A985BBE15}"/>
-              </a:ext>
-            </a:extLst>
-          </p:cNvPr>
-          <p:cNvSpPr/>
-          <p:nvPr/>
-        </p:nvSpPr>
-        <p:spPr>
-          <a:xfrm>
-            <a:off x="2847476" y="7600244"/>
-            <a:ext cx="1794994" cy="114300"/>
-          </a:xfrm>
-          <a:prstGeom prst="rect">
-            <a:avLst/>
-          </a:prstGeom>
-          <a:solidFill>
-            <a:schemeClr val="tx1">
-              <a:lumMod val="75000"/>
-              <a:lumOff val="25000"/>
-            </a:schemeClr>
-          </a:solidFill>
-          <a:ln>
-            <a:noFill/>
-          </a:ln>
-        </p:spPr>
-        <p:style>
-          <a:lnRef idx="2">
-            <a:schemeClr val="accent1">
-              <a:shade val="50000"/>
-            </a:schemeClr>
-          </a:lnRef>
-          <a:fillRef idx="1">
-            <a:schemeClr val="accent1"/>
-          </a:fillRef>
-          <a:effectRef idx="0">
-            <a:schemeClr val="accent1"/>
-          </a:effectRef>
-          <a:fontRef idx="minor">
-            <a:schemeClr val="lt1"/>
-          </a:fontRef>
-        </p:style>
-        <p:txBody>
-          <a:bodyPr rtlCol="0" anchor="ctr"/>
-          <a:lstStyle/>
-          <a:p>
-            <a:pPr algn="ctr"/>
-            <a:endParaRPr lang="en-US"/>
-          </a:p>
-        </p:txBody>
-      </p:sp>
-      <p:sp>
-        <p:nvSpPr>
-          <p:cNvPr id="1086" name="Rectangle 1085">
-            <a:extLst>
-              <a:ext uri="{FF2B5EF4-FFF2-40B4-BE49-F238E27FC236}">
-                <a16:creationId xmlns:a16="http://schemas.microsoft.com/office/drawing/2014/main" id="{914EEABC-C75C-F61B-6C4C-ADBB7C7C7364}"/>
-              </a:ext>
-            </a:extLst>
-          </p:cNvPr>
-          <p:cNvSpPr/>
-          <p:nvPr/>
-        </p:nvSpPr>
-        <p:spPr>
-          <a:xfrm>
-            <a:off x="2847475" y="7600244"/>
-            <a:ext cx="1766721" cy="114300"/>
-          </a:xfrm>
-          <a:prstGeom prst="rect">
-            <a:avLst/>
-          </a:prstGeom>
-          <a:solidFill>
-            <a:srgbClr val="00B0F0"/>
-          </a:solidFill>
-          <a:ln>
-            <a:noFill/>
-          </a:ln>
-        </p:spPr>
-        <p:style>
-          <a:lnRef idx="2">
-            <a:schemeClr val="accent1">
-              <a:shade val="50000"/>
-            </a:schemeClr>
-          </a:lnRef>
-          <a:fillRef idx="1">
-            <a:schemeClr val="accent1"/>
-          </a:fillRef>
-          <a:effectRef idx="0">
-            <a:schemeClr val="accent1"/>
-          </a:effectRef>
-          <a:fontRef idx="minor">
-            <a:schemeClr val="lt1"/>
-          </a:fontRef>
-        </p:style>
-        <p:txBody>
-          <a:bodyPr rtlCol="0" anchor="ctr"/>
-          <a:lstStyle/>
-          <a:p>
-            <a:pPr algn="ctr"/>
-            <a:endParaRPr lang="en-US"/>
-          </a:p>
-        </p:txBody>
-      </p:sp>
-      <p:sp>
-        <p:nvSpPr>
-          <p:cNvPr id="1087" name="TextBox 1086">
-            <a:extLst>
-              <a:ext uri="{FF2B5EF4-FFF2-40B4-BE49-F238E27FC236}">
-                <a16:creationId xmlns:a16="http://schemas.microsoft.com/office/drawing/2014/main" id="{2BC93861-CEF6-D4D5-9474-C6E7A2CAED65}"/>
-              </a:ext>
-            </a:extLst>
-          </p:cNvPr>
-          <p:cNvSpPr txBox="1"/>
-          <p:nvPr/>
-        </p:nvSpPr>
-        <p:spPr>
-          <a:xfrm>
-            <a:off x="2759111" y="7375358"/>
-            <a:ext cx="1611339" cy="230832"/>
-          </a:xfrm>
-          <a:prstGeom prst="rect">
-            <a:avLst/>
-          </a:prstGeom>
-          <a:noFill/>
-        </p:spPr>
-        <p:txBody>
-          <a:bodyPr wrap="none" rtlCol="0">
-            <a:spAutoFit/>
-          </a:bodyPr>
-          <a:lstStyle/>
-          <a:p>
-            <a:r>
-              <a:rPr lang="en-US" sz="900" dirty="0">
-                <a:solidFill>
-                  <a:schemeClr val="tx1">
-                    <a:lumMod val="75000"/>
-                    <a:lumOff val="25000"/>
-                  </a:schemeClr>
-                </a:solidFill>
-              </a:rPr>
-              <a:t>Ability to work under pressure</a:t>
-            </a:r>
-            <a:endParaRPr lang="en-US" sz="800" dirty="0">
-              <a:solidFill>
-                <a:schemeClr val="tx1">
-                  <a:lumMod val="75000"/>
-                  <a:lumOff val="25000"/>
-                </a:schemeClr>
-              </a:solidFill>
-            </a:endParaRPr>
-          </a:p>
-        </p:txBody>
-      </p:sp>
-      <p:sp>
-        <p:nvSpPr>
-          <p:cNvPr id="1088" name="TextBox 1087">
-            <a:extLst>
-              <a:ext uri="{FF2B5EF4-FFF2-40B4-BE49-F238E27FC236}">
-                <a16:creationId xmlns:a16="http://schemas.microsoft.com/office/drawing/2014/main" id="{1D1120FA-590C-B8A1-BDB0-5C777A30968A}"/>
-              </a:ext>
-            </a:extLst>
-          </p:cNvPr>
-          <p:cNvSpPr txBox="1"/>
-          <p:nvPr/>
-        </p:nvSpPr>
-        <p:spPr>
-          <a:xfrm>
-            <a:off x="2632979" y="6868317"/>
-            <a:ext cx="1794994" cy="230832"/>
-          </a:xfrm>
-          <a:prstGeom prst="rect">
-            <a:avLst/>
-          </a:prstGeom>
-          <a:noFill/>
-        </p:spPr>
-        <p:txBody>
-          <a:bodyPr wrap="square" rtlCol="0">
-            <a:spAutoFit/>
-          </a:bodyPr>
-          <a:lstStyle/>
-          <a:p>
-            <a:r>
-              <a:rPr lang="en-US" sz="900" b="1" dirty="0">
-                <a:latin typeface="Monaco" pitchFamily="2" charset="77"/>
-              </a:rPr>
-              <a:t>- Inter-personal Skills</a:t>
-            </a:r>
-          </a:p>
-        </p:txBody>
-      </p:sp>
-      <p:sp>
-        <p:nvSpPr>
-          <p:cNvPr id="1089" name="Rectangle 1088">
-            <a:extLst>
-              <a:ext uri="{FF2B5EF4-FFF2-40B4-BE49-F238E27FC236}">
-                <a16:creationId xmlns:a16="http://schemas.microsoft.com/office/drawing/2014/main" id="{A3C1F358-2F9E-3478-F1BF-24475DF839D2}"/>
-              </a:ext>
-            </a:extLst>
-          </p:cNvPr>
-          <p:cNvSpPr/>
-          <p:nvPr/>
-        </p:nvSpPr>
-        <p:spPr>
-          <a:xfrm>
-            <a:off x="2847476" y="7933964"/>
-            <a:ext cx="1794994" cy="114300"/>
-          </a:xfrm>
-          <a:prstGeom prst="rect">
-            <a:avLst/>
-          </a:prstGeom>
-          <a:solidFill>
-            <a:schemeClr val="tx1">
-              <a:lumMod val="75000"/>
-              <a:lumOff val="25000"/>
-            </a:schemeClr>
-          </a:solidFill>
-          <a:ln>
-            <a:noFill/>
-          </a:ln>
-        </p:spPr>
-        <p:style>
-          <a:lnRef idx="2">
-            <a:schemeClr val="accent1">
-              <a:shade val="50000"/>
-            </a:schemeClr>
-          </a:lnRef>
-          <a:fillRef idx="1">
-            <a:schemeClr val="accent1"/>
-          </a:fillRef>
-          <a:effectRef idx="0">
-            <a:schemeClr val="accent1"/>
-          </a:effectRef>
-          <a:fontRef idx="minor">
-            <a:schemeClr val="lt1"/>
-          </a:fontRef>
-        </p:style>
-        <p:txBody>
-          <a:bodyPr rtlCol="0" anchor="ctr"/>
-          <a:lstStyle/>
-          <a:p>
-            <a:pPr algn="ctr"/>
-            <a:endParaRPr lang="en-US"/>
-          </a:p>
-        </p:txBody>
-      </p:sp>
-      <p:sp>
-        <p:nvSpPr>
-          <p:cNvPr id="1090" name="Rectangle 1089">
-            <a:extLst>
-              <a:ext uri="{FF2B5EF4-FFF2-40B4-BE49-F238E27FC236}">
-                <a16:creationId xmlns:a16="http://schemas.microsoft.com/office/drawing/2014/main" id="{A66AC53A-0F09-55B3-DFAF-F76817367811}"/>
-              </a:ext>
-            </a:extLst>
-          </p:cNvPr>
-          <p:cNvSpPr/>
-          <p:nvPr/>
-        </p:nvSpPr>
-        <p:spPr>
-          <a:xfrm>
-            <a:off x="2847475" y="7933964"/>
-            <a:ext cx="1780857" cy="114300"/>
-          </a:xfrm>
-          <a:prstGeom prst="rect">
-            <a:avLst/>
-          </a:prstGeom>
-          <a:solidFill>
-            <a:srgbClr val="00B0F0"/>
-          </a:solidFill>
-          <a:ln>
-            <a:noFill/>
-          </a:ln>
-        </p:spPr>
-        <p:style>
-          <a:lnRef idx="2">
-            <a:schemeClr val="accent1">
-              <a:shade val="50000"/>
-            </a:schemeClr>
-          </a:lnRef>
-          <a:fillRef idx="1">
-            <a:schemeClr val="accent1"/>
-          </a:fillRef>
-          <a:effectRef idx="0">
-            <a:schemeClr val="accent1"/>
-          </a:effectRef>
-          <a:fontRef idx="minor">
-            <a:schemeClr val="lt1"/>
-          </a:fontRef>
-        </p:style>
-        <p:txBody>
-          <a:bodyPr rtlCol="0" anchor="ctr"/>
-          <a:lstStyle/>
-          <a:p>
-            <a:pPr algn="ctr"/>
-            <a:endParaRPr lang="en-US"/>
-          </a:p>
-        </p:txBody>
-      </p:sp>
-      <p:sp>
-        <p:nvSpPr>
-          <p:cNvPr id="1091" name="TextBox 1090">
-            <a:extLst>
-              <a:ext uri="{FF2B5EF4-FFF2-40B4-BE49-F238E27FC236}">
-                <a16:creationId xmlns:a16="http://schemas.microsoft.com/office/drawing/2014/main" id="{8637B99D-8F4C-DA7C-72E3-A1A997C1E4EC}"/>
-              </a:ext>
-            </a:extLst>
-          </p:cNvPr>
-          <p:cNvSpPr txBox="1"/>
-          <p:nvPr/>
-        </p:nvSpPr>
-        <p:spPr>
-          <a:xfrm>
-            <a:off x="2759111" y="7718222"/>
-            <a:ext cx="901209" cy="230832"/>
-          </a:xfrm>
-          <a:prstGeom prst="rect">
-            <a:avLst/>
-          </a:prstGeom>
-          <a:noFill/>
-        </p:spPr>
-        <p:txBody>
-          <a:bodyPr wrap="none" rtlCol="0">
-            <a:spAutoFit/>
-          </a:bodyPr>
-          <a:lstStyle/>
-          <a:p>
-            <a:r>
-              <a:rPr lang="en-US" sz="900" dirty="0">
-                <a:solidFill>
-                  <a:schemeClr val="tx1">
-                    <a:lumMod val="75000"/>
-                    <a:lumOff val="25000"/>
-                  </a:schemeClr>
-                </a:solidFill>
-              </a:rPr>
-              <a:t>Analytical Skills</a:t>
-            </a:r>
-            <a:endParaRPr lang="en-US" sz="800" dirty="0">
-              <a:solidFill>
-                <a:schemeClr val="tx1">
-                  <a:lumMod val="75000"/>
-                  <a:lumOff val="25000"/>
-                </a:schemeClr>
-              </a:solidFill>
-            </a:endParaRPr>
-          </a:p>
-        </p:txBody>
-      </p:sp>
-      <p:sp>
-        <p:nvSpPr>
-          <p:cNvPr id="1092" name="Rectangle 1091">
-            <a:extLst>
-              <a:ext uri="{FF2B5EF4-FFF2-40B4-BE49-F238E27FC236}">
-                <a16:creationId xmlns:a16="http://schemas.microsoft.com/office/drawing/2014/main" id="{3E0DEC95-549E-7263-E8FA-4F6C4748E7A0}"/>
-              </a:ext>
-            </a:extLst>
-          </p:cNvPr>
-          <p:cNvSpPr/>
-          <p:nvPr/>
-        </p:nvSpPr>
-        <p:spPr>
-          <a:xfrm>
-            <a:off x="2847476" y="8260458"/>
-            <a:ext cx="1794994" cy="114300"/>
-          </a:xfrm>
-          <a:prstGeom prst="rect">
-            <a:avLst/>
-          </a:prstGeom>
-          <a:solidFill>
-            <a:schemeClr val="tx1">
-              <a:lumMod val="75000"/>
-              <a:lumOff val="25000"/>
-            </a:schemeClr>
-          </a:solidFill>
-          <a:ln>
-            <a:noFill/>
-          </a:ln>
-        </p:spPr>
-        <p:style>
-          <a:lnRef idx="2">
-            <a:schemeClr val="accent1">
-              <a:shade val="50000"/>
-            </a:schemeClr>
-          </a:lnRef>
-          <a:fillRef idx="1">
-            <a:schemeClr val="accent1"/>
-          </a:fillRef>
-          <a:effectRef idx="0">
-            <a:schemeClr val="accent1"/>
-          </a:effectRef>
-          <a:fontRef idx="minor">
-            <a:schemeClr val="lt1"/>
-          </a:fontRef>
-        </p:style>
-        <p:txBody>
-          <a:bodyPr rtlCol="0" anchor="ctr"/>
-          <a:lstStyle/>
-          <a:p>
-            <a:pPr algn="ctr"/>
-            <a:endParaRPr lang="en-US"/>
-          </a:p>
-        </p:txBody>
-      </p:sp>
-      <p:sp>
-        <p:nvSpPr>
-          <p:cNvPr id="1093" name="Rectangle 1092">
-            <a:extLst>
-              <a:ext uri="{FF2B5EF4-FFF2-40B4-BE49-F238E27FC236}">
-                <a16:creationId xmlns:a16="http://schemas.microsoft.com/office/drawing/2014/main" id="{53655903-D5F3-A69D-45B4-EE1C8E77AD65}"/>
-              </a:ext>
-            </a:extLst>
-          </p:cNvPr>
-          <p:cNvSpPr/>
-          <p:nvPr/>
-        </p:nvSpPr>
-        <p:spPr>
-          <a:xfrm>
-            <a:off x="2847475" y="8259346"/>
-            <a:ext cx="1735787" cy="115412"/>
-          </a:xfrm>
-          <a:prstGeom prst="rect">
-            <a:avLst/>
-          </a:prstGeom>
-          <a:solidFill>
-            <a:srgbClr val="00B0F0"/>
-          </a:solidFill>
-          <a:ln>
-            <a:noFill/>
-          </a:ln>
-        </p:spPr>
-        <p:style>
-          <a:lnRef idx="2">
-            <a:schemeClr val="accent1">
-              <a:shade val="50000"/>
-            </a:schemeClr>
-          </a:lnRef>
-          <a:fillRef idx="1">
-            <a:schemeClr val="accent1"/>
-          </a:fillRef>
-          <a:effectRef idx="0">
-            <a:schemeClr val="accent1"/>
-          </a:effectRef>
-          <a:fontRef idx="minor">
-            <a:schemeClr val="lt1"/>
-          </a:fontRef>
-        </p:style>
-        <p:txBody>
-          <a:bodyPr rtlCol="0" anchor="ctr"/>
-          <a:lstStyle/>
-          <a:p>
-            <a:pPr algn="ctr"/>
-            <a:endParaRPr lang="en-US"/>
-          </a:p>
-        </p:txBody>
-      </p:sp>
-      <p:sp>
-        <p:nvSpPr>
-          <p:cNvPr id="1094" name="TextBox 1093">
-            <a:extLst>
-              <a:ext uri="{FF2B5EF4-FFF2-40B4-BE49-F238E27FC236}">
-                <a16:creationId xmlns:a16="http://schemas.microsoft.com/office/drawing/2014/main" id="{1913279F-7B99-DC3B-3B2D-38DB66A2E8C0}"/>
-              </a:ext>
-            </a:extLst>
-          </p:cNvPr>
-          <p:cNvSpPr txBox="1"/>
-          <p:nvPr/>
-        </p:nvSpPr>
-        <p:spPr>
-          <a:xfrm>
-            <a:off x="2759111" y="8044716"/>
-            <a:ext cx="899605" cy="230832"/>
-          </a:xfrm>
-          <a:prstGeom prst="rect">
-            <a:avLst/>
-          </a:prstGeom>
-          <a:noFill/>
-        </p:spPr>
-        <p:txBody>
-          <a:bodyPr wrap="none" rtlCol="0">
-            <a:spAutoFit/>
-          </a:bodyPr>
-          <a:lstStyle/>
-          <a:p>
-            <a:r>
-              <a:rPr lang="en-US" sz="900" dirty="0">
-                <a:solidFill>
-                  <a:schemeClr val="tx1">
-                    <a:lumMod val="75000"/>
-                    <a:lumOff val="25000"/>
-                  </a:schemeClr>
-                </a:solidFill>
-              </a:rPr>
-              <a:t>Detail-oriented</a:t>
-            </a:r>
-            <a:endParaRPr lang="en-US" sz="800" dirty="0">
-              <a:solidFill>
-                <a:schemeClr val="tx1">
-                  <a:lumMod val="75000"/>
-                  <a:lumOff val="25000"/>
-                </a:schemeClr>
-              </a:solidFill>
-            </a:endParaRPr>
-          </a:p>
-        </p:txBody>
-      </p:sp>
-      <p:sp>
-        <p:nvSpPr>
-          <p:cNvPr id="1095" name="Rectangle 1094">
-            <a:extLst>
-              <a:ext uri="{FF2B5EF4-FFF2-40B4-BE49-F238E27FC236}">
-                <a16:creationId xmlns:a16="http://schemas.microsoft.com/office/drawing/2014/main" id="{DFE758B5-FD15-0888-C6EB-EDC485C4B21F}"/>
-              </a:ext>
-            </a:extLst>
-          </p:cNvPr>
-          <p:cNvSpPr/>
-          <p:nvPr/>
-        </p:nvSpPr>
-        <p:spPr>
-          <a:xfrm>
-            <a:off x="2847476" y="8563005"/>
-            <a:ext cx="1794994" cy="114300"/>
-          </a:xfrm>
-          <a:prstGeom prst="rect">
-            <a:avLst/>
-          </a:prstGeom>
-          <a:solidFill>
-            <a:schemeClr val="tx1">
-              <a:lumMod val="75000"/>
-              <a:lumOff val="25000"/>
-            </a:schemeClr>
-          </a:solidFill>
-          <a:ln>
-            <a:noFill/>
-          </a:ln>
-        </p:spPr>
-        <p:style>
-          <a:lnRef idx="2">
-            <a:schemeClr val="accent1">
-              <a:shade val="50000"/>
-            </a:schemeClr>
-          </a:lnRef>
-          <a:fillRef idx="1">
-            <a:schemeClr val="accent1"/>
-          </a:fillRef>
-          <a:effectRef idx="0">
-            <a:schemeClr val="accent1"/>
-          </a:effectRef>
-          <a:fontRef idx="minor">
-            <a:schemeClr val="lt1"/>
-          </a:fontRef>
-        </p:style>
-        <p:txBody>
-          <a:bodyPr rtlCol="0" anchor="ctr"/>
-          <a:lstStyle/>
-          <a:p>
-            <a:pPr algn="ctr"/>
-            <a:endParaRPr lang="en-US"/>
-          </a:p>
-        </p:txBody>
-      </p:sp>
-      <p:sp>
-        <p:nvSpPr>
-          <p:cNvPr id="1096" name="Rectangle 1095">
-            <a:extLst>
-              <a:ext uri="{FF2B5EF4-FFF2-40B4-BE49-F238E27FC236}">
-                <a16:creationId xmlns:a16="http://schemas.microsoft.com/office/drawing/2014/main" id="{BCF60A8B-0218-0323-5D34-72EE64B85DFA}"/>
-              </a:ext>
-            </a:extLst>
-          </p:cNvPr>
-          <p:cNvSpPr/>
-          <p:nvPr/>
-        </p:nvSpPr>
-        <p:spPr>
-          <a:xfrm>
-            <a:off x="2847475" y="8563005"/>
-            <a:ext cx="1753946" cy="114300"/>
-          </a:xfrm>
-          <a:prstGeom prst="rect">
-            <a:avLst/>
-          </a:prstGeom>
-          <a:solidFill>
-            <a:srgbClr val="00B0F0"/>
-          </a:solidFill>
-          <a:ln>
-            <a:noFill/>
-          </a:ln>
-        </p:spPr>
-        <p:style>
-          <a:lnRef idx="2">
-            <a:schemeClr val="accent1">
-              <a:shade val="50000"/>
-            </a:schemeClr>
-          </a:lnRef>
-          <a:fillRef idx="1">
-            <a:schemeClr val="accent1"/>
-          </a:fillRef>
-          <a:effectRef idx="0">
-            <a:schemeClr val="accent1"/>
-          </a:effectRef>
-          <a:fontRef idx="minor">
-            <a:schemeClr val="lt1"/>
-          </a:fontRef>
-        </p:style>
-        <p:txBody>
-          <a:bodyPr rtlCol="0" anchor="ctr"/>
-          <a:lstStyle/>
-          <a:p>
-            <a:pPr algn="ctr"/>
-            <a:endParaRPr lang="en-US"/>
-          </a:p>
-        </p:txBody>
-      </p:sp>
-      <p:sp>
-        <p:nvSpPr>
-          <p:cNvPr id="1097" name="TextBox 1096">
-            <a:extLst>
-              <a:ext uri="{FF2B5EF4-FFF2-40B4-BE49-F238E27FC236}">
-                <a16:creationId xmlns:a16="http://schemas.microsoft.com/office/drawing/2014/main" id="{4F62FE6A-1D35-6A88-64D6-1FA1CF67BC90}"/>
-              </a:ext>
-            </a:extLst>
-          </p:cNvPr>
-          <p:cNvSpPr txBox="1"/>
-          <p:nvPr/>
-        </p:nvSpPr>
-        <p:spPr>
-          <a:xfrm>
-            <a:off x="2759111" y="8356407"/>
-            <a:ext cx="771365" cy="230832"/>
-          </a:xfrm>
-          <a:prstGeom prst="rect">
-            <a:avLst/>
-          </a:prstGeom>
-          <a:noFill/>
-        </p:spPr>
-        <p:txBody>
-          <a:bodyPr wrap="none" rtlCol="0">
-            <a:spAutoFit/>
-          </a:bodyPr>
-          <a:lstStyle/>
-          <a:p>
-            <a:r>
-              <a:rPr lang="en-US" sz="900" dirty="0">
-                <a:solidFill>
-                  <a:schemeClr val="tx1">
-                    <a:lumMod val="75000"/>
-                    <a:lumOff val="25000"/>
-                  </a:schemeClr>
-                </a:solidFill>
-              </a:rPr>
-              <a:t>Multitasking</a:t>
-            </a:r>
-            <a:endParaRPr lang="en-US" sz="800" dirty="0">
-              <a:solidFill>
-                <a:schemeClr val="tx1">
-                  <a:lumMod val="75000"/>
-                  <a:lumOff val="25000"/>
-                </a:schemeClr>
-              </a:solidFill>
-            </a:endParaRPr>
-          </a:p>
-        </p:txBody>
-      </p:sp>
-      <p:sp>
-        <p:nvSpPr>
-          <p:cNvPr id="1098" name="Rectangle 1097">
-            <a:extLst>
-              <a:ext uri="{FF2B5EF4-FFF2-40B4-BE49-F238E27FC236}">
-                <a16:creationId xmlns:a16="http://schemas.microsoft.com/office/drawing/2014/main" id="{211391E0-B532-2FF5-5ACB-875E435F7B48}"/>
-              </a:ext>
-            </a:extLst>
-          </p:cNvPr>
-          <p:cNvSpPr/>
-          <p:nvPr/>
-        </p:nvSpPr>
-        <p:spPr>
-          <a:xfrm>
-            <a:off x="2847476" y="8868963"/>
-            <a:ext cx="1794994" cy="114300"/>
-          </a:xfrm>
-          <a:prstGeom prst="rect">
-            <a:avLst/>
-          </a:prstGeom>
-          <a:solidFill>
-            <a:schemeClr val="tx1">
-              <a:lumMod val="75000"/>
-              <a:lumOff val="25000"/>
-            </a:schemeClr>
-          </a:solidFill>
-          <a:ln>
-            <a:noFill/>
-          </a:ln>
-        </p:spPr>
-        <p:style>
-          <a:lnRef idx="2">
-            <a:schemeClr val="accent1">
-              <a:shade val="50000"/>
-            </a:schemeClr>
-          </a:lnRef>
-          <a:fillRef idx="1">
-            <a:schemeClr val="accent1"/>
-          </a:fillRef>
-          <a:effectRef idx="0">
-            <a:schemeClr val="accent1"/>
-          </a:effectRef>
-          <a:fontRef idx="minor">
-            <a:schemeClr val="lt1"/>
-          </a:fontRef>
-        </p:style>
-        <p:txBody>
-          <a:bodyPr rtlCol="0" anchor="ctr"/>
-          <a:lstStyle/>
-          <a:p>
-            <a:pPr algn="ctr"/>
-            <a:endParaRPr lang="en-US"/>
-          </a:p>
-        </p:txBody>
-      </p:sp>
-      <p:sp>
-        <p:nvSpPr>
-          <p:cNvPr id="1099" name="Rectangle 1098">
-            <a:extLst>
-              <a:ext uri="{FF2B5EF4-FFF2-40B4-BE49-F238E27FC236}">
-                <a16:creationId xmlns:a16="http://schemas.microsoft.com/office/drawing/2014/main" id="{56C14BF6-2BF9-C49A-6F1D-C0FCF6E32D75}"/>
-              </a:ext>
-            </a:extLst>
-          </p:cNvPr>
-          <p:cNvSpPr/>
-          <p:nvPr/>
-        </p:nvSpPr>
-        <p:spPr>
-          <a:xfrm>
-            <a:off x="2847476" y="8868963"/>
-            <a:ext cx="1781416" cy="114300"/>
-          </a:xfrm>
-          <a:prstGeom prst="rect">
-            <a:avLst/>
-          </a:prstGeom>
-          <a:solidFill>
-            <a:srgbClr val="00B0F0"/>
-          </a:solidFill>
-          <a:ln>
-            <a:noFill/>
-          </a:ln>
-        </p:spPr>
-        <p:style>
-          <a:lnRef idx="2">
-            <a:schemeClr val="accent1">
-              <a:shade val="50000"/>
-            </a:schemeClr>
-          </a:lnRef>
-          <a:fillRef idx="1">
-            <a:schemeClr val="accent1"/>
-          </a:fillRef>
-          <a:effectRef idx="0">
-            <a:schemeClr val="accent1"/>
-          </a:effectRef>
-          <a:fontRef idx="minor">
-            <a:schemeClr val="lt1"/>
-          </a:fontRef>
-        </p:style>
-        <p:txBody>
-          <a:bodyPr rtlCol="0" anchor="ctr"/>
-          <a:lstStyle/>
-          <a:p>
-            <a:pPr algn="ctr"/>
-            <a:endParaRPr lang="en-US"/>
-          </a:p>
-        </p:txBody>
-      </p:sp>
-      <p:sp>
-        <p:nvSpPr>
-          <p:cNvPr id="1100" name="TextBox 1099">
-            <a:extLst>
-              <a:ext uri="{FF2B5EF4-FFF2-40B4-BE49-F238E27FC236}">
-                <a16:creationId xmlns:a16="http://schemas.microsoft.com/office/drawing/2014/main" id="{FEB51D22-AF41-B863-2261-1C172C8A3355}"/>
-              </a:ext>
-            </a:extLst>
-          </p:cNvPr>
-          <p:cNvSpPr txBox="1"/>
-          <p:nvPr/>
-        </p:nvSpPr>
-        <p:spPr>
-          <a:xfrm>
-            <a:off x="2759111" y="8653221"/>
-            <a:ext cx="947695" cy="230832"/>
-          </a:xfrm>
-          <a:prstGeom prst="rect">
-            <a:avLst/>
-          </a:prstGeom>
-          <a:noFill/>
-        </p:spPr>
-        <p:txBody>
-          <a:bodyPr wrap="none" rtlCol="0">
-            <a:spAutoFit/>
-          </a:bodyPr>
-          <a:lstStyle/>
-          <a:p>
-            <a:r>
-              <a:rPr lang="en-US" sz="900" dirty="0">
-                <a:solidFill>
-                  <a:schemeClr val="tx1">
-                    <a:lumMod val="75000"/>
-                    <a:lumOff val="25000"/>
-                  </a:schemeClr>
-                </a:solidFill>
-              </a:rPr>
-              <a:t>Problem-solving</a:t>
-            </a:r>
-          </a:p>
-        </p:txBody>
-      </p:sp>
-      <p:sp>
-        <p:nvSpPr>
-          <p:cNvPr id="1101" name="Rectangle 1100">
-            <a:extLst>
-              <a:ext uri="{FF2B5EF4-FFF2-40B4-BE49-F238E27FC236}">
-                <a16:creationId xmlns:a16="http://schemas.microsoft.com/office/drawing/2014/main" id="{1D54513D-5D08-62E0-BC91-FA2A92A3AAB3}"/>
-              </a:ext>
-            </a:extLst>
-          </p:cNvPr>
-          <p:cNvSpPr/>
-          <p:nvPr/>
-        </p:nvSpPr>
-        <p:spPr>
-          <a:xfrm>
-            <a:off x="2847476" y="9185066"/>
-            <a:ext cx="1794994" cy="114300"/>
-          </a:xfrm>
-          <a:prstGeom prst="rect">
-            <a:avLst/>
-          </a:prstGeom>
-          <a:solidFill>
-            <a:schemeClr val="tx1">
-              <a:lumMod val="75000"/>
-              <a:lumOff val="25000"/>
-            </a:schemeClr>
-          </a:solidFill>
-          <a:ln>
-            <a:noFill/>
-          </a:ln>
-        </p:spPr>
-        <p:style>
-          <a:lnRef idx="2">
-            <a:schemeClr val="accent1">
-              <a:shade val="50000"/>
-            </a:schemeClr>
-          </a:lnRef>
-          <a:fillRef idx="1">
-            <a:schemeClr val="accent1"/>
-          </a:fillRef>
-          <a:effectRef idx="0">
-            <a:schemeClr val="accent1"/>
-          </a:effectRef>
-          <a:fontRef idx="minor">
-            <a:schemeClr val="lt1"/>
-          </a:fontRef>
-        </p:style>
-        <p:txBody>
-          <a:bodyPr rtlCol="0" anchor="ctr"/>
-          <a:lstStyle/>
-          <a:p>
-            <a:pPr algn="ctr"/>
-            <a:endParaRPr lang="en-US"/>
-          </a:p>
-        </p:txBody>
-      </p:sp>
-      <p:sp>
-        <p:nvSpPr>
-          <p:cNvPr id="1102" name="Rectangle 1101">
-            <a:extLst>
-              <a:ext uri="{FF2B5EF4-FFF2-40B4-BE49-F238E27FC236}">
-                <a16:creationId xmlns:a16="http://schemas.microsoft.com/office/drawing/2014/main" id="{C2B82B19-46B2-B48A-530A-35562D3430B9}"/>
-              </a:ext>
-            </a:extLst>
-          </p:cNvPr>
-          <p:cNvSpPr/>
-          <p:nvPr/>
-        </p:nvSpPr>
-        <p:spPr>
-          <a:xfrm>
-            <a:off x="2847475" y="9185066"/>
-            <a:ext cx="1735787" cy="114300"/>
-          </a:xfrm>
-          <a:prstGeom prst="rect">
-            <a:avLst/>
-          </a:prstGeom>
-          <a:solidFill>
-            <a:srgbClr val="00B0F0"/>
-          </a:solidFill>
-          <a:ln>
-            <a:noFill/>
-          </a:ln>
-        </p:spPr>
-        <p:style>
-          <a:lnRef idx="2">
-            <a:schemeClr val="accent1">
-              <a:shade val="50000"/>
-            </a:schemeClr>
-          </a:lnRef>
-          <a:fillRef idx="1">
-            <a:schemeClr val="accent1"/>
-          </a:fillRef>
-          <a:effectRef idx="0">
-            <a:schemeClr val="accent1"/>
-          </a:effectRef>
-          <a:fontRef idx="minor">
-            <a:schemeClr val="lt1"/>
-          </a:fontRef>
-        </p:style>
-        <p:txBody>
-          <a:bodyPr rtlCol="0" anchor="ctr"/>
-          <a:lstStyle/>
-          <a:p>
-            <a:pPr algn="ctr"/>
-            <a:endParaRPr lang="en-US"/>
-          </a:p>
-        </p:txBody>
-      </p:sp>
-      <p:sp>
-        <p:nvSpPr>
-          <p:cNvPr id="1103" name="TextBox 1102">
-            <a:extLst>
-              <a:ext uri="{FF2B5EF4-FFF2-40B4-BE49-F238E27FC236}">
-                <a16:creationId xmlns:a16="http://schemas.microsoft.com/office/drawing/2014/main" id="{4061022E-9BDC-4024-44F2-1B06A525C6B8}"/>
-              </a:ext>
-            </a:extLst>
-          </p:cNvPr>
-          <p:cNvSpPr txBox="1"/>
-          <p:nvPr/>
-        </p:nvSpPr>
-        <p:spPr>
-          <a:xfrm>
-            <a:off x="2759111" y="8969324"/>
-            <a:ext cx="1075936" cy="230832"/>
-          </a:xfrm>
-          <a:prstGeom prst="rect">
-            <a:avLst/>
-          </a:prstGeom>
-          <a:noFill/>
-        </p:spPr>
-        <p:txBody>
-          <a:bodyPr wrap="none" rtlCol="0">
-            <a:spAutoFit/>
-          </a:bodyPr>
-          <a:lstStyle/>
-          <a:p>
-            <a:r>
-              <a:rPr lang="en-US" sz="900" dirty="0">
-                <a:solidFill>
-                  <a:schemeClr val="tx1">
-                    <a:lumMod val="75000"/>
-                    <a:lumOff val="25000"/>
-                  </a:schemeClr>
-                </a:solidFill>
-              </a:rPr>
-              <a:t>Time Management</a:t>
-            </a:r>
-            <a:endParaRPr lang="en-US" sz="800" dirty="0">
-              <a:solidFill>
-                <a:schemeClr val="tx1">
-                  <a:lumMod val="75000"/>
-                  <a:lumOff val="25000"/>
-                </a:schemeClr>
-              </a:solidFill>
-            </a:endParaRPr>
-          </a:p>
-        </p:txBody>
-      </p:sp>
-      <p:sp>
-        <p:nvSpPr>
-          <p:cNvPr id="1104" name="Rectangle 1103">
-            <a:extLst>
-              <a:ext uri="{FF2B5EF4-FFF2-40B4-BE49-F238E27FC236}">
-                <a16:creationId xmlns:a16="http://schemas.microsoft.com/office/drawing/2014/main" id="{0195119F-0330-D16C-98F4-F0BFCF7644D2}"/>
-              </a:ext>
-            </a:extLst>
-          </p:cNvPr>
-          <p:cNvSpPr/>
-          <p:nvPr/>
-        </p:nvSpPr>
-        <p:spPr>
-          <a:xfrm>
-            <a:off x="2847476" y="9496757"/>
-            <a:ext cx="1794994" cy="114300"/>
-          </a:xfrm>
-          <a:prstGeom prst="rect">
-            <a:avLst/>
-          </a:prstGeom>
-          <a:solidFill>
-            <a:schemeClr val="tx1">
-              <a:lumMod val="75000"/>
-              <a:lumOff val="25000"/>
-            </a:schemeClr>
-          </a:solidFill>
-          <a:ln>
-            <a:noFill/>
-          </a:ln>
-        </p:spPr>
-        <p:style>
-          <a:lnRef idx="2">
-            <a:schemeClr val="accent1">
-              <a:shade val="50000"/>
-            </a:schemeClr>
-          </a:lnRef>
-          <a:fillRef idx="1">
-            <a:schemeClr val="accent1"/>
-          </a:fillRef>
-          <a:effectRef idx="0">
-            <a:schemeClr val="accent1"/>
-          </a:effectRef>
-          <a:fontRef idx="minor">
-            <a:schemeClr val="lt1"/>
-          </a:fontRef>
-        </p:style>
-        <p:txBody>
-          <a:bodyPr rtlCol="0" anchor="ctr"/>
-          <a:lstStyle/>
-          <a:p>
-            <a:pPr algn="ctr"/>
-            <a:endParaRPr lang="en-US"/>
-          </a:p>
-        </p:txBody>
-      </p:sp>
-      <p:sp>
-        <p:nvSpPr>
-          <p:cNvPr id="1105" name="Rectangle 1104">
-            <a:extLst>
-              <a:ext uri="{FF2B5EF4-FFF2-40B4-BE49-F238E27FC236}">
-                <a16:creationId xmlns:a16="http://schemas.microsoft.com/office/drawing/2014/main" id="{A14D6596-8F82-29AE-09E6-773B2D0DAB7D}"/>
-              </a:ext>
-            </a:extLst>
-          </p:cNvPr>
-          <p:cNvSpPr/>
-          <p:nvPr/>
-        </p:nvSpPr>
-        <p:spPr>
-          <a:xfrm>
-            <a:off x="2847475" y="9496757"/>
-            <a:ext cx="1753946" cy="114300"/>
-          </a:xfrm>
-          <a:prstGeom prst="rect">
-            <a:avLst/>
-          </a:prstGeom>
-          <a:solidFill>
-            <a:srgbClr val="00B0F0"/>
-          </a:solidFill>
-          <a:ln>
-            <a:noFill/>
-          </a:ln>
-        </p:spPr>
-        <p:style>
-          <a:lnRef idx="2">
-            <a:schemeClr val="accent1">
-              <a:shade val="50000"/>
-            </a:schemeClr>
-          </a:lnRef>
-          <a:fillRef idx="1">
-            <a:schemeClr val="accent1"/>
-          </a:fillRef>
-          <a:effectRef idx="0">
-            <a:schemeClr val="accent1"/>
-          </a:effectRef>
-          <a:fontRef idx="minor">
-            <a:schemeClr val="lt1"/>
-          </a:fontRef>
-        </p:style>
-        <p:txBody>
-          <a:bodyPr rtlCol="0" anchor="ctr"/>
-          <a:lstStyle/>
-          <a:p>
-            <a:pPr algn="ctr"/>
-            <a:endParaRPr lang="en-US"/>
-          </a:p>
-        </p:txBody>
-      </p:sp>
-      <p:sp>
-        <p:nvSpPr>
-          <p:cNvPr id="1106" name="TextBox 1105">
-            <a:extLst>
-              <a:ext uri="{FF2B5EF4-FFF2-40B4-BE49-F238E27FC236}">
-                <a16:creationId xmlns:a16="http://schemas.microsoft.com/office/drawing/2014/main" id="{ED9B529B-EEC0-2A9E-F08C-D0CEE83F38F1}"/>
-              </a:ext>
-            </a:extLst>
-          </p:cNvPr>
-          <p:cNvSpPr txBox="1"/>
-          <p:nvPr/>
-        </p:nvSpPr>
-        <p:spPr>
-          <a:xfrm>
-            <a:off x="2759111" y="9281015"/>
-            <a:ext cx="681597" cy="230832"/>
-          </a:xfrm>
-          <a:prstGeom prst="rect">
-            <a:avLst/>
-          </a:prstGeom>
-          <a:noFill/>
-        </p:spPr>
-        <p:txBody>
-          <a:bodyPr wrap="none" rtlCol="0">
-            <a:spAutoFit/>
-          </a:bodyPr>
-          <a:lstStyle/>
-          <a:p>
-            <a:r>
-              <a:rPr lang="en-US" sz="900" dirty="0">
-                <a:solidFill>
-                  <a:schemeClr val="tx1">
-                    <a:lumMod val="75000"/>
-                    <a:lumOff val="25000"/>
-                  </a:schemeClr>
-                </a:solidFill>
-              </a:rPr>
-              <a:t>Teamwork</a:t>
-            </a:r>
-            <a:endParaRPr lang="en-US" sz="800" dirty="0">
-              <a:solidFill>
-                <a:schemeClr val="tx1">
-                  <a:lumMod val="75000"/>
-                  <a:lumOff val="25000"/>
-                </a:schemeClr>
-              </a:solidFill>
-            </a:endParaRPr>
-          </a:p>
-        </p:txBody>
-      </p:sp>
-      <p:cxnSp>
-        <p:nvCxnSpPr>
-          <p:cNvPr id="1112" name="Straight Connector 1111">
-            <a:extLst>
-              <a:ext uri="{FF2B5EF4-FFF2-40B4-BE49-F238E27FC236}">
-                <a16:creationId xmlns:a16="http://schemas.microsoft.com/office/drawing/2014/main" id="{380608A0-002F-044F-7D76-7C0B81D9BA64}"/>
-              </a:ext>
-            </a:extLst>
-          </p:cNvPr>
-          <p:cNvCxnSpPr>
-            <a:cxnSpLocks/>
-          </p:cNvCxnSpPr>
-          <p:nvPr/>
-        </p:nvCxnSpPr>
-        <p:spPr>
-          <a:xfrm>
-            <a:off x="5030561" y="6555335"/>
-            <a:ext cx="0" cy="3323423"/>
-          </a:xfrm>
-          <a:prstGeom prst="line">
-            <a:avLst/>
-          </a:prstGeom>
-          <a:ln>
-            <a:solidFill>
-              <a:schemeClr val="bg1">
-                <a:lumMod val="75000"/>
-              </a:schemeClr>
-            </a:solidFill>
-          </a:ln>
-        </p:spPr>
-        <p:style>
-          <a:lnRef idx="1">
-            <a:schemeClr val="accent1"/>
-          </a:lnRef>
-          <a:fillRef idx="0">
-            <a:schemeClr val="accent1"/>
-          </a:fillRef>
-          <a:effectRef idx="0">
-            <a:schemeClr val="accent1"/>
-          </a:effectRef>
-          <a:fontRef idx="minor">
-            <a:schemeClr val="tx1"/>
-          </a:fontRef>
-        </p:style>
-      </p:cxnSp>
-      <p:sp>
-        <p:nvSpPr>
-          <p:cNvPr id="1113" name="Rectangle 1112">
-            <a:extLst>
-              <a:ext uri="{FF2B5EF4-FFF2-40B4-BE49-F238E27FC236}">
-                <a16:creationId xmlns:a16="http://schemas.microsoft.com/office/drawing/2014/main" id="{EC473602-EBFB-93BF-9945-AD0CF9E0D125}"/>
-              </a:ext>
-            </a:extLst>
-          </p:cNvPr>
-          <p:cNvSpPr/>
-          <p:nvPr/>
-        </p:nvSpPr>
-        <p:spPr>
-          <a:xfrm>
-            <a:off x="2850356" y="7259421"/>
-            <a:ext cx="1794994" cy="114300"/>
-          </a:xfrm>
-          <a:prstGeom prst="rect">
-            <a:avLst/>
-          </a:prstGeom>
-          <a:solidFill>
-            <a:schemeClr val="tx1">
-              <a:lumMod val="75000"/>
-              <a:lumOff val="25000"/>
-            </a:schemeClr>
-          </a:solidFill>
-          <a:ln>
-            <a:noFill/>
-          </a:ln>
-        </p:spPr>
-        <p:style>
-          <a:lnRef idx="2">
-            <a:schemeClr val="accent1">
-              <a:shade val="50000"/>
-            </a:schemeClr>
-          </a:lnRef>
-          <a:fillRef idx="1">
-            <a:schemeClr val="accent1"/>
-          </a:fillRef>
-          <a:effectRef idx="0">
-            <a:schemeClr val="accent1"/>
-          </a:effectRef>
-          <a:fontRef idx="minor">
-            <a:schemeClr val="lt1"/>
-          </a:fontRef>
-        </p:style>
-        <p:txBody>
-          <a:bodyPr rtlCol="0" anchor="ctr"/>
-          <a:lstStyle/>
-          <a:p>
-            <a:pPr algn="ctr"/>
-            <a:endParaRPr lang="en-US"/>
-          </a:p>
-        </p:txBody>
-      </p:sp>
-      <p:sp>
-        <p:nvSpPr>
-          <p:cNvPr id="1114" name="Rectangle 1113">
-            <a:extLst>
-              <a:ext uri="{FF2B5EF4-FFF2-40B4-BE49-F238E27FC236}">
-                <a16:creationId xmlns:a16="http://schemas.microsoft.com/office/drawing/2014/main" id="{16FAF720-DA75-EE86-637B-DFA0A91B4489}"/>
-              </a:ext>
-            </a:extLst>
-          </p:cNvPr>
-          <p:cNvSpPr/>
-          <p:nvPr/>
-        </p:nvSpPr>
-        <p:spPr>
-          <a:xfrm>
-            <a:off x="2850355" y="7259421"/>
-            <a:ext cx="1753946" cy="114300"/>
-          </a:xfrm>
-          <a:prstGeom prst="rect">
-            <a:avLst/>
-          </a:prstGeom>
-          <a:solidFill>
-            <a:srgbClr val="00B0F0"/>
-          </a:solidFill>
-          <a:ln>
-            <a:noFill/>
-          </a:ln>
-        </p:spPr>
-        <p:style>
-          <a:lnRef idx="2">
-            <a:schemeClr val="accent1">
-              <a:shade val="50000"/>
-            </a:schemeClr>
-          </a:lnRef>
-          <a:fillRef idx="1">
-            <a:schemeClr val="accent1"/>
-          </a:fillRef>
-          <a:effectRef idx="0">
-            <a:schemeClr val="accent1"/>
-          </a:effectRef>
-          <a:fontRef idx="minor">
-            <a:schemeClr val="lt1"/>
-          </a:fontRef>
-        </p:style>
-        <p:txBody>
-          <a:bodyPr rtlCol="0" anchor="ctr"/>
-          <a:lstStyle/>
-          <a:p>
-            <a:pPr algn="ctr"/>
-            <a:endParaRPr lang="en-US"/>
-          </a:p>
-        </p:txBody>
-      </p:sp>
-      <p:sp>
-        <p:nvSpPr>
-          <p:cNvPr id="1115" name="TextBox 1114">
-            <a:extLst>
-              <a:ext uri="{FF2B5EF4-FFF2-40B4-BE49-F238E27FC236}">
-                <a16:creationId xmlns:a16="http://schemas.microsoft.com/office/drawing/2014/main" id="{24F69EFB-33EB-D336-361F-BAE99F741394}"/>
-              </a:ext>
-            </a:extLst>
-          </p:cNvPr>
-          <p:cNvSpPr txBox="1"/>
-          <p:nvPr/>
-        </p:nvSpPr>
-        <p:spPr>
-          <a:xfrm>
-            <a:off x="2761991" y="7043679"/>
-            <a:ext cx="697627" cy="230832"/>
-          </a:xfrm>
-          <a:prstGeom prst="rect">
-            <a:avLst/>
-          </a:prstGeom>
-          <a:noFill/>
-        </p:spPr>
-        <p:txBody>
-          <a:bodyPr wrap="none" rtlCol="0">
-            <a:spAutoFit/>
-          </a:bodyPr>
-          <a:lstStyle/>
-          <a:p>
-            <a:r>
-              <a:rPr lang="en-US" sz="900" dirty="0">
-                <a:solidFill>
-                  <a:schemeClr val="tx1">
-                    <a:lumMod val="75000"/>
-                    <a:lumOff val="25000"/>
-                  </a:schemeClr>
-                </a:solidFill>
-              </a:rPr>
-              <a:t>Leadership</a:t>
-            </a:r>
-            <a:endParaRPr lang="en-US" sz="800" dirty="0">
-              <a:solidFill>
-                <a:schemeClr val="tx1">
-                  <a:lumMod val="75000"/>
-                  <a:lumOff val="25000"/>
-                </a:schemeClr>
-              </a:solidFill>
-            </a:endParaRPr>
-          </a:p>
-        </p:txBody>
-      </p:sp>
-      <p:cxnSp>
-        <p:nvCxnSpPr>
-          <p:cNvPr id="1118" name="Straight Connector 1117">
-            <a:extLst>
-              <a:ext uri="{FF2B5EF4-FFF2-40B4-BE49-F238E27FC236}">
-                <a16:creationId xmlns:a16="http://schemas.microsoft.com/office/drawing/2014/main" id="{6AB811D1-3150-5BF9-1DE9-6D7CC0EE6526}"/>
-              </a:ext>
-            </a:extLst>
-          </p:cNvPr>
-          <p:cNvCxnSpPr>
-            <a:cxnSpLocks/>
-          </p:cNvCxnSpPr>
-          <p:nvPr/>
-        </p:nvCxnSpPr>
-        <p:spPr>
-          <a:xfrm>
-            <a:off x="-12349" y="6541012"/>
-            <a:ext cx="6858000" cy="0"/>
-          </a:xfrm>
-          <a:prstGeom prst="line">
-            <a:avLst/>
-          </a:prstGeom>
-          <a:ln>
-            <a:solidFill>
-              <a:schemeClr val="bg1">
-                <a:lumMod val="75000"/>
-              </a:schemeClr>
-            </a:solidFill>
-          </a:ln>
-        </p:spPr>
-        <p:style>
-          <a:lnRef idx="1">
-            <a:schemeClr val="accent1"/>
-          </a:lnRef>
-          <a:fillRef idx="0">
-            <a:schemeClr val="accent1"/>
-          </a:fillRef>
-          <a:effectRef idx="0">
-            <a:schemeClr val="accent1"/>
-          </a:effectRef>
-          <a:fontRef idx="minor">
-            <a:schemeClr val="tx1"/>
-          </a:fontRef>
-        </p:style>
-      </p:cxnSp>
-      <p:sp>
-        <p:nvSpPr>
-          <p:cNvPr id="1123" name="TextBox 1122">
-            <a:extLst>
-              <a:ext uri="{FF2B5EF4-FFF2-40B4-BE49-F238E27FC236}">
-                <a16:creationId xmlns:a16="http://schemas.microsoft.com/office/drawing/2014/main" id="{F939B66A-5AA1-EF11-FDDF-6F2FFD609785}"/>
-              </a:ext>
-            </a:extLst>
-          </p:cNvPr>
-          <p:cNvSpPr txBox="1"/>
-          <p:nvPr/>
-        </p:nvSpPr>
-        <p:spPr>
-          <a:xfrm>
-            <a:off x="5100980" y="6590101"/>
-            <a:ext cx="859332" cy="307777"/>
-          </a:xfrm>
-          <a:prstGeom prst="rect">
-            <a:avLst/>
-          </a:prstGeom>
-          <a:noFill/>
-        </p:spPr>
-        <p:txBody>
-          <a:bodyPr wrap="square" rtlCol="0">
-            <a:spAutoFit/>
-          </a:bodyPr>
-          <a:lstStyle/>
-          <a:p>
-            <a:r>
-              <a:rPr lang="en-US" sz="1400" b="1" dirty="0"/>
-              <a:t>Hobbies</a:t>
-            </a:r>
-          </a:p>
-        </p:txBody>
-      </p:sp>
-      <p:pic>
-        <p:nvPicPr>
-          <p:cNvPr id="1124" name="Graphic 1123">
-            <a:extLst>
-              <a:ext uri="{FF2B5EF4-FFF2-40B4-BE49-F238E27FC236}">
-                <a16:creationId xmlns:a16="http://schemas.microsoft.com/office/drawing/2014/main" id="{412B2503-0869-A900-4D43-6712B32B6CB2}"/>
-              </a:ext>
-              <a:ext uri="{C183D7F6-B498-43B3-948B-1728B52AA6E4}">
-                <adec:decorative xmlns:adec="http://schemas.microsoft.com/office/drawing/2017/decorative" val="1"/>
-              </a:ext>
-            </a:extLst>
-          </p:cNvPr>
-          <p:cNvPicPr>
-            <a:picLocks noChangeAspect="1"/>
-          </p:cNvPicPr>
-          <p:nvPr/>
-        </p:nvPicPr>
-        <p:blipFill>
-          <a:blip r:embed="rId5" cstate="print">
-            <a:extLst>
-              <a:ext uri="{96DAC541-7B7A-43D3-8B79-37D633B846F1}">
-                <asvg:svgBlip xmlns:asvg="http://schemas.microsoft.com/office/drawing/2016/SVG/main" r:embed="rId6"/>
-              </a:ext>
-            </a:extLst>
-          </a:blip>
-          <a:stretch>
-            <a:fillRect/>
-          </a:stretch>
-        </p:blipFill>
-        <p:spPr>
-          <a:xfrm>
-            <a:off x="6266470" y="6890487"/>
-            <a:ext cx="264177" cy="195261"/>
-          </a:xfrm>
-          <a:prstGeom prst="rect">
-            <a:avLst/>
-          </a:prstGeom>
-        </p:spPr>
-      </p:pic>
-      <p:pic>
-        <p:nvPicPr>
-          <p:cNvPr id="1125" name="Picture 2" descr="Motorcycle Of Big Size Black Silhouette free vector icons designed by  Freepik | Kids canvas art, Bike art, Black silhouette">
-            <a:extLst>
-              <a:ext uri="{FF2B5EF4-FFF2-40B4-BE49-F238E27FC236}">
-                <a16:creationId xmlns:a16="http://schemas.microsoft.com/office/drawing/2014/main" id="{7C427110-D704-CBBE-60E7-F4B8A148A012}"/>
-              </a:ext>
-            </a:extLst>
-          </p:cNvPr>
-          <p:cNvPicPr>
-            <a:picLocks noChangeAspect="1" noChangeArrowheads="1"/>
-          </p:cNvPicPr>
-          <p:nvPr/>
-        </p:nvPicPr>
-        <p:blipFill>
-          <a:blip r:embed="rId7" cstate="print">
-            <a:duotone>
-              <a:schemeClr val="bg2">
-                <a:shade val="45000"/>
-                <a:satMod val="135000"/>
-              </a:schemeClr>
-              <a:prstClr val="white"/>
-            </a:duotone>
-            <a:extLst>
-              <a:ext uri="{28A0092B-C50C-407E-A947-70E740481C1C}">
-                <a14:useLocalDpi xmlns:a14="http://schemas.microsoft.com/office/drawing/2010/main" val="0"/>
-              </a:ext>
-            </a:extLst>
-          </a:blip>
-          <a:srcRect/>
-          <a:stretch>
-            <a:fillRect/>
-          </a:stretch>
-        </p:blipFill>
-        <p:spPr bwMode="auto">
-          <a:xfrm>
-            <a:off x="5228770" y="6847525"/>
-            <a:ext cx="288997" cy="288997"/>
-          </a:xfrm>
-          <a:prstGeom prst="rect">
-            <a:avLst/>
-          </a:prstGeom>
-          <a:noFill/>
-          <a:extLst>
-            <a:ext uri="{909E8E84-426E-40DD-AFC4-6F175D3DCCD1}">
-              <a14:hiddenFill xmlns:a14="http://schemas.microsoft.com/office/drawing/2010/main">
-                <a:solidFill>
-                  <a:srgbClr val="FFFFFF"/>
-                </a:solidFill>
-              </a14:hiddenFill>
-            </a:ext>
-          </a:extLst>
-        </p:spPr>
-      </p:pic>
-      <p:pic>
-        <p:nvPicPr>
-          <p:cNvPr id="1126" name="Picture 1125">
-            <a:extLst>
-              <a:ext uri="{FF2B5EF4-FFF2-40B4-BE49-F238E27FC236}">
-                <a16:creationId xmlns:a16="http://schemas.microsoft.com/office/drawing/2014/main" id="{D64E0E8B-A5F1-1F19-794B-7589F60F278E}"/>
-              </a:ext>
-            </a:extLst>
-          </p:cNvPr>
-          <p:cNvPicPr>
-            <a:picLocks noChangeAspect="1"/>
-          </p:cNvPicPr>
-          <p:nvPr/>
-        </p:nvPicPr>
-        <p:blipFill>
-          <a:blip r:embed="rId8" cstate="print">
-            <a:duotone>
-              <a:schemeClr val="bg2">
-                <a:shade val="45000"/>
-                <a:satMod val="135000"/>
-              </a:schemeClr>
-              <a:prstClr val="white"/>
-            </a:duotone>
-            <a:extLst>
-              <a:ext uri="{28A0092B-C50C-407E-A947-70E740481C1C}">
-                <a14:useLocalDpi xmlns:a14="http://schemas.microsoft.com/office/drawing/2010/main" val="0"/>
-              </a:ext>
-              <a:ext uri="{837473B0-CC2E-450A-ABE3-18F120FF3D39}">
-                <a1611:picAttrSrcUrl xmlns:a1611="http://schemas.microsoft.com/office/drawing/2016/11/main" r:id="rId9"/>
-              </a:ext>
-            </a:extLst>
-          </a:blip>
-          <a:stretch>
-            <a:fillRect/>
-          </a:stretch>
-        </p:blipFill>
-        <p:spPr>
-          <a:xfrm>
-            <a:off x="5915457" y="6876430"/>
-            <a:ext cx="223374" cy="223374"/>
-          </a:xfrm>
-          <a:prstGeom prst="rect">
-            <a:avLst/>
-          </a:prstGeom>
-        </p:spPr>
-      </p:pic>
-      <p:pic>
-        <p:nvPicPr>
-          <p:cNvPr id="1127" name="Picture 1126">
-            <a:extLst>
-              <a:ext uri="{FF2B5EF4-FFF2-40B4-BE49-F238E27FC236}">
-                <a16:creationId xmlns:a16="http://schemas.microsoft.com/office/drawing/2014/main" id="{22032065-4135-2955-1681-62B9BA854B7C}"/>
-              </a:ext>
-            </a:extLst>
-          </p:cNvPr>
-          <p:cNvPicPr>
-            <a:picLocks noChangeAspect="1"/>
-          </p:cNvPicPr>
-          <p:nvPr/>
-        </p:nvPicPr>
-        <p:blipFill>
-          <a:blip r:embed="rId10" cstate="print">
-            <a:duotone>
-              <a:schemeClr val="bg2">
-                <a:shade val="45000"/>
-                <a:satMod val="135000"/>
-              </a:schemeClr>
-              <a:prstClr val="white"/>
-            </a:duotone>
-            <a:extLst>
-              <a:ext uri="{28A0092B-C50C-407E-A947-70E740481C1C}">
-                <a14:useLocalDpi xmlns:a14="http://schemas.microsoft.com/office/drawing/2010/main" val="0"/>
-              </a:ext>
-              <a:ext uri="{837473B0-CC2E-450A-ABE3-18F120FF3D39}">
-                <a1611:picAttrSrcUrl xmlns:a1611="http://schemas.microsoft.com/office/drawing/2016/11/main" r:id="rId11"/>
-              </a:ext>
-            </a:extLst>
-          </a:blip>
-          <a:stretch>
-            <a:fillRect/>
-          </a:stretch>
-        </p:blipFill>
-        <p:spPr>
-          <a:xfrm>
-            <a:off x="5610226" y="6876430"/>
-            <a:ext cx="223374" cy="223374"/>
-          </a:xfrm>
-          <a:prstGeom prst="rect">
-            <a:avLst/>
-          </a:prstGeom>
-        </p:spPr>
-      </p:pic>
     </p:spTree>
     <p:extLst>
       <p:ext uri="{BB962C8B-B14F-4D97-AF65-F5344CB8AC3E}">

</xml_diff>

<commit_message>
Update CV with underlined keywords
</commit_message>
<xml_diff>
--- a/my_resume_v2.pptx
+++ b/my_resume_v2.pptx
@@ -5803,7 +5803,7 @@
         </p:nvGrpSpPr>
         <p:grpSpPr>
           <a:xfrm>
-            <a:off x="126723" y="3870824"/>
+            <a:off x="126723" y="3887153"/>
             <a:ext cx="1502200" cy="292388"/>
             <a:chOff x="4141297" y="2671400"/>
             <a:chExt cx="1502200" cy="292388"/>
@@ -5899,7 +5899,7 @@
         </p:nvSpPr>
         <p:spPr>
           <a:xfrm>
-            <a:off x="88190" y="8084560"/>
+            <a:off x="88190" y="8230086"/>
             <a:ext cx="6657120" cy="1546257"/>
           </a:xfrm>
           <a:prstGeom prst="rect">
@@ -6361,7 +6361,7 @@
         </p:nvSpPr>
         <p:spPr>
           <a:xfrm>
-            <a:off x="88190" y="6416337"/>
+            <a:off x="88190" y="6561863"/>
             <a:ext cx="6657120" cy="1648849"/>
           </a:xfrm>
           <a:prstGeom prst="rect">
@@ -6906,8 +6906,8 @@
         </p:nvSpPr>
         <p:spPr>
           <a:xfrm>
-            <a:off x="88190" y="4159697"/>
-            <a:ext cx="6657120" cy="1494961"/>
+            <a:off x="88190" y="4148069"/>
+            <a:ext cx="6657120" cy="1648849"/>
           </a:xfrm>
           <a:prstGeom prst="rect">
             <a:avLst/>
@@ -6975,6 +6975,17 @@
               <a:buChar char="•"/>
             </a:pPr>
             <a:r>
+              <a:rPr lang="en-US" sz="900" u="sng" dirty="0">
+                <a:solidFill>
+                  <a:schemeClr val="tx1">
+                    <a:lumMod val="75000"/>
+                    <a:lumOff val="25000"/>
+                  </a:schemeClr>
+                </a:solidFill>
+              </a:rPr>
+              <a:t>Load testing of Subspace's EVM domain</a:t>
+            </a:r>
+            <a:r>
               <a:rPr lang="en-US" sz="900" dirty="0">
                 <a:solidFill>
                   <a:schemeClr val="tx1">
@@ -6983,7 +6994,29 @@
                   </a:schemeClr>
                 </a:solidFill>
               </a:rPr>
-              <a:t>Load testing of Subspace's EVM domain in Async Rust &amp; different Solidity contracts having low to high gas-consuming functions for sending transactions on-chain with custom load value.</a:t>
+              <a:t> in Async Rust &amp; different Solidity contracts having low to high gas-consuming functions for sending transactions on-chain with custom load value; created Solidity repository </a:t>
+            </a:r>
+            <a:r>
+              <a:rPr lang="en-US" sz="900" dirty="0" err="1">
+                <a:solidFill>
+                  <a:schemeClr val="tx1">
+                    <a:lumMod val="75000"/>
+                    <a:lumOff val="25000"/>
+                  </a:schemeClr>
+                </a:solidFill>
+              </a:rPr>
+              <a:t>monorepo</a:t>
+            </a:r>
+            <a:r>
+              <a:rPr lang="en-US" sz="900" dirty="0">
+                <a:solidFill>
+                  <a:schemeClr val="tx1">
+                    <a:lumMod val="75000"/>
+                    <a:lumOff val="25000"/>
+                  </a:schemeClr>
+                </a:solidFill>
+              </a:rPr>
+              <a:t> for community.</a:t>
             </a:r>
           </a:p>
           <a:p>
@@ -7003,7 +7036,29 @@
                   </a:schemeClr>
                 </a:solidFill>
               </a:rPr>
-              <a:t>Did some work on ZK-based Identity solution for native product using TypeScript &amp; Solidity.</a:t>
+              <a:t>Built a native </a:t>
+            </a:r>
+            <a:r>
+              <a:rPr lang="en-US" sz="900" u="sng" dirty="0">
+                <a:solidFill>
+                  <a:schemeClr val="tx1">
+                    <a:lumMod val="75000"/>
+                    <a:lumOff val="25000"/>
+                  </a:schemeClr>
+                </a:solidFill>
+              </a:rPr>
+              <a:t>cross-chain bridge</a:t>
+            </a:r>
+            <a:r>
+              <a:rPr lang="en-US" sz="900" dirty="0">
+                <a:solidFill>
+                  <a:schemeClr val="tx1">
+                    <a:lumMod val="75000"/>
+                    <a:lumOff val="25000"/>
+                  </a:schemeClr>
+                </a:solidFill>
+              </a:rPr>
+              <a:t> based on custom LZ contracts between Subspace's EVM and other EVM chains using Solidity &amp; TypeScript; also, extensive Foundry unit &amp; integration testing done.</a:t>
             </a:r>
           </a:p>
           <a:p>
@@ -7023,7 +7078,29 @@
                   </a:schemeClr>
                 </a:solidFill>
               </a:rPr>
-              <a:t>Plagiarism detection on text embeddings via LSH random projection with Python &amp; Rust.</a:t>
+              <a:t>Did some work on </a:t>
+            </a:r>
+            <a:r>
+              <a:rPr lang="en-US" sz="900" u="sng" dirty="0">
+                <a:solidFill>
+                  <a:schemeClr val="tx1">
+                    <a:lumMod val="75000"/>
+                    <a:lumOff val="25000"/>
+                  </a:schemeClr>
+                </a:solidFill>
+              </a:rPr>
+              <a:t>ZK-based Identity solution</a:t>
+            </a:r>
+            <a:r>
+              <a:rPr lang="en-US" sz="900" dirty="0">
+                <a:solidFill>
+                  <a:schemeClr val="tx1">
+                    <a:lumMod val="75000"/>
+                    <a:lumOff val="25000"/>
+                  </a:schemeClr>
+                </a:solidFill>
+              </a:rPr>
+              <a:t> for native product using TypeScript &amp; Solidity.</a:t>
             </a:r>
           </a:p>
           <a:p>
@@ -7043,7 +7120,29 @@
                   </a:schemeClr>
                 </a:solidFill>
               </a:rPr>
-              <a:t>Built a community telegram bot using Rust.</a:t>
+              <a:t>ETA Prediction of probabilistic farming reward for a Subspace farmer; released </a:t>
+            </a:r>
+            <a:r>
+              <a:rPr lang="en-US" sz="900" u="sng" dirty="0">
+                <a:solidFill>
+                  <a:schemeClr val="tx1">
+                    <a:lumMod val="75000"/>
+                    <a:lumOff val="25000"/>
+                  </a:schemeClr>
+                </a:solidFill>
+              </a:rPr>
+              <a:t>custom GTK4 FE component</a:t>
+            </a:r>
+            <a:r>
+              <a:rPr lang="en-US" sz="900" dirty="0">
+                <a:solidFill>
+                  <a:schemeClr val="tx1">
+                    <a:lumMod val="75000"/>
+                    <a:lumOff val="25000"/>
+                  </a:schemeClr>
+                </a:solidFill>
+              </a:rPr>
+              <a:t> for Space Acres in Rust.</a:t>
             </a:r>
           </a:p>
           <a:p>
@@ -7055,6 +7154,17 @@
               <a:buChar char="•"/>
             </a:pPr>
             <a:r>
+              <a:rPr lang="en-US" sz="900" u="sng" dirty="0">
+                <a:solidFill>
+                  <a:schemeClr val="tx1">
+                    <a:lumMod val="75000"/>
+                    <a:lumOff val="25000"/>
+                  </a:schemeClr>
+                </a:solidFill>
+              </a:rPr>
+              <a:t>Plagiarism detection</a:t>
+            </a:r>
+            <a:r>
               <a:rPr lang="en-US" sz="900" dirty="0">
                 <a:solidFill>
                   <a:schemeClr val="tx1">
@@ -7063,7 +7173,7 @@
                   </a:schemeClr>
                 </a:solidFill>
               </a:rPr>
-              <a:t>Built a native cross-chain bridge based on custom LZ contracts between Subspace's EVM and other EVM chains.</a:t>
+              <a:t> on text embeddings via LSH random projection with Python &amp; Rust.</a:t>
             </a:r>
           </a:p>
           <a:p>
@@ -7083,7 +7193,29 @@
                   </a:schemeClr>
                 </a:solidFill>
               </a:rPr>
-              <a:t>ETA Prediction of probabilistic farming reward for a Subspace farmer; released custom GTK4 FE component for Space Acres in Rust.</a:t>
+              <a:t>Worked on SDK development featuring </a:t>
+            </a:r>
+            <a:r>
+              <a:rPr lang="en-US" sz="900" u="sng" dirty="0">
+                <a:solidFill>
+                  <a:schemeClr val="tx1">
+                    <a:lumMod val="75000"/>
+                    <a:lumOff val="25000"/>
+                  </a:schemeClr>
+                </a:solidFill>
+              </a:rPr>
+              <a:t>PKI-based identity for Autonomys</a:t>
+            </a:r>
+            <a:r>
+              <a:rPr lang="en-US" sz="900" dirty="0">
+                <a:solidFill>
+                  <a:schemeClr val="tx1">
+                    <a:lumMod val="75000"/>
+                    <a:lumOff val="25000"/>
+                  </a:schemeClr>
+                </a:solidFill>
+              </a:rPr>
+              <a:t>.</a:t>
             </a:r>
           </a:p>
           <a:p>
@@ -7103,7 +7235,7 @@
                   </a:schemeClr>
                 </a:solidFill>
               </a:rPr>
-              <a:t>Worked on SDK development featuring PKI-based identity for Autonomys.</a:t>
+              <a:t>Built a community telegram bot using Rust.</a:t>
             </a:r>
           </a:p>
         </p:txBody>
@@ -7417,7 +7549,7 @@
         </p:nvSpPr>
         <p:spPr>
           <a:xfrm>
-            <a:off x="88190" y="5670955"/>
+            <a:off x="88190" y="5816481"/>
             <a:ext cx="6657120" cy="725520"/>
           </a:xfrm>
           <a:prstGeom prst="rect">
@@ -7472,7 +7604,29 @@
                   </a:schemeClr>
                 </a:solidFill>
               </a:rPr>
-              <a:t>Developed Bank pallet for substrate chain featuring traditional staking features like fixed, recurring deposits.</a:t>
+              <a:t>Developed Bank </a:t>
+            </a:r>
+            <a:r>
+              <a:rPr lang="en-US" sz="900" u="sng" dirty="0">
+                <a:solidFill>
+                  <a:schemeClr val="tx1">
+                    <a:lumMod val="75000"/>
+                    <a:lumOff val="25000"/>
+                  </a:schemeClr>
+                </a:solidFill>
+              </a:rPr>
+              <a:t>pallet for substrate</a:t>
+            </a:r>
+            <a:r>
+              <a:rPr lang="en-US" sz="900" dirty="0">
+                <a:solidFill>
+                  <a:schemeClr val="tx1">
+                    <a:lumMod val="75000"/>
+                    <a:lumOff val="25000"/>
+                  </a:schemeClr>
+                </a:solidFill>
+              </a:rPr>
+              <a:t> chain featuring traditional staking features like fixed, recurring deposits.</a:t>
             </a:r>
           </a:p>
           <a:p>
@@ -7492,7 +7646,29 @@
                   </a:schemeClr>
                 </a:solidFill>
               </a:rPr>
-              <a:t>As Coursera Instructor, released a GP on “Target proximity game &amp; food delivery proximity app using Rust”</a:t>
+              <a:t>As </a:t>
+            </a:r>
+            <a:r>
+              <a:rPr lang="en-US" sz="900" u="sng" dirty="0">
+                <a:solidFill>
+                  <a:schemeClr val="tx1">
+                    <a:lumMod val="75000"/>
+                    <a:lumOff val="25000"/>
+                  </a:schemeClr>
+                </a:solidFill>
+              </a:rPr>
+              <a:t>Coursera Instructor</a:t>
+            </a:r>
+            <a:r>
+              <a:rPr lang="en-US" sz="900" dirty="0">
+                <a:solidFill>
+                  <a:schemeClr val="tx1">
+                    <a:lumMod val="75000"/>
+                    <a:lumOff val="25000"/>
+                  </a:schemeClr>
+                </a:solidFill>
+              </a:rPr>
+              <a:t>, released a GP on “Target proximity game &amp; food delivery proximity app using Rust”</a:t>
             </a:r>
           </a:p>
           <a:p>

</xml_diff>

<commit_message>
Add LZ bug bounty report in CV
</commit_message>
<xml_diff>
--- a/my_resume_v2.pptx
+++ b/my_resume_v2.pptx
@@ -198,7 +198,7 @@
           <a:p>
             <a:fld id="{060BEAD1-672E-E841-95FA-08B9B35A46D7}" type="datetimeFigureOut">
               <a:rPr lang="en-US" smtClean="0"/>
-              <a:t>7/9/24</a:t>
+              <a:t>7/10/24</a:t>
             </a:fld>
             <a:endParaRPr lang="en-US"/>
           </a:p>
@@ -765,7 +765,7 @@
           <a:p>
             <a:fld id="{A417C049-F611-094D-8104-5764D8D04213}" type="datetimeFigureOut">
               <a:rPr lang="en-US" smtClean="0"/>
-              <a:t>7/9/24</a:t>
+              <a:t>7/10/24</a:t>
             </a:fld>
             <a:endParaRPr lang="en-US"/>
           </a:p>
@@ -935,7 +935,7 @@
           <a:p>
             <a:fld id="{A417C049-F611-094D-8104-5764D8D04213}" type="datetimeFigureOut">
               <a:rPr lang="en-US" smtClean="0"/>
-              <a:t>7/9/24</a:t>
+              <a:t>7/10/24</a:t>
             </a:fld>
             <a:endParaRPr lang="en-US"/>
           </a:p>
@@ -1115,7 +1115,7 @@
           <a:p>
             <a:fld id="{A417C049-F611-094D-8104-5764D8D04213}" type="datetimeFigureOut">
               <a:rPr lang="en-US" smtClean="0"/>
-              <a:t>7/9/24</a:t>
+              <a:t>7/10/24</a:t>
             </a:fld>
             <a:endParaRPr lang="en-US"/>
           </a:p>
@@ -1285,7 +1285,7 @@
           <a:p>
             <a:fld id="{A417C049-F611-094D-8104-5764D8D04213}" type="datetimeFigureOut">
               <a:rPr lang="en-US" smtClean="0"/>
-              <a:t>7/9/24</a:t>
+              <a:t>7/10/24</a:t>
             </a:fld>
             <a:endParaRPr lang="en-US"/>
           </a:p>
@@ -1529,7 +1529,7 @@
           <a:p>
             <a:fld id="{A417C049-F611-094D-8104-5764D8D04213}" type="datetimeFigureOut">
               <a:rPr lang="en-US" smtClean="0"/>
-              <a:t>7/9/24</a:t>
+              <a:t>7/10/24</a:t>
             </a:fld>
             <a:endParaRPr lang="en-US"/>
           </a:p>
@@ -1761,7 +1761,7 @@
           <a:p>
             <a:fld id="{A417C049-F611-094D-8104-5764D8D04213}" type="datetimeFigureOut">
               <a:rPr lang="en-US" smtClean="0"/>
-              <a:t>7/9/24</a:t>
+              <a:t>7/10/24</a:t>
             </a:fld>
             <a:endParaRPr lang="en-US"/>
           </a:p>
@@ -2128,7 +2128,7 @@
           <a:p>
             <a:fld id="{A417C049-F611-094D-8104-5764D8D04213}" type="datetimeFigureOut">
               <a:rPr lang="en-US" smtClean="0"/>
-              <a:t>7/9/24</a:t>
+              <a:t>7/10/24</a:t>
             </a:fld>
             <a:endParaRPr lang="en-US"/>
           </a:p>
@@ -2246,7 +2246,7 @@
           <a:p>
             <a:fld id="{A417C049-F611-094D-8104-5764D8D04213}" type="datetimeFigureOut">
               <a:rPr lang="en-US" smtClean="0"/>
-              <a:t>7/9/24</a:t>
+              <a:t>7/10/24</a:t>
             </a:fld>
             <a:endParaRPr lang="en-US"/>
           </a:p>
@@ -2341,7 +2341,7 @@
           <a:p>
             <a:fld id="{A417C049-F611-094D-8104-5764D8D04213}" type="datetimeFigureOut">
               <a:rPr lang="en-US" smtClean="0"/>
-              <a:t>7/9/24</a:t>
+              <a:t>7/10/24</a:t>
             </a:fld>
             <a:endParaRPr lang="en-US"/>
           </a:p>
@@ -2618,7 +2618,7 @@
           <a:p>
             <a:fld id="{A417C049-F611-094D-8104-5764D8D04213}" type="datetimeFigureOut">
               <a:rPr lang="en-US" smtClean="0"/>
-              <a:t>7/9/24</a:t>
+              <a:t>7/10/24</a:t>
             </a:fld>
             <a:endParaRPr lang="en-US"/>
           </a:p>
@@ -2875,7 +2875,7 @@
           <a:p>
             <a:fld id="{A417C049-F611-094D-8104-5764D8D04213}" type="datetimeFigureOut">
               <a:rPr lang="en-US" smtClean="0"/>
-              <a:t>7/9/24</a:t>
+              <a:t>7/10/24</a:t>
             </a:fld>
             <a:endParaRPr lang="en-US"/>
           </a:p>
@@ -3093,7 +3093,7 @@
           <a:p>
             <a:fld id="{A417C049-F611-094D-8104-5764D8D04213}" type="datetimeFigureOut">
               <a:rPr lang="en-US" smtClean="0"/>
-              <a:t>7/9/24</a:t>
+              <a:t>7/10/24</a:t>
             </a:fld>
             <a:endParaRPr lang="en-US"/>
           </a:p>
@@ -7058,7 +7058,51 @@
                   </a:schemeClr>
                 </a:solidFill>
               </a:rPr>
-              <a:t> based on custom LZ contracts between Subspace's EVM and other EVM chains using Solidity &amp; TypeScript; also, extensive Foundry unit &amp; integration testing done.</a:t>
+              <a:t> based on custom LZ contracts between Subspace's EVM and other EVM chains using Solidity &amp; TypeScript; also, extensive Foundry unit &amp; integration testing done; found </a:t>
+            </a:r>
+            <a:r>
+              <a:rPr lang="en-US" sz="900" u="sng" dirty="0">
+                <a:solidFill>
+                  <a:schemeClr val="tx1">
+                    <a:lumMod val="75000"/>
+                    <a:lumOff val="25000"/>
+                  </a:schemeClr>
+                </a:solidFill>
+              </a:rPr>
+              <a:t>security vulnerability</a:t>
+            </a:r>
+            <a:r>
+              <a:rPr lang="en-US" sz="900" dirty="0">
+                <a:solidFill>
+                  <a:schemeClr val="tx1">
+                    <a:lumMod val="75000"/>
+                    <a:lumOff val="25000"/>
+                  </a:schemeClr>
+                </a:solidFill>
+              </a:rPr>
+              <a:t> &amp; raised a </a:t>
+            </a:r>
+            <a:r>
+              <a:rPr lang="en-US" sz="900" u="sng" dirty="0">
+                <a:solidFill>
+                  <a:schemeClr val="tx1">
+                    <a:lumMod val="75000"/>
+                    <a:lumOff val="25000"/>
+                  </a:schemeClr>
+                </a:solidFill>
+              </a:rPr>
+              <a:t>bug bounty report</a:t>
+            </a:r>
+            <a:r>
+              <a:rPr lang="en-US" sz="900" dirty="0">
+                <a:solidFill>
+                  <a:schemeClr val="tx1">
+                    <a:lumMod val="75000"/>
+                    <a:lumOff val="25000"/>
+                  </a:schemeClr>
+                </a:solidFill>
+              </a:rPr>
+              <a:t>.</a:t>
             </a:r>
           </a:p>
           <a:p>

</xml_diff>

<commit_message>
Add skills from UniFi to CV
</commit_message>
<xml_diff>
--- a/my_resume_v2.pptx
+++ b/my_resume_v2.pptx
@@ -198,7 +198,7 @@
           <a:p>
             <a:fld id="{060BEAD1-672E-E841-95FA-08B9B35A46D7}" type="datetimeFigureOut">
               <a:rPr lang="en-US" smtClean="0"/>
-              <a:t>10/16/24</a:t>
+              <a:t>8/19/25</a:t>
             </a:fld>
             <a:endParaRPr lang="en-US"/>
           </a:p>
@@ -765,7 +765,7 @@
           <a:p>
             <a:fld id="{A417C049-F611-094D-8104-5764D8D04213}" type="datetimeFigureOut">
               <a:rPr lang="en-US" smtClean="0"/>
-              <a:t>10/16/24</a:t>
+              <a:t>8/19/25</a:t>
             </a:fld>
             <a:endParaRPr lang="en-US"/>
           </a:p>
@@ -935,7 +935,7 @@
           <a:p>
             <a:fld id="{A417C049-F611-094D-8104-5764D8D04213}" type="datetimeFigureOut">
               <a:rPr lang="en-US" smtClean="0"/>
-              <a:t>10/16/24</a:t>
+              <a:t>8/19/25</a:t>
             </a:fld>
             <a:endParaRPr lang="en-US"/>
           </a:p>
@@ -1115,7 +1115,7 @@
           <a:p>
             <a:fld id="{A417C049-F611-094D-8104-5764D8D04213}" type="datetimeFigureOut">
               <a:rPr lang="en-US" smtClean="0"/>
-              <a:t>10/16/24</a:t>
+              <a:t>8/19/25</a:t>
             </a:fld>
             <a:endParaRPr lang="en-US"/>
           </a:p>
@@ -1285,7 +1285,7 @@
           <a:p>
             <a:fld id="{A417C049-F611-094D-8104-5764D8D04213}" type="datetimeFigureOut">
               <a:rPr lang="en-US" smtClean="0"/>
-              <a:t>10/16/24</a:t>
+              <a:t>8/19/25</a:t>
             </a:fld>
             <a:endParaRPr lang="en-US"/>
           </a:p>
@@ -1529,7 +1529,7 @@
           <a:p>
             <a:fld id="{A417C049-F611-094D-8104-5764D8D04213}" type="datetimeFigureOut">
               <a:rPr lang="en-US" smtClean="0"/>
-              <a:t>10/16/24</a:t>
+              <a:t>8/19/25</a:t>
             </a:fld>
             <a:endParaRPr lang="en-US"/>
           </a:p>
@@ -1761,7 +1761,7 @@
           <a:p>
             <a:fld id="{A417C049-F611-094D-8104-5764D8D04213}" type="datetimeFigureOut">
               <a:rPr lang="en-US" smtClean="0"/>
-              <a:t>10/16/24</a:t>
+              <a:t>8/19/25</a:t>
             </a:fld>
             <a:endParaRPr lang="en-US"/>
           </a:p>
@@ -2128,7 +2128,7 @@
           <a:p>
             <a:fld id="{A417C049-F611-094D-8104-5764D8D04213}" type="datetimeFigureOut">
               <a:rPr lang="en-US" smtClean="0"/>
-              <a:t>10/16/24</a:t>
+              <a:t>8/19/25</a:t>
             </a:fld>
             <a:endParaRPr lang="en-US"/>
           </a:p>
@@ -2246,7 +2246,7 @@
           <a:p>
             <a:fld id="{A417C049-F611-094D-8104-5764D8D04213}" type="datetimeFigureOut">
               <a:rPr lang="en-US" smtClean="0"/>
-              <a:t>10/16/24</a:t>
+              <a:t>8/19/25</a:t>
             </a:fld>
             <a:endParaRPr lang="en-US"/>
           </a:p>
@@ -2341,7 +2341,7 @@
           <a:p>
             <a:fld id="{A417C049-F611-094D-8104-5764D8D04213}" type="datetimeFigureOut">
               <a:rPr lang="en-US" smtClean="0"/>
-              <a:t>10/16/24</a:t>
+              <a:t>8/19/25</a:t>
             </a:fld>
             <a:endParaRPr lang="en-US"/>
           </a:p>
@@ -2618,7 +2618,7 @@
           <a:p>
             <a:fld id="{A417C049-F611-094D-8104-5764D8D04213}" type="datetimeFigureOut">
               <a:rPr lang="en-US" smtClean="0"/>
-              <a:t>10/16/24</a:t>
+              <a:t>8/19/25</a:t>
             </a:fld>
             <a:endParaRPr lang="en-US"/>
           </a:p>
@@ -2875,7 +2875,7 @@
           <a:p>
             <a:fld id="{A417C049-F611-094D-8104-5764D8D04213}" type="datetimeFigureOut">
               <a:rPr lang="en-US" smtClean="0"/>
-              <a:t>10/16/24</a:t>
+              <a:t>8/19/25</a:t>
             </a:fld>
             <a:endParaRPr lang="en-US"/>
           </a:p>
@@ -3093,7 +3093,7 @@
           <a:p>
             <a:fld id="{A417C049-F611-094D-8104-5764D8D04213}" type="datetimeFigureOut">
               <a:rPr lang="en-US" smtClean="0"/>
-              <a:t>10/16/24</a:t>
+              <a:t>8/19/25</a:t>
             </a:fld>
             <a:endParaRPr lang="en-US"/>
           </a:p>
@@ -5738,7 +5738,7 @@
           <a:p>
             <a:r>
               <a:rPr lang="en-US" sz="900" b="1" dirty="0"/>
-              <a:t>8 </a:t>
+              <a:t>9 </a:t>
             </a:r>
             <a:r>
               <a:rPr lang="en-US" sz="900" dirty="0"/>
@@ -5806,7 +5806,7 @@
         </p:nvGrpSpPr>
         <p:grpSpPr>
           <a:xfrm>
-            <a:off x="126723" y="3650450"/>
+            <a:off x="126723" y="3682818"/>
             <a:ext cx="1502200" cy="292388"/>
             <a:chOff x="4141297" y="2671400"/>
             <a:chExt cx="1502200" cy="292388"/>
@@ -5890,468 +5890,6 @@
       </p:grpSp>
       <p:sp>
         <p:nvSpPr>
-          <p:cNvPr id="1057" name="TextBox 1056">
-            <a:extLst>
-              <a:ext uri="{FF2B5EF4-FFF2-40B4-BE49-F238E27FC236}">
-                <a16:creationId xmlns:a16="http://schemas.microsoft.com/office/drawing/2014/main" id="{EDA677FE-BCBD-363A-A66F-B5236C3C09E3}"/>
-              </a:ext>
-            </a:extLst>
-          </p:cNvPr>
-          <p:cNvSpPr txBox="1"/>
-          <p:nvPr/>
-        </p:nvSpPr>
-        <p:spPr>
-          <a:xfrm>
-            <a:off x="88190" y="8323059"/>
-            <a:ext cx="6657120" cy="1546257"/>
-          </a:xfrm>
-          <a:prstGeom prst="rect">
-            <a:avLst/>
-          </a:prstGeom>
-          <a:noFill/>
-          <a:ln>
-            <a:solidFill>
-              <a:schemeClr val="tx2">
-                <a:lumMod val="75000"/>
-              </a:schemeClr>
-            </a:solidFill>
-          </a:ln>
-        </p:spPr>
-        <p:txBody>
-          <a:bodyPr wrap="square" anchor="ctr">
-            <a:spAutoFit/>
-          </a:bodyPr>
-          <a:lstStyle/>
-          <a:p>
-            <a:pPr>
-              <a:lnSpc>
-                <a:spcPts val="1440"/>
-              </a:lnSpc>
-            </a:pPr>
-            <a:r>
-              <a:rPr lang="en-US" sz="900" b="1" dirty="0">
-                <a:solidFill>
-                  <a:schemeClr val="tx1">
-                    <a:lumMod val="75000"/>
-                    <a:lumOff val="25000"/>
-                  </a:schemeClr>
-                </a:solidFill>
-              </a:rPr>
-              <a:t>May 2022 – Oct 2022 </a:t>
-            </a:r>
-            <a:r>
-              <a:rPr lang="en-US" sz="900" dirty="0">
-                <a:solidFill>
-                  <a:schemeClr val="tx1">
-                    <a:lumMod val="75000"/>
-                    <a:lumOff val="25000"/>
-                  </a:schemeClr>
-                </a:solidFill>
-              </a:rPr>
-              <a:t>|</a:t>
-            </a:r>
-            <a:r>
-              <a:rPr lang="en-US" sz="900" b="1" dirty="0">
-                <a:solidFill>
-                  <a:schemeClr val="tx1">
-                    <a:lumMod val="75000"/>
-                    <a:lumOff val="25000"/>
-                  </a:schemeClr>
-                </a:solidFill>
-              </a:rPr>
-              <a:t> Senior Smart Contract Backend Engineer @ Upside </a:t>
-            </a:r>
-            <a:r>
-              <a:rPr lang="en-US" sz="900" dirty="0">
-                <a:solidFill>
-                  <a:schemeClr val="tx1">
-                    <a:lumMod val="75000"/>
-                    <a:lumOff val="25000"/>
-                  </a:schemeClr>
-                </a:solidFill>
-              </a:rPr>
-              <a:t>| </a:t>
-            </a:r>
-            <a:r>
-              <a:rPr lang="en-US" sz="900" b="1" dirty="0">
-                <a:solidFill>
-                  <a:schemeClr val="tx1">
-                    <a:lumMod val="75000"/>
-                    <a:lumOff val="25000"/>
-                  </a:schemeClr>
-                </a:solidFill>
-              </a:rPr>
-              <a:t>Full-time</a:t>
-            </a:r>
-          </a:p>
-          <a:p>
-            <a:pPr marL="171450" indent="-171450">
-              <a:lnSpc>
-                <a:spcPts val="1238"/>
-              </a:lnSpc>
-              <a:spcAft>
-                <a:spcPts val="125"/>
-              </a:spcAft>
-              <a:buFont typeface="Arial" panose="020B0604020202020204" pitchFamily="34" charset="0"/>
-              <a:buChar char="•"/>
-            </a:pPr>
-            <a:r>
-              <a:rPr lang="en-IN" sz="900" b="0" i="0" dirty="0">
-                <a:solidFill>
-                  <a:srgbClr val="374151"/>
-                </a:solidFill>
-                <a:effectLst/>
-              </a:rPr>
-              <a:t>Collaborated with auditors from </a:t>
-            </a:r>
-            <a:r>
-              <a:rPr lang="en-IN" sz="900" b="0" i="0" u="sng" dirty="0" err="1">
-                <a:solidFill>
-                  <a:srgbClr val="374151"/>
-                </a:solidFill>
-                <a:effectLst/>
-              </a:rPr>
-              <a:t>Quantstamp</a:t>
-            </a:r>
-            <a:r>
-              <a:rPr lang="en-IN" sz="900" b="0" i="0" dirty="0">
-                <a:solidFill>
-                  <a:srgbClr val="374151"/>
-                </a:solidFill>
-                <a:effectLst/>
-              </a:rPr>
-              <a:t>, </a:t>
-            </a:r>
-            <a:r>
-              <a:rPr lang="en-IN" sz="900" b="0" i="0" dirty="0" err="1">
-                <a:solidFill>
-                  <a:srgbClr val="374151"/>
-                </a:solidFill>
-                <a:effectLst/>
-              </a:rPr>
-              <a:t>Certik</a:t>
-            </a:r>
-            <a:r>
-              <a:rPr lang="en-IN" sz="900" b="0" i="0" dirty="0">
-                <a:solidFill>
-                  <a:srgbClr val="374151"/>
-                </a:solidFill>
-                <a:effectLst/>
-              </a:rPr>
-              <a:t>, </a:t>
-            </a:r>
-            <a:r>
-              <a:rPr lang="en-IN" sz="900" b="0" i="0" dirty="0" err="1">
-                <a:solidFill>
-                  <a:srgbClr val="374151"/>
-                </a:solidFill>
-                <a:effectLst/>
-              </a:rPr>
-              <a:t>Omniscia</a:t>
-            </a:r>
-            <a:r>
-              <a:rPr lang="en-IN" sz="900" b="0" i="0" dirty="0">
-                <a:solidFill>
-                  <a:srgbClr val="374151"/>
-                </a:solidFill>
-                <a:effectLst/>
-              </a:rPr>
-              <a:t> on Token, Vesting, Staking Solidity smart contracts for clients including </a:t>
-            </a:r>
-            <a:r>
-              <a:rPr lang="en-IN" sz="900" b="0" i="0" dirty="0" err="1">
-                <a:solidFill>
-                  <a:srgbClr val="374151"/>
-                </a:solidFill>
-                <a:effectLst/>
-              </a:rPr>
-              <a:t>Metacraft</a:t>
-            </a:r>
-            <a:r>
-              <a:rPr lang="en-IN" sz="900" b="0" i="0" dirty="0">
-                <a:solidFill>
-                  <a:srgbClr val="374151"/>
-                </a:solidFill>
-                <a:effectLst/>
-              </a:rPr>
-              <a:t>, </a:t>
-            </a:r>
-            <a:r>
-              <a:rPr lang="en-IN" sz="900" b="0" i="0" dirty="0" err="1">
-                <a:solidFill>
-                  <a:srgbClr val="374151"/>
-                </a:solidFill>
-                <a:effectLst/>
-              </a:rPr>
-              <a:t>Delysium</a:t>
-            </a:r>
-            <a:r>
-              <a:rPr lang="en-IN" sz="900" b="0" i="0" dirty="0">
-                <a:solidFill>
-                  <a:srgbClr val="374151"/>
-                </a:solidFill>
-                <a:effectLst/>
-              </a:rPr>
-              <a:t>, and </a:t>
-            </a:r>
-            <a:r>
-              <a:rPr lang="en-IN" sz="900" b="0" i="0" dirty="0" err="1">
-                <a:solidFill>
-                  <a:srgbClr val="374151"/>
-                </a:solidFill>
-                <a:effectLst/>
-              </a:rPr>
-              <a:t>Zedrun</a:t>
-            </a:r>
-            <a:r>
-              <a:rPr lang="en-IN" sz="900" b="0" i="0" dirty="0">
-                <a:solidFill>
-                  <a:srgbClr val="374151"/>
-                </a:solidFill>
-                <a:effectLst/>
-              </a:rPr>
-              <a:t>, etc.</a:t>
-            </a:r>
-          </a:p>
-          <a:p>
-            <a:pPr marL="171450" indent="-171450">
-              <a:lnSpc>
-                <a:spcPts val="1238"/>
-              </a:lnSpc>
-              <a:spcAft>
-                <a:spcPts val="125"/>
-              </a:spcAft>
-              <a:buFont typeface="Arial" panose="020B0604020202020204" pitchFamily="34" charset="0"/>
-              <a:buChar char="•"/>
-            </a:pPr>
-            <a:r>
-              <a:rPr lang="en-IN" sz="900" dirty="0">
-                <a:solidFill>
-                  <a:schemeClr val="tx1">
-                    <a:lumMod val="75000"/>
-                    <a:lumOff val="25000"/>
-                  </a:schemeClr>
-                </a:solidFill>
-              </a:rPr>
-              <a:t>Designed AMM &amp; Developed smart contracts for </a:t>
-            </a:r>
-            <a:r>
-              <a:rPr lang="en-IN" sz="900" dirty="0" err="1">
-                <a:solidFill>
-                  <a:schemeClr val="tx1">
-                    <a:lumMod val="75000"/>
-                    <a:lumOff val="25000"/>
-                  </a:schemeClr>
-                </a:solidFill>
-              </a:rPr>
-              <a:t>DeFi</a:t>
-            </a:r>
-            <a:r>
-              <a:rPr lang="en-IN" sz="900" dirty="0">
-                <a:solidFill>
-                  <a:schemeClr val="tx1">
-                    <a:lumMod val="75000"/>
-                    <a:lumOff val="25000"/>
-                  </a:schemeClr>
-                </a:solidFill>
-              </a:rPr>
-              <a:t> DEX - “</a:t>
-            </a:r>
-            <a:r>
-              <a:rPr lang="en-IN" sz="900" dirty="0" err="1">
-                <a:solidFill>
-                  <a:schemeClr val="tx1">
-                    <a:lumMod val="75000"/>
-                    <a:lumOff val="25000"/>
-                  </a:schemeClr>
-                </a:solidFill>
-              </a:rPr>
-              <a:t>Bioform</a:t>
-            </a:r>
-            <a:r>
-              <a:rPr lang="en-IN" sz="900" dirty="0">
-                <a:solidFill>
-                  <a:schemeClr val="tx1">
-                    <a:lumMod val="75000"/>
-                    <a:lumOff val="25000"/>
-                  </a:schemeClr>
-                </a:solidFill>
-              </a:rPr>
-              <a:t>” with MIT using their free-energy based parametrized model. </a:t>
-            </a:r>
-          </a:p>
-          <a:p>
-            <a:pPr marL="171450" indent="-171450">
-              <a:lnSpc>
-                <a:spcPts val="1238"/>
-              </a:lnSpc>
-              <a:spcAft>
-                <a:spcPts val="125"/>
-              </a:spcAft>
-              <a:buFont typeface="Arial" panose="020B0604020202020204" pitchFamily="34" charset="0"/>
-              <a:buChar char="•"/>
-            </a:pPr>
-            <a:r>
-              <a:rPr lang="en-IN" sz="900" dirty="0">
-                <a:solidFill>
-                  <a:schemeClr val="tx1">
-                    <a:lumMod val="75000"/>
-                    <a:lumOff val="25000"/>
-                  </a:schemeClr>
-                </a:solidFill>
-              </a:rPr>
-              <a:t>While writing smart contracts, I ensured testing, deployment scripts, flattening, verification, fuzzy-testing, gas optimization (using Yul, Solidity), contract-size optimization of smart contracts using Truffle, Hardhat, </a:t>
-            </a:r>
-            <a:r>
-              <a:rPr lang="en-IN" sz="900" u="sng" dirty="0">
-                <a:solidFill>
-                  <a:schemeClr val="tx1">
-                    <a:lumMod val="75000"/>
-                    <a:lumOff val="25000"/>
-                  </a:schemeClr>
-                </a:solidFill>
-              </a:rPr>
-              <a:t>Foundry</a:t>
-            </a:r>
-            <a:r>
-              <a:rPr lang="en-IN" sz="900" dirty="0">
-                <a:solidFill>
-                  <a:schemeClr val="tx1">
-                    <a:lumMod val="75000"/>
-                    <a:lumOff val="25000"/>
-                  </a:schemeClr>
-                </a:solidFill>
-              </a:rPr>
-              <a:t> tools before deploying to </a:t>
-            </a:r>
-            <a:r>
-              <a:rPr lang="en-IN" sz="900" dirty="0" err="1">
-                <a:solidFill>
-                  <a:schemeClr val="tx1">
-                    <a:lumMod val="75000"/>
-                    <a:lumOff val="25000"/>
-                  </a:schemeClr>
-                </a:solidFill>
-              </a:rPr>
-              <a:t>mainnet</a:t>
-            </a:r>
-            <a:r>
-              <a:rPr lang="en-IN" sz="900" dirty="0">
-                <a:solidFill>
-                  <a:schemeClr val="tx1">
-                    <a:lumMod val="75000"/>
-                    <a:lumOff val="25000"/>
-                  </a:schemeClr>
-                </a:solidFill>
-              </a:rPr>
-              <a:t>, </a:t>
-            </a:r>
-            <a:r>
-              <a:rPr lang="en-IN" sz="900" dirty="0" err="1">
-                <a:solidFill>
-                  <a:schemeClr val="tx1">
-                    <a:lumMod val="75000"/>
-                    <a:lumOff val="25000"/>
-                  </a:schemeClr>
-                </a:solidFill>
-              </a:rPr>
-              <a:t>testnet</a:t>
-            </a:r>
-            <a:r>
-              <a:rPr lang="en-IN" sz="900" dirty="0">
-                <a:solidFill>
-                  <a:schemeClr val="tx1">
-                    <a:lumMod val="75000"/>
-                    <a:lumOff val="25000"/>
-                  </a:schemeClr>
-                </a:solidFill>
-              </a:rPr>
-              <a:t>.</a:t>
-            </a:r>
-          </a:p>
-          <a:p>
-            <a:pPr marL="171450" indent="-171450">
-              <a:lnSpc>
-                <a:spcPts val="1238"/>
-              </a:lnSpc>
-              <a:spcAft>
-                <a:spcPts val="125"/>
-              </a:spcAft>
-              <a:buFont typeface="Arial" panose="020B0604020202020204" pitchFamily="34" charset="0"/>
-              <a:buChar char="•"/>
-            </a:pPr>
-            <a:r>
-              <a:rPr lang="en-IN" sz="900" b="0" i="0" dirty="0">
-                <a:solidFill>
-                  <a:srgbClr val="374151"/>
-                </a:solidFill>
-                <a:effectLst/>
-              </a:rPr>
-              <a:t>Co-developed and led 'Zippy' TGE tool project, crafting architecture with whitepaper, built REST APIs with </a:t>
-            </a:r>
-            <a:r>
-              <a:rPr lang="en-IN" sz="900" b="0" i="0" dirty="0" err="1">
-                <a:solidFill>
-                  <a:srgbClr val="374151"/>
-                </a:solidFill>
-                <a:effectLst/>
-              </a:rPr>
-              <a:t>NextJS</a:t>
-            </a:r>
-            <a:r>
-              <a:rPr lang="en-IN" sz="900" b="0" i="0" dirty="0">
-                <a:solidFill>
-                  <a:srgbClr val="374151"/>
-                </a:solidFill>
-                <a:effectLst/>
-              </a:rPr>
-              <a:t>, and conducting API tests via data mocking and integrated Swagger UI; also managed Firebase's NoSQL &amp; SQL databases. </a:t>
-            </a:r>
-            <a:r>
-              <a:rPr lang="en-IN" sz="900" b="0" i="0" dirty="0">
-                <a:solidFill>
-                  <a:srgbClr val="374151"/>
-                </a:solidFill>
-                <a:effectLst/>
-                <a:latin typeface="Söhne"/>
-              </a:rPr>
-              <a:t>Proficient in React and Redux.</a:t>
-            </a:r>
-          </a:p>
-          <a:p>
-            <a:pPr marL="171450" indent="-171450">
-              <a:lnSpc>
-                <a:spcPts val="1238"/>
-              </a:lnSpc>
-              <a:spcAft>
-                <a:spcPts val="125"/>
-              </a:spcAft>
-              <a:buFont typeface="Arial" panose="020B0604020202020204" pitchFamily="34" charset="0"/>
-              <a:buChar char="•"/>
-            </a:pPr>
-            <a:r>
-              <a:rPr lang="en-IN" sz="900" b="0" i="0" dirty="0">
-                <a:solidFill>
-                  <a:srgbClr val="374151"/>
-                </a:solidFill>
-                <a:effectLst/>
-                <a:latin typeface="Söhne"/>
-              </a:rPr>
-              <a:t>Implemented CI/CD via GitHub Actions and Docker for automated testing and repository packaging, respectively.</a:t>
-            </a:r>
-            <a:endParaRPr lang="en-US" sz="900" dirty="0">
-              <a:solidFill>
-                <a:schemeClr val="tx1">
-                  <a:lumMod val="75000"/>
-                  <a:lumOff val="25000"/>
-                </a:schemeClr>
-              </a:solidFill>
-            </a:endParaRPr>
-          </a:p>
-        </p:txBody>
-      </p:sp>
-      <p:sp>
-        <p:nvSpPr>
           <p:cNvPr id="1058" name="TextBox 1057">
             <a:extLst>
               <a:ext uri="{FF2B5EF4-FFF2-40B4-BE49-F238E27FC236}">
@@ -6364,7 +5902,7 @@
         </p:nvSpPr>
         <p:spPr>
           <a:xfrm>
-            <a:off x="88190" y="6641320"/>
+            <a:off x="88190" y="7821454"/>
             <a:ext cx="6657120" cy="1648849"/>
           </a:xfrm>
           <a:prstGeom prst="rect">
@@ -6909,7 +6447,7 @@
         </p:nvSpPr>
         <p:spPr>
           <a:xfrm>
-            <a:off x="88190" y="4222147"/>
+            <a:off x="88190" y="5379172"/>
             <a:ext cx="6657120" cy="1494961"/>
           </a:xfrm>
           <a:prstGeom prst="rect">
@@ -7523,7 +7061,7 @@
                   </a:schemeClr>
                 </a:solidFill>
               </a:rPr>
-              <a:t>Solidity, Rust, TypeScript, Python, C++</a:t>
+              <a:t>Rust, Solidity, TypeScript, Python, C++</a:t>
             </a:r>
           </a:p>
         </p:txBody>
@@ -7587,7 +7125,7 @@
         </p:nvSpPr>
         <p:spPr>
           <a:xfrm>
-            <a:off x="88190" y="5738930"/>
+            <a:off x="88190" y="6919064"/>
             <a:ext cx="6657120" cy="879408"/>
           </a:xfrm>
           <a:prstGeom prst="rect">
@@ -7838,8 +7376,8 @@
         </p:nvSpPr>
         <p:spPr>
           <a:xfrm>
-            <a:off x="85726" y="3940553"/>
-            <a:ext cx="6657120" cy="257443"/>
+            <a:off x="87378" y="4003372"/>
+            <a:ext cx="6657120" cy="1334661"/>
           </a:xfrm>
           <a:prstGeom prst="rect">
             <a:avLst/>
@@ -7873,8 +7411,17 @@
                   </a:schemeClr>
                 </a:solidFill>
               </a:rPr>
-              <a:t>Sep 2024 +: </a:t>
-            </a:r>
+              <a:t>Aug 2024 — Present | UniFi</a:t>
+            </a:r>
+          </a:p>
+          <a:p>
+            <a:pPr marL="171450" indent="-171450">
+              <a:lnSpc>
+                <a:spcPts val="1440"/>
+              </a:lnSpc>
+              <a:buFont typeface="Arial" panose="020B0604020202020204" pitchFamily="34" charset="0"/>
+              <a:buChar char="•"/>
+            </a:pPr>
             <a:r>
               <a:rPr lang="en-US" sz="900" dirty="0">
                 <a:solidFill>
@@ -7884,7 +7431,131 @@
                   </a:schemeClr>
                 </a:solidFill>
               </a:rPr>
-              <a:t>Working on my Stealth Blockchain project using Rust BE (Axum), MongoDB; Upskilling: L2 chains, ZK, etc.</a:t>
+              <a:t>Researched &amp; developed a novel highly scalable EVM Gasless Engine lowering on-chain fees by upto ↓</a:t>
+            </a:r>
+            <a:r>
+              <a:rPr lang="en-US" sz="900" u="sng" dirty="0">
+                <a:solidFill>
+                  <a:schemeClr val="tx1">
+                    <a:lumMod val="75000"/>
+                    <a:lumOff val="25000"/>
+                  </a:schemeClr>
+                </a:solidFill>
+              </a:rPr>
+              <a:t>84%</a:t>
+            </a:r>
+            <a:r>
+              <a:rPr lang="en-US" sz="900" dirty="0">
+                <a:solidFill>
+                  <a:schemeClr val="tx1">
+                    <a:lumMod val="75000"/>
+                    <a:lumOff val="25000"/>
+                  </a:schemeClr>
+                </a:solidFill>
+              </a:rPr>
+              <a:t> supporting both custodial/non-custodial wallets. | Rust, Solidity.</a:t>
+            </a:r>
+          </a:p>
+          <a:p>
+            <a:pPr marL="171450" indent="-171450">
+              <a:lnSpc>
+                <a:spcPts val="1440"/>
+              </a:lnSpc>
+              <a:buFont typeface="Arial" panose="020B0604020202020204" pitchFamily="34" charset="0"/>
+              <a:buChar char="•"/>
+            </a:pPr>
+            <a:r>
+              <a:rPr lang="en-US" sz="900" dirty="0">
+                <a:solidFill>
+                  <a:schemeClr val="tx1">
+                    <a:lumMod val="75000"/>
+                    <a:lumOff val="25000"/>
+                  </a:schemeClr>
+                </a:solidFill>
+              </a:rPr>
+              <a:t>Built a modern, beautiful, responsive UI-based WASM web app with Tailwind. | (</a:t>
+            </a:r>
+            <a:r>
+              <a:rPr lang="en-US" sz="900" dirty="0" err="1">
+                <a:solidFill>
+                  <a:schemeClr val="tx1">
+                    <a:lumMod val="75000"/>
+                    <a:lumOff val="25000"/>
+                  </a:schemeClr>
+                </a:solidFill>
+              </a:rPr>
+              <a:t>Dioxus</a:t>
+            </a:r>
+            <a:r>
+              <a:rPr lang="en-US" sz="900" dirty="0">
+                <a:solidFill>
+                  <a:schemeClr val="tx1">
+                    <a:lumMod val="75000"/>
+                    <a:lumOff val="25000"/>
+                  </a:schemeClr>
+                </a:solidFill>
+              </a:rPr>
+              <a:t>) Rust, CSS.</a:t>
+            </a:r>
+          </a:p>
+          <a:p>
+            <a:pPr marL="171450" indent="-171450">
+              <a:lnSpc>
+                <a:spcPts val="1440"/>
+              </a:lnSpc>
+              <a:buFont typeface="Arial" panose="020B0604020202020204" pitchFamily="34" charset="0"/>
+              <a:buChar char="•"/>
+            </a:pPr>
+            <a:r>
+              <a:rPr lang="en-IN" sz="900" dirty="0">
+                <a:solidFill>
+                  <a:schemeClr val="tx1">
+                    <a:lumMod val="75000"/>
+                    <a:lumOff val="25000"/>
+                  </a:schemeClr>
+                </a:solidFill>
+              </a:rPr>
+              <a:t>Built a secure OTP system ensuring unique 6-digit codes within the 1M space using efficient allocation and expiry handling. | Rust.</a:t>
+            </a:r>
+          </a:p>
+          <a:p>
+            <a:pPr marL="171450" indent="-171450">
+              <a:lnSpc>
+                <a:spcPts val="1440"/>
+              </a:lnSpc>
+              <a:buFont typeface="Arial" panose="020B0604020202020204" pitchFamily="34" charset="0"/>
+              <a:buChar char="•"/>
+            </a:pPr>
+            <a:r>
+              <a:rPr lang="en-US" sz="900" dirty="0">
+                <a:solidFill>
+                  <a:schemeClr val="tx1">
+                    <a:lumMod val="75000"/>
+                    <a:lumOff val="25000"/>
+                  </a:schemeClr>
+                </a:solidFill>
+              </a:rPr>
+              <a:t>Developed &amp; deployed the Backend with API, Proxy servers (in Axum, ..); native modules — Auth, Payment, Wallet, Support. | Rust.</a:t>
+            </a:r>
+          </a:p>
+          <a:p>
+            <a:pPr marL="171450" indent="-171450">
+              <a:lnSpc>
+                <a:spcPts val="1440"/>
+              </a:lnSpc>
+              <a:buFont typeface="Arial" panose="020B0604020202020204" pitchFamily="34" charset="0"/>
+              <a:buChar char="•"/>
+            </a:pPr>
+            <a:r>
+              <a:rPr lang="en-US" sz="900" dirty="0">
+                <a:solidFill>
+                  <a:schemeClr val="tx1">
+                    <a:lumMod val="75000"/>
+                    <a:lumOff val="25000"/>
+                  </a:schemeClr>
+                </a:solidFill>
+              </a:rPr>
+              <a:t>Built the interactive Telegram Bot with integrated mini-app. | Rust.</a:t>
             </a:r>
           </a:p>
         </p:txBody>
@@ -7905,7 +7576,7 @@
         </p:nvCxnSpPr>
         <p:spPr>
           <a:xfrm>
-            <a:off x="11442" y="3645872"/>
+            <a:off x="11442" y="3662056"/>
             <a:ext cx="6884696" cy="0"/>
           </a:xfrm>
           <a:prstGeom prst="line">
@@ -7978,8 +7649,8 @@
         </p:nvSpPr>
         <p:spPr>
           <a:xfrm>
-            <a:off x="100440" y="6313379"/>
-            <a:ext cx="6657120" cy="1546257"/>
+            <a:off x="100440" y="7859338"/>
+            <a:ext cx="6657120" cy="1212833"/>
           </a:xfrm>
           <a:prstGeom prst="rect">
             <a:avLst/>
@@ -8095,43 +7766,38 @@
               <a:buChar char="•"/>
             </a:pPr>
             <a:r>
-              <a:rPr lang="en-IN" sz="900" b="0" i="0" dirty="0">
-                <a:solidFill>
-                  <a:srgbClr val="374151"/>
-                </a:solidFill>
-                <a:effectLst/>
-                <a:latin typeface="Söhne"/>
-              </a:rPr>
-              <a:t>Researched and </a:t>
-            </a:r>
-            <a:r>
-              <a:rPr lang="en-IN" sz="900" b="0" i="0" dirty="0" err="1">
-                <a:solidFill>
-                  <a:srgbClr val="374151"/>
-                </a:solidFill>
-                <a:effectLst/>
-                <a:latin typeface="Söhne"/>
-              </a:rPr>
-              <a:t>analyzed</a:t>
-            </a:r>
-            <a:r>
-              <a:rPr lang="en-IN" sz="900" b="0" i="0" dirty="0">
-                <a:solidFill>
-                  <a:srgbClr val="374151"/>
-                </a:solidFill>
-                <a:effectLst/>
-                <a:latin typeface="Söhne"/>
-              </a:rPr>
-              <a:t> the EVM technology stack and early Solidity codebase to write simple contracts.</a:t>
-            </a:r>
-            <a:endParaRPr lang="en-IN" sz="900" dirty="0">
-              <a:solidFill>
-                <a:schemeClr val="tx1">
-                  <a:lumMod val="75000"/>
-                  <a:lumOff val="25000"/>
-                </a:schemeClr>
-              </a:solidFill>
-            </a:endParaRPr>
+              <a:rPr lang="en-IN" sz="900" dirty="0">
+                <a:solidFill>
+                  <a:schemeClr val="tx1">
+                    <a:lumMod val="75000"/>
+                    <a:lumOff val="25000"/>
+                  </a:schemeClr>
+                </a:solidFill>
+              </a:rPr>
+              <a:t>Extensive research into </a:t>
+            </a:r>
+            <a:r>
+              <a:rPr lang="en-IN" sz="900" dirty="0" err="1">
+                <a:solidFill>
+                  <a:schemeClr val="tx1">
+                    <a:lumMod val="75000"/>
+                    <a:lumOff val="25000"/>
+                  </a:schemeClr>
+                </a:solidFill>
+              </a:rPr>
+              <a:t>Steem</a:t>
+            </a:r>
+            <a:r>
+              <a:rPr lang="en-IN" sz="900" dirty="0">
+                <a:solidFill>
+                  <a:schemeClr val="tx1">
+                    <a:lumMod val="75000"/>
+                    <a:lumOff val="25000"/>
+                  </a:schemeClr>
+                </a:solidFill>
+              </a:rPr>
+              <a:t> blockchain’s Tokenomics model &amp; deep dived into EOS blockchain codebase. Wrote several contracts using C++; also written test scripts; deployment using CLI.</a:t>
+            </a:r>
           </a:p>
           <a:p>
             <a:pPr marL="171450" indent="-171450">
@@ -8145,51 +7811,6 @@
               <a:buChar char="•"/>
             </a:pPr>
             <a:r>
-              <a:rPr lang="en-IN" sz="900" dirty="0">
-                <a:solidFill>
-                  <a:schemeClr val="tx1">
-                    <a:lumMod val="75000"/>
-                    <a:lumOff val="25000"/>
-                  </a:schemeClr>
-                </a:solidFill>
-              </a:rPr>
-              <a:t>Extensive research into </a:t>
-            </a:r>
-            <a:r>
-              <a:rPr lang="en-IN" sz="900" dirty="0" err="1">
-                <a:solidFill>
-                  <a:schemeClr val="tx1">
-                    <a:lumMod val="75000"/>
-                    <a:lumOff val="25000"/>
-                  </a:schemeClr>
-                </a:solidFill>
-              </a:rPr>
-              <a:t>Steem</a:t>
-            </a:r>
-            <a:r>
-              <a:rPr lang="en-IN" sz="900" dirty="0">
-                <a:solidFill>
-                  <a:schemeClr val="tx1">
-                    <a:lumMod val="75000"/>
-                    <a:lumOff val="25000"/>
-                  </a:schemeClr>
-                </a:solidFill>
-              </a:rPr>
-              <a:t> blockchain’s Tokenomics model &amp; deep dived into EOS blockchain codebase. Wrote several contracts using C++; also written test scripts; deployment using CLI.</a:t>
-            </a:r>
-          </a:p>
-          <a:p>
-            <a:pPr marL="171450" indent="-171450">
-              <a:lnSpc>
-                <a:spcPts val="1238"/>
-              </a:lnSpc>
-              <a:spcAft>
-                <a:spcPts val="125"/>
-              </a:spcAft>
-              <a:buFont typeface="Arial" panose="020B0604020202020204" pitchFamily="34" charset="0"/>
-              <a:buChar char="•"/>
-            </a:pPr>
-            <a:r>
               <a:rPr lang="en-IN" sz="900" b="0" i="0" dirty="0">
                 <a:solidFill>
                   <a:srgbClr val="374151"/>
@@ -8219,37 +7840,6 @@
               </a:rPr>
               <a:t> Blockchain; also researched their consensus algorithm – ‘Proof of Brain’.</a:t>
             </a:r>
-          </a:p>
-          <a:p>
-            <a:pPr marL="171450" indent="-171450">
-              <a:lnSpc>
-                <a:spcPts val="1238"/>
-              </a:lnSpc>
-              <a:spcAft>
-                <a:spcPts val="125"/>
-              </a:spcAft>
-              <a:buFont typeface="Arial" panose="020B0604020202020204" pitchFamily="34" charset="0"/>
-              <a:buChar char="•"/>
-            </a:pPr>
-            <a:r>
-              <a:rPr lang="en-IN" sz="900" dirty="0">
-                <a:solidFill>
-                  <a:schemeClr val="tx1">
-                    <a:lumMod val="75000"/>
-                    <a:lumOff val="25000"/>
-                  </a:schemeClr>
-                </a:solidFill>
-              </a:rPr>
-              <a:t>I have published many unique content related to Blockchain, Data Science on Medium, LinkedIn.</a:t>
-            </a:r>
-            <a:endParaRPr lang="en-US" sz="900" dirty="0">
-              <a:solidFill>
-                <a:schemeClr val="tx1">
-                  <a:lumMod val="75000"/>
-                  <a:lumOff val="25000"/>
-                </a:schemeClr>
-              </a:solidFill>
-            </a:endParaRPr>
           </a:p>
         </p:txBody>
       </p:sp>
@@ -8267,7 +7857,7 @@
         </p:nvSpPr>
         <p:spPr>
           <a:xfrm>
-            <a:off x="100440" y="5281071"/>
+            <a:off x="100440" y="6810059"/>
             <a:ext cx="6657120" cy="1007648"/>
           </a:xfrm>
           <a:prstGeom prst="rect">
@@ -8444,7 +8034,7 @@
         </p:nvSpPr>
         <p:spPr>
           <a:xfrm>
-            <a:off x="100440" y="3576910"/>
+            <a:off x="100440" y="5105898"/>
             <a:ext cx="6657120" cy="1674497"/>
           </a:xfrm>
           <a:prstGeom prst="rect">
@@ -8788,7 +8378,7 @@
         </p:nvSpPr>
         <p:spPr>
           <a:xfrm>
-            <a:off x="100440" y="2515526"/>
+            <a:off x="100440" y="4044514"/>
             <a:ext cx="6657120" cy="1033296"/>
           </a:xfrm>
           <a:prstGeom prst="rect">
@@ -9037,7 +8627,7 @@
         </p:nvSpPr>
         <p:spPr>
           <a:xfrm>
-            <a:off x="100440" y="1613910"/>
+            <a:off x="100440" y="3142898"/>
             <a:ext cx="6657120" cy="879408"/>
           </a:xfrm>
           <a:prstGeom prst="rect">
@@ -9320,7 +8910,7 @@
         </p:nvSpPr>
         <p:spPr>
           <a:xfrm>
-            <a:off x="100440" y="7887295"/>
+            <a:off x="100440" y="9105774"/>
             <a:ext cx="6657120" cy="738344"/>
           </a:xfrm>
           <a:prstGeom prst="rect">
@@ -9450,7 +9040,7 @@
         </p:nvSpPr>
         <p:spPr>
           <a:xfrm>
-            <a:off x="100440" y="89285"/>
+            <a:off x="100440" y="1618273"/>
             <a:ext cx="6657120" cy="1494961"/>
           </a:xfrm>
           <a:prstGeom prst="rect">
@@ -9755,6 +9345,468 @@
               </a:rPr>
               <a:t>Collaboratively wrote and audited solidity smart contracts, enhancing security, optimizing gas use, and minimizing contract size.</a:t>
             </a:r>
+          </a:p>
+        </p:txBody>
+      </p:sp>
+      <p:sp>
+        <p:nvSpPr>
+          <p:cNvPr id="3" name="TextBox 2">
+            <a:extLst>
+              <a:ext uri="{FF2B5EF4-FFF2-40B4-BE49-F238E27FC236}">
+                <a16:creationId xmlns:a16="http://schemas.microsoft.com/office/drawing/2014/main" id="{ADA4BC5C-0C4E-8A8B-3273-A8D5FD602CB3}"/>
+              </a:ext>
+            </a:extLst>
+          </p:cNvPr>
+          <p:cNvSpPr txBox="1"/>
+          <p:nvPr/>
+        </p:nvSpPr>
+        <p:spPr>
+          <a:xfrm>
+            <a:off x="88190" y="48480"/>
+            <a:ext cx="6657120" cy="1546257"/>
+          </a:xfrm>
+          <a:prstGeom prst="rect">
+            <a:avLst/>
+          </a:prstGeom>
+          <a:noFill/>
+          <a:ln>
+            <a:solidFill>
+              <a:schemeClr val="tx2">
+                <a:lumMod val="75000"/>
+              </a:schemeClr>
+            </a:solidFill>
+          </a:ln>
+        </p:spPr>
+        <p:txBody>
+          <a:bodyPr wrap="square" anchor="ctr">
+            <a:spAutoFit/>
+          </a:bodyPr>
+          <a:lstStyle/>
+          <a:p>
+            <a:pPr>
+              <a:lnSpc>
+                <a:spcPts val="1440"/>
+              </a:lnSpc>
+            </a:pPr>
+            <a:r>
+              <a:rPr lang="en-US" sz="900" b="1" dirty="0">
+                <a:solidFill>
+                  <a:schemeClr val="tx1">
+                    <a:lumMod val="75000"/>
+                    <a:lumOff val="25000"/>
+                  </a:schemeClr>
+                </a:solidFill>
+              </a:rPr>
+              <a:t>May 2022 – Oct 2022 </a:t>
+            </a:r>
+            <a:r>
+              <a:rPr lang="en-US" sz="900" dirty="0">
+                <a:solidFill>
+                  <a:schemeClr val="tx1">
+                    <a:lumMod val="75000"/>
+                    <a:lumOff val="25000"/>
+                  </a:schemeClr>
+                </a:solidFill>
+              </a:rPr>
+              <a:t>|</a:t>
+            </a:r>
+            <a:r>
+              <a:rPr lang="en-US" sz="900" b="1" dirty="0">
+                <a:solidFill>
+                  <a:schemeClr val="tx1">
+                    <a:lumMod val="75000"/>
+                    <a:lumOff val="25000"/>
+                  </a:schemeClr>
+                </a:solidFill>
+              </a:rPr>
+              <a:t> Senior Smart Contract Backend Engineer @ Upside </a:t>
+            </a:r>
+            <a:r>
+              <a:rPr lang="en-US" sz="900" dirty="0">
+                <a:solidFill>
+                  <a:schemeClr val="tx1">
+                    <a:lumMod val="75000"/>
+                    <a:lumOff val="25000"/>
+                  </a:schemeClr>
+                </a:solidFill>
+              </a:rPr>
+              <a:t>| </a:t>
+            </a:r>
+            <a:r>
+              <a:rPr lang="en-US" sz="900" b="1" dirty="0">
+                <a:solidFill>
+                  <a:schemeClr val="tx1">
+                    <a:lumMod val="75000"/>
+                    <a:lumOff val="25000"/>
+                  </a:schemeClr>
+                </a:solidFill>
+              </a:rPr>
+              <a:t>Full-time</a:t>
+            </a:r>
+          </a:p>
+          <a:p>
+            <a:pPr marL="171450" indent="-171450">
+              <a:lnSpc>
+                <a:spcPts val="1238"/>
+              </a:lnSpc>
+              <a:spcAft>
+                <a:spcPts val="125"/>
+              </a:spcAft>
+              <a:buFont typeface="Arial" panose="020B0604020202020204" pitchFamily="34" charset="0"/>
+              <a:buChar char="•"/>
+            </a:pPr>
+            <a:r>
+              <a:rPr lang="en-IN" sz="900" b="0" i="0" dirty="0">
+                <a:solidFill>
+                  <a:srgbClr val="374151"/>
+                </a:solidFill>
+                <a:effectLst/>
+              </a:rPr>
+              <a:t>Collaborated with auditors from </a:t>
+            </a:r>
+            <a:r>
+              <a:rPr lang="en-IN" sz="900" b="0" i="0" u="sng" dirty="0" err="1">
+                <a:solidFill>
+                  <a:srgbClr val="374151"/>
+                </a:solidFill>
+                <a:effectLst/>
+              </a:rPr>
+              <a:t>Quantstamp</a:t>
+            </a:r>
+            <a:r>
+              <a:rPr lang="en-IN" sz="900" b="0" i="0" dirty="0">
+                <a:solidFill>
+                  <a:srgbClr val="374151"/>
+                </a:solidFill>
+                <a:effectLst/>
+              </a:rPr>
+              <a:t>, </a:t>
+            </a:r>
+            <a:r>
+              <a:rPr lang="en-IN" sz="900" b="0" i="0" dirty="0" err="1">
+                <a:solidFill>
+                  <a:srgbClr val="374151"/>
+                </a:solidFill>
+                <a:effectLst/>
+              </a:rPr>
+              <a:t>Certik</a:t>
+            </a:r>
+            <a:r>
+              <a:rPr lang="en-IN" sz="900" b="0" i="0" dirty="0">
+                <a:solidFill>
+                  <a:srgbClr val="374151"/>
+                </a:solidFill>
+                <a:effectLst/>
+              </a:rPr>
+              <a:t>, </a:t>
+            </a:r>
+            <a:r>
+              <a:rPr lang="en-IN" sz="900" b="0" i="0" dirty="0" err="1">
+                <a:solidFill>
+                  <a:srgbClr val="374151"/>
+                </a:solidFill>
+                <a:effectLst/>
+              </a:rPr>
+              <a:t>Omniscia</a:t>
+            </a:r>
+            <a:r>
+              <a:rPr lang="en-IN" sz="900" b="0" i="0" dirty="0">
+                <a:solidFill>
+                  <a:srgbClr val="374151"/>
+                </a:solidFill>
+                <a:effectLst/>
+              </a:rPr>
+              <a:t> on Token, Vesting, Staking Solidity smart contracts for clients including </a:t>
+            </a:r>
+            <a:r>
+              <a:rPr lang="en-IN" sz="900" b="0" i="0" dirty="0" err="1">
+                <a:solidFill>
+                  <a:srgbClr val="374151"/>
+                </a:solidFill>
+                <a:effectLst/>
+              </a:rPr>
+              <a:t>Metacraft</a:t>
+            </a:r>
+            <a:r>
+              <a:rPr lang="en-IN" sz="900" b="0" i="0" dirty="0">
+                <a:solidFill>
+                  <a:srgbClr val="374151"/>
+                </a:solidFill>
+                <a:effectLst/>
+              </a:rPr>
+              <a:t>, </a:t>
+            </a:r>
+            <a:r>
+              <a:rPr lang="en-IN" sz="900" b="0" i="0" dirty="0" err="1">
+                <a:solidFill>
+                  <a:srgbClr val="374151"/>
+                </a:solidFill>
+                <a:effectLst/>
+              </a:rPr>
+              <a:t>Delysium</a:t>
+            </a:r>
+            <a:r>
+              <a:rPr lang="en-IN" sz="900" b="0" i="0" dirty="0">
+                <a:solidFill>
+                  <a:srgbClr val="374151"/>
+                </a:solidFill>
+                <a:effectLst/>
+              </a:rPr>
+              <a:t>, and </a:t>
+            </a:r>
+            <a:r>
+              <a:rPr lang="en-IN" sz="900" b="0" i="0" dirty="0" err="1">
+                <a:solidFill>
+                  <a:srgbClr val="374151"/>
+                </a:solidFill>
+                <a:effectLst/>
+              </a:rPr>
+              <a:t>Zedrun</a:t>
+            </a:r>
+            <a:r>
+              <a:rPr lang="en-IN" sz="900" b="0" i="0" dirty="0">
+                <a:solidFill>
+                  <a:srgbClr val="374151"/>
+                </a:solidFill>
+                <a:effectLst/>
+              </a:rPr>
+              <a:t>, etc.</a:t>
+            </a:r>
+          </a:p>
+          <a:p>
+            <a:pPr marL="171450" indent="-171450">
+              <a:lnSpc>
+                <a:spcPts val="1238"/>
+              </a:lnSpc>
+              <a:spcAft>
+                <a:spcPts val="125"/>
+              </a:spcAft>
+              <a:buFont typeface="Arial" panose="020B0604020202020204" pitchFamily="34" charset="0"/>
+              <a:buChar char="•"/>
+            </a:pPr>
+            <a:r>
+              <a:rPr lang="en-IN" sz="900" dirty="0">
+                <a:solidFill>
+                  <a:schemeClr val="tx1">
+                    <a:lumMod val="75000"/>
+                    <a:lumOff val="25000"/>
+                  </a:schemeClr>
+                </a:solidFill>
+              </a:rPr>
+              <a:t>Designed AMM &amp; Developed smart contracts for </a:t>
+            </a:r>
+            <a:r>
+              <a:rPr lang="en-IN" sz="900" dirty="0" err="1">
+                <a:solidFill>
+                  <a:schemeClr val="tx1">
+                    <a:lumMod val="75000"/>
+                    <a:lumOff val="25000"/>
+                  </a:schemeClr>
+                </a:solidFill>
+              </a:rPr>
+              <a:t>DeFi</a:t>
+            </a:r>
+            <a:r>
+              <a:rPr lang="en-IN" sz="900" dirty="0">
+                <a:solidFill>
+                  <a:schemeClr val="tx1">
+                    <a:lumMod val="75000"/>
+                    <a:lumOff val="25000"/>
+                  </a:schemeClr>
+                </a:solidFill>
+              </a:rPr>
+              <a:t> DEX - “</a:t>
+            </a:r>
+            <a:r>
+              <a:rPr lang="en-IN" sz="900" dirty="0" err="1">
+                <a:solidFill>
+                  <a:schemeClr val="tx1">
+                    <a:lumMod val="75000"/>
+                    <a:lumOff val="25000"/>
+                  </a:schemeClr>
+                </a:solidFill>
+              </a:rPr>
+              <a:t>Bioform</a:t>
+            </a:r>
+            <a:r>
+              <a:rPr lang="en-IN" sz="900" dirty="0">
+                <a:solidFill>
+                  <a:schemeClr val="tx1">
+                    <a:lumMod val="75000"/>
+                    <a:lumOff val="25000"/>
+                  </a:schemeClr>
+                </a:solidFill>
+              </a:rPr>
+              <a:t>” with MIT using their free-energy based parametrized model. </a:t>
+            </a:r>
+          </a:p>
+          <a:p>
+            <a:pPr marL="171450" indent="-171450">
+              <a:lnSpc>
+                <a:spcPts val="1238"/>
+              </a:lnSpc>
+              <a:spcAft>
+                <a:spcPts val="125"/>
+              </a:spcAft>
+              <a:buFont typeface="Arial" panose="020B0604020202020204" pitchFamily="34" charset="0"/>
+              <a:buChar char="•"/>
+            </a:pPr>
+            <a:r>
+              <a:rPr lang="en-IN" sz="900" dirty="0">
+                <a:solidFill>
+                  <a:schemeClr val="tx1">
+                    <a:lumMod val="75000"/>
+                    <a:lumOff val="25000"/>
+                  </a:schemeClr>
+                </a:solidFill>
+              </a:rPr>
+              <a:t>While writing smart contracts, I ensured testing, deployment scripts, flattening, verification, fuzzy-testing, gas optimization (using Yul, Solidity), contract-size optimization of smart contracts using Truffle, Hardhat, </a:t>
+            </a:r>
+            <a:r>
+              <a:rPr lang="en-IN" sz="900" u="sng" dirty="0">
+                <a:solidFill>
+                  <a:schemeClr val="tx1">
+                    <a:lumMod val="75000"/>
+                    <a:lumOff val="25000"/>
+                  </a:schemeClr>
+                </a:solidFill>
+              </a:rPr>
+              <a:t>Foundry</a:t>
+            </a:r>
+            <a:r>
+              <a:rPr lang="en-IN" sz="900" dirty="0">
+                <a:solidFill>
+                  <a:schemeClr val="tx1">
+                    <a:lumMod val="75000"/>
+                    <a:lumOff val="25000"/>
+                  </a:schemeClr>
+                </a:solidFill>
+              </a:rPr>
+              <a:t> tools before deploying to </a:t>
+            </a:r>
+            <a:r>
+              <a:rPr lang="en-IN" sz="900" dirty="0" err="1">
+                <a:solidFill>
+                  <a:schemeClr val="tx1">
+                    <a:lumMod val="75000"/>
+                    <a:lumOff val="25000"/>
+                  </a:schemeClr>
+                </a:solidFill>
+              </a:rPr>
+              <a:t>mainnet</a:t>
+            </a:r>
+            <a:r>
+              <a:rPr lang="en-IN" sz="900" dirty="0">
+                <a:solidFill>
+                  <a:schemeClr val="tx1">
+                    <a:lumMod val="75000"/>
+                    <a:lumOff val="25000"/>
+                  </a:schemeClr>
+                </a:solidFill>
+              </a:rPr>
+              <a:t>, </a:t>
+            </a:r>
+            <a:r>
+              <a:rPr lang="en-IN" sz="900" dirty="0" err="1">
+                <a:solidFill>
+                  <a:schemeClr val="tx1">
+                    <a:lumMod val="75000"/>
+                    <a:lumOff val="25000"/>
+                  </a:schemeClr>
+                </a:solidFill>
+              </a:rPr>
+              <a:t>testnet</a:t>
+            </a:r>
+            <a:r>
+              <a:rPr lang="en-IN" sz="900" dirty="0">
+                <a:solidFill>
+                  <a:schemeClr val="tx1">
+                    <a:lumMod val="75000"/>
+                    <a:lumOff val="25000"/>
+                  </a:schemeClr>
+                </a:solidFill>
+              </a:rPr>
+              <a:t>.</a:t>
+            </a:r>
+          </a:p>
+          <a:p>
+            <a:pPr marL="171450" indent="-171450">
+              <a:lnSpc>
+                <a:spcPts val="1238"/>
+              </a:lnSpc>
+              <a:spcAft>
+                <a:spcPts val="125"/>
+              </a:spcAft>
+              <a:buFont typeface="Arial" panose="020B0604020202020204" pitchFamily="34" charset="0"/>
+              <a:buChar char="•"/>
+            </a:pPr>
+            <a:r>
+              <a:rPr lang="en-IN" sz="900" b="0" i="0" dirty="0">
+                <a:solidFill>
+                  <a:srgbClr val="374151"/>
+                </a:solidFill>
+                <a:effectLst/>
+              </a:rPr>
+              <a:t>Co-developed and led 'Zippy' TGE tool project, crafting architecture with whitepaper, built REST APIs with </a:t>
+            </a:r>
+            <a:r>
+              <a:rPr lang="en-IN" sz="900" b="0" i="0" dirty="0" err="1">
+                <a:solidFill>
+                  <a:srgbClr val="374151"/>
+                </a:solidFill>
+                <a:effectLst/>
+              </a:rPr>
+              <a:t>NextJS</a:t>
+            </a:r>
+            <a:r>
+              <a:rPr lang="en-IN" sz="900" b="0" i="0" dirty="0">
+                <a:solidFill>
+                  <a:srgbClr val="374151"/>
+                </a:solidFill>
+                <a:effectLst/>
+              </a:rPr>
+              <a:t>, and conducting API tests via data mocking and integrated Swagger UI; also managed Firebase's NoSQL &amp; SQL databases. </a:t>
+            </a:r>
+            <a:r>
+              <a:rPr lang="en-IN" sz="900" b="0" i="0" dirty="0">
+                <a:solidFill>
+                  <a:srgbClr val="374151"/>
+                </a:solidFill>
+                <a:effectLst/>
+                <a:latin typeface="Söhne"/>
+              </a:rPr>
+              <a:t>Proficient in React and Redux.</a:t>
+            </a:r>
+          </a:p>
+          <a:p>
+            <a:pPr marL="171450" indent="-171450">
+              <a:lnSpc>
+                <a:spcPts val="1238"/>
+              </a:lnSpc>
+              <a:spcAft>
+                <a:spcPts val="125"/>
+              </a:spcAft>
+              <a:buFont typeface="Arial" panose="020B0604020202020204" pitchFamily="34" charset="0"/>
+              <a:buChar char="•"/>
+            </a:pPr>
+            <a:r>
+              <a:rPr lang="en-IN" sz="900" b="0" i="0" dirty="0">
+                <a:solidFill>
+                  <a:srgbClr val="374151"/>
+                </a:solidFill>
+                <a:effectLst/>
+                <a:latin typeface="Söhne"/>
+              </a:rPr>
+              <a:t>Implemented CI/CD via GitHub Actions and Docker for automated testing and repository packaging, respectively.</a:t>
+            </a:r>
+            <a:endParaRPr lang="en-US" sz="900" dirty="0">
+              <a:solidFill>
+                <a:schemeClr val="tx1">
+                  <a:lumMod val="75000"/>
+                  <a:lumOff val="25000"/>
+                </a:schemeClr>
+              </a:solidFill>
+            </a:endParaRPr>
           </a:p>
         </p:txBody>
       </p:sp>

</xml_diff>

<commit_message>
Update my CV with exp. of UniFi
</commit_message>
<xml_diff>
--- a/my_resume_v2.pptx
+++ b/my_resume_v2.pptx
@@ -198,7 +198,7 @@
           <a:p>
             <a:fld id="{060BEAD1-672E-E841-95FA-08B9B35A46D7}" type="datetimeFigureOut">
               <a:rPr lang="en-US" smtClean="0"/>
-              <a:t>8/19/25</a:t>
+              <a:t>12/24/25</a:t>
             </a:fld>
             <a:endParaRPr lang="en-US"/>
           </a:p>
@@ -765,7 +765,7 @@
           <a:p>
             <a:fld id="{A417C049-F611-094D-8104-5764D8D04213}" type="datetimeFigureOut">
               <a:rPr lang="en-US" smtClean="0"/>
-              <a:t>8/19/25</a:t>
+              <a:t>12/24/25</a:t>
             </a:fld>
             <a:endParaRPr lang="en-US"/>
           </a:p>
@@ -935,7 +935,7 @@
           <a:p>
             <a:fld id="{A417C049-F611-094D-8104-5764D8D04213}" type="datetimeFigureOut">
               <a:rPr lang="en-US" smtClean="0"/>
-              <a:t>8/19/25</a:t>
+              <a:t>12/24/25</a:t>
             </a:fld>
             <a:endParaRPr lang="en-US"/>
           </a:p>
@@ -1115,7 +1115,7 @@
           <a:p>
             <a:fld id="{A417C049-F611-094D-8104-5764D8D04213}" type="datetimeFigureOut">
               <a:rPr lang="en-US" smtClean="0"/>
-              <a:t>8/19/25</a:t>
+              <a:t>12/24/25</a:t>
             </a:fld>
             <a:endParaRPr lang="en-US"/>
           </a:p>
@@ -1285,7 +1285,7 @@
           <a:p>
             <a:fld id="{A417C049-F611-094D-8104-5764D8D04213}" type="datetimeFigureOut">
               <a:rPr lang="en-US" smtClean="0"/>
-              <a:t>8/19/25</a:t>
+              <a:t>12/24/25</a:t>
             </a:fld>
             <a:endParaRPr lang="en-US"/>
           </a:p>
@@ -1529,7 +1529,7 @@
           <a:p>
             <a:fld id="{A417C049-F611-094D-8104-5764D8D04213}" type="datetimeFigureOut">
               <a:rPr lang="en-US" smtClean="0"/>
-              <a:t>8/19/25</a:t>
+              <a:t>12/24/25</a:t>
             </a:fld>
             <a:endParaRPr lang="en-US"/>
           </a:p>
@@ -1761,7 +1761,7 @@
           <a:p>
             <a:fld id="{A417C049-F611-094D-8104-5764D8D04213}" type="datetimeFigureOut">
               <a:rPr lang="en-US" smtClean="0"/>
-              <a:t>8/19/25</a:t>
+              <a:t>12/24/25</a:t>
             </a:fld>
             <a:endParaRPr lang="en-US"/>
           </a:p>
@@ -2128,7 +2128,7 @@
           <a:p>
             <a:fld id="{A417C049-F611-094D-8104-5764D8D04213}" type="datetimeFigureOut">
               <a:rPr lang="en-US" smtClean="0"/>
-              <a:t>8/19/25</a:t>
+              <a:t>12/24/25</a:t>
             </a:fld>
             <a:endParaRPr lang="en-US"/>
           </a:p>
@@ -2246,7 +2246,7 @@
           <a:p>
             <a:fld id="{A417C049-F611-094D-8104-5764D8D04213}" type="datetimeFigureOut">
               <a:rPr lang="en-US" smtClean="0"/>
-              <a:t>8/19/25</a:t>
+              <a:t>12/24/25</a:t>
             </a:fld>
             <a:endParaRPr lang="en-US"/>
           </a:p>
@@ -2341,7 +2341,7 @@
           <a:p>
             <a:fld id="{A417C049-F611-094D-8104-5764D8D04213}" type="datetimeFigureOut">
               <a:rPr lang="en-US" smtClean="0"/>
-              <a:t>8/19/25</a:t>
+              <a:t>12/24/25</a:t>
             </a:fld>
             <a:endParaRPr lang="en-US"/>
           </a:p>
@@ -2618,7 +2618,7 @@
           <a:p>
             <a:fld id="{A417C049-F611-094D-8104-5764D8D04213}" type="datetimeFigureOut">
               <a:rPr lang="en-US" smtClean="0"/>
-              <a:t>8/19/25</a:t>
+              <a:t>12/24/25</a:t>
             </a:fld>
             <a:endParaRPr lang="en-US"/>
           </a:p>
@@ -2875,7 +2875,7 @@
           <a:p>
             <a:fld id="{A417C049-F611-094D-8104-5764D8D04213}" type="datetimeFigureOut">
               <a:rPr lang="en-US" smtClean="0"/>
-              <a:t>8/19/25</a:t>
+              <a:t>12/24/25</a:t>
             </a:fld>
             <a:endParaRPr lang="en-US"/>
           </a:p>
@@ -3093,7 +3093,7 @@
           <a:p>
             <a:fld id="{A417C049-F611-094D-8104-5764D8D04213}" type="datetimeFigureOut">
               <a:rPr lang="en-US" smtClean="0"/>
-              <a:t>8/19/25</a:t>
+              <a:t>12/24/25</a:t>
             </a:fld>
             <a:endParaRPr lang="en-US"/>
           </a:p>
@@ -3512,8 +3512,8 @@
         </p:nvSpPr>
         <p:spPr>
           <a:xfrm>
-            <a:off x="88190" y="2308676"/>
-            <a:ext cx="6666468" cy="1366721"/>
+            <a:off x="88190" y="2340109"/>
+            <a:ext cx="6666468" cy="1267335"/>
           </a:xfrm>
           <a:prstGeom prst="rect">
             <a:avLst/>
@@ -3528,7 +3528,7 @@
           <a:p>
             <a:pPr marL="171450" indent="-171450">
               <a:lnSpc>
-                <a:spcPts val="1238"/>
+                <a:spcPts val="1138"/>
               </a:lnSpc>
               <a:spcAft>
                 <a:spcPts val="125"/>
@@ -3537,7 +3537,7 @@
               <a:buChar char="•"/>
             </a:pPr>
             <a:r>
-              <a:rPr lang="en-IN" sz="900" u="sng" dirty="0">
+              <a:rPr lang="en-IN" sz="880" u="sng" dirty="0">
                 <a:solidFill>
                   <a:schemeClr val="tx1">
                     <a:lumMod val="75000"/>
@@ -3548,7 +3548,7 @@
               <a:t>Contributed to Opensource projects: Subspace, </a:t>
             </a:r>
             <a:r>
-              <a:rPr lang="en-IN" sz="900" u="sng" dirty="0" err="1">
+              <a:rPr lang="en-IN" sz="880" u="sng" dirty="0" err="1">
                 <a:solidFill>
                   <a:schemeClr val="tx1">
                     <a:lumMod val="75000"/>
@@ -3559,7 +3559,7 @@
               <a:t>LayerZero</a:t>
             </a:r>
             <a:r>
-              <a:rPr lang="en-IN" sz="900" u="sng" dirty="0">
+              <a:rPr lang="en-IN" sz="880" u="sng" dirty="0">
                 <a:solidFill>
                   <a:schemeClr val="tx1">
                     <a:lumMod val="75000"/>
@@ -3570,7 +3570,7 @@
               <a:t>, </a:t>
             </a:r>
             <a:r>
-              <a:rPr lang="en-IN" sz="900" u="sng" dirty="0">
+              <a:rPr lang="en-IN" sz="880" u="sng" dirty="0">
                 <a:solidFill>
                   <a:schemeClr val="tx1">
                     <a:lumMod val="75000"/>
@@ -3588,7 +3588,7 @@
               <a:t>STARK Winterfell</a:t>
             </a:r>
             <a:r>
-              <a:rPr lang="en-IN" sz="900" u="sng" dirty="0">
+              <a:rPr lang="en-IN" sz="880" u="sng" dirty="0">
                 <a:solidFill>
                   <a:schemeClr val="tx1">
                     <a:lumMod val="75000"/>
@@ -3599,7 +3599,7 @@
               <a:t>, </a:t>
             </a:r>
             <a:r>
-              <a:rPr lang="en-IN" sz="900" u="sng" dirty="0">
+              <a:rPr lang="en-IN" sz="880" u="sng" dirty="0">
                 <a:solidFill>
                   <a:schemeClr val="tx1">
                     <a:lumMod val="75000"/>
@@ -3617,7 +3617,7 @@
               <a:t>Uniswap v2</a:t>
             </a:r>
             <a:r>
-              <a:rPr lang="en-IN" sz="900" u="sng" dirty="0">
+              <a:rPr lang="en-IN" sz="880" u="sng" dirty="0">
                 <a:solidFill>
                   <a:schemeClr val="tx1">
                     <a:lumMod val="75000"/>
@@ -3628,7 +3628,7 @@
               <a:t>, </a:t>
             </a:r>
             <a:r>
-              <a:rPr lang="en-IN" sz="900" u="sng" dirty="0">
+              <a:rPr lang="en-IN" sz="880" u="sng" dirty="0">
                 <a:solidFill>
                   <a:schemeClr val="tx1">
                     <a:lumMod val="75000"/>
@@ -3646,7 +3646,7 @@
               <a:t>OpenZeppelin</a:t>
             </a:r>
             <a:r>
-              <a:rPr lang="en-IN" sz="900" u="sng" dirty="0">
+              <a:rPr lang="en-IN" sz="880" u="sng" dirty="0">
                 <a:solidFill>
                   <a:schemeClr val="tx1">
                     <a:lumMod val="75000"/>
@@ -3657,7 +3657,7 @@
               <a:t>, </a:t>
             </a:r>
             <a:r>
-              <a:rPr lang="en-IN" sz="900" u="sng" dirty="0">
+              <a:rPr lang="en-IN" sz="880" u="sng" dirty="0">
                 <a:solidFill>
                   <a:schemeClr val="tx1">
                     <a:lumMod val="75000"/>
@@ -3675,7 +3675,7 @@
               <a:t>Telos Blockchain</a:t>
             </a:r>
             <a:r>
-              <a:rPr lang="en-IN" sz="900" u="sng" dirty="0">
+              <a:rPr lang="en-IN" sz="880" u="sng" dirty="0">
                 <a:solidFill>
                   <a:schemeClr val="tx1">
                     <a:lumMod val="75000"/>
@@ -3686,7 +3686,7 @@
               <a:t>, STFX (Perpetual), </a:t>
             </a:r>
             <a:r>
-              <a:rPr lang="en-IN" sz="900" u="sng" dirty="0">
+              <a:rPr lang="en-IN" sz="880" u="sng" dirty="0">
                 <a:solidFill>
                   <a:schemeClr val="tx1">
                     <a:lumMod val="75000"/>
@@ -3704,7 +3704,7 @@
               <a:t>Substrate Runtime</a:t>
             </a:r>
             <a:r>
-              <a:rPr lang="en-IN" sz="900" u="sng" dirty="0">
+              <a:rPr lang="en-IN" sz="880" u="sng" dirty="0">
                 <a:solidFill>
                   <a:schemeClr val="tx1">
                     <a:lumMod val="75000"/>
@@ -3715,7 +3715,7 @@
               <a:t> &amp; </a:t>
             </a:r>
             <a:r>
-              <a:rPr lang="en-IN" sz="900" u="sng" dirty="0">
+              <a:rPr lang="en-IN" sz="880" u="sng" dirty="0">
                 <a:solidFill>
                   <a:schemeClr val="tx1">
                     <a:lumMod val="75000"/>
@@ -3733,7 +3733,7 @@
               <a:t>SC ink lang</a:t>
             </a:r>
             <a:r>
-              <a:rPr lang="en-IN" sz="900" u="sng" dirty="0">
+              <a:rPr lang="en-IN" sz="880" u="sng" dirty="0">
                 <a:solidFill>
                   <a:schemeClr val="tx1">
                     <a:lumMod val="75000"/>
@@ -3744,7 +3744,7 @@
               <a:t>, </a:t>
             </a:r>
             <a:r>
-              <a:rPr lang="en-IN" sz="900" u="sng" dirty="0">
+              <a:rPr lang="en-IN" sz="880" u="sng" dirty="0">
                 <a:solidFill>
                   <a:schemeClr val="tx1">
                     <a:lumMod val="75000"/>
@@ -3762,7 +3762,7 @@
               <a:t>Rustlings</a:t>
             </a:r>
             <a:r>
-              <a:rPr lang="en-IN" sz="900" u="sng" dirty="0">
+              <a:rPr lang="en-IN" sz="880" u="sng" dirty="0">
                 <a:solidFill>
                   <a:schemeClr val="tx1">
                     <a:lumMod val="75000"/>
@@ -3773,7 +3773,7 @@
               <a:t>, </a:t>
             </a:r>
             <a:r>
-              <a:rPr lang="en-IN" sz="900" u="sng" dirty="0">
+              <a:rPr lang="en-IN" sz="880" u="sng" dirty="0">
                 <a:solidFill>
                   <a:schemeClr val="tx1">
                     <a:lumMod val="75000"/>
@@ -3791,7 +3791,7 @@
               <a:t>Sui</a:t>
             </a:r>
             <a:r>
-              <a:rPr lang="en-IN" sz="900" u="sng" dirty="0">
+              <a:rPr lang="en-IN" sz="880" u="sng" dirty="0">
                 <a:solidFill>
                   <a:schemeClr val="tx1">
                     <a:lumMod val="75000"/>
@@ -3801,7 +3801,7 @@
               </a:rPr>
               <a:t>.</a:t>
             </a:r>
-            <a:endParaRPr lang="en-IN" sz="900" dirty="0">
+            <a:endParaRPr lang="en-IN" sz="880" dirty="0">
               <a:solidFill>
                 <a:schemeClr val="tx1">
                   <a:lumMod val="75000"/>
@@ -3813,7 +3813,7 @@
           <a:p>
             <a:pPr marL="171450" indent="-171450">
               <a:lnSpc>
-                <a:spcPts val="1238"/>
+                <a:spcPts val="1138"/>
               </a:lnSpc>
               <a:spcAft>
                 <a:spcPts val="125"/>
@@ -3822,7 +3822,7 @@
               <a:buChar char="•"/>
             </a:pPr>
             <a:r>
-              <a:rPr lang="en-IN" sz="900" dirty="0">
+              <a:rPr lang="en-IN" sz="880" dirty="0">
                 <a:solidFill>
                   <a:schemeClr val="tx1">
                     <a:lumMod val="75000"/>
@@ -3833,7 +3833,7 @@
               <a:t>Developed </a:t>
             </a:r>
             <a:r>
-              <a:rPr lang="en-IN" sz="900" u="sng" dirty="0">
+              <a:rPr lang="en-IN" sz="880" u="sng" dirty="0">
                 <a:solidFill>
                   <a:schemeClr val="tx1">
                     <a:lumMod val="75000"/>
@@ -3844,7 +3844,7 @@
               <a:t>Polygon's native stablecoin</a:t>
             </a:r>
             <a:r>
-              <a:rPr lang="en-IN" sz="900" dirty="0">
+              <a:rPr lang="en-IN" sz="880" dirty="0">
                 <a:solidFill>
                   <a:schemeClr val="tx1">
                     <a:lumMod val="75000"/>
@@ -3855,7 +3855,7 @@
               <a:t> (DeFi) using a multi-collateral CDP approach, incentivized staking to prevent liquidation, informed by research into </a:t>
             </a:r>
             <a:r>
-              <a:rPr lang="en-IN" sz="900" dirty="0" err="1">
+              <a:rPr lang="en-IN" sz="880" dirty="0" err="1">
                 <a:solidFill>
                   <a:schemeClr val="tx1">
                     <a:lumMod val="75000"/>
@@ -3866,7 +3866,7 @@
               <a:t>MakerDAO</a:t>
             </a:r>
             <a:r>
-              <a:rPr lang="en-IN" sz="900" dirty="0">
+              <a:rPr lang="en-IN" sz="880" dirty="0">
                 <a:solidFill>
                   <a:schemeClr val="tx1">
                     <a:lumMod val="75000"/>
@@ -3877,7 +3877,7 @@
               <a:t>, </a:t>
             </a:r>
             <a:r>
-              <a:rPr lang="en-IN" sz="900" dirty="0" err="1">
+              <a:rPr lang="en-IN" sz="880" dirty="0" err="1">
                 <a:solidFill>
                   <a:schemeClr val="tx1">
                     <a:lumMod val="75000"/>
@@ -3888,7 +3888,7 @@
               <a:t>Liquity</a:t>
             </a:r>
             <a:r>
-              <a:rPr lang="en-IN" sz="900" dirty="0">
+              <a:rPr lang="en-IN" sz="880" dirty="0">
                 <a:solidFill>
                   <a:schemeClr val="tx1">
                     <a:lumMod val="75000"/>
@@ -3902,7 +3902,7 @@
           <a:p>
             <a:pPr marL="171450" indent="-171450">
               <a:lnSpc>
-                <a:spcPts val="1238"/>
+                <a:spcPts val="1138"/>
               </a:lnSpc>
               <a:spcAft>
                 <a:spcPts val="125"/>
@@ -3911,7 +3911,7 @@
               <a:buChar char="•"/>
             </a:pPr>
             <a:r>
-              <a:rPr lang="en-IN" sz="900" dirty="0">
+              <a:rPr lang="en-IN" sz="880" dirty="0">
                 <a:solidFill>
                   <a:schemeClr val="tx1">
                     <a:lumMod val="75000"/>
@@ -3922,7 +3922,7 @@
               <a:t>Bagged </a:t>
             </a:r>
             <a:r>
-              <a:rPr lang="en-IN" sz="900" u="sng" dirty="0">
+              <a:rPr lang="en-IN" sz="880" u="sng" dirty="0">
                 <a:solidFill>
                   <a:schemeClr val="tx1">
                     <a:lumMod val="75000"/>
@@ -3933,7 +3933,7 @@
               <a:t>2</a:t>
             </a:r>
             <a:r>
-              <a:rPr lang="en-IN" sz="900" u="sng" baseline="30000" dirty="0">
+              <a:rPr lang="en-IN" sz="880" u="sng" baseline="30000" dirty="0">
                 <a:solidFill>
                   <a:schemeClr val="tx1">
                     <a:lumMod val="75000"/>
@@ -3944,7 +3944,7 @@
               <a:t>nd</a:t>
             </a:r>
             <a:r>
-              <a:rPr lang="en-IN" sz="900" u="sng" dirty="0">
+              <a:rPr lang="en-IN" sz="880" u="sng" dirty="0">
                 <a:solidFill>
                   <a:schemeClr val="tx1">
                     <a:lumMod val="75000"/>
@@ -3955,7 +3955,7 @@
               <a:t> rank</a:t>
             </a:r>
             <a:r>
-              <a:rPr lang="en-IN" sz="900" dirty="0">
+              <a:rPr lang="en-IN" sz="880" dirty="0">
                 <a:solidFill>
                   <a:schemeClr val="tx1">
                     <a:lumMod val="75000"/>
@@ -3966,7 +3966,7 @@
               <a:t> in SNI Hack 2021 competition as EOSIO Blockchain Developer (also Presenter) for a project “</a:t>
             </a:r>
             <a:r>
-              <a:rPr lang="en-IN" sz="900" dirty="0">
+              <a:rPr lang="en-IN" sz="880" dirty="0">
                 <a:solidFill>
                   <a:schemeClr val="tx1">
                     <a:lumMod val="75000"/>
@@ -3984,7 +3984,7 @@
               <a:t>Ceven.Parks</a:t>
             </a:r>
             <a:r>
-              <a:rPr lang="en-IN" sz="900" dirty="0">
+              <a:rPr lang="en-IN" sz="880" dirty="0">
                 <a:solidFill>
                   <a:schemeClr val="tx1">
                     <a:lumMod val="75000"/>
@@ -3998,7 +3998,7 @@
           <a:p>
             <a:pPr marL="171450" indent="-171450">
               <a:lnSpc>
-                <a:spcPts val="1238"/>
+                <a:spcPts val="1138"/>
               </a:lnSpc>
               <a:spcAft>
                 <a:spcPts val="125"/>
@@ -4007,7 +4007,7 @@
               <a:buChar char="•"/>
             </a:pPr>
             <a:r>
-              <a:rPr lang="en-IN" sz="900" dirty="0">
+              <a:rPr lang="en-IN" sz="880" dirty="0">
                 <a:solidFill>
                   <a:schemeClr val="tx1">
                     <a:lumMod val="75000"/>
@@ -4018,7 +4018,7 @@
               <a:t>Built the architecture of </a:t>
             </a:r>
             <a:r>
-              <a:rPr lang="en-IN" sz="900" dirty="0" err="1">
+              <a:rPr lang="en-IN" sz="880" dirty="0" err="1">
                 <a:solidFill>
                   <a:schemeClr val="tx1">
                     <a:lumMod val="75000"/>
@@ -4029,7 +4029,7 @@
               <a:t>GameFi</a:t>
             </a:r>
             <a:r>
-              <a:rPr lang="en-IN" sz="900" dirty="0">
+              <a:rPr lang="en-IN" sz="880" dirty="0">
                 <a:solidFill>
                   <a:schemeClr val="tx1">
                     <a:lumMod val="75000"/>
@@ -4040,7 +4040,7 @@
               <a:t> project – “</a:t>
             </a:r>
             <a:r>
-              <a:rPr lang="en-IN" sz="900" dirty="0" err="1">
+              <a:rPr lang="en-IN" sz="880" dirty="0" err="1">
                 <a:solidFill>
                   <a:schemeClr val="tx1">
                     <a:lumMod val="75000"/>
@@ -4051,7 +4051,7 @@
               <a:t>Bowled.io</a:t>
             </a:r>
             <a:r>
-              <a:rPr lang="en-IN" sz="900" dirty="0">
+              <a:rPr lang="en-IN" sz="880" dirty="0">
                 <a:solidFill>
                   <a:schemeClr val="tx1">
                     <a:lumMod val="75000"/>
@@ -4065,7 +4065,7 @@
           <a:p>
             <a:pPr marL="171450" marR="0" lvl="0" indent="-171450">
               <a:lnSpc>
-                <a:spcPts val="1238"/>
+                <a:spcPts val="1138"/>
               </a:lnSpc>
               <a:spcBef>
                 <a:spcPts val="0"/>
@@ -4077,7 +4077,7 @@
               <a:buChar char="•"/>
             </a:pPr>
             <a:r>
-              <a:rPr lang="en-IN" sz="900" dirty="0">
+              <a:rPr lang="en-IN" sz="880" dirty="0">
                 <a:solidFill>
                   <a:schemeClr val="tx1">
                     <a:lumMod val="75000"/>
@@ -4088,7 +4088,7 @@
               <a:t>Represented </a:t>
             </a:r>
             <a:r>
-              <a:rPr lang="en-IN" sz="900" dirty="0">
+              <a:rPr lang="en-IN" sz="880" dirty="0">
                 <a:solidFill>
                   <a:schemeClr val="tx1">
                     <a:lumMod val="75000"/>
@@ -4106,7 +4106,7 @@
               <a:t>DRIFE</a:t>
             </a:r>
             <a:r>
-              <a:rPr lang="en-IN" sz="900" dirty="0">
+              <a:rPr lang="en-IN" sz="880" dirty="0">
                 <a:solidFill>
                   <a:schemeClr val="tx1">
                     <a:lumMod val="75000"/>
@@ -4117,7 +4117,7 @@
               <a:t> as CTO at WBS in 2018, where it ranked as best start-up in utility tokens category. Later, it received </a:t>
             </a:r>
             <a:r>
-              <a:rPr lang="en-IN" sz="900" u="sng" dirty="0">
+              <a:rPr lang="en-IN" sz="880" u="sng" dirty="0">
                 <a:solidFill>
                   <a:schemeClr val="tx1">
                     <a:lumMod val="75000"/>
@@ -4128,7 +4128,7 @@
               <a:t>UNESCO</a:t>
             </a:r>
             <a:r>
-              <a:rPr lang="en-IN" sz="900" dirty="0">
+              <a:rPr lang="en-IN" sz="880" dirty="0">
                 <a:solidFill>
                   <a:schemeClr val="tx1">
                     <a:lumMod val="75000"/>
@@ -4138,7 +4138,7 @@
               </a:rPr>
               <a:t> award for its innovation in 2022.</a:t>
             </a:r>
-            <a:endParaRPr lang="en-US" sz="900" dirty="0">
+            <a:endParaRPr lang="en-US" sz="880" dirty="0">
               <a:solidFill>
                 <a:schemeClr val="tx1">
                   <a:lumMod val="75000"/>
@@ -4275,7 +4275,7 @@
         </p:nvSpPr>
         <p:spPr>
           <a:xfrm>
-            <a:off x="2721173" y="232785"/>
+            <a:off x="2721173" y="214124"/>
             <a:ext cx="1424188" cy="295305"/>
           </a:xfrm>
           <a:prstGeom prst="roundRect">
@@ -4283,7 +4283,7 @@
           </a:prstGeom>
           <a:solidFill>
             <a:schemeClr val="tx2">
-              <a:lumMod val="75000"/>
+              <a:lumMod val="50000"/>
             </a:schemeClr>
           </a:solidFill>
           <a:ln>
@@ -4294,10 +4294,10 @@
             </a:solidFill>
           </a:ln>
           <a:effectLst>
-            <a:outerShdw blurRad="190500" dist="228600" dir="2700000" algn="ctr">
-              <a:srgbClr val="000000">
-                <a:alpha val="30000"/>
-              </a:srgbClr>
+            <a:outerShdw blurRad="50800" dist="38100" dir="5400000" algn="t" rotWithShape="0">
+              <a:prstClr val="black">
+                <a:alpha val="40000"/>
+              </a:prstClr>
             </a:outerShdw>
           </a:effectLst>
           <a:scene3d>
@@ -4360,7 +4360,7 @@
         </p:nvCxnSpPr>
         <p:spPr>
           <a:xfrm>
-            <a:off x="400309" y="816694"/>
+            <a:off x="400309" y="798033"/>
             <a:ext cx="5987270" cy="0"/>
           </a:xfrm>
           <a:prstGeom prst="line">
@@ -4404,7 +4404,7 @@
         </p:nvSpPr>
         <p:spPr>
           <a:xfrm>
-            <a:off x="400309" y="558166"/>
+            <a:off x="400309" y="539505"/>
             <a:ext cx="893414" cy="246221"/>
           </a:xfrm>
           <a:prstGeom prst="rect">
@@ -4449,7 +4449,7 @@
         </p:nvCxnSpPr>
         <p:spPr>
           <a:xfrm>
-            <a:off x="1267605" y="558166"/>
+            <a:off x="1267605" y="539505"/>
             <a:ext cx="0" cy="246221"/>
           </a:xfrm>
           <a:prstGeom prst="line">
@@ -4485,7 +4485,7 @@
         </p:nvSpPr>
         <p:spPr>
           <a:xfrm>
-            <a:off x="1232483" y="559993"/>
+            <a:off x="1232483" y="541332"/>
             <a:ext cx="1109869" cy="246220"/>
           </a:xfrm>
           <a:prstGeom prst="rect">
@@ -4530,7 +4530,7 @@
         </p:nvCxnSpPr>
         <p:spPr>
           <a:xfrm>
-            <a:off x="2288131" y="558166"/>
+            <a:off x="2288131" y="539505"/>
             <a:ext cx="0" cy="246221"/>
           </a:xfrm>
           <a:prstGeom prst="line">
@@ -4566,7 +4566,7 @@
         </p:nvSpPr>
         <p:spPr>
           <a:xfrm>
-            <a:off x="2258566" y="565554"/>
+            <a:off x="2258566" y="546893"/>
             <a:ext cx="1494965" cy="246221"/>
           </a:xfrm>
           <a:prstGeom prst="rect">
@@ -4611,7 +4611,7 @@
         </p:nvCxnSpPr>
         <p:spPr>
           <a:xfrm>
-            <a:off x="3705504" y="565553"/>
+            <a:off x="3705504" y="546892"/>
             <a:ext cx="0" cy="246221"/>
           </a:xfrm>
           <a:prstGeom prst="line">
@@ -4649,7 +4649,7 @@
         </p:nvCxnSpPr>
         <p:spPr>
           <a:xfrm>
-            <a:off x="4692922" y="558165"/>
+            <a:off x="4692922" y="539504"/>
             <a:ext cx="0" cy="246221"/>
           </a:xfrm>
           <a:prstGeom prst="line">
@@ -4687,7 +4687,7 @@
         </p:nvCxnSpPr>
         <p:spPr>
           <a:xfrm>
-            <a:off x="4145361" y="565553"/>
+            <a:off x="4145361" y="546892"/>
             <a:ext cx="0" cy="246221"/>
           </a:xfrm>
           <a:prstGeom prst="line">
@@ -4723,7 +4723,7 @@
         </p:nvSpPr>
         <p:spPr>
           <a:xfrm>
-            <a:off x="3640753" y="565676"/>
+            <a:off x="3640753" y="547015"/>
             <a:ext cx="563402" cy="246221"/>
           </a:xfrm>
           <a:prstGeom prst="rect">
@@ -4781,7 +4781,7 @@
         </p:nvSpPr>
         <p:spPr>
           <a:xfrm>
-            <a:off x="4630484" y="560454"/>
+            <a:off x="4630484" y="541793"/>
             <a:ext cx="674131" cy="246221"/>
           </a:xfrm>
           <a:prstGeom prst="rect">
@@ -4841,7 +4841,7 @@
         </p:nvCxnSpPr>
         <p:spPr>
           <a:xfrm>
-            <a:off x="5813329" y="558165"/>
+            <a:off x="5813329" y="539504"/>
             <a:ext cx="0" cy="246221"/>
           </a:xfrm>
           <a:prstGeom prst="line">
@@ -4879,7 +4879,7 @@
         </p:nvCxnSpPr>
         <p:spPr>
           <a:xfrm>
-            <a:off x="5238529" y="558165"/>
+            <a:off x="5238529" y="539504"/>
             <a:ext cx="0" cy="246221"/>
           </a:xfrm>
           <a:prstGeom prst="line">
@@ -4915,7 +4915,7 @@
         </p:nvSpPr>
         <p:spPr>
           <a:xfrm>
-            <a:off x="5191572" y="565553"/>
+            <a:off x="5191572" y="546892"/>
             <a:ext cx="674131" cy="246221"/>
           </a:xfrm>
           <a:prstGeom prst="rect">
@@ -4973,7 +4973,7 @@
         </p:nvSpPr>
         <p:spPr>
           <a:xfrm>
-            <a:off x="5713448" y="565553"/>
+            <a:off x="5713448" y="546892"/>
             <a:ext cx="674131" cy="246221"/>
           </a:xfrm>
           <a:prstGeom prst="rect">
@@ -5031,7 +5031,7 @@
         </p:nvSpPr>
         <p:spPr>
           <a:xfrm>
-            <a:off x="4080308" y="567517"/>
+            <a:off x="4080308" y="548856"/>
             <a:ext cx="674131" cy="246221"/>
           </a:xfrm>
           <a:prstGeom prst="rect">
@@ -5091,7 +5091,7 @@
         </p:nvCxnSpPr>
         <p:spPr>
           <a:xfrm>
-            <a:off x="4835179" y="875066"/>
+            <a:off x="4835179" y="856405"/>
             <a:ext cx="7132" cy="1237505"/>
           </a:xfrm>
           <a:prstGeom prst="line">
@@ -5134,7 +5134,7 @@
         </p:nvGrpSpPr>
         <p:grpSpPr>
           <a:xfrm>
-            <a:off x="125869" y="822349"/>
+            <a:off x="125869" y="803688"/>
             <a:ext cx="925662" cy="276999"/>
             <a:chOff x="433905" y="1621603"/>
             <a:chExt cx="925662" cy="276999"/>
@@ -5229,8 +5229,8 @@
         </p:nvSpPr>
         <p:spPr>
           <a:xfrm>
-            <a:off x="70368" y="1051155"/>
-            <a:ext cx="4870359" cy="1050031"/>
+            <a:off x="70368" y="1039932"/>
+            <a:ext cx="4870359" cy="1035155"/>
           </a:xfrm>
           <a:prstGeom prst="rect">
             <a:avLst/>
@@ -5249,7 +5249,7 @@
               </a:lnSpc>
             </a:pPr>
             <a:r>
-              <a:rPr lang="en-US" sz="930" b="0" i="0" dirty="0">
+              <a:rPr lang="en-US" sz="900" b="0" i="0" dirty="0">
                 <a:solidFill>
                   <a:schemeClr val="tx1">
                     <a:lumMod val="75000"/>
@@ -5258,10 +5258,10 @@
                 </a:solidFill>
                 <a:effectLst/>
               </a:rPr>
-              <a:t>I am an Agnostic </a:t>
-            </a:r>
-            <a:r>
-              <a:rPr lang="en-US" sz="930" dirty="0">
+              <a:t>I am a Senior </a:t>
+            </a:r>
+            <a:r>
+              <a:rPr lang="en-US" sz="900" dirty="0">
                 <a:solidFill>
                   <a:schemeClr val="tx1">
                     <a:lumMod val="75000"/>
@@ -5272,7 +5272,7 @@
               <a:t>Software Engineer specialized in Blockchain technology </a:t>
             </a:r>
             <a:r>
-              <a:rPr lang="en-US" sz="930" b="0" i="0" dirty="0">
+              <a:rPr lang="en-US" sz="900" b="0" i="0" dirty="0">
                 <a:solidFill>
                   <a:schemeClr val="tx1">
                     <a:lumMod val="75000"/>
@@ -5281,10 +5281,10 @@
                 </a:solidFill>
                 <a:effectLst/>
               </a:rPr>
-              <a:t>with 8 years of experience as CTO, </a:t>
-            </a:r>
-            <a:r>
-              <a:rPr lang="en-US" sz="930" b="0" i="0" dirty="0" err="1">
+              <a:t>with 10 years of experience as CTO, </a:t>
+            </a:r>
+            <a:r>
+              <a:rPr lang="en-US" sz="900" b="0" i="0" dirty="0" err="1">
                 <a:solidFill>
                   <a:schemeClr val="tx1">
                     <a:lumMod val="75000"/>
@@ -5296,7 +5296,7 @@
               <a:t>HoD</a:t>
             </a:r>
             <a:r>
-              <a:rPr lang="en-US" sz="930" b="0" i="0" dirty="0">
+              <a:rPr lang="en-US" sz="900" b="0" i="0" dirty="0">
                 <a:solidFill>
                   <a:schemeClr val="tx1">
                     <a:lumMod val="75000"/>
@@ -5308,7 +5308,7 @@
               <a:t>, Lead/Senior Blockchain Engineer</a:t>
             </a:r>
             <a:r>
-              <a:rPr lang="en-US" sz="930" dirty="0">
+              <a:rPr lang="en-US" sz="900" dirty="0">
                 <a:solidFill>
                   <a:schemeClr val="tx1">
                     <a:lumMod val="75000"/>
@@ -5319,7 +5319,7 @@
               <a:t> </a:t>
             </a:r>
             <a:r>
-              <a:rPr lang="en-US" sz="930" b="0" i="0" dirty="0">
+              <a:rPr lang="en-US" sz="900" b="0" i="0" dirty="0">
                 <a:solidFill>
                   <a:schemeClr val="tx1">
                     <a:lumMod val="75000"/>
@@ -5331,7 +5331,7 @@
               <a:t>in multiple Web3 startups</a:t>
             </a:r>
             <a:r>
-              <a:rPr lang="en-US" sz="930" dirty="0">
+              <a:rPr lang="en-US" sz="900" dirty="0">
                 <a:solidFill>
                   <a:schemeClr val="tx1">
                     <a:lumMod val="75000"/>
@@ -5342,7 +5342,7 @@
               <a:t>/</a:t>
             </a:r>
             <a:r>
-              <a:rPr lang="en-US" sz="930" b="0" i="0" dirty="0">
+              <a:rPr lang="en-US" sz="900" b="0" i="0" dirty="0">
                 <a:solidFill>
                   <a:schemeClr val="tx1">
                     <a:lumMod val="75000"/>
@@ -5351,21 +5351,21 @@
                 </a:solidFill>
                 <a:effectLst/>
               </a:rPr>
-              <a:t>projects mostly in </a:t>
-            </a:r>
-            <a:r>
-              <a:rPr lang="en-US" sz="930" dirty="0">
-                <a:solidFill>
-                  <a:schemeClr val="tx1">
-                    <a:lumMod val="75000"/>
-                    <a:lumOff val="25000"/>
-                  </a:schemeClr>
-                </a:solidFill>
-              </a:rPr>
-              <a:t>Smart contract &amp; Backend in </a:t>
-            </a:r>
-            <a:r>
-              <a:rPr lang="en-US" sz="930" b="0" i="0" dirty="0">
+              <a:t>projects in </a:t>
+            </a:r>
+            <a:r>
+              <a:rPr lang="en-US" sz="900" dirty="0">
+                <a:solidFill>
+                  <a:schemeClr val="tx1">
+                    <a:lumMod val="75000"/>
+                    <a:lumOff val="25000"/>
+                  </a:schemeClr>
+                </a:solidFill>
+              </a:rPr>
+              <a:t>Smart contract, Protocol &amp; Backend in </a:t>
+            </a:r>
+            <a:r>
+              <a:rPr lang="en-US" sz="900" b="0" i="0" dirty="0">
                 <a:solidFill>
                   <a:schemeClr val="tx1">
                     <a:lumMod val="75000"/>
@@ -5374,10 +5374,34 @@
                 </a:solidFill>
                 <a:effectLst/>
               </a:rPr>
-              <a:t>DeFi, NFT, Gaming, Protocol, etc. I hold development experience in multipl</a:t>
-            </a:r>
-            <a:r>
-              <a:rPr lang="en-US" sz="930" dirty="0">
+              <a:t>DeFi, NFT, Gaming, </a:t>
+            </a:r>
+            <a:r>
+              <a:rPr lang="en-US" sz="900" b="0" i="0" dirty="0" err="1">
+                <a:solidFill>
+                  <a:schemeClr val="tx1">
+                    <a:lumMod val="75000"/>
+                    <a:lumOff val="25000"/>
+                  </a:schemeClr>
+                </a:solidFill>
+                <a:effectLst/>
+              </a:rPr>
+              <a:t>DePIN</a:t>
+            </a:r>
+            <a:r>
+              <a:rPr lang="en-US" sz="900" b="0" i="0" dirty="0">
+                <a:solidFill>
+                  <a:schemeClr val="tx1">
+                    <a:lumMod val="75000"/>
+                    <a:lumOff val="25000"/>
+                  </a:schemeClr>
+                </a:solidFill>
+                <a:effectLst/>
+              </a:rPr>
+              <a:t>, etc. I hold development experience in multipl</a:t>
+            </a:r>
+            <a:r>
+              <a:rPr lang="en-US" sz="900" dirty="0">
                 <a:solidFill>
                   <a:schemeClr val="tx1">
                     <a:lumMod val="75000"/>
@@ -5388,7 +5412,7 @@
               <a:t>e </a:t>
             </a:r>
             <a:r>
-              <a:rPr lang="en-US" sz="930" b="0" i="0" dirty="0">
+              <a:rPr lang="en-US" sz="900" b="0" i="0" dirty="0">
                 <a:solidFill>
                   <a:schemeClr val="tx1">
                     <a:lumMod val="75000"/>
@@ -5400,6 +5424,16 @@
               <a:t>protocols like EVM, EOSIO, Substrate, Solana; contributed in many open-source projects as well.</a:t>
             </a:r>
             <a:endParaRPr lang="en-US" sz="900" dirty="0">
+              <a:solidFill>
+                <a:schemeClr val="tx1">
+                  <a:lumMod val="75000"/>
+                  <a:lumOff val="25000"/>
+                </a:schemeClr>
+              </a:solidFill>
+            </a:endParaRPr>
+          </a:p>
+          <a:p>
+            <a:endParaRPr lang="en-IN" sz="820" dirty="0">
               <a:solidFill>
                 <a:schemeClr val="tx1">
                   <a:lumMod val="75000"/>
@@ -5447,7 +5481,7 @@
         </p:nvCxnSpPr>
         <p:spPr>
           <a:xfrm>
-            <a:off x="0" y="2112571"/>
+            <a:off x="0" y="2093910"/>
             <a:ext cx="6864823" cy="0"/>
           </a:xfrm>
           <a:prstGeom prst="line">
@@ -5490,7 +5524,7 @@
         </p:nvGrpSpPr>
         <p:grpSpPr>
           <a:xfrm>
-            <a:off x="4911596" y="1124492"/>
+            <a:off x="4911596" y="1105831"/>
             <a:ext cx="1091741" cy="276999"/>
             <a:chOff x="5205740" y="1134652"/>
             <a:chExt cx="1091741" cy="276999"/>
@@ -5582,7 +5616,7 @@
         </p:nvSpPr>
         <p:spPr>
           <a:xfrm>
-            <a:off x="4861043" y="1321777"/>
+            <a:off x="4861043" y="1303116"/>
             <a:ext cx="1666508" cy="369332"/>
           </a:xfrm>
           <a:prstGeom prst="rect">
@@ -5629,7 +5663,7 @@
         </p:nvGrpSpPr>
         <p:grpSpPr>
           <a:xfrm>
-            <a:off x="4897051" y="854650"/>
+            <a:off x="4897051" y="835989"/>
             <a:ext cx="1219906" cy="276999"/>
             <a:chOff x="5209870" y="854650"/>
             <a:chExt cx="1219906" cy="276999"/>
@@ -5722,7 +5756,7 @@
         </p:nvSpPr>
         <p:spPr>
           <a:xfrm>
-            <a:off x="6256867" y="879072"/>
+            <a:off x="6256867" y="860411"/>
             <a:ext cx="603766" cy="230832"/>
           </a:xfrm>
           <a:prstGeom prst="rect">
@@ -5738,7 +5772,7 @@
           <a:p>
             <a:r>
               <a:rPr lang="en-US" sz="900" b="1" dirty="0"/>
-              <a:t>9 </a:t>
+              <a:t>10 </a:t>
             </a:r>
             <a:r>
               <a:rPr lang="en-US" sz="900" dirty="0"/>
@@ -5763,7 +5797,7 @@
         </p:nvCxnSpPr>
         <p:spPr>
           <a:xfrm flipV="1">
-            <a:off x="4837174" y="1124492"/>
+            <a:off x="4837174" y="1105831"/>
             <a:ext cx="2020826" cy="15305"/>
           </a:xfrm>
           <a:prstGeom prst="line">
@@ -5806,7 +5840,7 @@
         </p:nvGrpSpPr>
         <p:grpSpPr>
           <a:xfrm>
-            <a:off x="126723" y="3682818"/>
+            <a:off x="126723" y="3627230"/>
             <a:ext cx="1502200" cy="292388"/>
             <a:chOff x="4141297" y="2671400"/>
             <a:chExt cx="1502200" cy="292388"/>
@@ -5902,17 +5936,17 @@
         </p:nvSpPr>
         <p:spPr>
           <a:xfrm>
-            <a:off x="88190" y="7821454"/>
-            <a:ext cx="6657120" cy="1648849"/>
+            <a:off x="88190" y="8313796"/>
+            <a:ext cx="6657120" cy="1536639"/>
           </a:xfrm>
           <a:prstGeom prst="rect">
             <a:avLst/>
           </a:prstGeom>
           <a:noFill/>
-          <a:ln>
+          <a:ln w="6350">
             <a:solidFill>
-              <a:schemeClr val="tx2">
-                <a:lumMod val="75000"/>
+              <a:schemeClr val="bg1">
+                <a:lumMod val="65000"/>
               </a:schemeClr>
             </a:solidFill>
           </a:ln>
@@ -5995,7 +6029,7 @@
           <a:p>
             <a:pPr marL="171450" indent="-171450">
               <a:lnSpc>
-                <a:spcPts val="1238"/>
+                <a:spcPts val="1138"/>
               </a:lnSpc>
               <a:buFont typeface="Arial" panose="020B0604020202020204" pitchFamily="34" charset="0"/>
               <a:buChar char="•"/>
@@ -6081,7 +6115,7 @@
           <a:p>
             <a:pPr marL="171450" indent="-171450">
               <a:lnSpc>
-                <a:spcPts val="1238"/>
+                <a:spcPts val="1138"/>
               </a:lnSpc>
               <a:buFont typeface="Arial" panose="020B0604020202020204" pitchFamily="34" charset="0"/>
               <a:buChar char="•"/>
@@ -6123,7 +6157,7 @@
           <a:p>
             <a:pPr marL="171450" indent="-171450">
               <a:lnSpc>
-                <a:spcPts val="1238"/>
+                <a:spcPts val="1138"/>
               </a:lnSpc>
               <a:buFont typeface="Arial" panose="020B0604020202020204" pitchFamily="34" charset="0"/>
               <a:buChar char="•"/>
@@ -6209,7 +6243,7 @@
           <a:p>
             <a:pPr marL="171450" indent="-171450">
               <a:lnSpc>
-                <a:spcPts val="1238"/>
+                <a:spcPts val="1138"/>
               </a:lnSpc>
               <a:buFont typeface="Arial" panose="020B0604020202020204" pitchFamily="34" charset="0"/>
               <a:buChar char="•"/>
@@ -6273,7 +6307,7 @@
           <a:p>
             <a:pPr marL="171450" indent="-171450">
               <a:lnSpc>
-                <a:spcPts val="1238"/>
+                <a:spcPts val="1138"/>
               </a:lnSpc>
               <a:buFont typeface="Arial" panose="020B0604020202020204" pitchFamily="34" charset="0"/>
               <a:buChar char="•"/>
@@ -6293,7 +6327,7 @@
           <a:p>
             <a:pPr marL="171450" indent="-171450">
               <a:lnSpc>
-                <a:spcPts val="1238"/>
+                <a:spcPts val="1138"/>
               </a:lnSpc>
               <a:buFont typeface="Arial" panose="020B0604020202020204" pitchFamily="34" charset="0"/>
               <a:buChar char="•"/>
@@ -6370,7 +6404,7 @@
           <a:p>
             <a:pPr marL="171450" indent="-171450">
               <a:lnSpc>
-                <a:spcPts val="1238"/>
+                <a:spcPts val="1138"/>
               </a:lnSpc>
               <a:buFont typeface="Arial" panose="020B0604020202020204" pitchFamily="34" charset="0"/>
               <a:buChar char="•"/>
@@ -6447,17 +6481,17 @@
         </p:nvSpPr>
         <p:spPr>
           <a:xfrm>
-            <a:off x="88190" y="5379172"/>
-            <a:ext cx="6657120" cy="1494961"/>
+            <a:off x="88190" y="6034837"/>
+            <a:ext cx="6657120" cy="1395575"/>
           </a:xfrm>
           <a:prstGeom prst="rect">
             <a:avLst/>
           </a:prstGeom>
           <a:noFill/>
-          <a:ln>
+          <a:ln w="6350">
             <a:solidFill>
-              <a:schemeClr val="tx2">
-                <a:lumMod val="75000"/>
+              <a:schemeClr val="bg1">
+                <a:lumMod val="65000"/>
               </a:schemeClr>
             </a:solidFill>
           </a:ln>
@@ -6510,7 +6544,7 @@
           <a:p>
             <a:pPr marL="171450" indent="-171450">
               <a:lnSpc>
-                <a:spcPts val="1238"/>
+                <a:spcPts val="1138"/>
               </a:lnSpc>
               <a:buFont typeface="Arial" panose="020B0604020202020204" pitchFamily="34" charset="0"/>
               <a:buChar char="•"/>
@@ -6563,7 +6597,7 @@
           <a:p>
             <a:pPr marL="171450" indent="-171450">
               <a:lnSpc>
-                <a:spcPts val="1238"/>
+                <a:spcPts val="1138"/>
               </a:lnSpc>
               <a:buFont typeface="Arial" panose="020B0604020202020204" pitchFamily="34" charset="0"/>
               <a:buChar char="•"/>
@@ -6649,7 +6683,7 @@
           <a:p>
             <a:pPr marL="171450" indent="-171450">
               <a:lnSpc>
-                <a:spcPts val="1238"/>
+                <a:spcPts val="1138"/>
               </a:lnSpc>
               <a:buFont typeface="Arial" panose="020B0604020202020204" pitchFamily="34" charset="0"/>
               <a:buChar char="•"/>
@@ -6691,7 +6725,7 @@
           <a:p>
             <a:pPr marL="171450" indent="-171450">
               <a:lnSpc>
-                <a:spcPts val="1238"/>
+                <a:spcPts val="1138"/>
               </a:lnSpc>
               <a:buFont typeface="Arial" panose="020B0604020202020204" pitchFamily="34" charset="0"/>
               <a:buChar char="•"/>
@@ -6733,7 +6767,7 @@
           <a:p>
             <a:pPr marL="171450" indent="-171450">
               <a:lnSpc>
-                <a:spcPts val="1238"/>
+                <a:spcPts val="1138"/>
               </a:lnSpc>
               <a:buFont typeface="Arial" panose="020B0604020202020204" pitchFamily="34" charset="0"/>
               <a:buChar char="•"/>
@@ -6764,7 +6798,7 @@
           <a:p>
             <a:pPr marL="171450" indent="-171450">
               <a:lnSpc>
-                <a:spcPts val="1238"/>
+                <a:spcPts val="1138"/>
               </a:lnSpc>
               <a:buFont typeface="Arial" panose="020B0604020202020204" pitchFamily="34" charset="0"/>
               <a:buChar char="•"/>
@@ -6830,7 +6864,7 @@
         </p:nvGrpSpPr>
         <p:grpSpPr>
           <a:xfrm>
-            <a:off x="103342" y="2118190"/>
+            <a:off x="103342" y="2099529"/>
             <a:ext cx="2552737" cy="292388"/>
             <a:chOff x="183939" y="4975856"/>
             <a:chExt cx="2552737" cy="292388"/>
@@ -6924,7 +6958,7 @@
         </p:nvCxnSpPr>
         <p:spPr>
           <a:xfrm flipV="1">
-            <a:off x="4843997" y="1667045"/>
+            <a:off x="4843997" y="1648384"/>
             <a:ext cx="2020826" cy="1"/>
           </a:xfrm>
           <a:prstGeom prst="line">
@@ -6981,7 +7015,7 @@
         </p:blipFill>
         <p:spPr>
           <a:xfrm>
-            <a:off x="4963319" y="1696781"/>
+            <a:off x="4963319" y="1678120"/>
             <a:ext cx="172388" cy="172388"/>
           </a:xfrm>
           <a:prstGeom prst="rect">
@@ -7003,7 +7037,7 @@
         </p:nvSpPr>
         <p:spPr>
           <a:xfrm>
-            <a:off x="5068143" y="1658150"/>
+            <a:off x="5068143" y="1639489"/>
             <a:ext cx="1543764" cy="276999"/>
           </a:xfrm>
           <a:prstGeom prst="rect">
@@ -7038,7 +7072,7 @@
         </p:nvSpPr>
         <p:spPr>
           <a:xfrm>
-            <a:off x="4826952" y="1873201"/>
+            <a:off x="4826952" y="1854540"/>
             <a:ext cx="2069177" cy="230832"/>
           </a:xfrm>
           <a:prstGeom prst="rect">
@@ -7082,7 +7116,7 @@
         </p:nvCxnSpPr>
         <p:spPr>
           <a:xfrm>
-            <a:off x="85726" y="1822556"/>
+            <a:off x="85726" y="1786803"/>
             <a:ext cx="0" cy="221446"/>
           </a:xfrm>
           <a:prstGeom prst="line">
@@ -7125,17 +7159,17 @@
         </p:nvSpPr>
         <p:spPr>
           <a:xfrm>
-            <a:off x="88190" y="6919064"/>
-            <a:ext cx="6657120" cy="879408"/>
+            <a:off x="88190" y="7455080"/>
+            <a:ext cx="6657120" cy="831318"/>
           </a:xfrm>
           <a:prstGeom prst="rect">
             <a:avLst/>
           </a:prstGeom>
           <a:noFill/>
-          <a:ln>
+          <a:ln w="6350">
             <a:solidFill>
-              <a:schemeClr val="tx2">
-                <a:lumMod val="75000"/>
+              <a:schemeClr val="bg1">
+                <a:lumMod val="65000"/>
               </a:schemeClr>
             </a:solidFill>
           </a:ln>
@@ -7166,7 +7200,7 @@
           <a:p>
             <a:pPr marL="171450" indent="-171450">
               <a:lnSpc>
-                <a:spcPts val="1238"/>
+                <a:spcPts val="1138"/>
               </a:lnSpc>
               <a:buFont typeface="Arial" panose="020B0604020202020204" pitchFamily="34" charset="0"/>
               <a:buChar char="•"/>
@@ -7208,7 +7242,7 @@
           <a:p>
             <a:pPr marL="171450" indent="-171450">
               <a:lnSpc>
-                <a:spcPts val="1238"/>
+                <a:spcPts val="1138"/>
               </a:lnSpc>
               <a:buFont typeface="Arial" panose="020B0604020202020204" pitchFamily="34" charset="0"/>
               <a:buChar char="•"/>
@@ -7257,7 +7291,7 @@
           <a:p>
             <a:pPr marL="171450" indent="-171450">
               <a:lnSpc>
-                <a:spcPts val="1238"/>
+                <a:spcPts val="1138"/>
               </a:lnSpc>
               <a:buFont typeface="Arial" panose="020B0604020202020204" pitchFamily="34" charset="0"/>
               <a:buChar char="•"/>
@@ -7299,7 +7333,7 @@
           <a:p>
             <a:pPr marL="171450" indent="-171450">
               <a:lnSpc>
-                <a:spcPts val="1238"/>
+                <a:spcPts val="1138"/>
               </a:lnSpc>
               <a:buFont typeface="Arial" panose="020B0604020202020204" pitchFamily="34" charset="0"/>
               <a:buChar char="•"/>
@@ -7376,17 +7410,17 @@
         </p:nvSpPr>
         <p:spPr>
           <a:xfrm>
-            <a:off x="87378" y="4003372"/>
-            <a:ext cx="6657120" cy="1334661"/>
+            <a:off x="87378" y="3911213"/>
+            <a:ext cx="6657120" cy="2100896"/>
           </a:xfrm>
           <a:prstGeom prst="rect">
             <a:avLst/>
           </a:prstGeom>
           <a:noFill/>
-          <a:ln>
+          <a:ln w="6350">
             <a:solidFill>
-              <a:schemeClr val="tx2">
-                <a:lumMod val="75000"/>
+              <a:schemeClr val="bg1">
+                <a:lumMod val="65000"/>
               </a:schemeClr>
             </a:solidFill>
           </a:ln>
@@ -7411,13 +7445,13 @@
                   </a:schemeClr>
                 </a:solidFill>
               </a:rPr>
-              <a:t>Aug 2024 — Present | UniFi</a:t>
-            </a:r>
-          </a:p>
-          <a:p>
-            <a:pPr marL="171450" indent="-171450">
+              <a:t>Aug 2024 – Present | Founder @ UniFi — The Gasless Payment rail for Stablecoins</a:t>
+            </a:r>
+          </a:p>
+          <a:p>
+            <a:pPr marL="135450" indent="-171450">
               <a:lnSpc>
-                <a:spcPts val="1440"/>
+                <a:spcPts val="1140"/>
               </a:lnSpc>
               <a:buFont typeface="Arial" panose="020B0604020202020204" pitchFamily="34" charset="0"/>
               <a:buChar char="•"/>
@@ -7431,7 +7465,7 @@
                   </a:schemeClr>
                 </a:solidFill>
               </a:rPr>
-              <a:t>Researched &amp; developed a novel highly scalable EVM Gasless Engine lowering on-chain fees by upto ↓</a:t>
+              <a:t>Researched &amp; developed a novel highly scalable </a:t>
             </a:r>
             <a:r>
               <a:rPr lang="en-US" sz="900" u="sng" dirty="0">
@@ -7442,6 +7476,28 @@
                   </a:schemeClr>
                 </a:solidFill>
               </a:rPr>
+              <a:t>EVM Gasless Execution Engine </a:t>
+            </a:r>
+            <a:r>
+              <a:rPr lang="en-US" sz="900" dirty="0">
+                <a:solidFill>
+                  <a:schemeClr val="tx1">
+                    <a:lumMod val="75000"/>
+                    <a:lumOff val="25000"/>
+                  </a:schemeClr>
+                </a:solidFill>
+              </a:rPr>
+              <a:t>lowering on-chain fees by upto ↓</a:t>
+            </a:r>
+            <a:r>
+              <a:rPr lang="en-US" sz="900" u="sng" dirty="0">
+                <a:solidFill>
+                  <a:schemeClr val="tx1">
+                    <a:lumMod val="75000"/>
+                    <a:lumOff val="25000"/>
+                  </a:schemeClr>
+                </a:solidFill>
+              </a:rPr>
               <a:t>84%</a:t>
             </a:r>
             <a:r>
@@ -7453,13 +7509,35 @@
                   </a:schemeClr>
                 </a:solidFill>
               </a:rPr>
-              <a:t> supporting both custodial/non-custodial wallets. | Rust, Solidity.</a:t>
-            </a:r>
-          </a:p>
-          <a:p>
-            <a:pPr marL="171450" indent="-171450">
+              <a:t> supporting both custodial/non-custodial wallets, keeping assets on L1 with no asset migration, instant finality. | Rust, Solidity, MongoDB, Redis, </a:t>
+            </a:r>
+            <a:r>
+              <a:rPr lang="en-US" sz="900" dirty="0" err="1">
+                <a:solidFill>
+                  <a:schemeClr val="tx1">
+                    <a:lumMod val="75000"/>
+                    <a:lumOff val="25000"/>
+                  </a:schemeClr>
+                </a:solidFill>
+              </a:rPr>
+              <a:t>PubSub</a:t>
+            </a:r>
+            <a:r>
+              <a:rPr lang="en-US" sz="900" dirty="0">
+                <a:solidFill>
+                  <a:schemeClr val="tx1">
+                    <a:lumMod val="75000"/>
+                    <a:lumOff val="25000"/>
+                  </a:schemeClr>
+                </a:solidFill>
+              </a:rPr>
+              <a:t>.</a:t>
+            </a:r>
+          </a:p>
+          <a:p>
+            <a:pPr marL="135450" indent="-171450">
               <a:lnSpc>
-                <a:spcPts val="1440"/>
+                <a:spcPts val="1140"/>
               </a:lnSpc>
               <a:buFont typeface="Arial" panose="020B0604020202020204" pitchFamily="34" charset="0"/>
               <a:buChar char="•"/>
@@ -7473,7 +7551,7 @@
                   </a:schemeClr>
                 </a:solidFill>
               </a:rPr>
-              <a:t>Built a modern, beautiful, responsive UI-based WASM web app with Tailwind. | (</a:t>
+              <a:t>Building a permissionless gas </a:t>
             </a:r>
             <a:r>
               <a:rPr lang="en-US" sz="900" dirty="0" err="1">
@@ -7484,7 +7562,7 @@
                   </a:schemeClr>
                 </a:solidFill>
               </a:rPr>
-              <a:t>Dioxus</a:t>
+              <a:t>relayer</a:t>
             </a:r>
             <a:r>
               <a:rPr lang="en-US" sz="900" dirty="0">
@@ -7495,58 +7573,242 @@
                   </a:schemeClr>
                 </a:solidFill>
               </a:rPr>
-              <a:t>) Rust, CSS.</a:t>
-            </a:r>
-          </a:p>
-          <a:p>
-            <a:pPr marL="171450" indent="-171450">
+              <a:t> network — “Pulse” (on top of </a:t>
+            </a:r>
+            <a:r>
+              <a:rPr lang="en-US" sz="900" i="1" dirty="0">
+                <a:solidFill>
+                  <a:schemeClr val="tx1">
+                    <a:lumMod val="75000"/>
+                    <a:lumOff val="25000"/>
+                  </a:schemeClr>
+                </a:solidFill>
+              </a:rPr>
+              <a:t>Reth)</a:t>
+            </a:r>
+            <a:r>
+              <a:rPr lang="en-US" sz="900" dirty="0">
+                <a:solidFill>
+                  <a:schemeClr val="tx1">
+                    <a:lumMod val="75000"/>
+                    <a:lumOff val="25000"/>
+                  </a:schemeClr>
+                </a:solidFill>
+              </a:rPr>
+              <a:t> for routing payments from sequencer to chain| Rust.</a:t>
+            </a:r>
+          </a:p>
+          <a:p>
+            <a:pPr marL="135450" indent="-171450">
               <a:lnSpc>
-                <a:spcPts val="1440"/>
+                <a:spcPts val="1140"/>
               </a:lnSpc>
               <a:buFont typeface="Arial" panose="020B0604020202020204" pitchFamily="34" charset="0"/>
               <a:buChar char="•"/>
             </a:pPr>
             <a:r>
-              <a:rPr lang="en-IN" sz="900" dirty="0">
-                <a:solidFill>
-                  <a:schemeClr val="tx1">
-                    <a:lumMod val="75000"/>
-                    <a:lumOff val="25000"/>
-                  </a:schemeClr>
-                </a:solidFill>
-              </a:rPr>
-              <a:t>Built a secure OTP system ensuring unique 6-digit codes within the 1M space using efficient allocation and expiry handling. | Rust.</a:t>
-            </a:r>
-          </a:p>
-          <a:p>
-            <a:pPr marL="171450" indent="-171450">
+              <a:rPr lang="en-US" sz="900" dirty="0">
+                <a:solidFill>
+                  <a:schemeClr val="tx1">
+                    <a:lumMod val="75000"/>
+                    <a:lumOff val="25000"/>
+                  </a:schemeClr>
+                </a:solidFill>
+              </a:rPr>
+              <a:t>Developed &amp; deployed a secure, gas-optimized </a:t>
+            </a:r>
+            <a:r>
+              <a:rPr lang="en-US" sz="900" dirty="0" err="1">
+                <a:solidFill>
+                  <a:schemeClr val="tx1">
+                    <a:lumMod val="75000"/>
+                    <a:lumOff val="25000"/>
+                  </a:schemeClr>
+                </a:solidFill>
+              </a:rPr>
+              <a:t>BundlePay</a:t>
+            </a:r>
+            <a:r>
+              <a:rPr lang="en-US" sz="900" dirty="0">
+                <a:solidFill>
+                  <a:schemeClr val="tx1">
+                    <a:lumMod val="75000"/>
+                    <a:lumOff val="25000"/>
+                  </a:schemeClr>
+                </a:solidFill>
+              </a:rPr>
+              <a:t> smart contract (with tests) for handling payments from custodial &amp; non-custodial wallets | Foundry, Solidity.</a:t>
+            </a:r>
+          </a:p>
+          <a:p>
+            <a:pPr marL="135450" indent="-171450">
               <a:lnSpc>
-                <a:spcPts val="1440"/>
+                <a:spcPts val="1140"/>
               </a:lnSpc>
               <a:buFont typeface="Arial" panose="020B0604020202020204" pitchFamily="34" charset="0"/>
               <a:buChar char="•"/>
             </a:pPr>
             <a:r>
-              <a:rPr lang="en-US" sz="900" dirty="0">
-                <a:solidFill>
-                  <a:schemeClr val="tx1">
-                    <a:lumMod val="75000"/>
-                    <a:lumOff val="25000"/>
-                  </a:schemeClr>
-                </a:solidFill>
-              </a:rPr>
-              <a:t>Developed &amp; deployed the Backend with API, Proxy servers (in Axum, ..); native modules — Auth, Payment, Wallet, Support. | Rust.</a:t>
-            </a:r>
-          </a:p>
-          <a:p>
-            <a:pPr marL="171450" indent="-171450">
+              <a:rPr lang="en-IN" sz="900" dirty="0">
+                <a:solidFill>
+                  <a:schemeClr val="tx1">
+                    <a:lumMod val="75000"/>
+                    <a:lumOff val="25000"/>
+                  </a:schemeClr>
+                </a:solidFill>
+              </a:rPr>
+              <a:t>Built a secure custodial </a:t>
+            </a:r>
+            <a:r>
+              <a:rPr lang="en-IN" sz="900" u="sng" dirty="0">
+                <a:solidFill>
+                  <a:schemeClr val="tx1">
+                    <a:lumMod val="75000"/>
+                    <a:lumOff val="25000"/>
+                  </a:schemeClr>
+                </a:solidFill>
+              </a:rPr>
+              <a:t>wallet architecture</a:t>
+            </a:r>
+            <a:r>
+              <a:rPr lang="en-IN" sz="900" dirty="0">
+                <a:solidFill>
+                  <a:schemeClr val="tx1">
+                    <a:lumMod val="75000"/>
+                    <a:lumOff val="25000"/>
+                  </a:schemeClr>
+                </a:solidFill>
+              </a:rPr>
+              <a:t> with HD key derivation from a master seed, per-user derivation paths, custom key rotation, and decoupled encrypted key storage with obfuscation | Rust.</a:t>
+            </a:r>
+          </a:p>
+          <a:p>
+            <a:pPr marL="135450" indent="-171450">
               <a:lnSpc>
-                <a:spcPts val="1440"/>
+                <a:spcPts val="1140"/>
               </a:lnSpc>
               <a:buFont typeface="Arial" panose="020B0604020202020204" pitchFamily="34" charset="0"/>
               <a:buChar char="•"/>
             </a:pPr>
             <a:r>
+              <a:rPr lang="en-IN" sz="900" dirty="0">
+                <a:solidFill>
+                  <a:schemeClr val="tx1">
+                    <a:lumMod val="75000"/>
+                    <a:lumOff val="25000"/>
+                  </a:schemeClr>
+                </a:solidFill>
+              </a:rPr>
+              <a:t>Built a Docker-based CI/CD pipeline to deploy infrastructure seamlessly across ARM and x86 (Intel) environments.</a:t>
+            </a:r>
+          </a:p>
+          <a:p>
+            <a:pPr marL="135450" indent="-171450">
+              <a:lnSpc>
+                <a:spcPts val="1140"/>
+              </a:lnSpc>
+              <a:buFont typeface="Arial" panose="020B0604020202020204" pitchFamily="34" charset="0"/>
+              <a:buChar char="•"/>
+            </a:pPr>
+            <a:r>
+              <a:rPr lang="en-IN" sz="900" dirty="0">
+                <a:solidFill>
+                  <a:schemeClr val="tx1">
+                    <a:lumMod val="75000"/>
+                    <a:lumOff val="25000"/>
+                  </a:schemeClr>
+                </a:solidFill>
+              </a:rPr>
+              <a:t>Built a scalable API-</a:t>
+            </a:r>
+            <a:r>
+              <a:rPr lang="en-IN" sz="900" dirty="0" err="1">
+                <a:solidFill>
+                  <a:schemeClr val="tx1">
+                    <a:lumMod val="75000"/>
+                    <a:lumOff val="25000"/>
+                  </a:schemeClr>
+                </a:solidFill>
+              </a:rPr>
+              <a:t>aaS</a:t>
+            </a:r>
+            <a:r>
+              <a:rPr lang="en-IN" sz="900" dirty="0">
+                <a:solidFill>
+                  <a:schemeClr val="tx1">
+                    <a:lumMod val="75000"/>
+                    <a:lumOff val="25000"/>
+                  </a:schemeClr>
+                </a:solidFill>
+              </a:rPr>
+              <a:t> for builders to access low-cost gasless payment infra, auth, wallet, ... Released </a:t>
+            </a:r>
+            <a:r>
+              <a:rPr lang="en-IN" sz="900" dirty="0">
+                <a:solidFill>
+                  <a:schemeClr val="tx1">
+                    <a:lumMod val="75000"/>
+                    <a:lumOff val="25000"/>
+                  </a:schemeClr>
+                </a:solidFill>
+                <a:hlinkClick r:id="rId33"/>
+              </a:rPr>
+              <a:t>developer-kit</a:t>
+            </a:r>
+            <a:r>
+              <a:rPr lang="en-IN" sz="900" dirty="0">
+                <a:solidFill>
+                  <a:schemeClr val="tx1">
+                    <a:lumMod val="75000"/>
+                    <a:lumOff val="25000"/>
+                  </a:schemeClr>
+                </a:solidFill>
+              </a:rPr>
+              <a:t> | Rust.</a:t>
+            </a:r>
+          </a:p>
+          <a:p>
+            <a:pPr marL="135450" indent="-171450">
+              <a:lnSpc>
+                <a:spcPts val="1140"/>
+              </a:lnSpc>
+              <a:buFont typeface="Arial" panose="020B0604020202020204" pitchFamily="34" charset="0"/>
+              <a:buChar char="•"/>
+            </a:pPr>
+            <a:r>
+              <a:rPr lang="en-IN" sz="900" dirty="0">
+                <a:solidFill>
+                  <a:schemeClr val="tx1">
+                    <a:lumMod val="75000"/>
+                    <a:lumOff val="25000"/>
+                  </a:schemeClr>
+                </a:solidFill>
+              </a:rPr>
+              <a:t>Designed and developed a modern, high-performance </a:t>
+            </a:r>
+            <a:r>
+              <a:rPr lang="en-IN" sz="900" u="sng" dirty="0">
+                <a:solidFill>
+                  <a:schemeClr val="tx1">
+                    <a:lumMod val="75000"/>
+                    <a:lumOff val="25000"/>
+                  </a:schemeClr>
+                </a:solidFill>
+              </a:rPr>
+              <a:t>WASM web app</a:t>
+            </a:r>
+            <a:r>
+              <a:rPr lang="en-IN" sz="900" dirty="0">
+                <a:solidFill>
+                  <a:schemeClr val="tx1">
+                    <a:lumMod val="75000"/>
+                    <a:lumOff val="25000"/>
+                  </a:schemeClr>
+                </a:solidFill>
+              </a:rPr>
+              <a:t> with a clean, responsive UI using Tailwind CSS &amp; </a:t>
+            </a:r>
+            <a:r>
               <a:rPr lang="en-US" sz="900" dirty="0">
                 <a:solidFill>
                   <a:schemeClr val="tx1">
@@ -7555,7 +7817,133 @@
                   </a:schemeClr>
                 </a:solidFill>
               </a:rPr>
-              <a:t>Built the interactive Telegram Bot with integrated mini-app. | Rust.</a:t>
+              <a:t>(</a:t>
+            </a:r>
+            <a:r>
+              <a:rPr lang="en-US" sz="900" dirty="0" err="1">
+                <a:solidFill>
+                  <a:schemeClr val="tx1">
+                    <a:lumMod val="75000"/>
+                    <a:lumOff val="25000"/>
+                  </a:schemeClr>
+                </a:solidFill>
+              </a:rPr>
+              <a:t>Dioxus</a:t>
+            </a:r>
+            <a:r>
+              <a:rPr lang="en-US" sz="900" dirty="0">
+                <a:solidFill>
+                  <a:schemeClr val="tx1">
+                    <a:lumMod val="75000"/>
+                    <a:lumOff val="25000"/>
+                  </a:schemeClr>
+                </a:solidFill>
+              </a:rPr>
+              <a:t>) Rust.</a:t>
+            </a:r>
+          </a:p>
+          <a:p>
+            <a:pPr marL="135450" indent="-171450">
+              <a:lnSpc>
+                <a:spcPts val="1140"/>
+              </a:lnSpc>
+              <a:buFont typeface="Arial" panose="020B0604020202020204" pitchFamily="34" charset="0"/>
+              <a:buChar char="•"/>
+            </a:pPr>
+            <a:r>
+              <a:rPr lang="en-IN" sz="900" dirty="0">
+                <a:solidFill>
+                  <a:schemeClr val="tx1">
+                    <a:lumMod val="75000"/>
+                    <a:lumOff val="25000"/>
+                  </a:schemeClr>
+                </a:solidFill>
+              </a:rPr>
+              <a:t>Built a native Auth module with secure OTP generation, 2FA setup, and JWT-based access control | Rust.</a:t>
+            </a:r>
+          </a:p>
+          <a:p>
+            <a:pPr marL="135450" indent="-171450">
+              <a:lnSpc>
+                <a:spcPts val="1140"/>
+              </a:lnSpc>
+              <a:buFont typeface="Arial" panose="020B0604020202020204" pitchFamily="34" charset="0"/>
+              <a:buChar char="•"/>
+            </a:pPr>
+            <a:r>
+              <a:rPr lang="en-US" sz="900" dirty="0">
+                <a:solidFill>
+                  <a:schemeClr val="tx1">
+                    <a:lumMod val="75000"/>
+                    <a:lumOff val="25000"/>
+                  </a:schemeClr>
+                </a:solidFill>
+              </a:rPr>
+              <a:t>Developed &amp; deployed the </a:t>
+            </a:r>
+            <a:r>
+              <a:rPr lang="en-US" sz="900" u="sng" dirty="0">
+                <a:solidFill>
+                  <a:schemeClr val="tx1">
+                    <a:lumMod val="75000"/>
+                    <a:lumOff val="25000"/>
+                  </a:schemeClr>
+                </a:solidFill>
+              </a:rPr>
+              <a:t>Backend with API, Proxy servers </a:t>
+            </a:r>
+            <a:r>
+              <a:rPr lang="en-US" sz="900" dirty="0">
+                <a:solidFill>
+                  <a:schemeClr val="tx1">
+                    <a:lumMod val="75000"/>
+                    <a:lumOff val="25000"/>
+                  </a:schemeClr>
+                </a:solidFill>
+              </a:rPr>
+              <a:t>(in Axum, ..); native modules — Auth, Payment, Wallet, Support. | Rust.</a:t>
+            </a:r>
+          </a:p>
+          <a:p>
+            <a:pPr marL="135450" indent="-171450">
+              <a:lnSpc>
+                <a:spcPts val="1140"/>
+              </a:lnSpc>
+              <a:buFont typeface="Arial" panose="020B0604020202020204" pitchFamily="34" charset="0"/>
+              <a:buChar char="•"/>
+            </a:pPr>
+            <a:r>
+              <a:rPr lang="en-US" sz="900" dirty="0">
+                <a:solidFill>
+                  <a:schemeClr val="tx1">
+                    <a:lumMod val="75000"/>
+                    <a:lumOff val="25000"/>
+                  </a:schemeClr>
+                </a:solidFill>
+              </a:rPr>
+              <a:t>Built the interactive </a:t>
+            </a:r>
+            <a:r>
+              <a:rPr lang="en-US" sz="900" u="sng" dirty="0">
+                <a:solidFill>
+                  <a:schemeClr val="tx1">
+                    <a:lumMod val="75000"/>
+                    <a:lumOff val="25000"/>
+                  </a:schemeClr>
+                </a:solidFill>
+              </a:rPr>
+              <a:t>Telegram Bot</a:t>
+            </a:r>
+            <a:r>
+              <a:rPr lang="en-US" sz="900" dirty="0">
+                <a:solidFill>
+                  <a:schemeClr val="tx1">
+                    <a:lumMod val="75000"/>
+                    <a:lumOff val="25000"/>
+                  </a:schemeClr>
+                </a:solidFill>
+              </a:rPr>
+              <a:t> with integrated mini-app. | Rust.</a:t>
             </a:r>
           </a:p>
         </p:txBody>
@@ -7576,7 +7964,7 @@
         </p:nvCxnSpPr>
         <p:spPr>
           <a:xfrm>
-            <a:off x="11442" y="3662056"/>
+            <a:off x="11442" y="3596741"/>
             <a:ext cx="6884696" cy="0"/>
           </a:xfrm>
           <a:prstGeom prst="line">
@@ -7649,17 +8037,17 @@
         </p:nvSpPr>
         <p:spPr>
           <a:xfrm>
-            <a:off x="100440" y="7859338"/>
-            <a:ext cx="6657120" cy="1212833"/>
+            <a:off x="100440" y="7562918"/>
+            <a:ext cx="6657120" cy="1139094"/>
           </a:xfrm>
           <a:prstGeom prst="rect">
             <a:avLst/>
           </a:prstGeom>
           <a:noFill/>
-          <a:ln>
+          <a:ln w="6350">
             <a:solidFill>
-              <a:schemeClr val="tx2">
-                <a:lumMod val="50000"/>
+              <a:schemeClr val="bg1">
+                <a:lumMod val="65000"/>
               </a:schemeClr>
             </a:solidFill>
           </a:ln>
@@ -7712,7 +8100,7 @@
           <a:p>
             <a:pPr marL="171450" indent="-171450">
               <a:lnSpc>
-                <a:spcPts val="1238"/>
+                <a:spcPts val="1138"/>
               </a:lnSpc>
               <a:spcAft>
                 <a:spcPts val="125"/>
@@ -7757,7 +8145,7 @@
           <a:p>
             <a:pPr marL="171450" indent="-171450">
               <a:lnSpc>
-                <a:spcPts val="1238"/>
+                <a:spcPts val="1138"/>
               </a:lnSpc>
               <a:spcAft>
                 <a:spcPts val="125"/>
@@ -7802,7 +8190,7 @@
           <a:p>
             <a:pPr marL="171450" indent="-171450">
               <a:lnSpc>
-                <a:spcPts val="1238"/>
+                <a:spcPts val="1138"/>
               </a:lnSpc>
               <a:spcAft>
                 <a:spcPts val="125"/>
@@ -7857,17 +8245,17 @@
         </p:nvSpPr>
         <p:spPr>
           <a:xfrm>
-            <a:off x="100440" y="6810059"/>
-            <a:ext cx="6657120" cy="1007648"/>
+            <a:off x="100440" y="6592687"/>
+            <a:ext cx="6657120" cy="946734"/>
           </a:xfrm>
           <a:prstGeom prst="rect">
             <a:avLst/>
           </a:prstGeom>
           <a:noFill/>
-          <a:ln>
+          <a:ln w="6350">
             <a:solidFill>
-              <a:schemeClr val="tx2">
-                <a:lumMod val="75000"/>
+              <a:schemeClr val="bg1">
+                <a:lumMod val="65000"/>
               </a:schemeClr>
             </a:solidFill>
           </a:ln>
@@ -7920,7 +8308,7 @@
           <a:p>
             <a:pPr marL="171450" indent="-171450" algn="l">
               <a:lnSpc>
-                <a:spcPts val="1238"/>
+                <a:spcPts val="1138"/>
               </a:lnSpc>
               <a:buFont typeface="Arial" panose="020B0604020202020204" pitchFamily="34" charset="0"/>
               <a:buChar char="•"/>
@@ -7937,7 +8325,7 @@
           <a:p>
             <a:pPr marL="171450" indent="-171450" algn="l">
               <a:lnSpc>
-                <a:spcPts val="1238"/>
+                <a:spcPts val="1138"/>
               </a:lnSpc>
               <a:buFont typeface="Arial" panose="020B0604020202020204" pitchFamily="34" charset="0"/>
               <a:buChar char="•"/>
@@ -7954,7 +8342,7 @@
           <a:p>
             <a:pPr marL="171450" indent="-171450" algn="l">
               <a:lnSpc>
-                <a:spcPts val="1238"/>
+                <a:spcPts val="1138"/>
               </a:lnSpc>
               <a:buFont typeface="Arial" panose="020B0604020202020204" pitchFamily="34" charset="0"/>
               <a:buChar char="•"/>
@@ -7987,7 +8375,7 @@
           <a:p>
             <a:pPr marL="171450" indent="-171450" algn="l">
               <a:lnSpc>
-                <a:spcPts val="1238"/>
+                <a:spcPts val="1138"/>
               </a:lnSpc>
               <a:buFont typeface="Arial" panose="020B0604020202020204" pitchFamily="34" charset="0"/>
               <a:buChar char="•"/>
@@ -8004,7 +8392,7 @@
           <a:p>
             <a:pPr marL="171450" indent="-171450" algn="l">
               <a:lnSpc>
-                <a:spcPts val="1238"/>
+                <a:spcPts val="1138"/>
               </a:lnSpc>
               <a:buFont typeface="Arial" panose="020B0604020202020204" pitchFamily="34" charset="0"/>
               <a:buChar char="•"/>
@@ -8034,17 +8422,17 @@
         </p:nvSpPr>
         <p:spPr>
           <a:xfrm>
-            <a:off x="100440" y="5105898"/>
-            <a:ext cx="6657120" cy="1674497"/>
+            <a:off x="100440" y="5038091"/>
+            <a:ext cx="6657120" cy="1536639"/>
           </a:xfrm>
           <a:prstGeom prst="rect">
             <a:avLst/>
           </a:prstGeom>
           <a:noFill/>
-          <a:ln>
+          <a:ln w="6350">
             <a:solidFill>
-              <a:schemeClr val="tx2">
-                <a:lumMod val="50000"/>
+              <a:schemeClr val="bg1">
+                <a:lumMod val="65000"/>
               </a:schemeClr>
             </a:solidFill>
           </a:ln>
@@ -8119,7 +8507,7 @@
           <a:p>
             <a:pPr marL="171450" indent="-171450">
               <a:lnSpc>
-                <a:spcPts val="1238"/>
+                <a:spcPts val="1138"/>
               </a:lnSpc>
               <a:buFont typeface="Arial" panose="020B0604020202020204" pitchFamily="34" charset="0"/>
               <a:buChar char="•"/>
@@ -8158,7 +8546,7 @@
           <a:p>
             <a:pPr marL="171450" indent="-171450">
               <a:lnSpc>
-                <a:spcPts val="1238"/>
+                <a:spcPts val="1138"/>
               </a:lnSpc>
               <a:buFont typeface="Arial" panose="020B0604020202020204" pitchFamily="34" charset="0"/>
               <a:buChar char="•"/>
@@ -8178,7 +8566,7 @@
           <a:p>
             <a:pPr marL="171450" indent="-171450">
               <a:lnSpc>
-                <a:spcPts val="1238"/>
+                <a:spcPts val="1138"/>
               </a:lnSpc>
               <a:buFont typeface="Arial" panose="020B0604020202020204" pitchFamily="34" charset="0"/>
               <a:buChar char="•"/>
@@ -8231,7 +8619,7 @@
           <a:p>
             <a:pPr marL="171450" indent="-171450">
               <a:lnSpc>
-                <a:spcPts val="1238"/>
+                <a:spcPts val="1138"/>
               </a:lnSpc>
               <a:spcAft>
                 <a:spcPts val="125"/>
@@ -8273,7 +8661,7 @@
           <a:p>
             <a:pPr marL="171450" indent="-171450">
               <a:lnSpc>
-                <a:spcPts val="1238"/>
+                <a:spcPts val="1138"/>
               </a:lnSpc>
               <a:spcAft>
                 <a:spcPts val="125"/>
@@ -8335,7 +8723,7 @@
           <a:p>
             <a:pPr marL="171450" indent="-171450">
               <a:lnSpc>
-                <a:spcPts val="1238"/>
+                <a:spcPts val="1138"/>
               </a:lnSpc>
               <a:spcAft>
                 <a:spcPts val="125"/>
@@ -8378,17 +8766,17 @@
         </p:nvSpPr>
         <p:spPr>
           <a:xfrm>
-            <a:off x="100440" y="4044514"/>
-            <a:ext cx="6657120" cy="1033296"/>
+            <a:off x="100440" y="4040787"/>
+            <a:ext cx="6657120" cy="972382"/>
           </a:xfrm>
           <a:prstGeom prst="rect">
             <a:avLst/>
           </a:prstGeom>
           <a:noFill/>
-          <a:ln>
+          <a:ln w="6350">
             <a:solidFill>
-              <a:schemeClr val="tx2">
-                <a:lumMod val="75000"/>
+              <a:schemeClr val="bg1">
+                <a:lumMod val="65000"/>
               </a:schemeClr>
             </a:solidFill>
           </a:ln>
@@ -8471,7 +8859,7 @@
           <a:p>
             <a:pPr marL="171450" indent="-171450">
               <a:lnSpc>
-                <a:spcPts val="1238"/>
+                <a:spcPts val="1138"/>
               </a:lnSpc>
               <a:buFont typeface="Arial" panose="020B0604020202020204" pitchFamily="34" charset="0"/>
               <a:buChar char="•"/>
@@ -8525,7 +8913,7 @@
           <a:p>
             <a:pPr marL="171450" indent="-171450">
               <a:lnSpc>
-                <a:spcPts val="1238"/>
+                <a:spcPts val="1138"/>
               </a:lnSpc>
               <a:buFont typeface="Arial" panose="020B0604020202020204" pitchFamily="34" charset="0"/>
               <a:buChar char="•"/>
@@ -8542,7 +8930,7 @@
           <a:p>
             <a:pPr marL="171450" indent="-171450">
               <a:lnSpc>
-                <a:spcPts val="1238"/>
+                <a:spcPts val="1138"/>
               </a:lnSpc>
               <a:buFont typeface="Arial" panose="020B0604020202020204" pitchFamily="34" charset="0"/>
               <a:buChar char="•"/>
@@ -8581,7 +8969,7 @@
           <a:p>
             <a:pPr marL="171450" indent="-171450">
               <a:lnSpc>
-                <a:spcPts val="1238"/>
+                <a:spcPts val="1138"/>
               </a:lnSpc>
               <a:buFont typeface="Arial" panose="020B0604020202020204" pitchFamily="34" charset="0"/>
               <a:buChar char="•"/>
@@ -8627,17 +9015,17 @@
         </p:nvSpPr>
         <p:spPr>
           <a:xfrm>
-            <a:off x="100440" y="3142898"/>
-            <a:ext cx="6657120" cy="879408"/>
+            <a:off x="100440" y="3184032"/>
+            <a:ext cx="6657120" cy="831318"/>
           </a:xfrm>
           <a:prstGeom prst="rect">
             <a:avLst/>
           </a:prstGeom>
           <a:noFill/>
-          <a:ln>
+          <a:ln w="6350">
             <a:solidFill>
-              <a:schemeClr val="tx2">
-                <a:lumMod val="75000"/>
+              <a:schemeClr val="bg1">
+                <a:lumMod val="65000"/>
               </a:schemeClr>
             </a:solidFill>
           </a:ln>
@@ -8706,7 +9094,7 @@
                   </a:schemeClr>
                 </a:solidFill>
               </a:rPr>
-              <a:t>Contract</a:t>
+              <a:t>Part-time</a:t>
             </a:r>
             <a:endParaRPr lang="en-US" sz="900" dirty="0">
               <a:solidFill>
@@ -8720,7 +9108,7 @@
           <a:p>
             <a:pPr marL="171450" indent="-171450">
               <a:lnSpc>
-                <a:spcPts val="1238"/>
+                <a:spcPts val="1138"/>
               </a:lnSpc>
               <a:buFont typeface="Arial" panose="020B0604020202020204" pitchFamily="34" charset="0"/>
               <a:buChar char="•"/>
@@ -8756,7 +9144,7 @@
           <a:p>
             <a:pPr marL="171450" indent="-171450">
               <a:lnSpc>
-                <a:spcPts val="1238"/>
+                <a:spcPts val="1138"/>
               </a:lnSpc>
               <a:buFont typeface="Arial" panose="020B0604020202020204" pitchFamily="34" charset="0"/>
               <a:buChar char="•"/>
@@ -8864,7 +9252,7 @@
           <a:p>
             <a:pPr marL="171450" indent="-171450">
               <a:lnSpc>
-                <a:spcPts val="1238"/>
+                <a:spcPts val="1138"/>
               </a:lnSpc>
               <a:buFont typeface="Arial" panose="020B0604020202020204" pitchFamily="34" charset="0"/>
               <a:buChar char="•"/>
@@ -8910,17 +9298,17 @@
         </p:nvSpPr>
         <p:spPr>
           <a:xfrm>
-            <a:off x="100440" y="9105774"/>
-            <a:ext cx="6657120" cy="738344"/>
+            <a:off x="100440" y="8730296"/>
+            <a:ext cx="6657120" cy="703078"/>
           </a:xfrm>
           <a:prstGeom prst="rect">
             <a:avLst/>
           </a:prstGeom>
           <a:noFill/>
-          <a:ln>
+          <a:ln w="6350">
             <a:solidFill>
-              <a:schemeClr val="tx2">
-                <a:lumMod val="50000"/>
+              <a:schemeClr val="bg1">
+                <a:lumMod val="65000"/>
               </a:schemeClr>
             </a:solidFill>
           </a:ln>
@@ -8945,7 +9333,7 @@
                   </a:schemeClr>
                 </a:solidFill>
               </a:rPr>
-              <a:t>Sep 2014 – Sep 2016 | Scientist @ ISRO</a:t>
+              <a:t>Sep 2014 – Sep 2016 | Scientist/Engineer @ ISRO</a:t>
             </a:r>
             <a:r>
               <a:rPr lang="en-US" sz="900" dirty="0">
@@ -8973,7 +9361,7 @@
           <a:p>
             <a:pPr marL="171450" indent="-171450">
               <a:lnSpc>
-                <a:spcPts val="1238"/>
+                <a:spcPts val="1138"/>
               </a:lnSpc>
               <a:spcAft>
                 <a:spcPts val="125"/>
@@ -8996,7 +9384,7 @@
           <a:p>
             <a:pPr marL="171450" indent="-171450">
               <a:lnSpc>
-                <a:spcPts val="1238"/>
+                <a:spcPts val="1138"/>
               </a:lnSpc>
               <a:spcAft>
                 <a:spcPts val="125"/>
@@ -9040,17 +9428,17 @@
         </p:nvSpPr>
         <p:spPr>
           <a:xfrm>
-            <a:off x="100440" y="1618273"/>
-            <a:ext cx="6657120" cy="1494961"/>
+            <a:off x="100440" y="1770513"/>
+            <a:ext cx="6657120" cy="1395575"/>
           </a:xfrm>
           <a:prstGeom prst="rect">
             <a:avLst/>
           </a:prstGeom>
           <a:noFill/>
-          <a:ln>
+          <a:ln w="6350">
             <a:solidFill>
-              <a:schemeClr val="tx2">
-                <a:lumMod val="75000"/>
+              <a:schemeClr val="bg1">
+                <a:lumMod val="65000"/>
               </a:schemeClr>
             </a:solidFill>
           </a:ln>
@@ -9119,7 +9507,7 @@
                   </a:schemeClr>
                 </a:solidFill>
               </a:rPr>
-              <a:t>Contract</a:t>
+              <a:t>Part-time</a:t>
             </a:r>
             <a:endParaRPr lang="en-US" sz="900" dirty="0">
               <a:solidFill>
@@ -9133,7 +9521,7 @@
           <a:p>
             <a:pPr marL="171450" indent="-171450">
               <a:lnSpc>
-                <a:spcPts val="1238"/>
+                <a:spcPts val="1138"/>
               </a:lnSpc>
               <a:buFont typeface="Arial" panose="020B0604020202020204" pitchFamily="34" charset="0"/>
               <a:buChar char="•"/>
@@ -9187,7 +9575,7 @@
           <a:p>
             <a:pPr marL="171450" indent="-171450">
               <a:lnSpc>
-                <a:spcPts val="1238"/>
+                <a:spcPts val="1138"/>
               </a:lnSpc>
               <a:buFont typeface="Arial" panose="020B0604020202020204" pitchFamily="34" charset="0"/>
               <a:buChar char="•"/>
@@ -9223,7 +9611,7 @@
           <a:p>
             <a:pPr marL="171450" indent="-171450">
               <a:lnSpc>
-                <a:spcPts val="1238"/>
+                <a:spcPts val="1138"/>
               </a:lnSpc>
               <a:buFont typeface="Arial" panose="020B0604020202020204" pitchFamily="34" charset="0"/>
               <a:buChar char="•"/>
@@ -9241,7 +9629,7 @@
           <a:p>
             <a:pPr marL="171450" indent="-171450">
               <a:lnSpc>
-                <a:spcPts val="1238"/>
+                <a:spcPts val="1138"/>
               </a:lnSpc>
               <a:buFont typeface="Arial" panose="020B0604020202020204" pitchFamily="34" charset="0"/>
               <a:buChar char="•"/>
@@ -9331,7 +9719,7 @@
           <a:p>
             <a:pPr marL="171450" indent="-171450">
               <a:lnSpc>
-                <a:spcPts val="1238"/>
+                <a:spcPts val="1138"/>
               </a:lnSpc>
               <a:buFont typeface="Arial" panose="020B0604020202020204" pitchFamily="34" charset="0"/>
               <a:buChar char="•"/>
@@ -9362,17 +9750,17 @@
         </p:nvSpPr>
         <p:spPr>
           <a:xfrm>
-            <a:off x="88190" y="48480"/>
-            <a:ext cx="6657120" cy="1546257"/>
+            <a:off x="96736" y="303271"/>
+            <a:ext cx="6657120" cy="1446871"/>
           </a:xfrm>
           <a:prstGeom prst="rect">
             <a:avLst/>
           </a:prstGeom>
           <a:noFill/>
-          <a:ln>
+          <a:ln w="6350">
             <a:solidFill>
-              <a:schemeClr val="tx2">
-                <a:lumMod val="75000"/>
+              <a:schemeClr val="bg1">
+                <a:lumMod val="65000"/>
               </a:schemeClr>
             </a:solidFill>
           </a:ln>
@@ -9447,7 +9835,7 @@
           <a:p>
             <a:pPr marL="171450" indent="-171450">
               <a:lnSpc>
-                <a:spcPts val="1238"/>
+                <a:spcPts val="1138"/>
               </a:lnSpc>
               <a:spcAft>
                 <a:spcPts val="125"/>
@@ -9576,7 +9964,7 @@
           <a:p>
             <a:pPr marL="171450" indent="-171450">
               <a:lnSpc>
-                <a:spcPts val="1238"/>
+                <a:spcPts val="1138"/>
               </a:lnSpc>
               <a:spcAft>
                 <a:spcPts val="125"/>
@@ -9643,7 +10031,7 @@
           <a:p>
             <a:pPr marL="171450" indent="-171450">
               <a:lnSpc>
-                <a:spcPts val="1238"/>
+                <a:spcPts val="1138"/>
               </a:lnSpc>
               <a:spcAft>
                 <a:spcPts val="125"/>
@@ -9732,7 +10120,7 @@
           <a:p>
             <a:pPr marL="171450" indent="-171450">
               <a:lnSpc>
-                <a:spcPts val="1238"/>
+                <a:spcPts val="1138"/>
               </a:lnSpc>
               <a:spcAft>
                 <a:spcPts val="125"/>
@@ -9781,7 +10169,7 @@
           <a:p>
             <a:pPr marL="171450" indent="-171450">
               <a:lnSpc>
-                <a:spcPts val="1238"/>
+                <a:spcPts val="1138"/>
               </a:lnSpc>
               <a:spcAft>
                 <a:spcPts val="125"/>

</xml_diff>